<commit_message>
[Update] Finish backend slides
</commit_message>
<xml_diff>
--- a/02_Documentacion/Presentacion_Wewiza.pptx
+++ b/02_Documentacion/Presentacion_Wewiza.pptx
@@ -15,12 +15,13 @@
     <p:sldId id="259" r:id="rId9"/>
     <p:sldId id="256" r:id="rId10"/>
     <p:sldId id="270" r:id="rId11"/>
-    <p:sldId id="273" r:id="rId12"/>
-    <p:sldId id="261" r:id="rId13"/>
-    <p:sldId id="263" r:id="rId14"/>
-    <p:sldId id="266" r:id="rId15"/>
-    <p:sldId id="267" r:id="rId16"/>
-    <p:sldId id="275" r:id="rId17"/>
+    <p:sldId id="276" r:id="rId12"/>
+    <p:sldId id="273" r:id="rId13"/>
+    <p:sldId id="261" r:id="rId14"/>
+    <p:sldId id="263" r:id="rId15"/>
+    <p:sldId id="266" r:id="rId16"/>
+    <p:sldId id="267" r:id="rId17"/>
+    <p:sldId id="275" r:id="rId18"/>
   </p:sldIdLst>
   <p:sldSz cx="12192000" cy="6858000"/>
   <p:notesSz cx="6858000" cy="9144000"/>
@@ -3522,8 +3523,8 @@
         </p:nvSpPr>
         <p:spPr>
           <a:xfrm>
-            <a:off x="1557952" y="25355"/>
-            <a:ext cx="8857064" cy="784830"/>
+            <a:off x="827773" y="25355"/>
+            <a:ext cx="10679095" cy="784830"/>
           </a:xfrm>
           <a:prstGeom prst="rect">
             <a:avLst/>
@@ -3543,7 +3544,7 @@
                   <a:schemeClr val="tx2"/>
                 </a:solidFill>
               </a:rPr>
-              <a:t>Especialidad del servidor</a:t>
+              <a:t>Mensualidad del servidor (No automatizado)</a:t>
             </a:r>
           </a:p>
         </p:txBody>
@@ -3623,8 +3624,8 @@
           <a:p>
             <a:pPr algn="ctr"/>
             <a:r>
-              <a:rPr lang="es-ES" sz="4000" dirty="0"/>
-              <a:t>1. Scraping mensual</a:t>
+              <a:rPr lang="es-ES" sz="4000" b="1" u="sng" dirty="0"/>
+              <a:t>Scraping mensual</a:t>
             </a:r>
           </a:p>
         </p:txBody>
@@ -3643,8 +3644,8 @@
         </p:nvSpPr>
         <p:spPr>
           <a:xfrm>
-            <a:off x="6365885" y="1076721"/>
-            <a:ext cx="5260824" cy="707886"/>
+            <a:off x="6096000" y="1076721"/>
+            <a:ext cx="6096000" cy="707886"/>
           </a:xfrm>
           <a:prstGeom prst="rect">
             <a:avLst/>
@@ -3659,9 +3660,14 @@
           <a:p>
             <a:pPr algn="ctr"/>
             <a:r>
-              <a:rPr lang="es-ES" sz="4000" dirty="0"/>
-              <a:t>2. Cálculo de destacados </a:t>
-            </a:r>
+              <a:rPr lang="es-ES" sz="4000" b="1" u="sng" dirty="0"/>
+              <a:t>Reinicio de </a:t>
+            </a:r>
+            <a:r>
+              <a:rPr lang="es-ES" sz="4000" b="1" u="sng" dirty="0" err="1"/>
+              <a:t>likes</a:t>
+            </a:r>
+            <a:endParaRPr lang="es-ES" sz="4000" b="1" u="sng" dirty="0"/>
           </a:p>
         </p:txBody>
       </p:sp>
@@ -3679,87 +3685,8 @@
         </p:nvSpPr>
         <p:spPr>
           <a:xfrm>
-            <a:off x="1044864" y="1821156"/>
-            <a:ext cx="1072730" cy="369332"/>
-          </a:xfrm>
-          <a:prstGeom prst="rect">
-            <a:avLst/>
-          </a:prstGeom>
-          <a:noFill/>
-        </p:spPr>
-        <p:txBody>
-          <a:bodyPr wrap="none" rtlCol="0">
-            <a:spAutoFit/>
-          </a:bodyPr>
-          <a:lstStyle/>
-          <a:p>
-            <a:r>
-              <a:rPr lang="es-ES" dirty="0">
-                <a:highlight>
-                  <a:srgbClr val="FF0000"/>
-                </a:highlight>
-              </a:rPr>
-              <a:t>EXPLICAR</a:t>
-            </a:r>
-          </a:p>
-        </p:txBody>
-      </p:sp>
-      <p:sp>
-        <p:nvSpPr>
-          <p:cNvPr id="13" name="CuadroTexto 12">
-            <a:extLst>
-              <a:ext uri="{FF2B5EF4-FFF2-40B4-BE49-F238E27FC236}">
-                <a16:creationId xmlns:a16="http://schemas.microsoft.com/office/drawing/2014/main" id="{DCC59995-9044-0C86-E8B2-6574CC687B23}"/>
-              </a:ext>
-            </a:extLst>
-          </p:cNvPr>
-          <p:cNvSpPr txBox="1"/>
-          <p:nvPr/>
-        </p:nvSpPr>
-        <p:spPr>
-          <a:xfrm>
-            <a:off x="6124882" y="1821156"/>
-            <a:ext cx="1072730" cy="369332"/>
-          </a:xfrm>
-          <a:prstGeom prst="rect">
-            <a:avLst/>
-          </a:prstGeom>
-          <a:noFill/>
-        </p:spPr>
-        <p:txBody>
-          <a:bodyPr wrap="none" rtlCol="0">
-            <a:spAutoFit/>
-          </a:bodyPr>
-          <a:lstStyle/>
-          <a:p>
-            <a:r>
-              <a:rPr lang="es-ES" dirty="0">
-                <a:highlight>
-                  <a:srgbClr val="FF0000"/>
-                </a:highlight>
-              </a:rPr>
-              <a:t>EXPLICAR</a:t>
-            </a:r>
-            <a:endParaRPr lang="es-ES" dirty="0"/>
-          </a:p>
-        </p:txBody>
-      </p:sp>
-      <p:sp>
-        <p:nvSpPr>
-          <p:cNvPr id="14" name="CuadroTexto 13">
-            <a:extLst>
-              <a:ext uri="{FF2B5EF4-FFF2-40B4-BE49-F238E27FC236}">
-                <a16:creationId xmlns:a16="http://schemas.microsoft.com/office/drawing/2014/main" id="{9AA575F1-6B65-B80E-8E03-4BF5E48902B5}"/>
-              </a:ext>
-            </a:extLst>
-          </p:cNvPr>
-          <p:cNvSpPr txBox="1"/>
-          <p:nvPr/>
-        </p:nvSpPr>
-        <p:spPr>
-          <a:xfrm>
-            <a:off x="0" y="3959627"/>
-            <a:ext cx="6096000" cy="707886"/>
+            <a:off x="848070" y="1776237"/>
+            <a:ext cx="4514249" cy="430887"/>
           </a:xfrm>
           <a:prstGeom prst="rect">
             <a:avLst/>
@@ -3772,135 +3699,26 @@
           </a:bodyPr>
           <a:lstStyle/>
           <a:p>
-            <a:pPr algn="ctr"/>
-            <a:r>
-              <a:rPr lang="es-ES" sz="4000" dirty="0"/>
-              <a:t>3. Reinicio de “</a:t>
-            </a:r>
-            <a:r>
-              <a:rPr lang="es-ES" sz="4000" dirty="0" err="1"/>
-              <a:t>likes</a:t>
-            </a:r>
-            <a:r>
-              <a:rPr lang="es-ES" sz="4000" dirty="0"/>
-              <a:t>”</a:t>
-            </a:r>
-          </a:p>
-        </p:txBody>
-      </p:sp>
-      <p:sp>
-        <p:nvSpPr>
-          <p:cNvPr id="15" name="CuadroTexto 14">
-            <a:extLst>
-              <a:ext uri="{FF2B5EF4-FFF2-40B4-BE49-F238E27FC236}">
-                <a16:creationId xmlns:a16="http://schemas.microsoft.com/office/drawing/2014/main" id="{C75784EB-CABB-58D4-D673-5C9D97754213}"/>
-              </a:ext>
-            </a:extLst>
-          </p:cNvPr>
-          <p:cNvSpPr txBox="1"/>
-          <p:nvPr/>
-        </p:nvSpPr>
-        <p:spPr>
-          <a:xfrm>
-            <a:off x="1044864" y="4675797"/>
-            <a:ext cx="1072730" cy="369332"/>
-          </a:xfrm>
-          <a:prstGeom prst="rect">
-            <a:avLst/>
-          </a:prstGeom>
-          <a:noFill/>
-        </p:spPr>
-        <p:txBody>
-          <a:bodyPr wrap="none" rtlCol="0">
-            <a:spAutoFit/>
-          </a:bodyPr>
-          <a:lstStyle/>
-          <a:p>
-            <a:r>
-              <a:rPr lang="es-ES" dirty="0">
-                <a:highlight>
-                  <a:srgbClr val="FF0000"/>
-                </a:highlight>
-              </a:rPr>
-              <a:t>EXPLICAR</a:t>
-            </a:r>
-            <a:endParaRPr lang="es-ES" dirty="0"/>
-          </a:p>
-        </p:txBody>
-      </p:sp>
-      <p:sp>
-        <p:nvSpPr>
-          <p:cNvPr id="16" name="CuadroTexto 15">
-            <a:extLst>
-              <a:ext uri="{FF2B5EF4-FFF2-40B4-BE49-F238E27FC236}">
-                <a16:creationId xmlns:a16="http://schemas.microsoft.com/office/drawing/2014/main" id="{06EBBA0F-9EF7-E8FE-0FCC-BA12822DF2D5}"/>
-              </a:ext>
-            </a:extLst>
-          </p:cNvPr>
-          <p:cNvSpPr txBox="1"/>
-          <p:nvPr/>
-        </p:nvSpPr>
-        <p:spPr>
-          <a:xfrm>
-            <a:off x="6365885" y="3832627"/>
-            <a:ext cx="5826115" cy="1323439"/>
-          </a:xfrm>
-          <a:prstGeom prst="rect">
-            <a:avLst/>
-          </a:prstGeom>
-          <a:noFill/>
-        </p:spPr>
-        <p:txBody>
-          <a:bodyPr wrap="square" rtlCol="0">
-            <a:spAutoFit/>
-          </a:bodyPr>
-          <a:lstStyle/>
-          <a:p>
-            <a:pPr algn="ctr"/>
-            <a:r>
-              <a:rPr lang="es-ES" sz="4000" dirty="0"/>
-              <a:t>3. Lematización para sugerencias</a:t>
-            </a:r>
-          </a:p>
-        </p:txBody>
-      </p:sp>
-      <p:sp>
-        <p:nvSpPr>
-          <p:cNvPr id="17" name="CuadroTexto 16">
-            <a:extLst>
-              <a:ext uri="{FF2B5EF4-FFF2-40B4-BE49-F238E27FC236}">
-                <a16:creationId xmlns:a16="http://schemas.microsoft.com/office/drawing/2014/main" id="{4705C52B-9149-C088-2BC3-541984AE5FF1}"/>
-              </a:ext>
-            </a:extLst>
-          </p:cNvPr>
-          <p:cNvSpPr txBox="1"/>
-          <p:nvPr/>
-        </p:nvSpPr>
-        <p:spPr>
-          <a:xfrm>
-            <a:off x="6549036" y="5185767"/>
-            <a:ext cx="1072730" cy="369332"/>
-          </a:xfrm>
-          <a:prstGeom prst="rect">
-            <a:avLst/>
-          </a:prstGeom>
-          <a:noFill/>
-        </p:spPr>
-        <p:txBody>
-          <a:bodyPr wrap="none" rtlCol="0">
-            <a:spAutoFit/>
-          </a:bodyPr>
-          <a:lstStyle/>
-          <a:p>
-            <a:r>
-              <a:rPr lang="es-ES" dirty="0">
-                <a:highlight>
-                  <a:srgbClr val="FF0000"/>
-                </a:highlight>
-              </a:rPr>
-              <a:t>EXPLICAR</a:t>
-            </a:r>
-            <a:endParaRPr lang="es-ES" dirty="0"/>
+            <a:r>
+              <a:rPr lang="es-ES" sz="2200" dirty="0"/>
+              <a:t> De forma </a:t>
+            </a:r>
+            <a:r>
+              <a:rPr lang="es-ES" sz="2200" b="1" dirty="0"/>
+              <a:t>manual</a:t>
+            </a:r>
+            <a:r>
+              <a:rPr lang="es-ES" sz="2200" dirty="0"/>
+              <a:t> y </a:t>
+            </a:r>
+            <a:r>
+              <a:rPr lang="es-ES" sz="2200" b="1" dirty="0"/>
+              <a:t>mensual </a:t>
+            </a:r>
+            <a:r>
+              <a:rPr lang="es-ES" sz="2200" dirty="0"/>
+              <a:t>(script):</a:t>
+            </a:r>
           </a:p>
         </p:txBody>
       </p:sp>
@@ -3937,6 +3755,772 @@
           <a:xfrm>
             <a:off x="11506869" y="82334"/>
             <a:ext cx="531934" cy="670872"/>
+          </a:xfrm>
+          <a:prstGeom prst="rect">
+            <a:avLst/>
+          </a:prstGeom>
+        </p:spPr>
+      </p:pic>
+      <p:pic>
+        <p:nvPicPr>
+          <p:cNvPr id="1026" name="Picture 2" descr="Análisis del logo de Windows - FOROALFA">
+            <a:extLst>
+              <a:ext uri="{FF2B5EF4-FFF2-40B4-BE49-F238E27FC236}">
+                <a16:creationId xmlns:a16="http://schemas.microsoft.com/office/drawing/2014/main" id="{805DB304-E381-8F9F-23FC-C96F9F953BE0}"/>
+              </a:ext>
+            </a:extLst>
+          </p:cNvPr>
+          <p:cNvPicPr>
+            <a:picLocks noChangeAspect="1" noChangeArrowheads="1"/>
+          </p:cNvPicPr>
+          <p:nvPr/>
+        </p:nvPicPr>
+        <p:blipFill>
+          <a:blip r:embed="rId4">
+            <a:extLst>
+              <a:ext uri="{28A0092B-C50C-407E-A947-70E740481C1C}">
+                <a14:useLocalDpi xmlns:a14="http://schemas.microsoft.com/office/drawing/2010/main" val="0"/>
+              </a:ext>
+            </a:extLst>
+          </a:blip>
+          <a:srcRect/>
+          <a:stretch>
+            <a:fillRect/>
+          </a:stretch>
+        </p:blipFill>
+        <p:spPr bwMode="auto">
+          <a:xfrm>
+            <a:off x="3877914" y="2213399"/>
+            <a:ext cx="1129473" cy="1129473"/>
+          </a:xfrm>
+          <a:prstGeom prst="rect">
+            <a:avLst/>
+          </a:prstGeom>
+          <a:noFill/>
+          <a:extLst>
+            <a:ext uri="{909E8E84-426E-40DD-AFC4-6F175D3DCCD1}">
+              <a14:hiddenFill xmlns:a14="http://schemas.microsoft.com/office/drawing/2010/main">
+                <a:solidFill>
+                  <a:srgbClr val="FFFFFF"/>
+                </a:solidFill>
+              </a14:hiddenFill>
+            </a:ext>
+          </a:extLst>
+        </p:spPr>
+      </p:pic>
+      <p:pic>
+        <p:nvPicPr>
+          <p:cNvPr id="1028" name="Picture 4" descr="Spidering websites with Headless Chrome and Selenium">
+            <a:extLst>
+              <a:ext uri="{FF2B5EF4-FFF2-40B4-BE49-F238E27FC236}">
+                <a16:creationId xmlns:a16="http://schemas.microsoft.com/office/drawing/2014/main" id="{FB11AF68-5FB0-69CE-D448-3038F6C9E66A}"/>
+              </a:ext>
+            </a:extLst>
+          </p:cNvPr>
+          <p:cNvPicPr>
+            <a:picLocks noChangeAspect="1" noChangeArrowheads="1"/>
+          </p:cNvPicPr>
+          <p:nvPr/>
+        </p:nvPicPr>
+        <p:blipFill>
+          <a:blip r:embed="rId5">
+            <a:extLst>
+              <a:ext uri="{28A0092B-C50C-407E-A947-70E740481C1C}">
+                <a14:useLocalDpi xmlns:a14="http://schemas.microsoft.com/office/drawing/2010/main" val="0"/>
+              </a:ext>
+            </a:extLst>
+          </a:blip>
+          <a:srcRect/>
+          <a:stretch>
+            <a:fillRect/>
+          </a:stretch>
+        </p:blipFill>
+        <p:spPr bwMode="auto">
+          <a:xfrm>
+            <a:off x="3984848" y="3488229"/>
+            <a:ext cx="964234" cy="703928"/>
+          </a:xfrm>
+          <a:prstGeom prst="rect">
+            <a:avLst/>
+          </a:prstGeom>
+          <a:noFill/>
+          <a:extLst>
+            <a:ext uri="{909E8E84-426E-40DD-AFC4-6F175D3DCCD1}">
+              <a14:hiddenFill xmlns:a14="http://schemas.microsoft.com/office/drawing/2010/main">
+                <a:solidFill>
+                  <a:srgbClr val="FFFFFF"/>
+                </a:solidFill>
+              </a14:hiddenFill>
+            </a:ext>
+          </a:extLst>
+        </p:spPr>
+      </p:pic>
+      <p:pic>
+        <p:nvPicPr>
+          <p:cNvPr id="1030" name="Picture 6" descr="Selenium (software) - Wikiversity">
+            <a:extLst>
+              <a:ext uri="{FF2B5EF4-FFF2-40B4-BE49-F238E27FC236}">
+                <a16:creationId xmlns:a16="http://schemas.microsoft.com/office/drawing/2014/main" id="{EE35F26C-0C85-606F-E9AA-5763BC66A813}"/>
+              </a:ext>
+            </a:extLst>
+          </p:cNvPr>
+          <p:cNvPicPr>
+            <a:picLocks noChangeAspect="1" noChangeArrowheads="1"/>
+          </p:cNvPicPr>
+          <p:nvPr/>
+        </p:nvPicPr>
+        <p:blipFill>
+          <a:blip r:embed="rId6">
+            <a:extLst>
+              <a:ext uri="{28A0092B-C50C-407E-A947-70E740481C1C}">
+                <a14:useLocalDpi xmlns:a14="http://schemas.microsoft.com/office/drawing/2010/main" val="0"/>
+              </a:ext>
+            </a:extLst>
+          </a:blip>
+          <a:srcRect/>
+          <a:stretch>
+            <a:fillRect/>
+          </a:stretch>
+        </p:blipFill>
+        <p:spPr bwMode="auto">
+          <a:xfrm>
+            <a:off x="4109800" y="4567864"/>
+            <a:ext cx="740817" cy="774490"/>
+          </a:xfrm>
+          <a:prstGeom prst="rect">
+            <a:avLst/>
+          </a:prstGeom>
+          <a:noFill/>
+          <a:extLst>
+            <a:ext uri="{909E8E84-426E-40DD-AFC4-6F175D3DCCD1}">
+              <a14:hiddenFill xmlns:a14="http://schemas.microsoft.com/office/drawing/2010/main">
+                <a:solidFill>
+                  <a:srgbClr val="FFFFFF"/>
+                </a:solidFill>
+              </a14:hiddenFill>
+            </a:ext>
+          </a:extLst>
+        </p:spPr>
+      </p:pic>
+      <p:sp>
+        <p:nvSpPr>
+          <p:cNvPr id="8" name="CuadroTexto 7">
+            <a:extLst>
+              <a:ext uri="{FF2B5EF4-FFF2-40B4-BE49-F238E27FC236}">
+                <a16:creationId xmlns:a16="http://schemas.microsoft.com/office/drawing/2014/main" id="{24726C8A-C689-6DBD-C832-872A8F2434DD}"/>
+              </a:ext>
+            </a:extLst>
+          </p:cNvPr>
+          <p:cNvSpPr txBox="1"/>
+          <p:nvPr/>
+        </p:nvSpPr>
+        <p:spPr>
+          <a:xfrm>
+            <a:off x="1243508" y="2545678"/>
+            <a:ext cx="2037024" cy="369332"/>
+          </a:xfrm>
+          <a:prstGeom prst="rect">
+            <a:avLst/>
+          </a:prstGeom>
+          <a:noFill/>
+        </p:spPr>
+        <p:txBody>
+          <a:bodyPr wrap="square">
+            <a:spAutoFit/>
+          </a:bodyPr>
+          <a:lstStyle/>
+          <a:p>
+            <a:r>
+              <a:rPr lang="es-ES" sz="1800" b="1" u="sng" dirty="0"/>
+              <a:t>S</a:t>
+            </a:r>
+            <a:r>
+              <a:rPr lang="es-ES" b="1" u="sng" dirty="0"/>
+              <a:t>istema Operativo</a:t>
+            </a:r>
+          </a:p>
+        </p:txBody>
+      </p:sp>
+      <p:sp>
+        <p:nvSpPr>
+          <p:cNvPr id="9" name="Flecha: a la derecha 8">
+            <a:extLst>
+              <a:ext uri="{FF2B5EF4-FFF2-40B4-BE49-F238E27FC236}">
+                <a16:creationId xmlns:a16="http://schemas.microsoft.com/office/drawing/2014/main" id="{A534CD25-B66B-E10F-3D9D-E2F454F6621D}"/>
+              </a:ext>
+            </a:extLst>
+          </p:cNvPr>
+          <p:cNvSpPr/>
+          <p:nvPr/>
+        </p:nvSpPr>
+        <p:spPr>
+          <a:xfrm>
+            <a:off x="3280532" y="2593470"/>
+            <a:ext cx="491066" cy="308090"/>
+          </a:xfrm>
+          <a:prstGeom prst="rightArrow">
+            <a:avLst/>
+          </a:prstGeom>
+        </p:spPr>
+        <p:style>
+          <a:lnRef idx="2">
+            <a:schemeClr val="accent1">
+              <a:shade val="15000"/>
+            </a:schemeClr>
+          </a:lnRef>
+          <a:fillRef idx="1">
+            <a:schemeClr val="accent1"/>
+          </a:fillRef>
+          <a:effectRef idx="0">
+            <a:schemeClr val="accent1"/>
+          </a:effectRef>
+          <a:fontRef idx="minor">
+            <a:schemeClr val="lt1"/>
+          </a:fontRef>
+        </p:style>
+        <p:txBody>
+          <a:bodyPr rtlCol="0" anchor="ctr"/>
+          <a:lstStyle/>
+          <a:p>
+            <a:pPr algn="ctr"/>
+            <a:endParaRPr lang="es-ES"/>
+          </a:p>
+        </p:txBody>
+      </p:sp>
+      <p:sp>
+        <p:nvSpPr>
+          <p:cNvPr id="10" name="CuadroTexto 9">
+            <a:extLst>
+              <a:ext uri="{FF2B5EF4-FFF2-40B4-BE49-F238E27FC236}">
+                <a16:creationId xmlns:a16="http://schemas.microsoft.com/office/drawing/2014/main" id="{3EE804F1-AC8D-CC4C-8DB6-43DAAD731860}"/>
+              </a:ext>
+            </a:extLst>
+          </p:cNvPr>
+          <p:cNvSpPr txBox="1"/>
+          <p:nvPr/>
+        </p:nvSpPr>
+        <p:spPr>
+          <a:xfrm>
+            <a:off x="1234544" y="3667464"/>
+            <a:ext cx="1861689" cy="369332"/>
+          </a:xfrm>
+          <a:prstGeom prst="rect">
+            <a:avLst/>
+          </a:prstGeom>
+          <a:noFill/>
+        </p:spPr>
+        <p:txBody>
+          <a:bodyPr wrap="square">
+            <a:spAutoFit/>
+          </a:bodyPr>
+          <a:lstStyle/>
+          <a:p>
+            <a:r>
+              <a:rPr lang="es-ES" sz="1800" b="1" u="sng" dirty="0"/>
+              <a:t>Navegador Web</a:t>
+            </a:r>
+            <a:endParaRPr lang="es-ES" b="1" u="sng" dirty="0"/>
+          </a:p>
+        </p:txBody>
+      </p:sp>
+      <p:sp>
+        <p:nvSpPr>
+          <p:cNvPr id="19" name="Flecha: a la derecha 18">
+            <a:extLst>
+              <a:ext uri="{FF2B5EF4-FFF2-40B4-BE49-F238E27FC236}">
+                <a16:creationId xmlns:a16="http://schemas.microsoft.com/office/drawing/2014/main" id="{F311971E-C778-1350-A6D6-5D734BE61CE3}"/>
+              </a:ext>
+            </a:extLst>
+          </p:cNvPr>
+          <p:cNvSpPr/>
+          <p:nvPr/>
+        </p:nvSpPr>
+        <p:spPr>
+          <a:xfrm>
+            <a:off x="3280532" y="3709239"/>
+            <a:ext cx="491066" cy="308090"/>
+          </a:xfrm>
+          <a:prstGeom prst="rightArrow">
+            <a:avLst/>
+          </a:prstGeom>
+        </p:spPr>
+        <p:style>
+          <a:lnRef idx="2">
+            <a:schemeClr val="accent1">
+              <a:shade val="15000"/>
+            </a:schemeClr>
+          </a:lnRef>
+          <a:fillRef idx="1">
+            <a:schemeClr val="accent1"/>
+          </a:fillRef>
+          <a:effectRef idx="0">
+            <a:schemeClr val="accent1"/>
+          </a:effectRef>
+          <a:fontRef idx="minor">
+            <a:schemeClr val="lt1"/>
+          </a:fontRef>
+        </p:style>
+        <p:txBody>
+          <a:bodyPr rtlCol="0" anchor="ctr"/>
+          <a:lstStyle/>
+          <a:p>
+            <a:pPr algn="ctr"/>
+            <a:endParaRPr lang="es-ES"/>
+          </a:p>
+        </p:txBody>
+      </p:sp>
+      <p:sp>
+        <p:nvSpPr>
+          <p:cNvPr id="20" name="CuadroTexto 19">
+            <a:extLst>
+              <a:ext uri="{FF2B5EF4-FFF2-40B4-BE49-F238E27FC236}">
+                <a16:creationId xmlns:a16="http://schemas.microsoft.com/office/drawing/2014/main" id="{08977346-A6C4-B353-DE14-22A7F0D41870}"/>
+              </a:ext>
+            </a:extLst>
+          </p:cNvPr>
+          <p:cNvSpPr txBox="1"/>
+          <p:nvPr/>
+        </p:nvSpPr>
+        <p:spPr>
+          <a:xfrm>
+            <a:off x="1231921" y="4779945"/>
+            <a:ext cx="1861689" cy="369332"/>
+          </a:xfrm>
+          <a:prstGeom prst="rect">
+            <a:avLst/>
+          </a:prstGeom>
+          <a:noFill/>
+        </p:spPr>
+        <p:txBody>
+          <a:bodyPr wrap="square">
+            <a:spAutoFit/>
+          </a:bodyPr>
+          <a:lstStyle/>
+          <a:p>
+            <a:r>
+              <a:rPr lang="es-ES" b="1" u="sng" dirty="0"/>
+              <a:t>Automación Web</a:t>
+            </a:r>
+          </a:p>
+        </p:txBody>
+      </p:sp>
+      <p:sp>
+        <p:nvSpPr>
+          <p:cNvPr id="21" name="Flecha: a la derecha 20">
+            <a:extLst>
+              <a:ext uri="{FF2B5EF4-FFF2-40B4-BE49-F238E27FC236}">
+                <a16:creationId xmlns:a16="http://schemas.microsoft.com/office/drawing/2014/main" id="{C6351293-5998-0F92-3AD9-AC5DD736CEA1}"/>
+              </a:ext>
+            </a:extLst>
+          </p:cNvPr>
+          <p:cNvSpPr/>
+          <p:nvPr/>
+        </p:nvSpPr>
+        <p:spPr>
+          <a:xfrm>
+            <a:off x="3280532" y="4841187"/>
+            <a:ext cx="491066" cy="308090"/>
+          </a:xfrm>
+          <a:prstGeom prst="rightArrow">
+            <a:avLst/>
+          </a:prstGeom>
+        </p:spPr>
+        <p:style>
+          <a:lnRef idx="2">
+            <a:schemeClr val="accent1">
+              <a:shade val="15000"/>
+            </a:schemeClr>
+          </a:lnRef>
+          <a:fillRef idx="1">
+            <a:schemeClr val="accent1"/>
+          </a:fillRef>
+          <a:effectRef idx="0">
+            <a:schemeClr val="accent1"/>
+          </a:effectRef>
+          <a:fontRef idx="minor">
+            <a:schemeClr val="lt1"/>
+          </a:fontRef>
+        </p:style>
+        <p:txBody>
+          <a:bodyPr rtlCol="0" anchor="ctr"/>
+          <a:lstStyle/>
+          <a:p>
+            <a:pPr algn="ctr"/>
+            <a:endParaRPr lang="es-ES"/>
+          </a:p>
+        </p:txBody>
+      </p:sp>
+      <p:sp>
+        <p:nvSpPr>
+          <p:cNvPr id="22" name="CuadroTexto 21">
+            <a:extLst>
+              <a:ext uri="{FF2B5EF4-FFF2-40B4-BE49-F238E27FC236}">
+                <a16:creationId xmlns:a16="http://schemas.microsoft.com/office/drawing/2014/main" id="{E4F6FD6D-F0EF-FEF3-FA1A-602172840960}"/>
+              </a:ext>
+            </a:extLst>
+          </p:cNvPr>
+          <p:cNvSpPr txBox="1"/>
+          <p:nvPr/>
+        </p:nvSpPr>
+        <p:spPr>
+          <a:xfrm>
+            <a:off x="6152474" y="1776237"/>
+            <a:ext cx="5913630" cy="430887"/>
+          </a:xfrm>
+          <a:prstGeom prst="rect">
+            <a:avLst/>
+          </a:prstGeom>
+          <a:noFill/>
+        </p:spPr>
+        <p:txBody>
+          <a:bodyPr wrap="square" rtlCol="0">
+            <a:spAutoFit/>
+          </a:bodyPr>
+          <a:lstStyle/>
+          <a:p>
+            <a:r>
+              <a:rPr lang="es-ES" sz="2200" dirty="0"/>
+              <a:t> De forma </a:t>
+            </a:r>
+            <a:r>
+              <a:rPr lang="es-ES" sz="2200" b="1" dirty="0"/>
+              <a:t>manual</a:t>
+            </a:r>
+            <a:r>
+              <a:rPr lang="es-ES" sz="2200" dirty="0"/>
+              <a:t> y </a:t>
+            </a:r>
+            <a:r>
+              <a:rPr lang="es-ES" sz="2200" b="1" dirty="0"/>
+              <a:t>mensual</a:t>
+            </a:r>
+            <a:r>
+              <a:rPr lang="es-ES" sz="2200" dirty="0"/>
+              <a:t> mediante </a:t>
+            </a:r>
+            <a:r>
+              <a:rPr lang="es-ES" sz="2200" b="1" dirty="0" err="1"/>
+              <a:t>endpoint</a:t>
+            </a:r>
+            <a:r>
+              <a:rPr lang="es-ES" sz="2200" dirty="0"/>
+              <a:t>:</a:t>
+            </a:r>
+          </a:p>
+        </p:txBody>
+      </p:sp>
+      <p:pic>
+        <p:nvPicPr>
+          <p:cNvPr id="24" name="Imagen 23">
+            <a:extLst>
+              <a:ext uri="{FF2B5EF4-FFF2-40B4-BE49-F238E27FC236}">
+                <a16:creationId xmlns:a16="http://schemas.microsoft.com/office/drawing/2014/main" id="{36BAD904-5F16-0DC6-2D03-E6F1A30867A7}"/>
+              </a:ext>
+            </a:extLst>
+          </p:cNvPr>
+          <p:cNvPicPr>
+            <a:picLocks noChangeAspect="1"/>
+          </p:cNvPicPr>
+          <p:nvPr/>
+        </p:nvPicPr>
+        <p:blipFill>
+          <a:blip r:embed="rId7"/>
+          <a:stretch>
+            <a:fillRect/>
+          </a:stretch>
+        </p:blipFill>
+        <p:spPr>
+          <a:xfrm>
+            <a:off x="6658110" y="2354475"/>
+            <a:ext cx="4940554" cy="381020"/>
+          </a:xfrm>
+          <a:prstGeom prst="rect">
+            <a:avLst/>
+          </a:prstGeom>
+        </p:spPr>
+      </p:pic>
+      <p:pic>
+        <p:nvPicPr>
+          <p:cNvPr id="1032" name="Picture 8" descr="UUID+ | WebWolf Studios">
+            <a:extLst>
+              <a:ext uri="{FF2B5EF4-FFF2-40B4-BE49-F238E27FC236}">
+                <a16:creationId xmlns:a16="http://schemas.microsoft.com/office/drawing/2014/main" id="{C4337A62-3B7E-ADAF-A38E-DF419BD5A97B}"/>
+              </a:ext>
+            </a:extLst>
+          </p:cNvPr>
+          <p:cNvPicPr>
+            <a:picLocks noChangeAspect="1" noChangeArrowheads="1"/>
+          </p:cNvPicPr>
+          <p:nvPr/>
+        </p:nvPicPr>
+        <p:blipFill>
+          <a:blip r:embed="rId8">
+            <a:extLst>
+              <a:ext uri="{28A0092B-C50C-407E-A947-70E740481C1C}">
+                <a14:useLocalDpi xmlns:a14="http://schemas.microsoft.com/office/drawing/2010/main" val="0"/>
+              </a:ext>
+            </a:extLst>
+          </a:blip>
+          <a:srcRect/>
+          <a:stretch>
+            <a:fillRect/>
+          </a:stretch>
+        </p:blipFill>
+        <p:spPr bwMode="auto">
+          <a:xfrm>
+            <a:off x="7184615" y="3509867"/>
+            <a:ext cx="1376362" cy="1376362"/>
+          </a:xfrm>
+          <a:prstGeom prst="rect">
+            <a:avLst/>
+          </a:prstGeom>
+          <a:noFill/>
+          <a:extLst>
+            <a:ext uri="{909E8E84-426E-40DD-AFC4-6F175D3DCCD1}">
+              <a14:hiddenFill xmlns:a14="http://schemas.microsoft.com/office/drawing/2010/main">
+                <a:solidFill>
+                  <a:srgbClr val="FFFFFF"/>
+                </a:solidFill>
+              </a14:hiddenFill>
+            </a:ext>
+          </a:extLst>
+        </p:spPr>
+      </p:pic>
+      <p:pic>
+        <p:nvPicPr>
+          <p:cNvPr id="28" name="Gráfico 27">
+            <a:extLst>
+              <a:ext uri="{FF2B5EF4-FFF2-40B4-BE49-F238E27FC236}">
+                <a16:creationId xmlns:a16="http://schemas.microsoft.com/office/drawing/2014/main" id="{06A074AC-808F-96AC-1F0D-051A29E191D5}"/>
+              </a:ext>
+            </a:extLst>
+          </p:cNvPr>
+          <p:cNvPicPr>
+            <a:picLocks noChangeAspect="1"/>
+          </p:cNvPicPr>
+          <p:nvPr/>
+        </p:nvPicPr>
+        <p:blipFill>
+          <a:blip r:embed="rId9">
+            <a:extLst>
+              <a:ext uri="{28A0092B-C50C-407E-A947-70E740481C1C}">
+                <a14:useLocalDpi xmlns:a14="http://schemas.microsoft.com/office/drawing/2010/main" val="0"/>
+              </a:ext>
+              <a:ext uri="{96DAC541-7B7A-43D3-8B79-37D633B846F1}">
+                <asvg:svgBlip xmlns:asvg="http://schemas.microsoft.com/office/drawing/2016/SVG/main" r:embed="rId10"/>
+              </a:ext>
+            </a:extLst>
+          </a:blip>
+          <a:stretch>
+            <a:fillRect/>
+          </a:stretch>
+        </p:blipFill>
+        <p:spPr>
+          <a:xfrm>
+            <a:off x="10184446" y="3250385"/>
+            <a:ext cx="1533888" cy="1533888"/>
+          </a:xfrm>
+          <a:prstGeom prst="rect">
+            <a:avLst/>
+          </a:prstGeom>
+        </p:spPr>
+      </p:pic>
+      <p:sp>
+        <p:nvSpPr>
+          <p:cNvPr id="29" name="CuadroTexto 28">
+            <a:extLst>
+              <a:ext uri="{FF2B5EF4-FFF2-40B4-BE49-F238E27FC236}">
+                <a16:creationId xmlns:a16="http://schemas.microsoft.com/office/drawing/2014/main" id="{674A9452-191E-2A46-75FE-1B25E4708F57}"/>
+              </a:ext>
+            </a:extLst>
+          </p:cNvPr>
+          <p:cNvSpPr txBox="1"/>
+          <p:nvPr/>
+        </p:nvSpPr>
+        <p:spPr>
+          <a:xfrm rot="20200669">
+            <a:off x="6482320" y="3033488"/>
+            <a:ext cx="1335366" cy="553998"/>
+          </a:xfrm>
+          <a:prstGeom prst="rect">
+            <a:avLst/>
+          </a:prstGeom>
+          <a:noFill/>
+        </p:spPr>
+        <p:txBody>
+          <a:bodyPr wrap="none" rtlCol="0">
+            <a:spAutoFit/>
+          </a:bodyPr>
+          <a:lstStyle/>
+          <a:p>
+            <a:r>
+              <a:rPr lang="es-ES" sz="3000" dirty="0">
+                <a:solidFill>
+                  <a:srgbClr val="FF0000"/>
+                </a:solidFill>
+              </a:rPr>
+              <a:t>NUEVO</a:t>
+            </a:r>
+          </a:p>
+        </p:txBody>
+      </p:sp>
+      <p:sp>
+        <p:nvSpPr>
+          <p:cNvPr id="30" name="CuadroTexto 29">
+            <a:extLst>
+              <a:ext uri="{FF2B5EF4-FFF2-40B4-BE49-F238E27FC236}">
+                <a16:creationId xmlns:a16="http://schemas.microsoft.com/office/drawing/2014/main" id="{20B61439-2E1B-FBF2-E372-0E4542AACC23}"/>
+              </a:ext>
+            </a:extLst>
+          </p:cNvPr>
+          <p:cNvSpPr txBox="1"/>
+          <p:nvPr/>
+        </p:nvSpPr>
+        <p:spPr>
+          <a:xfrm rot="20200669">
+            <a:off x="9375194" y="2941732"/>
+            <a:ext cx="1887761" cy="553998"/>
+          </a:xfrm>
+          <a:prstGeom prst="rect">
+            <a:avLst/>
+          </a:prstGeom>
+          <a:noFill/>
+        </p:spPr>
+        <p:txBody>
+          <a:bodyPr wrap="none" rtlCol="0">
+            <a:spAutoFit/>
+          </a:bodyPr>
+          <a:lstStyle/>
+          <a:p>
+            <a:r>
+              <a:rPr lang="es-ES" sz="3000" dirty="0">
+                <a:solidFill>
+                  <a:srgbClr val="FF0000"/>
+                </a:solidFill>
+              </a:rPr>
+              <a:t>HISTÓRICO</a:t>
+            </a:r>
+          </a:p>
+        </p:txBody>
+      </p:sp>
+      <p:pic>
+        <p:nvPicPr>
+          <p:cNvPr id="34" name="Gráfico 33">
+            <a:extLst>
+              <a:ext uri="{FF2B5EF4-FFF2-40B4-BE49-F238E27FC236}">
+                <a16:creationId xmlns:a16="http://schemas.microsoft.com/office/drawing/2014/main" id="{AAEAB065-F2BA-8F2F-EF6D-31FC3F152414}"/>
+              </a:ext>
+            </a:extLst>
+          </p:cNvPr>
+          <p:cNvPicPr>
+            <a:picLocks noChangeAspect="1"/>
+          </p:cNvPicPr>
+          <p:nvPr/>
+        </p:nvPicPr>
+        <p:blipFill>
+          <a:blip r:embed="rId11">
+            <a:extLst>
+              <a:ext uri="{28A0092B-C50C-407E-A947-70E740481C1C}">
+                <a14:useLocalDpi xmlns:a14="http://schemas.microsoft.com/office/drawing/2010/main" val="0"/>
+              </a:ext>
+              <a:ext uri="{96DAC541-7B7A-43D3-8B79-37D633B846F1}">
+                <asvg:svgBlip xmlns:asvg="http://schemas.microsoft.com/office/drawing/2016/SVG/main" r:embed="rId12"/>
+              </a:ext>
+            </a:extLst>
+          </a:blip>
+          <a:stretch>
+            <a:fillRect/>
+          </a:stretch>
+        </p:blipFill>
+        <p:spPr>
+          <a:xfrm>
+            <a:off x="8768137" y="5343339"/>
+            <a:ext cx="1256100" cy="1256100"/>
+          </a:xfrm>
+          <a:prstGeom prst="rect">
+            <a:avLst/>
+          </a:prstGeom>
+        </p:spPr>
+      </p:pic>
+      <p:sp>
+        <p:nvSpPr>
+          <p:cNvPr id="36" name="Flecha: a la derecha 35">
+            <a:extLst>
+              <a:ext uri="{FF2B5EF4-FFF2-40B4-BE49-F238E27FC236}">
+                <a16:creationId xmlns:a16="http://schemas.microsoft.com/office/drawing/2014/main" id="{7281B73E-7E0D-425D-5185-D3038CC4A288}"/>
+              </a:ext>
+            </a:extLst>
+          </p:cNvPr>
+          <p:cNvSpPr/>
+          <p:nvPr/>
+        </p:nvSpPr>
+        <p:spPr>
+          <a:xfrm rot="5400000">
+            <a:off x="9053195" y="4737459"/>
+            <a:ext cx="697155" cy="515546"/>
+          </a:xfrm>
+          <a:prstGeom prst="rightArrow">
+            <a:avLst/>
+          </a:prstGeom>
+        </p:spPr>
+        <p:style>
+          <a:lnRef idx="2">
+            <a:schemeClr val="accent1">
+              <a:shade val="15000"/>
+            </a:schemeClr>
+          </a:lnRef>
+          <a:fillRef idx="1">
+            <a:schemeClr val="accent1"/>
+          </a:fillRef>
+          <a:effectRef idx="0">
+            <a:schemeClr val="accent1"/>
+          </a:effectRef>
+          <a:fontRef idx="minor">
+            <a:schemeClr val="lt1"/>
+          </a:fontRef>
+        </p:style>
+        <p:txBody>
+          <a:bodyPr rtlCol="0" anchor="ctr"/>
+          <a:lstStyle/>
+          <a:p>
+            <a:pPr algn="ctr"/>
+            <a:endParaRPr lang="es-ES"/>
+          </a:p>
+        </p:txBody>
+      </p:sp>
+      <p:pic>
+        <p:nvPicPr>
+          <p:cNvPr id="38" name="Gráfico 37">
+            <a:extLst>
+              <a:ext uri="{FF2B5EF4-FFF2-40B4-BE49-F238E27FC236}">
+                <a16:creationId xmlns:a16="http://schemas.microsoft.com/office/drawing/2014/main" id="{8336D51F-6DC7-1A57-55B6-D632C661DE38}"/>
+              </a:ext>
+            </a:extLst>
+          </p:cNvPr>
+          <p:cNvPicPr>
+            <a:picLocks noChangeAspect="1"/>
+          </p:cNvPicPr>
+          <p:nvPr/>
+        </p:nvPicPr>
+        <p:blipFill>
+          <a:blip r:embed="rId13">
+            <a:extLst>
+              <a:ext uri="{28A0092B-C50C-407E-A947-70E740481C1C}">
+                <a14:useLocalDpi xmlns:a14="http://schemas.microsoft.com/office/drawing/2010/main" val="0"/>
+              </a:ext>
+              <a:ext uri="{96DAC541-7B7A-43D3-8B79-37D633B846F1}">
+                <asvg:svgBlip xmlns:asvg="http://schemas.microsoft.com/office/drawing/2016/SVG/main" r:embed="rId14"/>
+              </a:ext>
+            </a:extLst>
+          </a:blip>
+          <a:stretch>
+            <a:fillRect/>
+          </a:stretch>
+        </p:blipFill>
+        <p:spPr>
+          <a:xfrm>
+            <a:off x="9153505" y="3903695"/>
+            <a:ext cx="459090" cy="459090"/>
           </a:xfrm>
           <a:prstGeom prst="rect">
             <a:avLst/>
@@ -3973,6 +4557,53 @@
           <a:chExt cx="0" cy="0"/>
         </a:xfrm>
       </p:grpSpPr>
+      <p:pic>
+        <p:nvPicPr>
+          <p:cNvPr id="2052" name="Picture 4" descr="Money Bag Euro Symbol Vectores, Ilustraciones y Gráficos - 123RF">
+            <a:extLst>
+              <a:ext uri="{FF2B5EF4-FFF2-40B4-BE49-F238E27FC236}">
+                <a16:creationId xmlns:a16="http://schemas.microsoft.com/office/drawing/2014/main" id="{3ED31337-C812-B812-B250-466A413D63DA}"/>
+              </a:ext>
+            </a:extLst>
+          </p:cNvPr>
+          <p:cNvPicPr>
+            <a:picLocks noChangeAspect="1" noChangeArrowheads="1"/>
+          </p:cNvPicPr>
+          <p:nvPr/>
+        </p:nvPicPr>
+        <p:blipFill>
+          <a:blip r:embed="rId2">
+            <a:extLst>
+              <a:ext uri="{28A0092B-C50C-407E-A947-70E740481C1C}">
+                <a14:useLocalDpi xmlns:a14="http://schemas.microsoft.com/office/drawing/2010/main" val="0"/>
+              </a:ext>
+            </a:extLst>
+          </a:blip>
+          <a:srcRect/>
+          <a:stretch>
+            <a:fillRect/>
+          </a:stretch>
+        </p:blipFill>
+        <p:spPr bwMode="auto">
+          <a:xfrm>
+            <a:off x="4283265" y="2204927"/>
+            <a:ext cx="1886501" cy="1886501"/>
+          </a:xfrm>
+          <a:prstGeom prst="rect">
+            <a:avLst/>
+          </a:prstGeom>
+          <a:noFill/>
+          <a:extLst>
+            <a:ext uri="{909E8E84-426E-40DD-AFC4-6F175D3DCCD1}">
+              <a14:hiddenFill xmlns:a14="http://schemas.microsoft.com/office/drawing/2010/main">
+                <a:solidFill>
+                  <a:srgbClr val="FFFFFF"/>
+                </a:solidFill>
+              </a14:hiddenFill>
+            </a:ext>
+          </a:extLst>
+        </p:spPr>
+      </p:pic>
       <p:sp>
         <p:nvSpPr>
           <p:cNvPr id="3" name="CuadroTexto 2">
@@ -3987,8 +4618,8 @@
         </p:nvSpPr>
         <p:spPr>
           <a:xfrm>
-            <a:off x="0" y="25355"/>
-            <a:ext cx="12192000" cy="784830"/>
+            <a:off x="404261" y="25355"/>
+            <a:ext cx="11102608" cy="784830"/>
           </a:xfrm>
           <a:prstGeom prst="rect">
             <a:avLst/>
@@ -4008,7 +4639,7 @@
                   <a:schemeClr val="tx2"/>
                 </a:solidFill>
               </a:rPr>
-              <a:t>App - Productos y categorías destacados</a:t>
+              <a:t>Especialidad del servidor (Automatizado)</a:t>
             </a:r>
           </a:p>
         </p:txBody>
@@ -4058,12 +4689,51 @@
           </a:fontRef>
         </p:style>
       </p:cxnSp>
+      <p:pic>
+        <p:nvPicPr>
+          <p:cNvPr id="18" name="Gráfico 17">
+            <a:extLst>
+              <a:ext uri="{FF2B5EF4-FFF2-40B4-BE49-F238E27FC236}">
+                <a16:creationId xmlns:a16="http://schemas.microsoft.com/office/drawing/2014/main" id="{DB1D4794-5C9C-BFB9-49A6-016ECE3F9A87}"/>
+              </a:ext>
+            </a:extLst>
+          </p:cNvPr>
+          <p:cNvPicPr>
+            <a:picLocks noChangeAspect="1"/>
+          </p:cNvPicPr>
+          <p:nvPr/>
+        </p:nvPicPr>
+        <p:blipFill>
+          <a:blip r:embed="rId3">
+            <a:extLst>
+              <a:ext uri="{28A0092B-C50C-407E-A947-70E740481C1C}">
+                <a14:useLocalDpi xmlns:a14="http://schemas.microsoft.com/office/drawing/2010/main" val="0"/>
+              </a:ext>
+              <a:ext uri="{96DAC541-7B7A-43D3-8B79-37D633B846F1}">
+                <asvg:svgBlip xmlns:asvg="http://schemas.microsoft.com/office/drawing/2016/SVG/main" r:embed="rId4"/>
+              </a:ext>
+            </a:extLst>
+          </a:blip>
+          <a:stretch>
+            <a:fillRect/>
+          </a:stretch>
+        </p:blipFill>
+        <p:spPr>
+          <a:xfrm>
+            <a:off x="11506869" y="82334"/>
+            <a:ext cx="531934" cy="670872"/>
+          </a:xfrm>
+          <a:prstGeom prst="rect">
+            <a:avLst/>
+          </a:prstGeom>
+        </p:spPr>
+      </p:pic>
       <p:sp>
         <p:nvSpPr>
           <p:cNvPr id="5" name="CuadroTexto 4">
             <a:extLst>
               <a:ext uri="{FF2B5EF4-FFF2-40B4-BE49-F238E27FC236}">
-                <a16:creationId xmlns:a16="http://schemas.microsoft.com/office/drawing/2014/main" id="{4E9CD9FE-0E28-577C-A59E-0A662B2D77DD}"/>
+                <a16:creationId xmlns:a16="http://schemas.microsoft.com/office/drawing/2014/main" id="{56B21D7A-21E3-4605-DD2B-7EE8312403FE}"/>
               </a:ext>
             </a:extLst>
           </p:cNvPr>
@@ -4072,8 +4742,127 @@
         </p:nvSpPr>
         <p:spPr>
           <a:xfrm>
-            <a:off x="1879484" y="1069848"/>
-            <a:ext cx="2298001" cy="707886"/>
+            <a:off x="0" y="1068351"/>
+            <a:ext cx="6124882" cy="707886"/>
+          </a:xfrm>
+          <a:prstGeom prst="rect">
+            <a:avLst/>
+          </a:prstGeom>
+          <a:noFill/>
+        </p:spPr>
+        <p:txBody>
+          <a:bodyPr wrap="square" rtlCol="0">
+            <a:spAutoFit/>
+          </a:bodyPr>
+          <a:lstStyle/>
+          <a:p>
+            <a:pPr algn="ctr"/>
+            <a:r>
+              <a:rPr lang="es-ES" sz="4000" b="1" u="sng" dirty="0"/>
+              <a:t>Cálculo de destacados</a:t>
+            </a:r>
+          </a:p>
+        </p:txBody>
+      </p:sp>
+      <p:sp>
+        <p:nvSpPr>
+          <p:cNvPr id="6" name="CuadroTexto 5">
+            <a:extLst>
+              <a:ext uri="{FF2B5EF4-FFF2-40B4-BE49-F238E27FC236}">
+                <a16:creationId xmlns:a16="http://schemas.microsoft.com/office/drawing/2014/main" id="{0F61FD0A-53A8-C930-E731-9DD896DFD4D7}"/>
+              </a:ext>
+            </a:extLst>
+          </p:cNvPr>
+          <p:cNvSpPr txBox="1"/>
+          <p:nvPr/>
+        </p:nvSpPr>
+        <p:spPr>
+          <a:xfrm>
+            <a:off x="6096000" y="1076721"/>
+            <a:ext cx="6096000" cy="707886"/>
+          </a:xfrm>
+          <a:prstGeom prst="rect">
+            <a:avLst/>
+          </a:prstGeom>
+          <a:noFill/>
+        </p:spPr>
+        <p:txBody>
+          <a:bodyPr wrap="square" rtlCol="0">
+            <a:spAutoFit/>
+          </a:bodyPr>
+          <a:lstStyle/>
+          <a:p>
+            <a:pPr algn="ctr"/>
+            <a:r>
+              <a:rPr lang="es-ES" sz="4000" b="1" u="sng" dirty="0"/>
+              <a:t>Sugerencias de productos</a:t>
+            </a:r>
+          </a:p>
+        </p:txBody>
+      </p:sp>
+      <p:sp>
+        <p:nvSpPr>
+          <p:cNvPr id="7" name="CuadroTexto 6">
+            <a:extLst>
+              <a:ext uri="{FF2B5EF4-FFF2-40B4-BE49-F238E27FC236}">
+                <a16:creationId xmlns:a16="http://schemas.microsoft.com/office/drawing/2014/main" id="{B576BCC1-7564-CF9E-2AAA-3A610162505B}"/>
+              </a:ext>
+            </a:extLst>
+          </p:cNvPr>
+          <p:cNvSpPr txBox="1"/>
+          <p:nvPr/>
+        </p:nvSpPr>
+        <p:spPr>
+          <a:xfrm>
+            <a:off x="529388" y="1774040"/>
+            <a:ext cx="5043639" cy="430887"/>
+          </a:xfrm>
+          <a:prstGeom prst="rect">
+            <a:avLst/>
+          </a:prstGeom>
+          <a:noFill/>
+        </p:spPr>
+        <p:txBody>
+          <a:bodyPr wrap="square" rtlCol="0">
+            <a:spAutoFit/>
+          </a:bodyPr>
+          <a:lstStyle/>
+          <a:p>
+            <a:r>
+              <a:rPr lang="es-ES" sz="2200" b="1" dirty="0"/>
+              <a:t>Diariamente</a:t>
+            </a:r>
+            <a:r>
+              <a:rPr lang="es-ES" sz="2200" dirty="0"/>
+              <a:t> automatizado a las </a:t>
+            </a:r>
+            <a:r>
+              <a:rPr lang="es-ES" sz="2200" b="1" dirty="0"/>
+              <a:t>03:00 am</a:t>
+            </a:r>
+            <a:r>
+              <a:rPr lang="es-ES" sz="2200" dirty="0"/>
+              <a:t>:</a:t>
+            </a:r>
+          </a:p>
+        </p:txBody>
+      </p:sp>
+      <p:sp>
+        <p:nvSpPr>
+          <p:cNvPr id="8" name="CuadroTexto 7">
+            <a:extLst>
+              <a:ext uri="{FF2B5EF4-FFF2-40B4-BE49-F238E27FC236}">
+                <a16:creationId xmlns:a16="http://schemas.microsoft.com/office/drawing/2014/main" id="{5916B271-0D9E-6EEF-F7FE-E27F463DD6BD}"/>
+              </a:ext>
+            </a:extLst>
+          </p:cNvPr>
+          <p:cNvSpPr txBox="1"/>
+          <p:nvPr/>
+        </p:nvSpPr>
+        <p:spPr>
+          <a:xfrm>
+            <a:off x="1001009" y="3076467"/>
+            <a:ext cx="3806363" cy="400110"/>
           </a:xfrm>
           <a:prstGeom prst="rect">
             <a:avLst/>
@@ -4087,53 +4876,34 @@
           <a:lstStyle/>
           <a:p>
             <a:r>
-              <a:rPr lang="es-ES" sz="4000" dirty="0"/>
-              <a:t>1. Rebajas</a:t>
-            </a:r>
-          </a:p>
-        </p:txBody>
-      </p:sp>
-      <p:sp>
-        <p:nvSpPr>
-          <p:cNvPr id="6" name="CuadroTexto 5">
-            <a:extLst>
-              <a:ext uri="{FF2B5EF4-FFF2-40B4-BE49-F238E27FC236}">
-                <a16:creationId xmlns:a16="http://schemas.microsoft.com/office/drawing/2014/main" id="{9D18D34A-443F-B01E-B00C-8A3770F0F078}"/>
-              </a:ext>
-            </a:extLst>
-          </p:cNvPr>
-          <p:cNvSpPr txBox="1"/>
-          <p:nvPr/>
-        </p:nvSpPr>
-        <p:spPr>
-          <a:xfrm>
-            <a:off x="6931176" y="1136904"/>
-            <a:ext cx="3702873" cy="707886"/>
-          </a:xfrm>
-          <a:prstGeom prst="rect">
-            <a:avLst/>
-          </a:prstGeom>
-          <a:noFill/>
-        </p:spPr>
-        <p:txBody>
-          <a:bodyPr wrap="none" rtlCol="0">
-            <a:spAutoFit/>
-          </a:bodyPr>
-          <a:lstStyle/>
-          <a:p>
-            <a:r>
-              <a:rPr lang="es-ES" sz="4000" dirty="0"/>
-              <a:t>2. Más valorados</a:t>
-            </a:r>
-          </a:p>
-        </p:txBody>
-      </p:sp>
-      <p:sp>
-        <p:nvSpPr>
-          <p:cNvPr id="7" name="Rectángulo: esquinas redondeadas 6">
-            <a:extLst>
-              <a:ext uri="{FF2B5EF4-FFF2-40B4-BE49-F238E27FC236}">
-                <a16:creationId xmlns:a16="http://schemas.microsoft.com/office/drawing/2014/main" id="{615B91DF-4210-5E5F-049D-FC78274FB030}"/>
+              <a:rPr lang="es-ES" sz="2000" b="1" u="sng" dirty="0"/>
+              <a:t>Ganancias</a:t>
+            </a:r>
+            <a:r>
+              <a:rPr lang="es-ES" sz="2000" dirty="0"/>
+              <a:t> respecto al </a:t>
+            </a:r>
+            <a:r>
+              <a:rPr lang="es-ES" sz="2000" b="1" dirty="0"/>
+              <a:t>mes</a:t>
+            </a:r>
+            <a:r>
+              <a:rPr lang="es-ES" sz="2000" dirty="0"/>
+              <a:t> </a:t>
+            </a:r>
+            <a:r>
+              <a:rPr lang="es-ES" sz="2000" b="1" dirty="0"/>
+              <a:t>pasado</a:t>
+            </a:r>
+          </a:p>
+        </p:txBody>
+      </p:sp>
+      <p:sp>
+        <p:nvSpPr>
+          <p:cNvPr id="9" name="Flecha: hacia abajo 8">
+            <a:extLst>
+              <a:ext uri="{FF2B5EF4-FFF2-40B4-BE49-F238E27FC236}">
+                <a16:creationId xmlns:a16="http://schemas.microsoft.com/office/drawing/2014/main" id="{3DE252AB-9488-0C02-4DCF-3CDA30EC6CCB}"/>
               </a:ext>
             </a:extLst>
           </p:cNvPr>
@@ -4141,13 +4911,21 @@
           <p:nvPr/>
         </p:nvSpPr>
         <p:spPr>
-          <a:xfrm>
-            <a:off x="1879484" y="2259369"/>
-            <a:ext cx="2423160" cy="4192416"/>
-          </a:xfrm>
-          <a:prstGeom prst="roundRect">
-            <a:avLst/>
-          </a:prstGeom>
+          <a:xfrm rot="10800000">
+            <a:off x="581865" y="2718651"/>
+            <a:ext cx="500512" cy="859055"/>
+          </a:xfrm>
+          <a:prstGeom prst="downArrow">
+            <a:avLst/>
+          </a:prstGeom>
+          <a:solidFill>
+            <a:srgbClr val="92D050"/>
+          </a:solidFill>
+          <a:ln>
+            <a:solidFill>
+              <a:srgbClr val="92D050"/>
+            </a:solidFill>
+          </a:ln>
         </p:spPr>
         <p:style>
           <a:lnRef idx="2">
@@ -4174,12 +4952,110 @@
           </a:p>
         </p:txBody>
       </p:sp>
-      <p:sp>
-        <p:nvSpPr>
-          <p:cNvPr id="8" name="Rectángulo: esquinas redondeadas 7">
-            <a:extLst>
-              <a:ext uri="{FF2B5EF4-FFF2-40B4-BE49-F238E27FC236}">
-                <a16:creationId xmlns:a16="http://schemas.microsoft.com/office/drawing/2014/main" id="{FD456482-F852-5C25-60C5-37B057367CFC}"/>
+      <p:pic>
+        <p:nvPicPr>
+          <p:cNvPr id="2054" name="Picture 6" descr="Facebook Like Logo PNG Vector (EPS) Free Download">
+            <a:extLst>
+              <a:ext uri="{FF2B5EF4-FFF2-40B4-BE49-F238E27FC236}">
+                <a16:creationId xmlns:a16="http://schemas.microsoft.com/office/drawing/2014/main" id="{81756016-42C3-9518-00A6-E97A600F6519}"/>
+              </a:ext>
+            </a:extLst>
+          </p:cNvPr>
+          <p:cNvPicPr>
+            <a:picLocks noChangeAspect="1" noChangeArrowheads="1"/>
+          </p:cNvPicPr>
+          <p:nvPr/>
+        </p:nvPicPr>
+        <p:blipFill>
+          <a:blip r:embed="rId5">
+            <a:extLst>
+              <a:ext uri="{28A0092B-C50C-407E-A947-70E740481C1C}">
+                <a14:useLocalDpi xmlns:a14="http://schemas.microsoft.com/office/drawing/2010/main" val="0"/>
+              </a:ext>
+            </a:extLst>
+          </a:blip>
+          <a:srcRect/>
+          <a:stretch>
+            <a:fillRect/>
+          </a:stretch>
+        </p:blipFill>
+        <p:spPr bwMode="auto">
+          <a:xfrm>
+            <a:off x="4625061" y="4323313"/>
+            <a:ext cx="1202907" cy="1155631"/>
+          </a:xfrm>
+          <a:prstGeom prst="rect">
+            <a:avLst/>
+          </a:prstGeom>
+          <a:noFill/>
+          <a:extLst>
+            <a:ext uri="{909E8E84-426E-40DD-AFC4-6F175D3DCCD1}">
+              <a14:hiddenFill xmlns:a14="http://schemas.microsoft.com/office/drawing/2010/main">
+                <a:solidFill>
+                  <a:srgbClr val="FFFFFF"/>
+                </a:solidFill>
+              </a14:hiddenFill>
+            </a:ext>
+          </a:extLst>
+        </p:spPr>
+      </p:pic>
+      <p:sp>
+        <p:nvSpPr>
+          <p:cNvPr id="10" name="CuadroTexto 9">
+            <a:extLst>
+              <a:ext uri="{FF2B5EF4-FFF2-40B4-BE49-F238E27FC236}">
+                <a16:creationId xmlns:a16="http://schemas.microsoft.com/office/drawing/2014/main" id="{DA1C0787-1AAA-E29B-420D-919C9709F8ED}"/>
+              </a:ext>
+            </a:extLst>
+          </p:cNvPr>
+          <p:cNvSpPr txBox="1"/>
+          <p:nvPr/>
+        </p:nvSpPr>
+        <p:spPr>
+          <a:xfrm>
+            <a:off x="1001009" y="4867025"/>
+            <a:ext cx="3586175" cy="400110"/>
+          </a:xfrm>
+          <a:prstGeom prst="rect">
+            <a:avLst/>
+          </a:prstGeom>
+          <a:noFill/>
+        </p:spPr>
+        <p:txBody>
+          <a:bodyPr wrap="none" rtlCol="0">
+            <a:spAutoFit/>
+          </a:bodyPr>
+          <a:lstStyle/>
+          <a:p>
+            <a:r>
+              <a:rPr lang="es-ES" sz="2000" b="1" u="sng" dirty="0"/>
+              <a:t>Gustados</a:t>
+            </a:r>
+            <a:r>
+              <a:rPr lang="es-ES" sz="2000" dirty="0"/>
+              <a:t> respecto al </a:t>
+            </a:r>
+            <a:r>
+              <a:rPr lang="es-ES" sz="2000" b="1" dirty="0"/>
+              <a:t>mes</a:t>
+            </a:r>
+            <a:r>
+              <a:rPr lang="es-ES" sz="2000" dirty="0"/>
+              <a:t> </a:t>
+            </a:r>
+            <a:r>
+              <a:rPr lang="es-ES" sz="2000" b="1" dirty="0"/>
+              <a:t>actual</a:t>
+            </a:r>
+          </a:p>
+        </p:txBody>
+      </p:sp>
+      <p:sp>
+        <p:nvSpPr>
+          <p:cNvPr id="19" name="Flecha: hacia abajo 18">
+            <a:extLst>
+              <a:ext uri="{FF2B5EF4-FFF2-40B4-BE49-F238E27FC236}">
+                <a16:creationId xmlns:a16="http://schemas.microsoft.com/office/drawing/2014/main" id="{F017D72E-0DEE-CF46-75DF-6CD4FA101654}"/>
               </a:ext>
             </a:extLst>
           </p:cNvPr>
@@ -4187,13 +5063,21 @@
           <p:nvPr/>
         </p:nvSpPr>
         <p:spPr>
-          <a:xfrm>
-            <a:off x="7622313" y="2259369"/>
-            <a:ext cx="2423160" cy="4192416"/>
-          </a:xfrm>
-          <a:prstGeom prst="roundRect">
-            <a:avLst/>
-          </a:prstGeom>
+          <a:xfrm rot="10800000">
+            <a:off x="581865" y="4607321"/>
+            <a:ext cx="500512" cy="859055"/>
+          </a:xfrm>
+          <a:prstGeom prst="downArrow">
+            <a:avLst/>
+          </a:prstGeom>
+          <a:solidFill>
+            <a:srgbClr val="0070C0"/>
+          </a:solidFill>
+          <a:ln>
+            <a:solidFill>
+              <a:srgbClr val="0070C0"/>
+            </a:solidFill>
+          </a:ln>
         </p:spPr>
         <p:style>
           <a:lnRef idx="2">
@@ -4222,10 +5106,10 @@
       </p:sp>
       <p:sp>
         <p:nvSpPr>
-          <p:cNvPr id="9" name="CuadroTexto 8">
-            <a:extLst>
-              <a:ext uri="{FF2B5EF4-FFF2-40B4-BE49-F238E27FC236}">
-                <a16:creationId xmlns:a16="http://schemas.microsoft.com/office/drawing/2014/main" id="{10951958-685D-A434-25CF-6D6BA120428D}"/>
+          <p:cNvPr id="20" name="CuadroTexto 19">
+            <a:extLst>
+              <a:ext uri="{FF2B5EF4-FFF2-40B4-BE49-F238E27FC236}">
+                <a16:creationId xmlns:a16="http://schemas.microsoft.com/office/drawing/2014/main" id="{5C3FD489-7D74-8EDC-87C0-542C2E4D8837}"/>
               </a:ext>
             </a:extLst>
           </p:cNvPr>
@@ -4234,8 +5118,8 @@
         </p:nvSpPr>
         <p:spPr>
           <a:xfrm>
-            <a:off x="1044864" y="1821156"/>
-            <a:ext cx="4282711" cy="369332"/>
+            <a:off x="6463230" y="1774039"/>
+            <a:ext cx="5043639" cy="430887"/>
           </a:xfrm>
           <a:prstGeom prst="rect">
             <a:avLst/>
@@ -4243,91 +5127,34 @@
           <a:noFill/>
         </p:spPr>
         <p:txBody>
-          <a:bodyPr wrap="none" rtlCol="0">
+          <a:bodyPr wrap="square" rtlCol="0">
             <a:spAutoFit/>
           </a:bodyPr>
           <a:lstStyle/>
           <a:p>
-            <a:r>
-              <a:rPr lang="es-ES" dirty="0"/>
-              <a:t>Comprobamos el </a:t>
-            </a:r>
-            <a:r>
-              <a:rPr lang="es-ES" b="1" dirty="0"/>
-              <a:t>histórico</a:t>
-            </a:r>
-            <a:r>
-              <a:rPr lang="es-ES" dirty="0"/>
-              <a:t> pasado </a:t>
-            </a:r>
-            <a:r>
-              <a:rPr lang="es-ES" b="1" dirty="0"/>
-              <a:t>mensual</a:t>
-            </a:r>
-            <a:r>
-              <a:rPr lang="es-ES" dirty="0"/>
-              <a:t>.</a:t>
-            </a:r>
-          </a:p>
-        </p:txBody>
-      </p:sp>
-      <p:sp>
-        <p:nvSpPr>
-          <p:cNvPr id="10" name="CuadroTexto 9">
-            <a:extLst>
-              <a:ext uri="{FF2B5EF4-FFF2-40B4-BE49-F238E27FC236}">
-                <a16:creationId xmlns:a16="http://schemas.microsoft.com/office/drawing/2014/main" id="{2D395CDF-B3DE-7887-1C84-87B5BCBA85BB}"/>
-              </a:ext>
-            </a:extLst>
-          </p:cNvPr>
-          <p:cNvSpPr txBox="1"/>
-          <p:nvPr/>
-        </p:nvSpPr>
-        <p:spPr>
-          <a:xfrm>
-            <a:off x="6124882" y="1821156"/>
-            <a:ext cx="5501827" cy="369332"/>
-          </a:xfrm>
-          <a:prstGeom prst="rect">
-            <a:avLst/>
-          </a:prstGeom>
-          <a:noFill/>
-        </p:spPr>
-        <p:txBody>
-          <a:bodyPr wrap="none" rtlCol="0">
-            <a:spAutoFit/>
-          </a:bodyPr>
-          <a:lstStyle/>
-          <a:p>
-            <a:r>
-              <a:rPr lang="es-ES" dirty="0"/>
-              <a:t>Comprobamos aquellos valorados </a:t>
-            </a:r>
-            <a:r>
-              <a:rPr lang="es-ES" b="1" dirty="0"/>
-              <a:t>superiores</a:t>
-            </a:r>
-            <a:r>
-              <a:rPr lang="es-ES" dirty="0"/>
-              <a:t> a la </a:t>
-            </a:r>
-            <a:r>
-              <a:rPr lang="es-ES" b="1" dirty="0"/>
-              <a:t>media</a:t>
-            </a:r>
-            <a:r>
-              <a:rPr lang="es-ES" dirty="0"/>
-              <a:t>.</a:t>
-            </a:r>
+            <a:pPr algn="ctr"/>
+            <a:r>
+              <a:rPr lang="es-ES" sz="2200" b="1" dirty="0"/>
+              <a:t>Técnica </a:t>
+            </a:r>
+            <a:r>
+              <a:rPr lang="es-ES" sz="2200" dirty="0"/>
+              <a:t>de</a:t>
+            </a:r>
+            <a:r>
+              <a:rPr lang="es-ES" sz="2200" b="1" dirty="0"/>
+              <a:t> lematización:</a:t>
+            </a:r>
+            <a:endParaRPr lang="es-ES" sz="2200" dirty="0"/>
           </a:p>
         </p:txBody>
       </p:sp>
       <p:pic>
         <p:nvPicPr>
-          <p:cNvPr id="2" name="Gráfico 1">
-            <a:extLst>
-              <a:ext uri="{FF2B5EF4-FFF2-40B4-BE49-F238E27FC236}">
-                <a16:creationId xmlns:a16="http://schemas.microsoft.com/office/drawing/2014/main" id="{099AAE3B-28D8-33FD-9443-EB316279DA31}"/>
+          <p:cNvPr id="22" name="Imagen 21">
+            <a:extLst>
+              <a:ext uri="{FF2B5EF4-FFF2-40B4-BE49-F238E27FC236}">
+                <a16:creationId xmlns:a16="http://schemas.microsoft.com/office/drawing/2014/main" id="{653025BD-B726-241E-869A-C7C8E0AFC413}"/>
               </a:ext>
             </a:extLst>
           </p:cNvPr>
@@ -4337,34 +5164,63 @@
           <p:nvPr/>
         </p:nvPicPr>
         <p:blipFill>
-          <a:blip r:embed="rId2">
-            <a:extLst>
-              <a:ext uri="{28A0092B-C50C-407E-A947-70E740481C1C}">
-                <a14:useLocalDpi xmlns:a14="http://schemas.microsoft.com/office/drawing/2010/main" val="0"/>
-              </a:ext>
-              <a:ext uri="{96DAC541-7B7A-43D3-8B79-37D633B846F1}">
-                <asvg:svgBlip xmlns:asvg="http://schemas.microsoft.com/office/drawing/2016/SVG/main" r:embed="rId3"/>
-              </a:ext>
-            </a:extLst>
-          </a:blip>
+          <a:blip r:embed="rId6"/>
           <a:stretch>
             <a:fillRect/>
           </a:stretch>
         </p:blipFill>
         <p:spPr>
           <a:xfrm>
-            <a:off x="11506869" y="82334"/>
-            <a:ext cx="531934" cy="670872"/>
+            <a:off x="6282830" y="2281317"/>
+            <a:ext cx="5327305" cy="3359088"/>
           </a:xfrm>
           <a:prstGeom prst="rect">
             <a:avLst/>
           </a:prstGeom>
         </p:spPr>
       </p:pic>
+      <p:sp>
+        <p:nvSpPr>
+          <p:cNvPr id="24" name="CuadroTexto 23">
+            <a:extLst>
+              <a:ext uri="{FF2B5EF4-FFF2-40B4-BE49-F238E27FC236}">
+                <a16:creationId xmlns:a16="http://schemas.microsoft.com/office/drawing/2014/main" id="{23DC1ADA-6005-F1A0-C695-95BF1C678ED1}"/>
+              </a:ext>
+            </a:extLst>
+          </p:cNvPr>
+          <p:cNvSpPr txBox="1"/>
+          <p:nvPr/>
+        </p:nvSpPr>
+        <p:spPr>
+          <a:xfrm>
+            <a:off x="7645899" y="5698237"/>
+            <a:ext cx="2996202" cy="430887"/>
+          </a:xfrm>
+          <a:prstGeom prst="rect">
+            <a:avLst/>
+          </a:prstGeom>
+          <a:noFill/>
+        </p:spPr>
+        <p:txBody>
+          <a:bodyPr wrap="square">
+            <a:spAutoFit/>
+          </a:bodyPr>
+          <a:lstStyle/>
+          <a:p>
+            <a:r>
+              <a:rPr lang="es-ES" sz="2200" dirty="0">
+                <a:hlinkClick r:id="rId7"/>
+              </a:rPr>
+              <a:t>Ejemplo de lematización</a:t>
+            </a:r>
+            <a:endParaRPr lang="es-ES" sz="2200" dirty="0"/>
+          </a:p>
+        </p:txBody>
+      </p:sp>
     </p:spTree>
     <p:extLst>
       <p:ext uri="{BB962C8B-B14F-4D97-AF65-F5344CB8AC3E}">
-        <p14:creationId xmlns:p14="http://schemas.microsoft.com/office/powerpoint/2010/main" val="2852605939"/>
+        <p14:creationId xmlns:p14="http://schemas.microsoft.com/office/powerpoint/2010/main" val="1863250850"/>
       </p:ext>
     </p:extLst>
   </p:cSld>
@@ -4405,8 +5261,8 @@
         </p:nvSpPr>
         <p:spPr>
           <a:xfrm>
-            <a:off x="2644437" y="25355"/>
-            <a:ext cx="7016988" cy="784830"/>
+            <a:off x="0" y="25355"/>
+            <a:ext cx="12192000" cy="784830"/>
           </a:xfrm>
           <a:prstGeom prst="rect">
             <a:avLst/>
@@ -4426,7 +5282,7 @@
                   <a:schemeClr val="tx2"/>
                 </a:solidFill>
               </a:rPr>
-              <a:t>App - Buscador</a:t>
+              <a:t>App - Productos y categorías destacados</a:t>
             </a:r>
           </a:p>
         </p:txBody>
@@ -4478,6 +5334,76 @@
       </p:cxnSp>
       <p:sp>
         <p:nvSpPr>
+          <p:cNvPr id="5" name="CuadroTexto 4">
+            <a:extLst>
+              <a:ext uri="{FF2B5EF4-FFF2-40B4-BE49-F238E27FC236}">
+                <a16:creationId xmlns:a16="http://schemas.microsoft.com/office/drawing/2014/main" id="{4E9CD9FE-0E28-577C-A59E-0A662B2D77DD}"/>
+              </a:ext>
+            </a:extLst>
+          </p:cNvPr>
+          <p:cNvSpPr txBox="1"/>
+          <p:nvPr/>
+        </p:nvSpPr>
+        <p:spPr>
+          <a:xfrm>
+            <a:off x="1879484" y="1069848"/>
+            <a:ext cx="2298001" cy="707886"/>
+          </a:xfrm>
+          <a:prstGeom prst="rect">
+            <a:avLst/>
+          </a:prstGeom>
+          <a:noFill/>
+        </p:spPr>
+        <p:txBody>
+          <a:bodyPr wrap="none" rtlCol="0">
+            <a:spAutoFit/>
+          </a:bodyPr>
+          <a:lstStyle/>
+          <a:p>
+            <a:r>
+              <a:rPr lang="es-ES" sz="4000" dirty="0"/>
+              <a:t>1. Rebajas</a:t>
+            </a:r>
+          </a:p>
+        </p:txBody>
+      </p:sp>
+      <p:sp>
+        <p:nvSpPr>
+          <p:cNvPr id="6" name="CuadroTexto 5">
+            <a:extLst>
+              <a:ext uri="{FF2B5EF4-FFF2-40B4-BE49-F238E27FC236}">
+                <a16:creationId xmlns:a16="http://schemas.microsoft.com/office/drawing/2014/main" id="{9D18D34A-443F-B01E-B00C-8A3770F0F078}"/>
+              </a:ext>
+            </a:extLst>
+          </p:cNvPr>
+          <p:cNvSpPr txBox="1"/>
+          <p:nvPr/>
+        </p:nvSpPr>
+        <p:spPr>
+          <a:xfrm>
+            <a:off x="6931176" y="1136904"/>
+            <a:ext cx="3702873" cy="707886"/>
+          </a:xfrm>
+          <a:prstGeom prst="rect">
+            <a:avLst/>
+          </a:prstGeom>
+          <a:noFill/>
+        </p:spPr>
+        <p:txBody>
+          <a:bodyPr wrap="none" rtlCol="0">
+            <a:spAutoFit/>
+          </a:bodyPr>
+          <a:lstStyle/>
+          <a:p>
+            <a:r>
+              <a:rPr lang="es-ES" sz="4000" dirty="0"/>
+              <a:t>2. Más valorados</a:t>
+            </a:r>
+          </a:p>
+        </p:txBody>
+      </p:sp>
+      <p:sp>
+        <p:nvSpPr>
           <p:cNvPr id="7" name="Rectángulo: esquinas redondeadas 6">
             <a:extLst>
               <a:ext uri="{FF2B5EF4-FFF2-40B4-BE49-F238E27FC236}">
@@ -4490,7 +5416,7 @@
         </p:nvSpPr>
         <p:spPr>
           <a:xfrm>
-            <a:off x="846212" y="2295945"/>
+            <a:off x="1879484" y="2259369"/>
             <a:ext cx="2423160" cy="4192416"/>
           </a:xfrm>
           <a:prstGeom prst="roundRect">
@@ -4536,7 +5462,7 @@
         </p:nvSpPr>
         <p:spPr>
           <a:xfrm>
-            <a:off x="4884420" y="1665009"/>
+            <a:off x="7622313" y="2259369"/>
             <a:ext cx="2423160" cy="4192416"/>
           </a:xfrm>
           <a:prstGeom prst="roundRect">
@@ -4570,10 +5496,10 @@
       </p:sp>
       <p:sp>
         <p:nvSpPr>
-          <p:cNvPr id="11" name="CuadroTexto 10">
-            <a:extLst>
-              <a:ext uri="{FF2B5EF4-FFF2-40B4-BE49-F238E27FC236}">
-                <a16:creationId xmlns:a16="http://schemas.microsoft.com/office/drawing/2014/main" id="{C1CF97DD-A361-B116-C77B-0F3B9D7C7848}"/>
+          <p:cNvPr id="9" name="CuadroTexto 8">
+            <a:extLst>
+              <a:ext uri="{FF2B5EF4-FFF2-40B4-BE49-F238E27FC236}">
+                <a16:creationId xmlns:a16="http://schemas.microsoft.com/office/drawing/2014/main" id="{10951958-685D-A434-25CF-6D6BA120428D}"/>
               </a:ext>
             </a:extLst>
           </p:cNvPr>
@@ -4582,8 +5508,8 @@
         </p:nvSpPr>
         <p:spPr>
           <a:xfrm>
-            <a:off x="4261251" y="1000575"/>
-            <a:ext cx="3782446" cy="707886"/>
+            <a:off x="1044864" y="1821156"/>
+            <a:ext cx="4282711" cy="369332"/>
           </a:xfrm>
           <a:prstGeom prst="rect">
             <a:avLst/>
@@ -4597,18 +5523,34 @@
           <a:lstStyle/>
           <a:p>
             <a:r>
-              <a:rPr lang="es-ES" sz="4000" dirty="0"/>
-              <a:t>Inicial/Categorías</a:t>
-            </a:r>
-          </a:p>
-        </p:txBody>
-      </p:sp>
-      <p:sp>
-        <p:nvSpPr>
-          <p:cNvPr id="12" name="CuadroTexto 11">
-            <a:extLst>
-              <a:ext uri="{FF2B5EF4-FFF2-40B4-BE49-F238E27FC236}">
-                <a16:creationId xmlns:a16="http://schemas.microsoft.com/office/drawing/2014/main" id="{84D967ED-65BC-CFD5-E209-CAE0C4BC242A}"/>
+              <a:rPr lang="es-ES" dirty="0"/>
+              <a:t>Comprobamos el </a:t>
+            </a:r>
+            <a:r>
+              <a:rPr lang="es-ES" b="1" dirty="0"/>
+              <a:t>histórico</a:t>
+            </a:r>
+            <a:r>
+              <a:rPr lang="es-ES" dirty="0"/>
+              <a:t> pasado </a:t>
+            </a:r>
+            <a:r>
+              <a:rPr lang="es-ES" b="1" dirty="0"/>
+              <a:t>mensual</a:t>
+            </a:r>
+            <a:r>
+              <a:rPr lang="es-ES" dirty="0"/>
+              <a:t>.</a:t>
+            </a:r>
+          </a:p>
+        </p:txBody>
+      </p:sp>
+      <p:sp>
+        <p:nvSpPr>
+          <p:cNvPr id="10" name="CuadroTexto 9">
+            <a:extLst>
+              <a:ext uri="{FF2B5EF4-FFF2-40B4-BE49-F238E27FC236}">
+                <a16:creationId xmlns:a16="http://schemas.microsoft.com/office/drawing/2014/main" id="{2D395CDF-B3DE-7887-1C84-87B5BCBA85BB}"/>
               </a:ext>
             </a:extLst>
           </p:cNvPr>
@@ -4617,8 +5559,8 @@
         </p:nvSpPr>
         <p:spPr>
           <a:xfrm>
-            <a:off x="874612" y="1588059"/>
-            <a:ext cx="2284151" cy="707886"/>
+            <a:off x="6124882" y="1821156"/>
+            <a:ext cx="5501827" cy="369332"/>
           </a:xfrm>
           <a:prstGeom prst="rect">
             <a:avLst/>
@@ -4632,182 +5574,25 @@
           <a:lstStyle/>
           <a:p>
             <a:r>
-              <a:rPr lang="es-ES" sz="4000" dirty="0"/>
-              <a:t>Productos</a:t>
-            </a:r>
-          </a:p>
-        </p:txBody>
-      </p:sp>
-      <p:sp>
-        <p:nvSpPr>
-          <p:cNvPr id="13" name="Rectángulo: esquinas redondeadas 12">
-            <a:extLst>
-              <a:ext uri="{FF2B5EF4-FFF2-40B4-BE49-F238E27FC236}">
-                <a16:creationId xmlns:a16="http://schemas.microsoft.com/office/drawing/2014/main" id="{BED32F55-342F-11E0-3BD8-38A9ABEBAECE}"/>
-              </a:ext>
-            </a:extLst>
-          </p:cNvPr>
-          <p:cNvSpPr/>
-          <p:nvPr/>
-        </p:nvSpPr>
-        <p:spPr>
-          <a:xfrm>
-            <a:off x="8922628" y="2295945"/>
-            <a:ext cx="2423160" cy="4192416"/>
-          </a:xfrm>
-          <a:prstGeom prst="roundRect">
-            <a:avLst/>
-          </a:prstGeom>
-        </p:spPr>
-        <p:style>
-          <a:lnRef idx="2">
-            <a:schemeClr val="accent1">
-              <a:shade val="15000"/>
-            </a:schemeClr>
-          </a:lnRef>
-          <a:fillRef idx="1">
-            <a:schemeClr val="accent1"/>
-          </a:fillRef>
-          <a:effectRef idx="0">
-            <a:schemeClr val="accent1"/>
-          </a:effectRef>
-          <a:fontRef idx="minor">
-            <a:schemeClr val="lt1"/>
-          </a:fontRef>
-        </p:style>
-        <p:txBody>
-          <a:bodyPr rtlCol="0" anchor="ctr"/>
-          <a:lstStyle/>
-          <a:p>
-            <a:pPr algn="ctr"/>
-            <a:endParaRPr lang="es-ES" dirty="0"/>
-          </a:p>
-        </p:txBody>
-      </p:sp>
-      <p:sp>
-        <p:nvSpPr>
-          <p:cNvPr id="14" name="CuadroTexto 13">
-            <a:extLst>
-              <a:ext uri="{FF2B5EF4-FFF2-40B4-BE49-F238E27FC236}">
-                <a16:creationId xmlns:a16="http://schemas.microsoft.com/office/drawing/2014/main" id="{BEC8769F-346D-490B-02EB-B8B913BCD8B2}"/>
-              </a:ext>
-            </a:extLst>
-          </p:cNvPr>
-          <p:cNvSpPr txBox="1"/>
-          <p:nvPr/>
-        </p:nvSpPr>
-        <p:spPr>
-          <a:xfrm>
-            <a:off x="9400000" y="1665009"/>
-            <a:ext cx="1468415" cy="707886"/>
-          </a:xfrm>
-          <a:prstGeom prst="rect">
-            <a:avLst/>
-          </a:prstGeom>
-          <a:noFill/>
-        </p:spPr>
-        <p:txBody>
-          <a:bodyPr wrap="none" rtlCol="0">
-            <a:spAutoFit/>
-          </a:bodyPr>
-          <a:lstStyle/>
-          <a:p>
-            <a:r>
-              <a:rPr lang="es-ES" sz="4000" dirty="0"/>
-              <a:t>Filtros</a:t>
-            </a:r>
-          </a:p>
-        </p:txBody>
-      </p:sp>
-      <p:sp>
-        <p:nvSpPr>
-          <p:cNvPr id="15" name="Flecha: a la derecha 14">
-            <a:extLst>
-              <a:ext uri="{FF2B5EF4-FFF2-40B4-BE49-F238E27FC236}">
-                <a16:creationId xmlns:a16="http://schemas.microsoft.com/office/drawing/2014/main" id="{00D8AC1D-6376-68B3-C968-517801907F45}"/>
-              </a:ext>
-            </a:extLst>
-          </p:cNvPr>
-          <p:cNvSpPr/>
-          <p:nvPr/>
-        </p:nvSpPr>
-        <p:spPr>
-          <a:xfrm rot="8761098">
-            <a:off x="3480327" y="2478024"/>
-            <a:ext cx="1082529" cy="465912"/>
-          </a:xfrm>
-          <a:prstGeom prst="rightArrow">
-            <a:avLst/>
-          </a:prstGeom>
-        </p:spPr>
-        <p:style>
-          <a:lnRef idx="2">
-            <a:schemeClr val="accent1">
-              <a:shade val="15000"/>
-            </a:schemeClr>
-          </a:lnRef>
-          <a:fillRef idx="1">
-            <a:schemeClr val="accent1"/>
-          </a:fillRef>
-          <a:effectRef idx="0">
-            <a:schemeClr val="accent1"/>
-          </a:effectRef>
-          <a:fontRef idx="minor">
-            <a:schemeClr val="lt1"/>
-          </a:fontRef>
-        </p:style>
-        <p:txBody>
-          <a:bodyPr rtlCol="0" anchor="ctr"/>
-          <a:lstStyle/>
-          <a:p>
-            <a:pPr algn="ctr"/>
-            <a:endParaRPr lang="es-ES"/>
-          </a:p>
-        </p:txBody>
-      </p:sp>
-      <p:sp>
-        <p:nvSpPr>
-          <p:cNvPr id="16" name="Flecha: a la derecha 15">
-            <a:extLst>
-              <a:ext uri="{FF2B5EF4-FFF2-40B4-BE49-F238E27FC236}">
-                <a16:creationId xmlns:a16="http://schemas.microsoft.com/office/drawing/2014/main" id="{73024F4F-22F9-737E-2321-C0B3CA555E52}"/>
-              </a:ext>
-            </a:extLst>
-          </p:cNvPr>
-          <p:cNvSpPr/>
-          <p:nvPr/>
-        </p:nvSpPr>
-        <p:spPr>
-          <a:xfrm rot="2434594">
-            <a:off x="7612753" y="2444712"/>
-            <a:ext cx="1082529" cy="465912"/>
-          </a:xfrm>
-          <a:prstGeom prst="rightArrow">
-            <a:avLst/>
-          </a:prstGeom>
-        </p:spPr>
-        <p:style>
-          <a:lnRef idx="2">
-            <a:schemeClr val="accent1">
-              <a:shade val="15000"/>
-            </a:schemeClr>
-          </a:lnRef>
-          <a:fillRef idx="1">
-            <a:schemeClr val="accent1"/>
-          </a:fillRef>
-          <a:effectRef idx="0">
-            <a:schemeClr val="accent1"/>
-          </a:effectRef>
-          <a:fontRef idx="minor">
-            <a:schemeClr val="lt1"/>
-          </a:fontRef>
-        </p:style>
-        <p:txBody>
-          <a:bodyPr rtlCol="0" anchor="ctr"/>
-          <a:lstStyle/>
-          <a:p>
-            <a:pPr algn="ctr"/>
-            <a:endParaRPr lang="es-ES"/>
+              <a:rPr lang="es-ES" dirty="0"/>
+              <a:t>Comprobamos aquellos valorados </a:t>
+            </a:r>
+            <a:r>
+              <a:rPr lang="es-ES" b="1" dirty="0"/>
+              <a:t>superiores</a:t>
+            </a:r>
+            <a:r>
+              <a:rPr lang="es-ES" dirty="0"/>
+              <a:t> a la </a:t>
+            </a:r>
+            <a:r>
+              <a:rPr lang="es-ES" b="1" dirty="0"/>
+              <a:t>media</a:t>
+            </a:r>
+            <a:r>
+              <a:rPr lang="es-ES" dirty="0"/>
+              <a:t>.</a:t>
+            </a:r>
           </a:p>
         </p:txBody>
       </p:sp>
@@ -4816,7 +5601,7 @@
           <p:cNvPr id="2" name="Gráfico 1">
             <a:extLst>
               <a:ext uri="{FF2B5EF4-FFF2-40B4-BE49-F238E27FC236}">
-                <a16:creationId xmlns:a16="http://schemas.microsoft.com/office/drawing/2014/main" id="{44F07C3F-91C2-BAEC-6C86-57783607D327}"/>
+                <a16:creationId xmlns:a16="http://schemas.microsoft.com/office/drawing/2014/main" id="{099AAE3B-28D8-33FD-9443-EB316279DA31}"/>
               </a:ext>
             </a:extLst>
           </p:cNvPr>
@@ -4853,7 +5638,7 @@
     </p:spTree>
     <p:extLst>
       <p:ext uri="{BB962C8B-B14F-4D97-AF65-F5344CB8AC3E}">
-        <p14:creationId xmlns:p14="http://schemas.microsoft.com/office/powerpoint/2010/main" val="2562442824"/>
+        <p14:creationId xmlns:p14="http://schemas.microsoft.com/office/powerpoint/2010/main" val="2852605939"/>
       </p:ext>
     </p:extLst>
   </p:cSld>
@@ -4915,7 +5700,7 @@
                   <a:schemeClr val="tx2"/>
                 </a:solidFill>
               </a:rPr>
-              <a:t>App - Mis listas</a:t>
+              <a:t>App - Buscador</a:t>
             </a:r>
           </a:p>
         </p:txBody>
@@ -4967,10 +5752,10 @@
       </p:cxnSp>
       <p:sp>
         <p:nvSpPr>
-          <p:cNvPr id="8" name="Rectángulo: esquinas redondeadas 7">
-            <a:extLst>
-              <a:ext uri="{FF2B5EF4-FFF2-40B4-BE49-F238E27FC236}">
-                <a16:creationId xmlns:a16="http://schemas.microsoft.com/office/drawing/2014/main" id="{FD456482-F852-5C25-60C5-37B057367CFC}"/>
+          <p:cNvPr id="7" name="Rectángulo: esquinas redondeadas 6">
+            <a:extLst>
+              <a:ext uri="{FF2B5EF4-FFF2-40B4-BE49-F238E27FC236}">
+                <a16:creationId xmlns:a16="http://schemas.microsoft.com/office/drawing/2014/main" id="{615B91DF-4210-5E5F-049D-FC78274FB030}"/>
               </a:ext>
             </a:extLst>
           </p:cNvPr>
@@ -4979,7 +5764,7 @@
         </p:nvSpPr>
         <p:spPr>
           <a:xfrm>
-            <a:off x="846213" y="1774259"/>
+            <a:off x="846212" y="2295945"/>
             <a:ext cx="2423160" cy="4192416"/>
           </a:xfrm>
           <a:prstGeom prst="roundRect">
@@ -5013,45 +5798,10 @@
       </p:sp>
       <p:sp>
         <p:nvSpPr>
-          <p:cNvPr id="11" name="CuadroTexto 10">
-            <a:extLst>
-              <a:ext uri="{FF2B5EF4-FFF2-40B4-BE49-F238E27FC236}">
-                <a16:creationId xmlns:a16="http://schemas.microsoft.com/office/drawing/2014/main" id="{C1CF97DD-A361-B116-C77B-0F3B9D7C7848}"/>
-              </a:ext>
-            </a:extLst>
-          </p:cNvPr>
-          <p:cNvSpPr txBox="1"/>
-          <p:nvPr/>
-        </p:nvSpPr>
-        <p:spPr>
-          <a:xfrm>
-            <a:off x="1009685" y="1066373"/>
-            <a:ext cx="2096215" cy="707886"/>
-          </a:xfrm>
-          <a:prstGeom prst="rect">
-            <a:avLst/>
-          </a:prstGeom>
-          <a:noFill/>
-        </p:spPr>
-        <p:txBody>
-          <a:bodyPr wrap="none" rtlCol="0">
-            <a:spAutoFit/>
-          </a:bodyPr>
-          <a:lstStyle/>
-          <a:p>
-            <a:r>
-              <a:rPr lang="es-ES" sz="4000" dirty="0"/>
-              <a:t>Mis listas</a:t>
-            </a:r>
-          </a:p>
-        </p:txBody>
-      </p:sp>
-      <p:sp>
-        <p:nvSpPr>
-          <p:cNvPr id="13" name="Rectángulo: esquinas redondeadas 12">
-            <a:extLst>
-              <a:ext uri="{FF2B5EF4-FFF2-40B4-BE49-F238E27FC236}">
-                <a16:creationId xmlns:a16="http://schemas.microsoft.com/office/drawing/2014/main" id="{BED32F55-342F-11E0-3BD8-38A9ABEBAECE}"/>
+          <p:cNvPr id="8" name="Rectángulo: esquinas redondeadas 7">
+            <a:extLst>
+              <a:ext uri="{FF2B5EF4-FFF2-40B4-BE49-F238E27FC236}">
+                <a16:creationId xmlns:a16="http://schemas.microsoft.com/office/drawing/2014/main" id="{FD456482-F852-5C25-60C5-37B057367CFC}"/>
               </a:ext>
             </a:extLst>
           </p:cNvPr>
@@ -5060,7 +5810,7 @@
         </p:nvSpPr>
         <p:spPr>
           <a:xfrm>
-            <a:off x="4884420" y="1826536"/>
+            <a:off x="4884420" y="1665009"/>
             <a:ext cx="2423160" cy="4192416"/>
           </a:xfrm>
           <a:prstGeom prst="roundRect">
@@ -5088,16 +5838,16 @@
           <a:lstStyle/>
           <a:p>
             <a:pPr algn="ctr"/>
-            <a:endParaRPr lang="es-ES" dirty="0"/>
-          </a:p>
-        </p:txBody>
-      </p:sp>
-      <p:sp>
-        <p:nvSpPr>
-          <p:cNvPr id="14" name="CuadroTexto 13">
-            <a:extLst>
-              <a:ext uri="{FF2B5EF4-FFF2-40B4-BE49-F238E27FC236}">
-                <a16:creationId xmlns:a16="http://schemas.microsoft.com/office/drawing/2014/main" id="{BEC8769F-346D-490B-02EB-B8B913BCD8B2}"/>
+            <a:endParaRPr lang="es-ES"/>
+          </a:p>
+        </p:txBody>
+      </p:sp>
+      <p:sp>
+        <p:nvSpPr>
+          <p:cNvPr id="11" name="CuadroTexto 10">
+            <a:extLst>
+              <a:ext uri="{FF2B5EF4-FFF2-40B4-BE49-F238E27FC236}">
+                <a16:creationId xmlns:a16="http://schemas.microsoft.com/office/drawing/2014/main" id="{C1CF97DD-A361-B116-C77B-0F3B9D7C7848}"/>
               </a:ext>
             </a:extLst>
           </p:cNvPr>
@@ -5106,8 +5856,8 @@
         </p:nvSpPr>
         <p:spPr>
           <a:xfrm>
-            <a:off x="4182223" y="1118650"/>
-            <a:ext cx="3940502" cy="707886"/>
+            <a:off x="4261251" y="1000575"/>
+            <a:ext cx="3782446" cy="707886"/>
           </a:xfrm>
           <a:prstGeom prst="rect">
             <a:avLst/>
@@ -5122,17 +5872,52 @@
           <a:p>
             <a:r>
               <a:rPr lang="es-ES" sz="4000" dirty="0"/>
-              <a:t>Sugerencia/Filtros</a:t>
-            </a:r>
-          </a:p>
-        </p:txBody>
-      </p:sp>
-      <p:sp>
-        <p:nvSpPr>
-          <p:cNvPr id="16" name="Flecha: a la derecha 15">
-            <a:extLst>
-              <a:ext uri="{FF2B5EF4-FFF2-40B4-BE49-F238E27FC236}">
-                <a16:creationId xmlns:a16="http://schemas.microsoft.com/office/drawing/2014/main" id="{73024F4F-22F9-737E-2321-C0B3CA555E52}"/>
+              <a:t>Inicial/Categorías</a:t>
+            </a:r>
+          </a:p>
+        </p:txBody>
+      </p:sp>
+      <p:sp>
+        <p:nvSpPr>
+          <p:cNvPr id="12" name="CuadroTexto 11">
+            <a:extLst>
+              <a:ext uri="{FF2B5EF4-FFF2-40B4-BE49-F238E27FC236}">
+                <a16:creationId xmlns:a16="http://schemas.microsoft.com/office/drawing/2014/main" id="{84D967ED-65BC-CFD5-E209-CAE0C4BC242A}"/>
+              </a:ext>
+            </a:extLst>
+          </p:cNvPr>
+          <p:cNvSpPr txBox="1"/>
+          <p:nvPr/>
+        </p:nvSpPr>
+        <p:spPr>
+          <a:xfrm>
+            <a:off x="874612" y="1588059"/>
+            <a:ext cx="2284151" cy="707886"/>
+          </a:xfrm>
+          <a:prstGeom prst="rect">
+            <a:avLst/>
+          </a:prstGeom>
+          <a:noFill/>
+        </p:spPr>
+        <p:txBody>
+          <a:bodyPr wrap="none" rtlCol="0">
+            <a:spAutoFit/>
+          </a:bodyPr>
+          <a:lstStyle/>
+          <a:p>
+            <a:r>
+              <a:rPr lang="es-ES" sz="4000" dirty="0"/>
+              <a:t>Productos</a:t>
+            </a:r>
+          </a:p>
+        </p:txBody>
+      </p:sp>
+      <p:sp>
+        <p:nvSpPr>
+          <p:cNvPr id="13" name="Rectángulo: esquinas redondeadas 12">
+            <a:extLst>
+              <a:ext uri="{FF2B5EF4-FFF2-40B4-BE49-F238E27FC236}">
+                <a16:creationId xmlns:a16="http://schemas.microsoft.com/office/drawing/2014/main" id="{BED32F55-342F-11E0-3BD8-38A9ABEBAECE}"/>
               </a:ext>
             </a:extLst>
           </p:cNvPr>
@@ -5141,10 +5926,10 @@
         </p:nvSpPr>
         <p:spPr>
           <a:xfrm>
-            <a:off x="3481692" y="3404555"/>
-            <a:ext cx="1082529" cy="465912"/>
-          </a:xfrm>
-          <a:prstGeom prst="rightArrow">
+            <a:off x="8922628" y="2295945"/>
+            <a:ext cx="2423160" cy="4192416"/>
+          </a:xfrm>
+          <a:prstGeom prst="roundRect">
             <a:avLst/>
           </a:prstGeom>
         </p:spPr>
@@ -5169,16 +5954,51 @@
           <a:lstStyle/>
           <a:p>
             <a:pPr algn="ctr"/>
-            <a:endParaRPr lang="es-ES"/>
-          </a:p>
-        </p:txBody>
-      </p:sp>
-      <p:sp>
-        <p:nvSpPr>
-          <p:cNvPr id="2" name="Flecha: a la derecha 1">
-            <a:extLst>
-              <a:ext uri="{FF2B5EF4-FFF2-40B4-BE49-F238E27FC236}">
-                <a16:creationId xmlns:a16="http://schemas.microsoft.com/office/drawing/2014/main" id="{4734DEDB-A7A8-0082-9728-84B3899201D9}"/>
+            <a:endParaRPr lang="es-ES" dirty="0"/>
+          </a:p>
+        </p:txBody>
+      </p:sp>
+      <p:sp>
+        <p:nvSpPr>
+          <p:cNvPr id="14" name="CuadroTexto 13">
+            <a:extLst>
+              <a:ext uri="{FF2B5EF4-FFF2-40B4-BE49-F238E27FC236}">
+                <a16:creationId xmlns:a16="http://schemas.microsoft.com/office/drawing/2014/main" id="{BEC8769F-346D-490B-02EB-B8B913BCD8B2}"/>
+              </a:ext>
+            </a:extLst>
+          </p:cNvPr>
+          <p:cNvSpPr txBox="1"/>
+          <p:nvPr/>
+        </p:nvSpPr>
+        <p:spPr>
+          <a:xfrm>
+            <a:off x="9400000" y="1665009"/>
+            <a:ext cx="1468415" cy="707886"/>
+          </a:xfrm>
+          <a:prstGeom prst="rect">
+            <a:avLst/>
+          </a:prstGeom>
+          <a:noFill/>
+        </p:spPr>
+        <p:txBody>
+          <a:bodyPr wrap="none" rtlCol="0">
+            <a:spAutoFit/>
+          </a:bodyPr>
+          <a:lstStyle/>
+          <a:p>
+            <a:r>
+              <a:rPr lang="es-ES" sz="4000" dirty="0"/>
+              <a:t>Filtros</a:t>
+            </a:r>
+          </a:p>
+        </p:txBody>
+      </p:sp>
+      <p:sp>
+        <p:nvSpPr>
+          <p:cNvPr id="15" name="Flecha: a la derecha 14">
+            <a:extLst>
+              <a:ext uri="{FF2B5EF4-FFF2-40B4-BE49-F238E27FC236}">
+                <a16:creationId xmlns:a16="http://schemas.microsoft.com/office/drawing/2014/main" id="{00D8AC1D-6376-68B3-C968-517801907F45}"/>
               </a:ext>
             </a:extLst>
           </p:cNvPr>
@@ -5186,8 +6006,8 @@
           <p:nvPr/>
         </p:nvSpPr>
         <p:spPr>
-          <a:xfrm>
-            <a:off x="7571344" y="3404555"/>
+          <a:xfrm rot="8761098">
+            <a:off x="3480327" y="2478024"/>
             <a:ext cx="1082529" cy="465912"/>
           </a:xfrm>
           <a:prstGeom prst="rightArrow">
@@ -5221,10 +6041,10 @@
       </p:sp>
       <p:sp>
         <p:nvSpPr>
-          <p:cNvPr id="5" name="Rectángulo: esquinas redondeadas 4">
-            <a:extLst>
-              <a:ext uri="{FF2B5EF4-FFF2-40B4-BE49-F238E27FC236}">
-                <a16:creationId xmlns:a16="http://schemas.microsoft.com/office/drawing/2014/main" id="{3C666E25-0514-5036-E0DB-699520D03745}"/>
+          <p:cNvPr id="16" name="Flecha: a la derecha 15">
+            <a:extLst>
+              <a:ext uri="{FF2B5EF4-FFF2-40B4-BE49-F238E27FC236}">
+                <a16:creationId xmlns:a16="http://schemas.microsoft.com/office/drawing/2014/main" id="{73024F4F-22F9-737E-2321-C0B3CA555E52}"/>
               </a:ext>
             </a:extLst>
           </p:cNvPr>
@@ -5232,11 +6052,11 @@
           <p:nvPr/>
         </p:nvSpPr>
         <p:spPr>
-          <a:xfrm>
-            <a:off x="9035575" y="1718544"/>
-            <a:ext cx="2423160" cy="4192416"/>
-          </a:xfrm>
-          <a:prstGeom prst="roundRect">
+          <a:xfrm rot="2434594">
+            <a:off x="7612753" y="2444712"/>
+            <a:ext cx="1082529" cy="465912"/>
+          </a:xfrm>
+          <a:prstGeom prst="rightArrow">
             <a:avLst/>
           </a:prstGeom>
         </p:spPr>
@@ -5261,114 +6081,16 @@
           <a:lstStyle/>
           <a:p>
             <a:pPr algn="ctr"/>
-            <a:endParaRPr lang="es-ES" dirty="0"/>
-          </a:p>
-        </p:txBody>
-      </p:sp>
-      <p:sp>
-        <p:nvSpPr>
-          <p:cNvPr id="6" name="CuadroTexto 5">
-            <a:extLst>
-              <a:ext uri="{FF2B5EF4-FFF2-40B4-BE49-F238E27FC236}">
-                <a16:creationId xmlns:a16="http://schemas.microsoft.com/office/drawing/2014/main" id="{912CB09F-2697-B431-B381-F1775FF6D8DA}"/>
-              </a:ext>
-            </a:extLst>
-          </p:cNvPr>
-          <p:cNvSpPr txBox="1"/>
-          <p:nvPr/>
-        </p:nvSpPr>
-        <p:spPr>
-          <a:xfrm>
-            <a:off x="9018164" y="1023081"/>
-            <a:ext cx="2457981" cy="707886"/>
-          </a:xfrm>
-          <a:prstGeom prst="rect">
-            <a:avLst/>
-          </a:prstGeom>
-          <a:noFill/>
-        </p:spPr>
-        <p:txBody>
-          <a:bodyPr wrap="none" rtlCol="0">
-            <a:spAutoFit/>
-          </a:bodyPr>
-          <a:lstStyle/>
-          <a:p>
-            <a:r>
-              <a:rPr lang="es-ES" sz="4000" dirty="0"/>
-              <a:t>Sugerencia</a:t>
-            </a:r>
-          </a:p>
-        </p:txBody>
-      </p:sp>
-      <p:sp>
-        <p:nvSpPr>
-          <p:cNvPr id="10" name="CuadroTexto 9">
-            <a:extLst>
-              <a:ext uri="{FF2B5EF4-FFF2-40B4-BE49-F238E27FC236}">
-                <a16:creationId xmlns:a16="http://schemas.microsoft.com/office/drawing/2014/main" id="{F5D5010F-6E9F-0D31-B500-A95AAA4CEBA0}"/>
-              </a:ext>
-            </a:extLst>
-          </p:cNvPr>
-          <p:cNvSpPr txBox="1"/>
-          <p:nvPr/>
-        </p:nvSpPr>
-        <p:spPr>
-          <a:xfrm>
-            <a:off x="2070744" y="6249514"/>
-            <a:ext cx="8323112" cy="369332"/>
-          </a:xfrm>
-          <a:prstGeom prst="rect">
-            <a:avLst/>
-          </a:prstGeom>
-          <a:noFill/>
-        </p:spPr>
-        <p:txBody>
-          <a:bodyPr wrap="none" rtlCol="0">
-            <a:spAutoFit/>
-          </a:bodyPr>
-          <a:lstStyle/>
-          <a:p>
-            <a:r>
-              <a:rPr lang="es-ES" dirty="0"/>
-              <a:t>* En todo momento en el </a:t>
-            </a:r>
-            <a:r>
-              <a:rPr lang="es-ES" b="1" dirty="0"/>
-              <a:t>buscador</a:t>
-            </a:r>
-            <a:r>
-              <a:rPr lang="es-ES" dirty="0"/>
-              <a:t> anterior podríamos </a:t>
-            </a:r>
-            <a:r>
-              <a:rPr lang="es-ES" b="1" dirty="0"/>
-              <a:t>añadir</a:t>
-            </a:r>
-            <a:r>
-              <a:rPr lang="es-ES" dirty="0"/>
-              <a:t> un </a:t>
-            </a:r>
-            <a:r>
-              <a:rPr lang="es-ES" b="1" dirty="0"/>
-              <a:t>producto</a:t>
-            </a:r>
-            <a:r>
-              <a:rPr lang="es-ES" dirty="0"/>
-              <a:t> a una </a:t>
-            </a:r>
-            <a:r>
-              <a:rPr lang="es-ES" b="1" dirty="0"/>
-              <a:t>lista.</a:t>
-            </a:r>
+            <a:endParaRPr lang="es-ES"/>
           </a:p>
         </p:txBody>
       </p:sp>
       <p:pic>
         <p:nvPicPr>
-          <p:cNvPr id="7" name="Gráfico 6">
-            <a:extLst>
-              <a:ext uri="{FF2B5EF4-FFF2-40B4-BE49-F238E27FC236}">
-                <a16:creationId xmlns:a16="http://schemas.microsoft.com/office/drawing/2014/main" id="{A8D3541F-1735-7952-2820-8A70ADCBDA68}"/>
+          <p:cNvPr id="2" name="Gráfico 1">
+            <a:extLst>
+              <a:ext uri="{FF2B5EF4-FFF2-40B4-BE49-F238E27FC236}">
+                <a16:creationId xmlns:a16="http://schemas.microsoft.com/office/drawing/2014/main" id="{44F07C3F-91C2-BAEC-6C86-57783607D327}"/>
               </a:ext>
             </a:extLst>
           </p:cNvPr>
@@ -5405,7 +6127,7 @@
     </p:spTree>
     <p:extLst>
       <p:ext uri="{BB962C8B-B14F-4D97-AF65-F5344CB8AC3E}">
-        <p14:creationId xmlns:p14="http://schemas.microsoft.com/office/powerpoint/2010/main" val="3386400139"/>
+        <p14:creationId xmlns:p14="http://schemas.microsoft.com/office/powerpoint/2010/main" val="2562442824"/>
       </p:ext>
     </p:extLst>
   </p:cSld>
@@ -5467,7 +6189,7 @@
                   <a:schemeClr val="tx2"/>
                 </a:solidFill>
               </a:rPr>
-              <a:t>App - Perfil</a:t>
+              <a:t>App - Mis listas</a:t>
             </a:r>
           </a:p>
         </p:txBody>
@@ -5519,10 +6241,10 @@
       </p:cxnSp>
       <p:sp>
         <p:nvSpPr>
-          <p:cNvPr id="7" name="Rectángulo: esquinas redondeadas 6">
-            <a:extLst>
-              <a:ext uri="{FF2B5EF4-FFF2-40B4-BE49-F238E27FC236}">
-                <a16:creationId xmlns:a16="http://schemas.microsoft.com/office/drawing/2014/main" id="{615B91DF-4210-5E5F-049D-FC78274FB030}"/>
+          <p:cNvPr id="8" name="Rectángulo: esquinas redondeadas 7">
+            <a:extLst>
+              <a:ext uri="{FF2B5EF4-FFF2-40B4-BE49-F238E27FC236}">
+                <a16:creationId xmlns:a16="http://schemas.microsoft.com/office/drawing/2014/main" id="{FD456482-F852-5C25-60C5-37B057367CFC}"/>
               </a:ext>
             </a:extLst>
           </p:cNvPr>
@@ -5531,7 +6253,7 @@
         </p:nvSpPr>
         <p:spPr>
           <a:xfrm>
-            <a:off x="846212" y="2295945"/>
+            <a:off x="846213" y="1774259"/>
             <a:ext cx="2423160" cy="4192416"/>
           </a:xfrm>
           <a:prstGeom prst="roundRect">
@@ -5565,10 +6287,45 @@
       </p:sp>
       <p:sp>
         <p:nvSpPr>
-          <p:cNvPr id="8" name="Rectángulo: esquinas redondeadas 7">
-            <a:extLst>
-              <a:ext uri="{FF2B5EF4-FFF2-40B4-BE49-F238E27FC236}">
-                <a16:creationId xmlns:a16="http://schemas.microsoft.com/office/drawing/2014/main" id="{FD456482-F852-5C25-60C5-37B057367CFC}"/>
+          <p:cNvPr id="11" name="CuadroTexto 10">
+            <a:extLst>
+              <a:ext uri="{FF2B5EF4-FFF2-40B4-BE49-F238E27FC236}">
+                <a16:creationId xmlns:a16="http://schemas.microsoft.com/office/drawing/2014/main" id="{C1CF97DD-A361-B116-C77B-0F3B9D7C7848}"/>
+              </a:ext>
+            </a:extLst>
+          </p:cNvPr>
+          <p:cNvSpPr txBox="1"/>
+          <p:nvPr/>
+        </p:nvSpPr>
+        <p:spPr>
+          <a:xfrm>
+            <a:off x="1009685" y="1066373"/>
+            <a:ext cx="2096215" cy="707886"/>
+          </a:xfrm>
+          <a:prstGeom prst="rect">
+            <a:avLst/>
+          </a:prstGeom>
+          <a:noFill/>
+        </p:spPr>
+        <p:txBody>
+          <a:bodyPr wrap="none" rtlCol="0">
+            <a:spAutoFit/>
+          </a:bodyPr>
+          <a:lstStyle/>
+          <a:p>
+            <a:r>
+              <a:rPr lang="es-ES" sz="4000" dirty="0"/>
+              <a:t>Mis listas</a:t>
+            </a:r>
+          </a:p>
+        </p:txBody>
+      </p:sp>
+      <p:sp>
+        <p:nvSpPr>
+          <p:cNvPr id="13" name="Rectángulo: esquinas redondeadas 12">
+            <a:extLst>
+              <a:ext uri="{FF2B5EF4-FFF2-40B4-BE49-F238E27FC236}">
+                <a16:creationId xmlns:a16="http://schemas.microsoft.com/office/drawing/2014/main" id="{BED32F55-342F-11E0-3BD8-38A9ABEBAECE}"/>
               </a:ext>
             </a:extLst>
           </p:cNvPr>
@@ -5577,7 +6334,7 @@
         </p:nvSpPr>
         <p:spPr>
           <a:xfrm>
-            <a:off x="4884420" y="1665009"/>
+            <a:off x="4884420" y="1826536"/>
             <a:ext cx="2423160" cy="4192416"/>
           </a:xfrm>
           <a:prstGeom prst="roundRect">
@@ -5605,16 +6362,16 @@
           <a:lstStyle/>
           <a:p>
             <a:pPr algn="ctr"/>
-            <a:endParaRPr lang="es-ES"/>
-          </a:p>
-        </p:txBody>
-      </p:sp>
-      <p:sp>
-        <p:nvSpPr>
-          <p:cNvPr id="11" name="CuadroTexto 10">
-            <a:extLst>
-              <a:ext uri="{FF2B5EF4-FFF2-40B4-BE49-F238E27FC236}">
-                <a16:creationId xmlns:a16="http://schemas.microsoft.com/office/drawing/2014/main" id="{C1CF97DD-A361-B116-C77B-0F3B9D7C7848}"/>
+            <a:endParaRPr lang="es-ES" dirty="0"/>
+          </a:p>
+        </p:txBody>
+      </p:sp>
+      <p:sp>
+        <p:nvSpPr>
+          <p:cNvPr id="14" name="CuadroTexto 13">
+            <a:extLst>
+              <a:ext uri="{FF2B5EF4-FFF2-40B4-BE49-F238E27FC236}">
+                <a16:creationId xmlns:a16="http://schemas.microsoft.com/office/drawing/2014/main" id="{BEC8769F-346D-490B-02EB-B8B913BCD8B2}"/>
               </a:ext>
             </a:extLst>
           </p:cNvPr>
@@ -5623,8 +6380,8 @@
         </p:nvSpPr>
         <p:spPr>
           <a:xfrm>
-            <a:off x="5397732" y="967997"/>
-            <a:ext cx="1396536" cy="707886"/>
+            <a:off x="4182223" y="1118650"/>
+            <a:ext cx="3940502" cy="707886"/>
           </a:xfrm>
           <a:prstGeom prst="rect">
             <a:avLst/>
@@ -5639,52 +6396,17 @@
           <a:p>
             <a:r>
               <a:rPr lang="es-ES" sz="4000" dirty="0"/>
-              <a:t>Inicial</a:t>
-            </a:r>
-          </a:p>
-        </p:txBody>
-      </p:sp>
-      <p:sp>
-        <p:nvSpPr>
-          <p:cNvPr id="12" name="CuadroTexto 11">
-            <a:extLst>
-              <a:ext uri="{FF2B5EF4-FFF2-40B4-BE49-F238E27FC236}">
-                <a16:creationId xmlns:a16="http://schemas.microsoft.com/office/drawing/2014/main" id="{84D967ED-65BC-CFD5-E209-CAE0C4BC242A}"/>
-              </a:ext>
-            </a:extLst>
-          </p:cNvPr>
-          <p:cNvSpPr txBox="1"/>
-          <p:nvPr/>
-        </p:nvSpPr>
-        <p:spPr>
-          <a:xfrm>
-            <a:off x="1323585" y="1588059"/>
-            <a:ext cx="1403589" cy="707886"/>
-          </a:xfrm>
-          <a:prstGeom prst="rect">
-            <a:avLst/>
-          </a:prstGeom>
-          <a:noFill/>
-        </p:spPr>
-        <p:txBody>
-          <a:bodyPr wrap="none" rtlCol="0">
-            <a:spAutoFit/>
-          </a:bodyPr>
-          <a:lstStyle/>
-          <a:p>
-            <a:r>
-              <a:rPr lang="es-ES" sz="4000" dirty="0"/>
-              <a:t>Editar</a:t>
-            </a:r>
-          </a:p>
-        </p:txBody>
-      </p:sp>
-      <p:sp>
-        <p:nvSpPr>
-          <p:cNvPr id="13" name="Rectángulo: esquinas redondeadas 12">
-            <a:extLst>
-              <a:ext uri="{FF2B5EF4-FFF2-40B4-BE49-F238E27FC236}">
-                <a16:creationId xmlns:a16="http://schemas.microsoft.com/office/drawing/2014/main" id="{BED32F55-342F-11E0-3BD8-38A9ABEBAECE}"/>
+              <a:t>Sugerencia/Filtros</a:t>
+            </a:r>
+          </a:p>
+        </p:txBody>
+      </p:sp>
+      <p:sp>
+        <p:nvSpPr>
+          <p:cNvPr id="16" name="Flecha: a la derecha 15">
+            <a:extLst>
+              <a:ext uri="{FF2B5EF4-FFF2-40B4-BE49-F238E27FC236}">
+                <a16:creationId xmlns:a16="http://schemas.microsoft.com/office/drawing/2014/main" id="{73024F4F-22F9-737E-2321-C0B3CA555E52}"/>
               </a:ext>
             </a:extLst>
           </p:cNvPr>
@@ -5693,10 +6415,10 @@
         </p:nvSpPr>
         <p:spPr>
           <a:xfrm>
-            <a:off x="8922628" y="2295945"/>
-            <a:ext cx="2423160" cy="4192416"/>
-          </a:xfrm>
-          <a:prstGeom prst="roundRect">
+            <a:off x="3481692" y="3404555"/>
+            <a:ext cx="1082529" cy="465912"/>
+          </a:xfrm>
+          <a:prstGeom prst="rightArrow">
             <a:avLst/>
           </a:prstGeom>
         </p:spPr>
@@ -5721,51 +6443,16 @@
           <a:lstStyle/>
           <a:p>
             <a:pPr algn="ctr"/>
-            <a:endParaRPr lang="es-ES" dirty="0"/>
-          </a:p>
-        </p:txBody>
-      </p:sp>
-      <p:sp>
-        <p:nvSpPr>
-          <p:cNvPr id="14" name="CuadroTexto 13">
-            <a:extLst>
-              <a:ext uri="{FF2B5EF4-FFF2-40B4-BE49-F238E27FC236}">
-                <a16:creationId xmlns:a16="http://schemas.microsoft.com/office/drawing/2014/main" id="{BEC8769F-346D-490B-02EB-B8B913BCD8B2}"/>
-              </a:ext>
-            </a:extLst>
-          </p:cNvPr>
-          <p:cNvSpPr txBox="1"/>
-          <p:nvPr/>
-        </p:nvSpPr>
-        <p:spPr>
-          <a:xfrm>
-            <a:off x="9218284" y="1588059"/>
-            <a:ext cx="1831848" cy="707886"/>
-          </a:xfrm>
-          <a:prstGeom prst="rect">
-            <a:avLst/>
-          </a:prstGeom>
-          <a:noFill/>
-        </p:spPr>
-        <p:txBody>
-          <a:bodyPr wrap="none" rtlCol="0">
-            <a:spAutoFit/>
-          </a:bodyPr>
-          <a:lstStyle/>
-          <a:p>
-            <a:r>
-              <a:rPr lang="es-ES" sz="4000" dirty="0"/>
-              <a:t>Soporte</a:t>
-            </a:r>
-          </a:p>
-        </p:txBody>
-      </p:sp>
-      <p:sp>
-        <p:nvSpPr>
-          <p:cNvPr id="15" name="Flecha: a la derecha 14">
-            <a:extLst>
-              <a:ext uri="{FF2B5EF4-FFF2-40B4-BE49-F238E27FC236}">
-                <a16:creationId xmlns:a16="http://schemas.microsoft.com/office/drawing/2014/main" id="{00D8AC1D-6376-68B3-C968-517801907F45}"/>
+            <a:endParaRPr lang="es-ES"/>
+          </a:p>
+        </p:txBody>
+      </p:sp>
+      <p:sp>
+        <p:nvSpPr>
+          <p:cNvPr id="2" name="Flecha: a la derecha 1">
+            <a:extLst>
+              <a:ext uri="{FF2B5EF4-FFF2-40B4-BE49-F238E27FC236}">
+                <a16:creationId xmlns:a16="http://schemas.microsoft.com/office/drawing/2014/main" id="{4734DEDB-A7A8-0082-9728-84B3899201D9}"/>
               </a:ext>
             </a:extLst>
           </p:cNvPr>
@@ -5773,8 +6460,8 @@
           <p:nvPr/>
         </p:nvSpPr>
         <p:spPr>
-          <a:xfrm rot="8761098">
-            <a:off x="3480327" y="2478024"/>
+          <a:xfrm>
+            <a:off x="7571344" y="3404555"/>
             <a:ext cx="1082529" cy="465912"/>
           </a:xfrm>
           <a:prstGeom prst="rightArrow">
@@ -5808,10 +6495,10 @@
       </p:sp>
       <p:sp>
         <p:nvSpPr>
-          <p:cNvPr id="16" name="Flecha: a la derecha 15">
-            <a:extLst>
-              <a:ext uri="{FF2B5EF4-FFF2-40B4-BE49-F238E27FC236}">
-                <a16:creationId xmlns:a16="http://schemas.microsoft.com/office/drawing/2014/main" id="{73024F4F-22F9-737E-2321-C0B3CA555E52}"/>
+          <p:cNvPr id="5" name="Rectángulo: esquinas redondeadas 4">
+            <a:extLst>
+              <a:ext uri="{FF2B5EF4-FFF2-40B4-BE49-F238E27FC236}">
+                <a16:creationId xmlns:a16="http://schemas.microsoft.com/office/drawing/2014/main" id="{3C666E25-0514-5036-E0DB-699520D03745}"/>
               </a:ext>
             </a:extLst>
           </p:cNvPr>
@@ -5819,11 +6506,11 @@
           <p:nvPr/>
         </p:nvSpPr>
         <p:spPr>
-          <a:xfrm rot="2434594">
-            <a:off x="7612753" y="2444712"/>
-            <a:ext cx="1082529" cy="465912"/>
-          </a:xfrm>
-          <a:prstGeom prst="rightArrow">
+          <a:xfrm>
+            <a:off x="9035575" y="1718544"/>
+            <a:ext cx="2423160" cy="4192416"/>
+          </a:xfrm>
+          <a:prstGeom prst="roundRect">
             <a:avLst/>
           </a:prstGeom>
         </p:spPr>
@@ -5848,16 +6535,114 @@
           <a:lstStyle/>
           <a:p>
             <a:pPr algn="ctr"/>
-            <a:endParaRPr lang="es-ES"/>
+            <a:endParaRPr lang="es-ES" dirty="0"/>
+          </a:p>
+        </p:txBody>
+      </p:sp>
+      <p:sp>
+        <p:nvSpPr>
+          <p:cNvPr id="6" name="CuadroTexto 5">
+            <a:extLst>
+              <a:ext uri="{FF2B5EF4-FFF2-40B4-BE49-F238E27FC236}">
+                <a16:creationId xmlns:a16="http://schemas.microsoft.com/office/drawing/2014/main" id="{912CB09F-2697-B431-B381-F1775FF6D8DA}"/>
+              </a:ext>
+            </a:extLst>
+          </p:cNvPr>
+          <p:cNvSpPr txBox="1"/>
+          <p:nvPr/>
+        </p:nvSpPr>
+        <p:spPr>
+          <a:xfrm>
+            <a:off x="9018164" y="1023081"/>
+            <a:ext cx="2457981" cy="707886"/>
+          </a:xfrm>
+          <a:prstGeom prst="rect">
+            <a:avLst/>
+          </a:prstGeom>
+          <a:noFill/>
+        </p:spPr>
+        <p:txBody>
+          <a:bodyPr wrap="none" rtlCol="0">
+            <a:spAutoFit/>
+          </a:bodyPr>
+          <a:lstStyle/>
+          <a:p>
+            <a:r>
+              <a:rPr lang="es-ES" sz="4000" dirty="0"/>
+              <a:t>Sugerencia</a:t>
+            </a:r>
+          </a:p>
+        </p:txBody>
+      </p:sp>
+      <p:sp>
+        <p:nvSpPr>
+          <p:cNvPr id="10" name="CuadroTexto 9">
+            <a:extLst>
+              <a:ext uri="{FF2B5EF4-FFF2-40B4-BE49-F238E27FC236}">
+                <a16:creationId xmlns:a16="http://schemas.microsoft.com/office/drawing/2014/main" id="{F5D5010F-6E9F-0D31-B500-A95AAA4CEBA0}"/>
+              </a:ext>
+            </a:extLst>
+          </p:cNvPr>
+          <p:cNvSpPr txBox="1"/>
+          <p:nvPr/>
+        </p:nvSpPr>
+        <p:spPr>
+          <a:xfrm>
+            <a:off x="2070744" y="6249514"/>
+            <a:ext cx="8323112" cy="369332"/>
+          </a:xfrm>
+          <a:prstGeom prst="rect">
+            <a:avLst/>
+          </a:prstGeom>
+          <a:noFill/>
+        </p:spPr>
+        <p:txBody>
+          <a:bodyPr wrap="none" rtlCol="0">
+            <a:spAutoFit/>
+          </a:bodyPr>
+          <a:lstStyle/>
+          <a:p>
+            <a:r>
+              <a:rPr lang="es-ES" dirty="0"/>
+              <a:t>* En todo momento en el </a:t>
+            </a:r>
+            <a:r>
+              <a:rPr lang="es-ES" b="1" dirty="0"/>
+              <a:t>buscador</a:t>
+            </a:r>
+            <a:r>
+              <a:rPr lang="es-ES" dirty="0"/>
+              <a:t> anterior podríamos </a:t>
+            </a:r>
+            <a:r>
+              <a:rPr lang="es-ES" b="1" dirty="0"/>
+              <a:t>añadir</a:t>
+            </a:r>
+            <a:r>
+              <a:rPr lang="es-ES" dirty="0"/>
+              <a:t> un </a:t>
+            </a:r>
+            <a:r>
+              <a:rPr lang="es-ES" b="1" dirty="0"/>
+              <a:t>producto</a:t>
+            </a:r>
+            <a:r>
+              <a:rPr lang="es-ES" dirty="0"/>
+              <a:t> a una </a:t>
+            </a:r>
+            <a:r>
+              <a:rPr lang="es-ES" b="1" dirty="0"/>
+              <a:t>lista.</a:t>
+            </a:r>
           </a:p>
         </p:txBody>
       </p:sp>
       <p:pic>
         <p:nvPicPr>
-          <p:cNvPr id="2" name="Gráfico 1">
-            <a:extLst>
-              <a:ext uri="{FF2B5EF4-FFF2-40B4-BE49-F238E27FC236}">
-                <a16:creationId xmlns:a16="http://schemas.microsoft.com/office/drawing/2014/main" id="{E5C8D729-6585-5539-B004-ED7AE3519E0E}"/>
+          <p:cNvPr id="7" name="Gráfico 6">
+            <a:extLst>
+              <a:ext uri="{FF2B5EF4-FFF2-40B4-BE49-F238E27FC236}">
+                <a16:creationId xmlns:a16="http://schemas.microsoft.com/office/drawing/2014/main" id="{A8D3541F-1735-7952-2820-8A70ADCBDA68}"/>
               </a:ext>
             </a:extLst>
           </p:cNvPr>
@@ -5894,7 +6679,7 @@
     </p:spTree>
     <p:extLst>
       <p:ext uri="{BB962C8B-B14F-4D97-AF65-F5344CB8AC3E}">
-        <p14:creationId xmlns:p14="http://schemas.microsoft.com/office/powerpoint/2010/main" val="1689739066"/>
+        <p14:creationId xmlns:p14="http://schemas.microsoft.com/office/powerpoint/2010/main" val="3386400139"/>
       </p:ext>
     </p:extLst>
   </p:cSld>
@@ -6112,6 +6897,495 @@
         </p:nvSpPr>
         <p:spPr>
           <a:xfrm>
+            <a:off x="5397732" y="967997"/>
+            <a:ext cx="1396536" cy="707886"/>
+          </a:xfrm>
+          <a:prstGeom prst="rect">
+            <a:avLst/>
+          </a:prstGeom>
+          <a:noFill/>
+        </p:spPr>
+        <p:txBody>
+          <a:bodyPr wrap="none" rtlCol="0">
+            <a:spAutoFit/>
+          </a:bodyPr>
+          <a:lstStyle/>
+          <a:p>
+            <a:r>
+              <a:rPr lang="es-ES" sz="4000" dirty="0"/>
+              <a:t>Inicial</a:t>
+            </a:r>
+          </a:p>
+        </p:txBody>
+      </p:sp>
+      <p:sp>
+        <p:nvSpPr>
+          <p:cNvPr id="12" name="CuadroTexto 11">
+            <a:extLst>
+              <a:ext uri="{FF2B5EF4-FFF2-40B4-BE49-F238E27FC236}">
+                <a16:creationId xmlns:a16="http://schemas.microsoft.com/office/drawing/2014/main" id="{84D967ED-65BC-CFD5-E209-CAE0C4BC242A}"/>
+              </a:ext>
+            </a:extLst>
+          </p:cNvPr>
+          <p:cNvSpPr txBox="1"/>
+          <p:nvPr/>
+        </p:nvSpPr>
+        <p:spPr>
+          <a:xfrm>
+            <a:off x="1323585" y="1588059"/>
+            <a:ext cx="1403589" cy="707886"/>
+          </a:xfrm>
+          <a:prstGeom prst="rect">
+            <a:avLst/>
+          </a:prstGeom>
+          <a:noFill/>
+        </p:spPr>
+        <p:txBody>
+          <a:bodyPr wrap="none" rtlCol="0">
+            <a:spAutoFit/>
+          </a:bodyPr>
+          <a:lstStyle/>
+          <a:p>
+            <a:r>
+              <a:rPr lang="es-ES" sz="4000" dirty="0"/>
+              <a:t>Editar</a:t>
+            </a:r>
+          </a:p>
+        </p:txBody>
+      </p:sp>
+      <p:sp>
+        <p:nvSpPr>
+          <p:cNvPr id="13" name="Rectángulo: esquinas redondeadas 12">
+            <a:extLst>
+              <a:ext uri="{FF2B5EF4-FFF2-40B4-BE49-F238E27FC236}">
+                <a16:creationId xmlns:a16="http://schemas.microsoft.com/office/drawing/2014/main" id="{BED32F55-342F-11E0-3BD8-38A9ABEBAECE}"/>
+              </a:ext>
+            </a:extLst>
+          </p:cNvPr>
+          <p:cNvSpPr/>
+          <p:nvPr/>
+        </p:nvSpPr>
+        <p:spPr>
+          <a:xfrm>
+            <a:off x="8922628" y="2295945"/>
+            <a:ext cx="2423160" cy="4192416"/>
+          </a:xfrm>
+          <a:prstGeom prst="roundRect">
+            <a:avLst/>
+          </a:prstGeom>
+        </p:spPr>
+        <p:style>
+          <a:lnRef idx="2">
+            <a:schemeClr val="accent1">
+              <a:shade val="15000"/>
+            </a:schemeClr>
+          </a:lnRef>
+          <a:fillRef idx="1">
+            <a:schemeClr val="accent1"/>
+          </a:fillRef>
+          <a:effectRef idx="0">
+            <a:schemeClr val="accent1"/>
+          </a:effectRef>
+          <a:fontRef idx="minor">
+            <a:schemeClr val="lt1"/>
+          </a:fontRef>
+        </p:style>
+        <p:txBody>
+          <a:bodyPr rtlCol="0" anchor="ctr"/>
+          <a:lstStyle/>
+          <a:p>
+            <a:pPr algn="ctr"/>
+            <a:endParaRPr lang="es-ES" dirty="0"/>
+          </a:p>
+        </p:txBody>
+      </p:sp>
+      <p:sp>
+        <p:nvSpPr>
+          <p:cNvPr id="14" name="CuadroTexto 13">
+            <a:extLst>
+              <a:ext uri="{FF2B5EF4-FFF2-40B4-BE49-F238E27FC236}">
+                <a16:creationId xmlns:a16="http://schemas.microsoft.com/office/drawing/2014/main" id="{BEC8769F-346D-490B-02EB-B8B913BCD8B2}"/>
+              </a:ext>
+            </a:extLst>
+          </p:cNvPr>
+          <p:cNvSpPr txBox="1"/>
+          <p:nvPr/>
+        </p:nvSpPr>
+        <p:spPr>
+          <a:xfrm>
+            <a:off x="9218284" y="1588059"/>
+            <a:ext cx="1831848" cy="707886"/>
+          </a:xfrm>
+          <a:prstGeom prst="rect">
+            <a:avLst/>
+          </a:prstGeom>
+          <a:noFill/>
+        </p:spPr>
+        <p:txBody>
+          <a:bodyPr wrap="none" rtlCol="0">
+            <a:spAutoFit/>
+          </a:bodyPr>
+          <a:lstStyle/>
+          <a:p>
+            <a:r>
+              <a:rPr lang="es-ES" sz="4000" dirty="0"/>
+              <a:t>Soporte</a:t>
+            </a:r>
+          </a:p>
+        </p:txBody>
+      </p:sp>
+      <p:sp>
+        <p:nvSpPr>
+          <p:cNvPr id="15" name="Flecha: a la derecha 14">
+            <a:extLst>
+              <a:ext uri="{FF2B5EF4-FFF2-40B4-BE49-F238E27FC236}">
+                <a16:creationId xmlns:a16="http://schemas.microsoft.com/office/drawing/2014/main" id="{00D8AC1D-6376-68B3-C968-517801907F45}"/>
+              </a:ext>
+            </a:extLst>
+          </p:cNvPr>
+          <p:cNvSpPr/>
+          <p:nvPr/>
+        </p:nvSpPr>
+        <p:spPr>
+          <a:xfrm rot="8761098">
+            <a:off x="3480327" y="2478024"/>
+            <a:ext cx="1082529" cy="465912"/>
+          </a:xfrm>
+          <a:prstGeom prst="rightArrow">
+            <a:avLst/>
+          </a:prstGeom>
+        </p:spPr>
+        <p:style>
+          <a:lnRef idx="2">
+            <a:schemeClr val="accent1">
+              <a:shade val="15000"/>
+            </a:schemeClr>
+          </a:lnRef>
+          <a:fillRef idx="1">
+            <a:schemeClr val="accent1"/>
+          </a:fillRef>
+          <a:effectRef idx="0">
+            <a:schemeClr val="accent1"/>
+          </a:effectRef>
+          <a:fontRef idx="minor">
+            <a:schemeClr val="lt1"/>
+          </a:fontRef>
+        </p:style>
+        <p:txBody>
+          <a:bodyPr rtlCol="0" anchor="ctr"/>
+          <a:lstStyle/>
+          <a:p>
+            <a:pPr algn="ctr"/>
+            <a:endParaRPr lang="es-ES"/>
+          </a:p>
+        </p:txBody>
+      </p:sp>
+      <p:sp>
+        <p:nvSpPr>
+          <p:cNvPr id="16" name="Flecha: a la derecha 15">
+            <a:extLst>
+              <a:ext uri="{FF2B5EF4-FFF2-40B4-BE49-F238E27FC236}">
+                <a16:creationId xmlns:a16="http://schemas.microsoft.com/office/drawing/2014/main" id="{73024F4F-22F9-737E-2321-C0B3CA555E52}"/>
+              </a:ext>
+            </a:extLst>
+          </p:cNvPr>
+          <p:cNvSpPr/>
+          <p:nvPr/>
+        </p:nvSpPr>
+        <p:spPr>
+          <a:xfrm rot="2434594">
+            <a:off x="7612753" y="2444712"/>
+            <a:ext cx="1082529" cy="465912"/>
+          </a:xfrm>
+          <a:prstGeom prst="rightArrow">
+            <a:avLst/>
+          </a:prstGeom>
+        </p:spPr>
+        <p:style>
+          <a:lnRef idx="2">
+            <a:schemeClr val="accent1">
+              <a:shade val="15000"/>
+            </a:schemeClr>
+          </a:lnRef>
+          <a:fillRef idx="1">
+            <a:schemeClr val="accent1"/>
+          </a:fillRef>
+          <a:effectRef idx="0">
+            <a:schemeClr val="accent1"/>
+          </a:effectRef>
+          <a:fontRef idx="minor">
+            <a:schemeClr val="lt1"/>
+          </a:fontRef>
+        </p:style>
+        <p:txBody>
+          <a:bodyPr rtlCol="0" anchor="ctr"/>
+          <a:lstStyle/>
+          <a:p>
+            <a:pPr algn="ctr"/>
+            <a:endParaRPr lang="es-ES"/>
+          </a:p>
+        </p:txBody>
+      </p:sp>
+      <p:pic>
+        <p:nvPicPr>
+          <p:cNvPr id="2" name="Gráfico 1">
+            <a:extLst>
+              <a:ext uri="{FF2B5EF4-FFF2-40B4-BE49-F238E27FC236}">
+                <a16:creationId xmlns:a16="http://schemas.microsoft.com/office/drawing/2014/main" id="{E5C8D729-6585-5539-B004-ED7AE3519E0E}"/>
+              </a:ext>
+            </a:extLst>
+          </p:cNvPr>
+          <p:cNvPicPr>
+            <a:picLocks noChangeAspect="1"/>
+          </p:cNvPicPr>
+          <p:nvPr/>
+        </p:nvPicPr>
+        <p:blipFill>
+          <a:blip r:embed="rId2">
+            <a:extLst>
+              <a:ext uri="{28A0092B-C50C-407E-A947-70E740481C1C}">
+                <a14:useLocalDpi xmlns:a14="http://schemas.microsoft.com/office/drawing/2010/main" val="0"/>
+              </a:ext>
+              <a:ext uri="{96DAC541-7B7A-43D3-8B79-37D633B846F1}">
+                <asvg:svgBlip xmlns:asvg="http://schemas.microsoft.com/office/drawing/2016/SVG/main" r:embed="rId3"/>
+              </a:ext>
+            </a:extLst>
+          </a:blip>
+          <a:stretch>
+            <a:fillRect/>
+          </a:stretch>
+        </p:blipFill>
+        <p:spPr>
+          <a:xfrm>
+            <a:off x="11506869" y="82334"/>
+            <a:ext cx="531934" cy="670872"/>
+          </a:xfrm>
+          <a:prstGeom prst="rect">
+            <a:avLst/>
+          </a:prstGeom>
+        </p:spPr>
+      </p:pic>
+    </p:spTree>
+    <p:extLst>
+      <p:ext uri="{BB962C8B-B14F-4D97-AF65-F5344CB8AC3E}">
+        <p14:creationId xmlns:p14="http://schemas.microsoft.com/office/powerpoint/2010/main" val="1689739066"/>
+      </p:ext>
+    </p:extLst>
+  </p:cSld>
+  <p:clrMapOvr>
+    <a:masterClrMapping/>
+  </p:clrMapOvr>
+</p:sld>
+</file>
+
+<file path=ppt/slides/slide16.xml><?xml version="1.0" encoding="utf-8"?>
+<p:sld xmlns:a="http://schemas.openxmlformats.org/drawingml/2006/main" xmlns:r="http://schemas.openxmlformats.org/officeDocument/2006/relationships" xmlns:p="http://schemas.openxmlformats.org/presentationml/2006/main">
+  <p:cSld>
+    <p:spTree>
+      <p:nvGrpSpPr>
+        <p:cNvPr id="1" name=""/>
+        <p:cNvGrpSpPr/>
+        <p:nvPr/>
+      </p:nvGrpSpPr>
+      <p:grpSpPr>
+        <a:xfrm>
+          <a:off x="0" y="0"/>
+          <a:ext cx="0" cy="0"/>
+          <a:chOff x="0" y="0"/>
+          <a:chExt cx="0" cy="0"/>
+        </a:xfrm>
+      </p:grpSpPr>
+      <p:sp>
+        <p:nvSpPr>
+          <p:cNvPr id="3" name="CuadroTexto 2">
+            <a:extLst>
+              <a:ext uri="{FF2B5EF4-FFF2-40B4-BE49-F238E27FC236}">
+                <a16:creationId xmlns:a16="http://schemas.microsoft.com/office/drawing/2014/main" id="{DBF921F4-EE9D-BD74-1A3F-AFF8CD8E2B97}"/>
+              </a:ext>
+            </a:extLst>
+          </p:cNvPr>
+          <p:cNvSpPr txBox="1"/>
+          <p:nvPr/>
+        </p:nvSpPr>
+        <p:spPr>
+          <a:xfrm>
+            <a:off x="2644437" y="25355"/>
+            <a:ext cx="7016988" cy="784830"/>
+          </a:xfrm>
+          <a:prstGeom prst="rect">
+            <a:avLst/>
+          </a:prstGeom>
+          <a:noFill/>
+        </p:spPr>
+        <p:txBody>
+          <a:bodyPr wrap="square" rtlCol="0">
+            <a:spAutoFit/>
+          </a:bodyPr>
+          <a:lstStyle/>
+          <a:p>
+            <a:pPr algn="ctr"/>
+            <a:r>
+              <a:rPr lang="es-ES" sz="4500" i="1" dirty="0">
+                <a:solidFill>
+                  <a:schemeClr val="tx2"/>
+                </a:solidFill>
+              </a:rPr>
+              <a:t>App - Perfil</a:t>
+            </a:r>
+          </a:p>
+        </p:txBody>
+      </p:sp>
+      <p:cxnSp>
+        <p:nvCxnSpPr>
+          <p:cNvPr id="4" name="Conector recto 3">
+            <a:extLst>
+              <a:ext uri="{FF2B5EF4-FFF2-40B4-BE49-F238E27FC236}">
+                <a16:creationId xmlns:a16="http://schemas.microsoft.com/office/drawing/2014/main" id="{6637E1B0-398F-64B7-7E6B-0B7E738300E5}"/>
+              </a:ext>
+            </a:extLst>
+          </p:cNvPr>
+          <p:cNvCxnSpPr>
+            <a:cxnSpLocks/>
+          </p:cNvCxnSpPr>
+          <p:nvPr/>
+        </p:nvCxnSpPr>
+        <p:spPr>
+          <a:xfrm>
+            <a:off x="0" y="839048"/>
+            <a:ext cx="12304948" cy="16056"/>
+          </a:xfrm>
+          <a:prstGeom prst="line">
+            <a:avLst/>
+          </a:prstGeom>
+          <a:ln w="57150">
+            <a:solidFill>
+              <a:schemeClr val="bg2">
+                <a:lumMod val="10000"/>
+              </a:schemeClr>
+            </a:solidFill>
+          </a:ln>
+        </p:spPr>
+        <p:style>
+          <a:lnRef idx="1">
+            <a:schemeClr val="accent1"/>
+          </a:lnRef>
+          <a:fillRef idx="0">
+            <a:schemeClr val="accent1"/>
+          </a:fillRef>
+          <a:effectRef idx="0">
+            <a:schemeClr val="accent1"/>
+          </a:effectRef>
+          <a:fontRef idx="minor">
+            <a:schemeClr val="tx1"/>
+          </a:fontRef>
+        </p:style>
+      </p:cxnSp>
+      <p:sp>
+        <p:nvSpPr>
+          <p:cNvPr id="7" name="Rectángulo: esquinas redondeadas 6">
+            <a:extLst>
+              <a:ext uri="{FF2B5EF4-FFF2-40B4-BE49-F238E27FC236}">
+                <a16:creationId xmlns:a16="http://schemas.microsoft.com/office/drawing/2014/main" id="{615B91DF-4210-5E5F-049D-FC78274FB030}"/>
+              </a:ext>
+            </a:extLst>
+          </p:cNvPr>
+          <p:cNvSpPr/>
+          <p:nvPr/>
+        </p:nvSpPr>
+        <p:spPr>
+          <a:xfrm>
+            <a:off x="846212" y="2295945"/>
+            <a:ext cx="2423160" cy="4192416"/>
+          </a:xfrm>
+          <a:prstGeom prst="roundRect">
+            <a:avLst/>
+          </a:prstGeom>
+        </p:spPr>
+        <p:style>
+          <a:lnRef idx="2">
+            <a:schemeClr val="accent1">
+              <a:shade val="15000"/>
+            </a:schemeClr>
+          </a:lnRef>
+          <a:fillRef idx="1">
+            <a:schemeClr val="accent1"/>
+          </a:fillRef>
+          <a:effectRef idx="0">
+            <a:schemeClr val="accent1"/>
+          </a:effectRef>
+          <a:fontRef idx="minor">
+            <a:schemeClr val="lt1"/>
+          </a:fontRef>
+        </p:style>
+        <p:txBody>
+          <a:bodyPr rtlCol="0" anchor="ctr"/>
+          <a:lstStyle/>
+          <a:p>
+            <a:pPr algn="ctr"/>
+            <a:endParaRPr lang="es-ES"/>
+          </a:p>
+        </p:txBody>
+      </p:sp>
+      <p:sp>
+        <p:nvSpPr>
+          <p:cNvPr id="8" name="Rectángulo: esquinas redondeadas 7">
+            <a:extLst>
+              <a:ext uri="{FF2B5EF4-FFF2-40B4-BE49-F238E27FC236}">
+                <a16:creationId xmlns:a16="http://schemas.microsoft.com/office/drawing/2014/main" id="{FD456482-F852-5C25-60C5-37B057367CFC}"/>
+              </a:ext>
+            </a:extLst>
+          </p:cNvPr>
+          <p:cNvSpPr/>
+          <p:nvPr/>
+        </p:nvSpPr>
+        <p:spPr>
+          <a:xfrm>
+            <a:off x="4884420" y="1665009"/>
+            <a:ext cx="2423160" cy="4192416"/>
+          </a:xfrm>
+          <a:prstGeom prst="roundRect">
+            <a:avLst/>
+          </a:prstGeom>
+        </p:spPr>
+        <p:style>
+          <a:lnRef idx="2">
+            <a:schemeClr val="accent1">
+              <a:shade val="15000"/>
+            </a:schemeClr>
+          </a:lnRef>
+          <a:fillRef idx="1">
+            <a:schemeClr val="accent1"/>
+          </a:fillRef>
+          <a:effectRef idx="0">
+            <a:schemeClr val="accent1"/>
+          </a:effectRef>
+          <a:fontRef idx="minor">
+            <a:schemeClr val="lt1"/>
+          </a:fontRef>
+        </p:style>
+        <p:txBody>
+          <a:bodyPr rtlCol="0" anchor="ctr"/>
+          <a:lstStyle/>
+          <a:p>
+            <a:pPr algn="ctr"/>
+            <a:endParaRPr lang="es-ES"/>
+          </a:p>
+        </p:txBody>
+      </p:sp>
+      <p:sp>
+        <p:nvSpPr>
+          <p:cNvPr id="11" name="CuadroTexto 10">
+            <a:extLst>
+              <a:ext uri="{FF2B5EF4-FFF2-40B4-BE49-F238E27FC236}">
+                <a16:creationId xmlns:a16="http://schemas.microsoft.com/office/drawing/2014/main" id="{C1CF97DD-A361-B116-C77B-0F3B9D7C7848}"/>
+              </a:ext>
+            </a:extLst>
+          </p:cNvPr>
+          <p:cNvSpPr txBox="1"/>
+          <p:nvPr/>
+        </p:nvSpPr>
+        <p:spPr>
+          <a:xfrm>
             <a:off x="4637878" y="995797"/>
             <a:ext cx="3069366" cy="707886"/>
           </a:xfrm>
@@ -6393,7 +7667,7 @@
 </p:sld>
 </file>
 
-<file path=ppt/slides/slide16.xml><?xml version="1.0" encoding="utf-8"?>
+<file path=ppt/slides/slide17.xml><?xml version="1.0" encoding="utf-8"?>
 <p:sld xmlns:a="http://schemas.openxmlformats.org/drawingml/2006/main" xmlns:r="http://schemas.openxmlformats.org/officeDocument/2006/relationships" xmlns:p="http://schemas.openxmlformats.org/presentationml/2006/main">
   <p:cSld>
     <p:spTree>
@@ -8248,10 +9522,122 @@
       </p:cxnSp>
       <p:sp>
         <p:nvSpPr>
-          <p:cNvPr id="18" name="Rectángulo: esquinas redondeadas 17">
-            <a:extLst>
-              <a:ext uri="{FF2B5EF4-FFF2-40B4-BE49-F238E27FC236}">
-                <a16:creationId xmlns:a16="http://schemas.microsoft.com/office/drawing/2014/main" id="{E47885CB-A356-50AC-4B60-7D582EDB26F9}"/>
+          <p:cNvPr id="20" name="CuadroTexto 19">
+            <a:extLst>
+              <a:ext uri="{FF2B5EF4-FFF2-40B4-BE49-F238E27FC236}">
+                <a16:creationId xmlns:a16="http://schemas.microsoft.com/office/drawing/2014/main" id="{A01612CC-FB57-4A9D-8A3E-33F265B6C54D}"/>
+              </a:ext>
+            </a:extLst>
+          </p:cNvPr>
+          <p:cNvSpPr txBox="1"/>
+          <p:nvPr/>
+        </p:nvSpPr>
+        <p:spPr>
+          <a:xfrm>
+            <a:off x="7228371" y="1860876"/>
+            <a:ext cx="3979080" cy="369332"/>
+          </a:xfrm>
+          <a:prstGeom prst="rect">
+            <a:avLst/>
+          </a:prstGeom>
+          <a:noFill/>
+        </p:spPr>
+        <p:txBody>
+          <a:bodyPr wrap="square">
+            <a:spAutoFit/>
+          </a:bodyPr>
+          <a:lstStyle/>
+          <a:p>
+            <a:r>
+              <a:rPr lang="es-ES" dirty="0">
+                <a:hlinkClick r:id="rId6"/>
+              </a:rPr>
+              <a:t>Guía de instalación APK y certificado SSL</a:t>
+            </a:r>
+            <a:endParaRPr lang="es-ES" dirty="0"/>
+          </a:p>
+        </p:txBody>
+      </p:sp>
+      <p:pic>
+        <p:nvPicPr>
+          <p:cNvPr id="6" name="Imagen 5">
+            <a:extLst>
+              <a:ext uri="{FF2B5EF4-FFF2-40B4-BE49-F238E27FC236}">
+                <a16:creationId xmlns:a16="http://schemas.microsoft.com/office/drawing/2014/main" id="{D82EB423-94A9-C9C0-CEF5-4FEEDFC2F43E}"/>
+              </a:ext>
+            </a:extLst>
+          </p:cNvPr>
+          <p:cNvPicPr>
+            <a:picLocks noChangeAspect="1"/>
+          </p:cNvPicPr>
+          <p:nvPr/>
+        </p:nvPicPr>
+        <p:blipFill>
+          <a:blip r:embed="rId7"/>
+          <a:stretch>
+            <a:fillRect/>
+          </a:stretch>
+        </p:blipFill>
+        <p:spPr>
+          <a:xfrm>
+            <a:off x="9425668" y="2435484"/>
+            <a:ext cx="1978696" cy="3900745"/>
+          </a:xfrm>
+          <a:prstGeom prst="roundRect">
+            <a:avLst/>
+          </a:prstGeom>
+          <a:ln w="19050">
+            <a:solidFill>
+              <a:schemeClr val="bg2">
+                <a:lumMod val="75000"/>
+              </a:schemeClr>
+            </a:solidFill>
+          </a:ln>
+        </p:spPr>
+      </p:pic>
+      <p:pic>
+        <p:nvPicPr>
+          <p:cNvPr id="8" name="Imagen 7">
+            <a:extLst>
+              <a:ext uri="{FF2B5EF4-FFF2-40B4-BE49-F238E27FC236}">
+                <a16:creationId xmlns:a16="http://schemas.microsoft.com/office/drawing/2014/main" id="{DE1B0DB8-1632-A03F-5938-561C6889A05C}"/>
+              </a:ext>
+            </a:extLst>
+          </p:cNvPr>
+          <p:cNvPicPr>
+            <a:picLocks noChangeAspect="1"/>
+          </p:cNvPicPr>
+          <p:nvPr/>
+        </p:nvPicPr>
+        <p:blipFill>
+          <a:blip r:embed="rId8"/>
+          <a:stretch>
+            <a:fillRect/>
+          </a:stretch>
+        </p:blipFill>
+        <p:spPr>
+          <a:xfrm>
+            <a:off x="6814301" y="2374421"/>
+            <a:ext cx="1968600" cy="3900745"/>
+          </a:xfrm>
+          <a:prstGeom prst="roundRect">
+            <a:avLst/>
+          </a:prstGeom>
+          <a:ln w="19050">
+            <a:solidFill>
+              <a:schemeClr val="bg2">
+                <a:lumMod val="75000"/>
+              </a:schemeClr>
+            </a:solidFill>
+          </a:ln>
+        </p:spPr>
+      </p:pic>
+      <p:sp>
+        <p:nvSpPr>
+          <p:cNvPr id="9" name="Flecha: a la derecha 8">
+            <a:extLst>
+              <a:ext uri="{FF2B5EF4-FFF2-40B4-BE49-F238E27FC236}">
+                <a16:creationId xmlns:a16="http://schemas.microsoft.com/office/drawing/2014/main" id="{62AA2E22-CB31-65CA-874A-6F27DFD2D4E0}"/>
               </a:ext>
             </a:extLst>
           </p:cNvPr>
@@ -8260,10 +9646,10 @@
         </p:nvSpPr>
         <p:spPr>
           <a:xfrm>
-            <a:off x="8006331" y="2328811"/>
-            <a:ext cx="2423160" cy="4192416"/>
-          </a:xfrm>
-          <a:prstGeom prst="roundRect">
+            <a:off x="8931029" y="3561347"/>
+            <a:ext cx="346510" cy="231007"/>
+          </a:xfrm>
+          <a:prstGeom prst="rightArrow">
             <a:avLst/>
           </a:prstGeom>
         </p:spPr>
@@ -8289,44 +9675,6 @@
           <a:p>
             <a:pPr algn="ctr"/>
             <a:endParaRPr lang="es-ES"/>
-          </a:p>
-        </p:txBody>
-      </p:sp>
-      <p:sp>
-        <p:nvSpPr>
-          <p:cNvPr id="20" name="CuadroTexto 19">
-            <a:extLst>
-              <a:ext uri="{FF2B5EF4-FFF2-40B4-BE49-F238E27FC236}">
-                <a16:creationId xmlns:a16="http://schemas.microsoft.com/office/drawing/2014/main" id="{A01612CC-FB57-4A9D-8A3E-33F265B6C54D}"/>
-              </a:ext>
-            </a:extLst>
-          </p:cNvPr>
-          <p:cNvSpPr txBox="1"/>
-          <p:nvPr/>
-        </p:nvSpPr>
-        <p:spPr>
-          <a:xfrm>
-            <a:off x="7228371" y="1860876"/>
-            <a:ext cx="3979080" cy="369332"/>
-          </a:xfrm>
-          <a:prstGeom prst="rect">
-            <a:avLst/>
-          </a:prstGeom>
-          <a:noFill/>
-        </p:spPr>
-        <p:txBody>
-          <a:bodyPr wrap="square">
-            <a:spAutoFit/>
-          </a:bodyPr>
-          <a:lstStyle/>
-          <a:p>
-            <a:r>
-              <a:rPr lang="es-ES" dirty="0">
-                <a:hlinkClick r:id="rId6"/>
-              </a:rPr>
-              <a:t>Guía de instalación APK y certificado SSL</a:t>
-            </a:r>
-            <a:endParaRPr lang="es-ES" dirty="0"/>
           </a:p>
         </p:txBody>
       </p:sp>

</xml_diff>

<commit_message>
[add] Screens added to ppt
</commit_message>
<xml_diff>
--- a/02_Documentacion/Presentacion_Wewiza.pptx
+++ b/02_Documentacion/Presentacion_Wewiza.pptx
@@ -275,7 +275,7 @@
           <a:p>
             <a:fld id="{E9F195BA-A261-43B0-804A-A3DDA37443A6}" type="datetimeFigureOut">
               <a:rPr lang="es-ES" smtClean="0"/>
-              <a:t>06/06/2024</a:t>
+              <a:t>10/06/2024</a:t>
             </a:fld>
             <a:endParaRPr lang="es-ES"/>
           </a:p>
@@ -473,7 +473,7 @@
           <a:p>
             <a:fld id="{E9F195BA-A261-43B0-804A-A3DDA37443A6}" type="datetimeFigureOut">
               <a:rPr lang="es-ES" smtClean="0"/>
-              <a:t>06/06/2024</a:t>
+              <a:t>10/06/2024</a:t>
             </a:fld>
             <a:endParaRPr lang="es-ES"/>
           </a:p>
@@ -681,7 +681,7 @@
           <a:p>
             <a:fld id="{E9F195BA-A261-43B0-804A-A3DDA37443A6}" type="datetimeFigureOut">
               <a:rPr lang="es-ES" smtClean="0"/>
-              <a:t>06/06/2024</a:t>
+              <a:t>10/06/2024</a:t>
             </a:fld>
             <a:endParaRPr lang="es-ES"/>
           </a:p>
@@ -879,7 +879,7 @@
           <a:p>
             <a:fld id="{E9F195BA-A261-43B0-804A-A3DDA37443A6}" type="datetimeFigureOut">
               <a:rPr lang="es-ES" smtClean="0"/>
-              <a:t>06/06/2024</a:t>
+              <a:t>10/06/2024</a:t>
             </a:fld>
             <a:endParaRPr lang="es-ES"/>
           </a:p>
@@ -1154,7 +1154,7 @@
           <a:p>
             <a:fld id="{E9F195BA-A261-43B0-804A-A3DDA37443A6}" type="datetimeFigureOut">
               <a:rPr lang="es-ES" smtClean="0"/>
-              <a:t>06/06/2024</a:t>
+              <a:t>10/06/2024</a:t>
             </a:fld>
             <a:endParaRPr lang="es-ES"/>
           </a:p>
@@ -1419,7 +1419,7 @@
           <a:p>
             <a:fld id="{E9F195BA-A261-43B0-804A-A3DDA37443A6}" type="datetimeFigureOut">
               <a:rPr lang="es-ES" smtClean="0"/>
-              <a:t>06/06/2024</a:t>
+              <a:t>10/06/2024</a:t>
             </a:fld>
             <a:endParaRPr lang="es-ES"/>
           </a:p>
@@ -1831,7 +1831,7 @@
           <a:p>
             <a:fld id="{E9F195BA-A261-43B0-804A-A3DDA37443A6}" type="datetimeFigureOut">
               <a:rPr lang="es-ES" smtClean="0"/>
-              <a:t>06/06/2024</a:t>
+              <a:t>10/06/2024</a:t>
             </a:fld>
             <a:endParaRPr lang="es-ES"/>
           </a:p>
@@ -1972,7 +1972,7 @@
           <a:p>
             <a:fld id="{E9F195BA-A261-43B0-804A-A3DDA37443A6}" type="datetimeFigureOut">
               <a:rPr lang="es-ES" smtClean="0"/>
-              <a:t>06/06/2024</a:t>
+              <a:t>10/06/2024</a:t>
             </a:fld>
             <a:endParaRPr lang="es-ES"/>
           </a:p>
@@ -2085,7 +2085,7 @@
           <a:p>
             <a:fld id="{E9F195BA-A261-43B0-804A-A3DDA37443A6}" type="datetimeFigureOut">
               <a:rPr lang="es-ES" smtClean="0"/>
-              <a:t>06/06/2024</a:t>
+              <a:t>10/06/2024</a:t>
             </a:fld>
             <a:endParaRPr lang="es-ES"/>
           </a:p>
@@ -2396,7 +2396,7 @@
           <a:p>
             <a:fld id="{E9F195BA-A261-43B0-804A-A3DDA37443A6}" type="datetimeFigureOut">
               <a:rPr lang="es-ES" smtClean="0"/>
-              <a:t>06/06/2024</a:t>
+              <a:t>10/06/2024</a:t>
             </a:fld>
             <a:endParaRPr lang="es-ES"/>
           </a:p>
@@ -2684,7 +2684,7 @@
           <a:p>
             <a:fld id="{E9F195BA-A261-43B0-804A-A3DDA37443A6}" type="datetimeFigureOut">
               <a:rPr lang="es-ES" smtClean="0"/>
-              <a:t>06/06/2024</a:t>
+              <a:t>10/06/2024</a:t>
             </a:fld>
             <a:endParaRPr lang="es-ES"/>
           </a:p>
@@ -2925,7 +2925,7 @@
           <a:p>
             <a:fld id="{E9F195BA-A261-43B0-804A-A3DDA37443A6}" type="datetimeFigureOut">
               <a:rPr lang="es-ES" smtClean="0"/>
-              <a:t>06/06/2024</a:t>
+              <a:t>10/06/2024</a:t>
             </a:fld>
             <a:endParaRPr lang="es-ES"/>
           </a:p>
@@ -5346,8 +5346,8 @@
         </p:nvSpPr>
         <p:spPr>
           <a:xfrm>
-            <a:off x="1879484" y="1069848"/>
-            <a:ext cx="2298001" cy="707886"/>
+            <a:off x="1637120" y="907937"/>
+            <a:ext cx="3251318" cy="707886"/>
           </a:xfrm>
           <a:prstGeom prst="rect">
             <a:avLst/>
@@ -5355,24 +5355,24 @@
           <a:noFill/>
         </p:spPr>
         <p:txBody>
-          <a:bodyPr wrap="none" rtlCol="0">
+          <a:bodyPr wrap="square" rtlCol="0">
             <a:spAutoFit/>
           </a:bodyPr>
           <a:lstStyle/>
           <a:p>
             <a:r>
               <a:rPr lang="es-ES" sz="4000" dirty="0"/>
-              <a:t>1. Rebajas</a:t>
-            </a:r>
-          </a:p>
-        </p:txBody>
-      </p:sp>
-      <p:sp>
-        <p:nvSpPr>
-          <p:cNvPr id="6" name="CuadroTexto 5">
-            <a:extLst>
-              <a:ext uri="{FF2B5EF4-FFF2-40B4-BE49-F238E27FC236}">
-                <a16:creationId xmlns:a16="http://schemas.microsoft.com/office/drawing/2014/main" id="{9D18D34A-443F-B01E-B00C-8A3770F0F078}"/>
+              <a:t>Destacados</a:t>
+            </a:r>
+          </a:p>
+        </p:txBody>
+      </p:sp>
+      <p:sp>
+        <p:nvSpPr>
+          <p:cNvPr id="9" name="CuadroTexto 8">
+            <a:extLst>
+              <a:ext uri="{FF2B5EF4-FFF2-40B4-BE49-F238E27FC236}">
+                <a16:creationId xmlns:a16="http://schemas.microsoft.com/office/drawing/2014/main" id="{10951958-685D-A434-25CF-6D6BA120428D}"/>
               </a:ext>
             </a:extLst>
           </p:cNvPr>
@@ -5381,8 +5381,8 @@
         </p:nvSpPr>
         <p:spPr>
           <a:xfrm>
-            <a:off x="6931176" y="1136904"/>
-            <a:ext cx="3702873" cy="707886"/>
+            <a:off x="254372" y="1498650"/>
+            <a:ext cx="5317836" cy="646331"/>
           </a:xfrm>
           <a:prstGeom prst="rect">
             <a:avLst/>
@@ -5390,208 +5390,15 @@
           <a:noFill/>
         </p:spPr>
         <p:txBody>
-          <a:bodyPr wrap="none" rtlCol="0">
+          <a:bodyPr wrap="square" rtlCol="0">
             <a:spAutoFit/>
           </a:bodyPr>
           <a:lstStyle/>
           <a:p>
-            <a:r>
-              <a:rPr lang="es-ES" sz="4000" dirty="0"/>
-              <a:t>2. Más valorados</a:t>
-            </a:r>
-          </a:p>
-        </p:txBody>
-      </p:sp>
-      <p:sp>
-        <p:nvSpPr>
-          <p:cNvPr id="7" name="Rectángulo: esquinas redondeadas 6">
-            <a:extLst>
-              <a:ext uri="{FF2B5EF4-FFF2-40B4-BE49-F238E27FC236}">
-                <a16:creationId xmlns:a16="http://schemas.microsoft.com/office/drawing/2014/main" id="{615B91DF-4210-5E5F-049D-FC78274FB030}"/>
-              </a:ext>
-            </a:extLst>
-          </p:cNvPr>
-          <p:cNvSpPr/>
-          <p:nvPr/>
-        </p:nvSpPr>
-        <p:spPr>
-          <a:xfrm>
-            <a:off x="1879484" y="2259369"/>
-            <a:ext cx="2423160" cy="4192416"/>
-          </a:xfrm>
-          <a:prstGeom prst="roundRect">
-            <a:avLst/>
-          </a:prstGeom>
-        </p:spPr>
-        <p:style>
-          <a:lnRef idx="2">
-            <a:schemeClr val="accent1">
-              <a:shade val="15000"/>
-            </a:schemeClr>
-          </a:lnRef>
-          <a:fillRef idx="1">
-            <a:schemeClr val="accent1"/>
-          </a:fillRef>
-          <a:effectRef idx="0">
-            <a:schemeClr val="accent1"/>
-          </a:effectRef>
-          <a:fontRef idx="minor">
-            <a:schemeClr val="lt1"/>
-          </a:fontRef>
-        </p:style>
-        <p:txBody>
-          <a:bodyPr rtlCol="0" anchor="ctr"/>
-          <a:lstStyle/>
-          <a:p>
             <a:pPr algn="ctr"/>
-            <a:endParaRPr lang="es-ES"/>
-          </a:p>
-        </p:txBody>
-      </p:sp>
-      <p:sp>
-        <p:nvSpPr>
-          <p:cNvPr id="8" name="Rectángulo: esquinas redondeadas 7">
-            <a:extLst>
-              <a:ext uri="{FF2B5EF4-FFF2-40B4-BE49-F238E27FC236}">
-                <a16:creationId xmlns:a16="http://schemas.microsoft.com/office/drawing/2014/main" id="{FD456482-F852-5C25-60C5-37B057367CFC}"/>
-              </a:ext>
-            </a:extLst>
-          </p:cNvPr>
-          <p:cNvSpPr/>
-          <p:nvPr/>
-        </p:nvSpPr>
-        <p:spPr>
-          <a:xfrm>
-            <a:off x="7622313" y="2259369"/>
-            <a:ext cx="2423160" cy="4192416"/>
-          </a:xfrm>
-          <a:prstGeom prst="roundRect">
-            <a:avLst/>
-          </a:prstGeom>
-        </p:spPr>
-        <p:style>
-          <a:lnRef idx="2">
-            <a:schemeClr val="accent1">
-              <a:shade val="15000"/>
-            </a:schemeClr>
-          </a:lnRef>
-          <a:fillRef idx="1">
-            <a:schemeClr val="accent1"/>
-          </a:fillRef>
-          <a:effectRef idx="0">
-            <a:schemeClr val="accent1"/>
-          </a:effectRef>
-          <a:fontRef idx="minor">
-            <a:schemeClr val="lt1"/>
-          </a:fontRef>
-        </p:style>
-        <p:txBody>
-          <a:bodyPr rtlCol="0" anchor="ctr"/>
-          <a:lstStyle/>
-          <a:p>
-            <a:pPr algn="ctr"/>
-            <a:endParaRPr lang="es-ES"/>
-          </a:p>
-        </p:txBody>
-      </p:sp>
-      <p:sp>
-        <p:nvSpPr>
-          <p:cNvPr id="9" name="CuadroTexto 8">
-            <a:extLst>
-              <a:ext uri="{FF2B5EF4-FFF2-40B4-BE49-F238E27FC236}">
-                <a16:creationId xmlns:a16="http://schemas.microsoft.com/office/drawing/2014/main" id="{10951958-685D-A434-25CF-6D6BA120428D}"/>
-              </a:ext>
-            </a:extLst>
-          </p:cNvPr>
-          <p:cNvSpPr txBox="1"/>
-          <p:nvPr/>
-        </p:nvSpPr>
-        <p:spPr>
-          <a:xfrm>
-            <a:off x="1044864" y="1821156"/>
-            <a:ext cx="4282711" cy="369332"/>
-          </a:xfrm>
-          <a:prstGeom prst="rect">
-            <a:avLst/>
-          </a:prstGeom>
-          <a:noFill/>
-        </p:spPr>
-        <p:txBody>
-          <a:bodyPr wrap="none" rtlCol="0">
-            <a:spAutoFit/>
-          </a:bodyPr>
-          <a:lstStyle/>
-          <a:p>
             <a:r>
               <a:rPr lang="es-ES" dirty="0"/>
-              <a:t>Comprobamos el </a:t>
-            </a:r>
-            <a:r>
-              <a:rPr lang="es-ES" b="1" dirty="0"/>
-              <a:t>histórico</a:t>
-            </a:r>
-            <a:r>
-              <a:rPr lang="es-ES" dirty="0"/>
-              <a:t> pasado </a:t>
-            </a:r>
-            <a:r>
-              <a:rPr lang="es-ES" b="1" dirty="0"/>
-              <a:t>mensual</a:t>
-            </a:r>
-            <a:r>
-              <a:rPr lang="es-ES" dirty="0"/>
-              <a:t>.</a:t>
-            </a:r>
-          </a:p>
-        </p:txBody>
-      </p:sp>
-      <p:sp>
-        <p:nvSpPr>
-          <p:cNvPr id="10" name="CuadroTexto 9">
-            <a:extLst>
-              <a:ext uri="{FF2B5EF4-FFF2-40B4-BE49-F238E27FC236}">
-                <a16:creationId xmlns:a16="http://schemas.microsoft.com/office/drawing/2014/main" id="{2D395CDF-B3DE-7887-1C84-87B5BCBA85BB}"/>
-              </a:ext>
-            </a:extLst>
-          </p:cNvPr>
-          <p:cNvSpPr txBox="1"/>
-          <p:nvPr/>
-        </p:nvSpPr>
-        <p:spPr>
-          <a:xfrm>
-            <a:off x="6124882" y="1821156"/>
-            <a:ext cx="5501827" cy="369332"/>
-          </a:xfrm>
-          <a:prstGeom prst="rect">
-            <a:avLst/>
-          </a:prstGeom>
-          <a:noFill/>
-        </p:spPr>
-        <p:txBody>
-          <a:bodyPr wrap="none" rtlCol="0">
-            <a:spAutoFit/>
-          </a:bodyPr>
-          <a:lstStyle/>
-          <a:p>
-            <a:r>
-              <a:rPr lang="es-ES" dirty="0"/>
-              <a:t>Comprobamos aquellos valorados </a:t>
-            </a:r>
-            <a:r>
-              <a:rPr lang="es-ES" b="1" dirty="0"/>
-              <a:t>superiores</a:t>
-            </a:r>
-            <a:r>
-              <a:rPr lang="es-ES" dirty="0"/>
-              <a:t> a la </a:t>
-            </a:r>
-            <a:r>
-              <a:rPr lang="es-ES" b="1" dirty="0"/>
-              <a:t>media</a:t>
-            </a:r>
-            <a:r>
-              <a:rPr lang="es-ES" dirty="0"/>
-              <a:t>.</a:t>
+              <a:t>Destacamos los productos que tengan un mayor ahorra y los más gustados por la comunidad. </a:t>
             </a:r>
           </a:p>
         </p:txBody>
@@ -5635,6 +5442,172 @@
           </a:prstGeom>
         </p:spPr>
       </p:pic>
+      <p:pic>
+        <p:nvPicPr>
+          <p:cNvPr id="12" name="Imagen 11" descr="Interfaz de usuario gráfica, Aplicación&#10;&#10;Descripción generada automáticamente">
+            <a:extLst>
+              <a:ext uri="{FF2B5EF4-FFF2-40B4-BE49-F238E27FC236}">
+                <a16:creationId xmlns:a16="http://schemas.microsoft.com/office/drawing/2014/main" id="{407FB257-983D-D67C-BD8E-BCE9D61E17A2}"/>
+              </a:ext>
+            </a:extLst>
+          </p:cNvPr>
+          <p:cNvPicPr>
+            <a:picLocks noChangeAspect="1"/>
+          </p:cNvPicPr>
+          <p:nvPr/>
+        </p:nvPicPr>
+        <p:blipFill rotWithShape="1">
+          <a:blip r:embed="rId4">
+            <a:extLst>
+              <a:ext uri="{28A0092B-C50C-407E-A947-70E740481C1C}">
+                <a14:useLocalDpi xmlns:a14="http://schemas.microsoft.com/office/drawing/2010/main" val="0"/>
+              </a:ext>
+            </a:extLst>
+          </a:blip>
+          <a:srcRect t="3844"/>
+          <a:stretch/>
+        </p:blipFill>
+        <p:spPr>
+          <a:xfrm>
+            <a:off x="845677" y="2259369"/>
+            <a:ext cx="2067613" cy="4420965"/>
+          </a:xfrm>
+          <a:prstGeom prst="rect">
+            <a:avLst/>
+          </a:prstGeom>
+        </p:spPr>
+      </p:pic>
+      <p:pic>
+        <p:nvPicPr>
+          <p:cNvPr id="14" name="Imagen 13">
+            <a:extLst>
+              <a:ext uri="{FF2B5EF4-FFF2-40B4-BE49-F238E27FC236}">
+                <a16:creationId xmlns:a16="http://schemas.microsoft.com/office/drawing/2014/main" id="{A28237B9-9B9E-0663-476B-11A757A34292}"/>
+              </a:ext>
+            </a:extLst>
+          </p:cNvPr>
+          <p:cNvPicPr>
+            <a:picLocks noChangeAspect="1"/>
+          </p:cNvPicPr>
+          <p:nvPr/>
+        </p:nvPicPr>
+        <p:blipFill>
+          <a:blip r:embed="rId5"/>
+          <a:stretch>
+            <a:fillRect/>
+          </a:stretch>
+        </p:blipFill>
+        <p:spPr>
+          <a:xfrm>
+            <a:off x="3028484" y="2261267"/>
+            <a:ext cx="1859955" cy="2125663"/>
+          </a:xfrm>
+          <a:prstGeom prst="rect">
+            <a:avLst/>
+          </a:prstGeom>
+        </p:spPr>
+      </p:pic>
+      <p:pic>
+        <p:nvPicPr>
+          <p:cNvPr id="16" name="Imagen 15">
+            <a:extLst>
+              <a:ext uri="{FF2B5EF4-FFF2-40B4-BE49-F238E27FC236}">
+                <a16:creationId xmlns:a16="http://schemas.microsoft.com/office/drawing/2014/main" id="{6FC586F6-7C03-F30D-F4FB-92BE4EE5D3AC}"/>
+              </a:ext>
+            </a:extLst>
+          </p:cNvPr>
+          <p:cNvPicPr>
+            <a:picLocks noChangeAspect="1"/>
+          </p:cNvPicPr>
+          <p:nvPr/>
+        </p:nvPicPr>
+        <p:blipFill>
+          <a:blip r:embed="rId6"/>
+          <a:stretch>
+            <a:fillRect/>
+          </a:stretch>
+        </p:blipFill>
+        <p:spPr>
+          <a:xfrm>
+            <a:off x="3028483" y="4457709"/>
+            <a:ext cx="1859955" cy="2265509"/>
+          </a:xfrm>
+          <a:prstGeom prst="rect">
+            <a:avLst/>
+          </a:prstGeom>
+        </p:spPr>
+      </p:pic>
+      <p:pic>
+        <p:nvPicPr>
+          <p:cNvPr id="17" name="Imagen 16" descr="Interfaz de usuario gráfica, Aplicación&#10;&#10;Descripción generada automáticamente">
+            <a:extLst>
+              <a:ext uri="{FF2B5EF4-FFF2-40B4-BE49-F238E27FC236}">
+                <a16:creationId xmlns:a16="http://schemas.microsoft.com/office/drawing/2014/main" id="{FAFB58EB-2FB0-9A3E-DCF2-FC12FCE8E197}"/>
+              </a:ext>
+            </a:extLst>
+          </p:cNvPr>
+          <p:cNvPicPr>
+            <a:picLocks noChangeAspect="1"/>
+          </p:cNvPicPr>
+          <p:nvPr/>
+        </p:nvPicPr>
+        <p:blipFill rotWithShape="1">
+          <a:blip r:embed="rId7">
+            <a:extLst>
+              <a:ext uri="{28A0092B-C50C-407E-A947-70E740481C1C}">
+                <a14:useLocalDpi xmlns:a14="http://schemas.microsoft.com/office/drawing/2010/main" val="0"/>
+              </a:ext>
+            </a:extLst>
+          </a:blip>
+          <a:srcRect t="3949" r="-273"/>
+          <a:stretch/>
+        </p:blipFill>
+        <p:spPr>
+          <a:xfrm>
+            <a:off x="8103234" y="1817135"/>
+            <a:ext cx="2234566" cy="4759758"/>
+          </a:xfrm>
+          <a:prstGeom prst="rect">
+            <a:avLst/>
+          </a:prstGeom>
+        </p:spPr>
+      </p:pic>
+      <p:sp>
+        <p:nvSpPr>
+          <p:cNvPr id="18" name="CuadroTexto 17">
+            <a:extLst>
+              <a:ext uri="{FF2B5EF4-FFF2-40B4-BE49-F238E27FC236}">
+                <a16:creationId xmlns:a16="http://schemas.microsoft.com/office/drawing/2014/main" id="{9718BA95-FE7F-A023-9E9B-3E081A77BC9B}"/>
+              </a:ext>
+            </a:extLst>
+          </p:cNvPr>
+          <p:cNvSpPr txBox="1"/>
+          <p:nvPr/>
+        </p:nvSpPr>
+        <p:spPr>
+          <a:xfrm>
+            <a:off x="7594858" y="982176"/>
+            <a:ext cx="3251318" cy="707886"/>
+          </a:xfrm>
+          <a:prstGeom prst="rect">
+            <a:avLst/>
+          </a:prstGeom>
+          <a:noFill/>
+        </p:spPr>
+        <p:txBody>
+          <a:bodyPr wrap="square" rtlCol="0">
+            <a:spAutoFit/>
+          </a:bodyPr>
+          <a:lstStyle/>
+          <a:p>
+            <a:pPr algn="ctr"/>
+            <a:r>
+              <a:rPr lang="es-ES" sz="4000" dirty="0"/>
+              <a:t>Categorías</a:t>
+            </a:r>
+          </a:p>
+        </p:txBody>
+      </p:sp>
     </p:spTree>
     <p:extLst>
       <p:ext uri="{BB962C8B-B14F-4D97-AF65-F5344CB8AC3E}">
@@ -5752,10 +5725,115 @@
       </p:cxnSp>
       <p:sp>
         <p:nvSpPr>
-          <p:cNvPr id="7" name="Rectángulo: esquinas redondeadas 6">
-            <a:extLst>
-              <a:ext uri="{FF2B5EF4-FFF2-40B4-BE49-F238E27FC236}">
-                <a16:creationId xmlns:a16="http://schemas.microsoft.com/office/drawing/2014/main" id="{615B91DF-4210-5E5F-049D-FC78274FB030}"/>
+          <p:cNvPr id="11" name="CuadroTexto 10">
+            <a:extLst>
+              <a:ext uri="{FF2B5EF4-FFF2-40B4-BE49-F238E27FC236}">
+                <a16:creationId xmlns:a16="http://schemas.microsoft.com/office/drawing/2014/main" id="{C1CF97DD-A361-B116-C77B-0F3B9D7C7848}"/>
+              </a:ext>
+            </a:extLst>
+          </p:cNvPr>
+          <p:cNvSpPr txBox="1"/>
+          <p:nvPr/>
+        </p:nvSpPr>
+        <p:spPr>
+          <a:xfrm>
+            <a:off x="4064437" y="1077432"/>
+            <a:ext cx="1852367" cy="707886"/>
+          </a:xfrm>
+          <a:prstGeom prst="rect">
+            <a:avLst/>
+          </a:prstGeom>
+          <a:noFill/>
+        </p:spPr>
+        <p:txBody>
+          <a:bodyPr wrap="none" rtlCol="0">
+            <a:spAutoFit/>
+          </a:bodyPr>
+          <a:lstStyle/>
+          <a:p>
+            <a:r>
+              <a:rPr lang="es-ES" sz="4000" dirty="0"/>
+              <a:t>Detalles</a:t>
+            </a:r>
+          </a:p>
+        </p:txBody>
+      </p:sp>
+      <p:sp>
+        <p:nvSpPr>
+          <p:cNvPr id="12" name="CuadroTexto 11">
+            <a:extLst>
+              <a:ext uri="{FF2B5EF4-FFF2-40B4-BE49-F238E27FC236}">
+                <a16:creationId xmlns:a16="http://schemas.microsoft.com/office/drawing/2014/main" id="{84D967ED-65BC-CFD5-E209-CAE0C4BC242A}"/>
+              </a:ext>
+            </a:extLst>
+          </p:cNvPr>
+          <p:cNvSpPr txBox="1"/>
+          <p:nvPr/>
+        </p:nvSpPr>
+        <p:spPr>
+          <a:xfrm>
+            <a:off x="360286" y="1588059"/>
+            <a:ext cx="2284151" cy="707886"/>
+          </a:xfrm>
+          <a:prstGeom prst="rect">
+            <a:avLst/>
+          </a:prstGeom>
+          <a:noFill/>
+        </p:spPr>
+        <p:txBody>
+          <a:bodyPr wrap="none" rtlCol="0">
+            <a:spAutoFit/>
+          </a:bodyPr>
+          <a:lstStyle/>
+          <a:p>
+            <a:r>
+              <a:rPr lang="es-ES" sz="4000" dirty="0"/>
+              <a:t>Productos</a:t>
+            </a:r>
+          </a:p>
+        </p:txBody>
+      </p:sp>
+      <p:sp>
+        <p:nvSpPr>
+          <p:cNvPr id="14" name="CuadroTexto 13">
+            <a:extLst>
+              <a:ext uri="{FF2B5EF4-FFF2-40B4-BE49-F238E27FC236}">
+                <a16:creationId xmlns:a16="http://schemas.microsoft.com/office/drawing/2014/main" id="{BEC8769F-346D-490B-02EB-B8B913BCD8B2}"/>
+              </a:ext>
+            </a:extLst>
+          </p:cNvPr>
+          <p:cNvSpPr txBox="1"/>
+          <p:nvPr/>
+        </p:nvSpPr>
+        <p:spPr>
+          <a:xfrm>
+            <a:off x="8983830" y="1247959"/>
+            <a:ext cx="1468415" cy="707886"/>
+          </a:xfrm>
+          <a:prstGeom prst="rect">
+            <a:avLst/>
+          </a:prstGeom>
+          <a:noFill/>
+        </p:spPr>
+        <p:txBody>
+          <a:bodyPr wrap="none" rtlCol="0">
+            <a:spAutoFit/>
+          </a:bodyPr>
+          <a:lstStyle/>
+          <a:p>
+            <a:r>
+              <a:rPr lang="es-ES" sz="4000" dirty="0"/>
+              <a:t>Filtros</a:t>
+            </a:r>
+          </a:p>
+        </p:txBody>
+      </p:sp>
+      <p:sp>
+        <p:nvSpPr>
+          <p:cNvPr id="15" name="Flecha: a la derecha 14">
+            <a:extLst>
+              <a:ext uri="{FF2B5EF4-FFF2-40B4-BE49-F238E27FC236}">
+                <a16:creationId xmlns:a16="http://schemas.microsoft.com/office/drawing/2014/main" id="{00D8AC1D-6376-68B3-C968-517801907F45}"/>
               </a:ext>
             </a:extLst>
           </p:cNvPr>
@@ -5763,11 +5841,11 @@
           <p:nvPr/>
         </p:nvSpPr>
         <p:spPr>
-          <a:xfrm>
-            <a:off x="846212" y="2295945"/>
-            <a:ext cx="2423160" cy="4192416"/>
-          </a:xfrm>
-          <a:prstGeom prst="roundRect">
+          <a:xfrm rot="8761098">
+            <a:off x="2567248" y="2209776"/>
+            <a:ext cx="1082529" cy="465912"/>
+          </a:xfrm>
+          <a:prstGeom prst="rightArrow">
             <a:avLst/>
           </a:prstGeom>
         </p:spPr>
@@ -5798,10 +5876,10 @@
       </p:sp>
       <p:sp>
         <p:nvSpPr>
-          <p:cNvPr id="8" name="Rectángulo: esquinas redondeadas 7">
-            <a:extLst>
-              <a:ext uri="{FF2B5EF4-FFF2-40B4-BE49-F238E27FC236}">
-                <a16:creationId xmlns:a16="http://schemas.microsoft.com/office/drawing/2014/main" id="{FD456482-F852-5C25-60C5-37B057367CFC}"/>
+          <p:cNvPr id="16" name="Flecha: a la derecha 15">
+            <a:extLst>
+              <a:ext uri="{FF2B5EF4-FFF2-40B4-BE49-F238E27FC236}">
+                <a16:creationId xmlns:a16="http://schemas.microsoft.com/office/drawing/2014/main" id="{73024F4F-22F9-737E-2321-C0B3CA555E52}"/>
               </a:ext>
             </a:extLst>
           </p:cNvPr>
@@ -5809,11 +5887,11 @@
           <p:nvPr/>
         </p:nvSpPr>
         <p:spPr>
-          <a:xfrm>
-            <a:off x="4884420" y="1665009"/>
-            <a:ext cx="2423160" cy="4192416"/>
-          </a:xfrm>
-          <a:prstGeom prst="roundRect">
+          <a:xfrm rot="2434594">
+            <a:off x="6321419" y="2209775"/>
+            <a:ext cx="1082529" cy="465912"/>
+          </a:xfrm>
+          <a:prstGeom prst="rightArrow">
             <a:avLst/>
           </a:prstGeom>
         </p:spPr>
@@ -5842,249 +5920,6 @@
           </a:p>
         </p:txBody>
       </p:sp>
-      <p:sp>
-        <p:nvSpPr>
-          <p:cNvPr id="11" name="CuadroTexto 10">
-            <a:extLst>
-              <a:ext uri="{FF2B5EF4-FFF2-40B4-BE49-F238E27FC236}">
-                <a16:creationId xmlns:a16="http://schemas.microsoft.com/office/drawing/2014/main" id="{C1CF97DD-A361-B116-C77B-0F3B9D7C7848}"/>
-              </a:ext>
-            </a:extLst>
-          </p:cNvPr>
-          <p:cNvSpPr txBox="1"/>
-          <p:nvPr/>
-        </p:nvSpPr>
-        <p:spPr>
-          <a:xfrm>
-            <a:off x="4261251" y="1000575"/>
-            <a:ext cx="3782446" cy="707886"/>
-          </a:xfrm>
-          <a:prstGeom prst="rect">
-            <a:avLst/>
-          </a:prstGeom>
-          <a:noFill/>
-        </p:spPr>
-        <p:txBody>
-          <a:bodyPr wrap="none" rtlCol="0">
-            <a:spAutoFit/>
-          </a:bodyPr>
-          <a:lstStyle/>
-          <a:p>
-            <a:r>
-              <a:rPr lang="es-ES" sz="4000" dirty="0"/>
-              <a:t>Inicial/Categorías</a:t>
-            </a:r>
-          </a:p>
-        </p:txBody>
-      </p:sp>
-      <p:sp>
-        <p:nvSpPr>
-          <p:cNvPr id="12" name="CuadroTexto 11">
-            <a:extLst>
-              <a:ext uri="{FF2B5EF4-FFF2-40B4-BE49-F238E27FC236}">
-                <a16:creationId xmlns:a16="http://schemas.microsoft.com/office/drawing/2014/main" id="{84D967ED-65BC-CFD5-E209-CAE0C4BC242A}"/>
-              </a:ext>
-            </a:extLst>
-          </p:cNvPr>
-          <p:cNvSpPr txBox="1"/>
-          <p:nvPr/>
-        </p:nvSpPr>
-        <p:spPr>
-          <a:xfrm>
-            <a:off x="874612" y="1588059"/>
-            <a:ext cx="2284151" cy="707886"/>
-          </a:xfrm>
-          <a:prstGeom prst="rect">
-            <a:avLst/>
-          </a:prstGeom>
-          <a:noFill/>
-        </p:spPr>
-        <p:txBody>
-          <a:bodyPr wrap="none" rtlCol="0">
-            <a:spAutoFit/>
-          </a:bodyPr>
-          <a:lstStyle/>
-          <a:p>
-            <a:r>
-              <a:rPr lang="es-ES" sz="4000" dirty="0"/>
-              <a:t>Productos</a:t>
-            </a:r>
-          </a:p>
-        </p:txBody>
-      </p:sp>
-      <p:sp>
-        <p:nvSpPr>
-          <p:cNvPr id="13" name="Rectángulo: esquinas redondeadas 12">
-            <a:extLst>
-              <a:ext uri="{FF2B5EF4-FFF2-40B4-BE49-F238E27FC236}">
-                <a16:creationId xmlns:a16="http://schemas.microsoft.com/office/drawing/2014/main" id="{BED32F55-342F-11E0-3BD8-38A9ABEBAECE}"/>
-              </a:ext>
-            </a:extLst>
-          </p:cNvPr>
-          <p:cNvSpPr/>
-          <p:nvPr/>
-        </p:nvSpPr>
-        <p:spPr>
-          <a:xfrm>
-            <a:off x="8922628" y="2295945"/>
-            <a:ext cx="2423160" cy="4192416"/>
-          </a:xfrm>
-          <a:prstGeom prst="roundRect">
-            <a:avLst/>
-          </a:prstGeom>
-        </p:spPr>
-        <p:style>
-          <a:lnRef idx="2">
-            <a:schemeClr val="accent1">
-              <a:shade val="15000"/>
-            </a:schemeClr>
-          </a:lnRef>
-          <a:fillRef idx="1">
-            <a:schemeClr val="accent1"/>
-          </a:fillRef>
-          <a:effectRef idx="0">
-            <a:schemeClr val="accent1"/>
-          </a:effectRef>
-          <a:fontRef idx="minor">
-            <a:schemeClr val="lt1"/>
-          </a:fontRef>
-        </p:style>
-        <p:txBody>
-          <a:bodyPr rtlCol="0" anchor="ctr"/>
-          <a:lstStyle/>
-          <a:p>
-            <a:pPr algn="ctr"/>
-            <a:endParaRPr lang="es-ES" dirty="0"/>
-          </a:p>
-        </p:txBody>
-      </p:sp>
-      <p:sp>
-        <p:nvSpPr>
-          <p:cNvPr id="14" name="CuadroTexto 13">
-            <a:extLst>
-              <a:ext uri="{FF2B5EF4-FFF2-40B4-BE49-F238E27FC236}">
-                <a16:creationId xmlns:a16="http://schemas.microsoft.com/office/drawing/2014/main" id="{BEC8769F-346D-490B-02EB-B8B913BCD8B2}"/>
-              </a:ext>
-            </a:extLst>
-          </p:cNvPr>
-          <p:cNvSpPr txBox="1"/>
-          <p:nvPr/>
-        </p:nvSpPr>
-        <p:spPr>
-          <a:xfrm>
-            <a:off x="9400000" y="1665009"/>
-            <a:ext cx="1468415" cy="707886"/>
-          </a:xfrm>
-          <a:prstGeom prst="rect">
-            <a:avLst/>
-          </a:prstGeom>
-          <a:noFill/>
-        </p:spPr>
-        <p:txBody>
-          <a:bodyPr wrap="none" rtlCol="0">
-            <a:spAutoFit/>
-          </a:bodyPr>
-          <a:lstStyle/>
-          <a:p>
-            <a:r>
-              <a:rPr lang="es-ES" sz="4000" dirty="0"/>
-              <a:t>Filtros</a:t>
-            </a:r>
-          </a:p>
-        </p:txBody>
-      </p:sp>
-      <p:sp>
-        <p:nvSpPr>
-          <p:cNvPr id="15" name="Flecha: a la derecha 14">
-            <a:extLst>
-              <a:ext uri="{FF2B5EF4-FFF2-40B4-BE49-F238E27FC236}">
-                <a16:creationId xmlns:a16="http://schemas.microsoft.com/office/drawing/2014/main" id="{00D8AC1D-6376-68B3-C968-517801907F45}"/>
-              </a:ext>
-            </a:extLst>
-          </p:cNvPr>
-          <p:cNvSpPr/>
-          <p:nvPr/>
-        </p:nvSpPr>
-        <p:spPr>
-          <a:xfrm rot="8761098">
-            <a:off x="3480327" y="2478024"/>
-            <a:ext cx="1082529" cy="465912"/>
-          </a:xfrm>
-          <a:prstGeom prst="rightArrow">
-            <a:avLst/>
-          </a:prstGeom>
-        </p:spPr>
-        <p:style>
-          <a:lnRef idx="2">
-            <a:schemeClr val="accent1">
-              <a:shade val="15000"/>
-            </a:schemeClr>
-          </a:lnRef>
-          <a:fillRef idx="1">
-            <a:schemeClr val="accent1"/>
-          </a:fillRef>
-          <a:effectRef idx="0">
-            <a:schemeClr val="accent1"/>
-          </a:effectRef>
-          <a:fontRef idx="minor">
-            <a:schemeClr val="lt1"/>
-          </a:fontRef>
-        </p:style>
-        <p:txBody>
-          <a:bodyPr rtlCol="0" anchor="ctr"/>
-          <a:lstStyle/>
-          <a:p>
-            <a:pPr algn="ctr"/>
-            <a:endParaRPr lang="es-ES"/>
-          </a:p>
-        </p:txBody>
-      </p:sp>
-      <p:sp>
-        <p:nvSpPr>
-          <p:cNvPr id="16" name="Flecha: a la derecha 15">
-            <a:extLst>
-              <a:ext uri="{FF2B5EF4-FFF2-40B4-BE49-F238E27FC236}">
-                <a16:creationId xmlns:a16="http://schemas.microsoft.com/office/drawing/2014/main" id="{73024F4F-22F9-737E-2321-C0B3CA555E52}"/>
-              </a:ext>
-            </a:extLst>
-          </p:cNvPr>
-          <p:cNvSpPr/>
-          <p:nvPr/>
-        </p:nvSpPr>
-        <p:spPr>
-          <a:xfrm rot="2434594">
-            <a:off x="7612753" y="2444712"/>
-            <a:ext cx="1082529" cy="465912"/>
-          </a:xfrm>
-          <a:prstGeom prst="rightArrow">
-            <a:avLst/>
-          </a:prstGeom>
-        </p:spPr>
-        <p:style>
-          <a:lnRef idx="2">
-            <a:schemeClr val="accent1">
-              <a:shade val="15000"/>
-            </a:schemeClr>
-          </a:lnRef>
-          <a:fillRef idx="1">
-            <a:schemeClr val="accent1"/>
-          </a:fillRef>
-          <a:effectRef idx="0">
-            <a:schemeClr val="accent1"/>
-          </a:effectRef>
-          <a:fontRef idx="minor">
-            <a:schemeClr val="lt1"/>
-          </a:fontRef>
-        </p:style>
-        <p:txBody>
-          <a:bodyPr rtlCol="0" anchor="ctr"/>
-          <a:lstStyle/>
-          <a:p>
-            <a:pPr algn="ctr"/>
-            <a:endParaRPr lang="es-ES"/>
-          </a:p>
-        </p:txBody>
-      </p:sp>
       <p:pic>
         <p:nvPicPr>
           <p:cNvPr id="2" name="Gráfico 1">
@@ -6118,6 +5953,146 @@
           <a:xfrm>
             <a:off x="11506869" y="82334"/>
             <a:ext cx="531934" cy="670872"/>
+          </a:xfrm>
+          <a:prstGeom prst="rect">
+            <a:avLst/>
+          </a:prstGeom>
+        </p:spPr>
+      </p:pic>
+      <p:pic>
+        <p:nvPicPr>
+          <p:cNvPr id="6" name="Imagen 5" descr="Interfaz de usuario gráfica, Aplicación, Sitio web&#10;&#10;Descripción generada automáticamente">
+            <a:extLst>
+              <a:ext uri="{FF2B5EF4-FFF2-40B4-BE49-F238E27FC236}">
+                <a16:creationId xmlns:a16="http://schemas.microsoft.com/office/drawing/2014/main" id="{8D5C6448-14AC-5BD0-42AA-3927759B80FA}"/>
+              </a:ext>
+            </a:extLst>
+          </p:cNvPr>
+          <p:cNvPicPr>
+            <a:picLocks noChangeAspect="1"/>
+          </p:cNvPicPr>
+          <p:nvPr/>
+        </p:nvPicPr>
+        <p:blipFill rotWithShape="1">
+          <a:blip r:embed="rId4">
+            <a:extLst>
+              <a:ext uri="{28A0092B-C50C-407E-A947-70E740481C1C}">
+                <a14:useLocalDpi xmlns:a14="http://schemas.microsoft.com/office/drawing/2010/main" val="0"/>
+              </a:ext>
+            </a:extLst>
+          </a:blip>
+          <a:srcRect l="-1" t="4489" r="147"/>
+          <a:stretch/>
+        </p:blipFill>
+        <p:spPr>
+          <a:xfrm>
+            <a:off x="503802" y="2442732"/>
+            <a:ext cx="1821060" cy="3873361"/>
+          </a:xfrm>
+          <a:prstGeom prst="rect">
+            <a:avLst/>
+          </a:prstGeom>
+        </p:spPr>
+      </p:pic>
+      <p:pic>
+        <p:nvPicPr>
+          <p:cNvPr id="18" name="Imagen 17" descr="Interfaz de usuario gráfica, Aplicación&#10;&#10;Descripción generada automáticamente">
+            <a:extLst>
+              <a:ext uri="{FF2B5EF4-FFF2-40B4-BE49-F238E27FC236}">
+                <a16:creationId xmlns:a16="http://schemas.microsoft.com/office/drawing/2014/main" id="{EBC13BCD-95DC-C67B-FB69-0846B1CA87F8}"/>
+              </a:ext>
+            </a:extLst>
+          </p:cNvPr>
+          <p:cNvPicPr>
+            <a:picLocks noChangeAspect="1"/>
+          </p:cNvPicPr>
+          <p:nvPr/>
+        </p:nvPicPr>
+        <p:blipFill rotWithShape="1">
+          <a:blip r:embed="rId5">
+            <a:extLst>
+              <a:ext uri="{28A0092B-C50C-407E-A947-70E740481C1C}">
+                <a14:useLocalDpi xmlns:a14="http://schemas.microsoft.com/office/drawing/2010/main" val="0"/>
+              </a:ext>
+            </a:extLst>
+          </a:blip>
+          <a:srcRect t="3741" r="-40"/>
+          <a:stretch/>
+        </p:blipFill>
+        <p:spPr>
+          <a:xfrm>
+            <a:off x="9848805" y="1990665"/>
+            <a:ext cx="2042663" cy="4370550"/>
+          </a:xfrm>
+          <a:prstGeom prst="rect">
+            <a:avLst/>
+          </a:prstGeom>
+        </p:spPr>
+      </p:pic>
+      <p:pic>
+        <p:nvPicPr>
+          <p:cNvPr id="20" name="Imagen 19" descr="Interfaz de usuario gráfica&#10;&#10;Descripción generada automáticamente con confianza media">
+            <a:extLst>
+              <a:ext uri="{FF2B5EF4-FFF2-40B4-BE49-F238E27FC236}">
+                <a16:creationId xmlns:a16="http://schemas.microsoft.com/office/drawing/2014/main" id="{9099A761-9326-958F-DAD2-EFA4C6630942}"/>
+              </a:ext>
+            </a:extLst>
+          </p:cNvPr>
+          <p:cNvPicPr>
+            <a:picLocks noChangeAspect="1"/>
+          </p:cNvPicPr>
+          <p:nvPr/>
+        </p:nvPicPr>
+        <p:blipFill rotWithShape="1">
+          <a:blip r:embed="rId6">
+            <a:extLst>
+              <a:ext uri="{28A0092B-C50C-407E-A947-70E740481C1C}">
+                <a14:useLocalDpi xmlns:a14="http://schemas.microsoft.com/office/drawing/2010/main" val="0"/>
+              </a:ext>
+            </a:extLst>
+          </a:blip>
+          <a:srcRect t="4055" r="-746"/>
+          <a:stretch/>
+        </p:blipFill>
+        <p:spPr>
+          <a:xfrm>
+            <a:off x="7661831" y="1990665"/>
+            <a:ext cx="2056206" cy="4354494"/>
+          </a:xfrm>
+          <a:prstGeom prst="rect">
+            <a:avLst/>
+          </a:prstGeom>
+        </p:spPr>
+      </p:pic>
+      <p:pic>
+        <p:nvPicPr>
+          <p:cNvPr id="22" name="Imagen 21" descr="Diagrama&#10;&#10;Descripción generada automáticamente">
+            <a:extLst>
+              <a:ext uri="{FF2B5EF4-FFF2-40B4-BE49-F238E27FC236}">
+                <a16:creationId xmlns:a16="http://schemas.microsoft.com/office/drawing/2014/main" id="{573F9B75-9E89-8037-2D3E-AF59E2C37CA5}"/>
+              </a:ext>
+            </a:extLst>
+          </p:cNvPr>
+          <p:cNvPicPr>
+            <a:picLocks noChangeAspect="1"/>
+          </p:cNvPicPr>
+          <p:nvPr/>
+        </p:nvPicPr>
+        <p:blipFill rotWithShape="1">
+          <a:blip r:embed="rId7">
+            <a:extLst>
+              <a:ext uri="{28A0092B-C50C-407E-A947-70E740481C1C}">
+                <a14:useLocalDpi xmlns:a14="http://schemas.microsoft.com/office/drawing/2010/main" val="0"/>
+              </a:ext>
+            </a:extLst>
+          </a:blip>
+          <a:srcRect l="1" t="3768" r="-771"/>
+          <a:stretch/>
+        </p:blipFill>
+        <p:spPr>
+          <a:xfrm>
+            <a:off x="3829912" y="1804396"/>
+            <a:ext cx="2233624" cy="4743088"/>
           </a:xfrm>
           <a:prstGeom prst="rect">
             <a:avLst/>
@@ -6241,10 +6216,80 @@
       </p:cxnSp>
       <p:sp>
         <p:nvSpPr>
-          <p:cNvPr id="8" name="Rectángulo: esquinas redondeadas 7">
-            <a:extLst>
-              <a:ext uri="{FF2B5EF4-FFF2-40B4-BE49-F238E27FC236}">
-                <a16:creationId xmlns:a16="http://schemas.microsoft.com/office/drawing/2014/main" id="{FD456482-F852-5C25-60C5-37B057367CFC}"/>
+          <p:cNvPr id="11" name="CuadroTexto 10">
+            <a:extLst>
+              <a:ext uri="{FF2B5EF4-FFF2-40B4-BE49-F238E27FC236}">
+                <a16:creationId xmlns:a16="http://schemas.microsoft.com/office/drawing/2014/main" id="{C1CF97DD-A361-B116-C77B-0F3B9D7C7848}"/>
+              </a:ext>
+            </a:extLst>
+          </p:cNvPr>
+          <p:cNvSpPr txBox="1"/>
+          <p:nvPr/>
+        </p:nvSpPr>
+        <p:spPr>
+          <a:xfrm>
+            <a:off x="1009685" y="1066373"/>
+            <a:ext cx="2096215" cy="707886"/>
+          </a:xfrm>
+          <a:prstGeom prst="rect">
+            <a:avLst/>
+          </a:prstGeom>
+          <a:noFill/>
+        </p:spPr>
+        <p:txBody>
+          <a:bodyPr wrap="none" rtlCol="0">
+            <a:spAutoFit/>
+          </a:bodyPr>
+          <a:lstStyle/>
+          <a:p>
+            <a:r>
+              <a:rPr lang="es-ES" sz="4000" dirty="0"/>
+              <a:t>Mis listas</a:t>
+            </a:r>
+          </a:p>
+        </p:txBody>
+      </p:sp>
+      <p:sp>
+        <p:nvSpPr>
+          <p:cNvPr id="14" name="CuadroTexto 13">
+            <a:extLst>
+              <a:ext uri="{FF2B5EF4-FFF2-40B4-BE49-F238E27FC236}">
+                <a16:creationId xmlns:a16="http://schemas.microsoft.com/office/drawing/2014/main" id="{BEC8769F-346D-490B-02EB-B8B913BCD8B2}"/>
+              </a:ext>
+            </a:extLst>
+          </p:cNvPr>
+          <p:cNvSpPr txBox="1"/>
+          <p:nvPr/>
+        </p:nvSpPr>
+        <p:spPr>
+          <a:xfrm>
+            <a:off x="4182223" y="1118650"/>
+            <a:ext cx="3940502" cy="707886"/>
+          </a:xfrm>
+          <a:prstGeom prst="rect">
+            <a:avLst/>
+          </a:prstGeom>
+          <a:noFill/>
+        </p:spPr>
+        <p:txBody>
+          <a:bodyPr wrap="none" rtlCol="0">
+            <a:spAutoFit/>
+          </a:bodyPr>
+          <a:lstStyle/>
+          <a:p>
+            <a:r>
+              <a:rPr lang="es-ES" sz="4000" dirty="0"/>
+              <a:t>Sugerencia/Filtros</a:t>
+            </a:r>
+          </a:p>
+        </p:txBody>
+      </p:sp>
+      <p:sp>
+        <p:nvSpPr>
+          <p:cNvPr id="16" name="Flecha: a la derecha 15">
+            <a:extLst>
+              <a:ext uri="{FF2B5EF4-FFF2-40B4-BE49-F238E27FC236}">
+                <a16:creationId xmlns:a16="http://schemas.microsoft.com/office/drawing/2014/main" id="{73024F4F-22F9-737E-2321-C0B3CA555E52}"/>
               </a:ext>
             </a:extLst>
           </p:cNvPr>
@@ -6253,10 +6298,10 @@
         </p:nvSpPr>
         <p:spPr>
           <a:xfrm>
-            <a:off x="846213" y="1774259"/>
-            <a:ext cx="2423160" cy="4192416"/>
-          </a:xfrm>
-          <a:prstGeom prst="roundRect">
+            <a:off x="3481692" y="3404555"/>
+            <a:ext cx="1082529" cy="465912"/>
+          </a:xfrm>
+          <a:prstGeom prst="rightArrow">
             <a:avLst/>
           </a:prstGeom>
         </p:spPr>
@@ -6287,45 +6332,10 @@
       </p:sp>
       <p:sp>
         <p:nvSpPr>
-          <p:cNvPr id="11" name="CuadroTexto 10">
-            <a:extLst>
-              <a:ext uri="{FF2B5EF4-FFF2-40B4-BE49-F238E27FC236}">
-                <a16:creationId xmlns:a16="http://schemas.microsoft.com/office/drawing/2014/main" id="{C1CF97DD-A361-B116-C77B-0F3B9D7C7848}"/>
-              </a:ext>
-            </a:extLst>
-          </p:cNvPr>
-          <p:cNvSpPr txBox="1"/>
-          <p:nvPr/>
-        </p:nvSpPr>
-        <p:spPr>
-          <a:xfrm>
-            <a:off x="1009685" y="1066373"/>
-            <a:ext cx="2096215" cy="707886"/>
-          </a:xfrm>
-          <a:prstGeom prst="rect">
-            <a:avLst/>
-          </a:prstGeom>
-          <a:noFill/>
-        </p:spPr>
-        <p:txBody>
-          <a:bodyPr wrap="none" rtlCol="0">
-            <a:spAutoFit/>
-          </a:bodyPr>
-          <a:lstStyle/>
-          <a:p>
-            <a:r>
-              <a:rPr lang="es-ES" sz="4000" dirty="0"/>
-              <a:t>Mis listas</a:t>
-            </a:r>
-          </a:p>
-        </p:txBody>
-      </p:sp>
-      <p:sp>
-        <p:nvSpPr>
-          <p:cNvPr id="13" name="Rectángulo: esquinas redondeadas 12">
-            <a:extLst>
-              <a:ext uri="{FF2B5EF4-FFF2-40B4-BE49-F238E27FC236}">
-                <a16:creationId xmlns:a16="http://schemas.microsoft.com/office/drawing/2014/main" id="{BED32F55-342F-11E0-3BD8-38A9ABEBAECE}"/>
+          <p:cNvPr id="2" name="Flecha: a la derecha 1">
+            <a:extLst>
+              <a:ext uri="{FF2B5EF4-FFF2-40B4-BE49-F238E27FC236}">
+                <a16:creationId xmlns:a16="http://schemas.microsoft.com/office/drawing/2014/main" id="{4734DEDB-A7A8-0082-9728-84B3899201D9}"/>
               </a:ext>
             </a:extLst>
           </p:cNvPr>
@@ -6334,10 +6344,10 @@
         </p:nvSpPr>
         <p:spPr>
           <a:xfrm>
-            <a:off x="4884420" y="1826536"/>
-            <a:ext cx="2423160" cy="4192416"/>
-          </a:xfrm>
-          <a:prstGeom prst="roundRect">
+            <a:off x="7571344" y="3404555"/>
+            <a:ext cx="1082529" cy="465912"/>
+          </a:xfrm>
+          <a:prstGeom prst="rightArrow">
             <a:avLst/>
           </a:prstGeom>
         </p:spPr>
@@ -6362,16 +6372,16 @@
           <a:lstStyle/>
           <a:p>
             <a:pPr algn="ctr"/>
-            <a:endParaRPr lang="es-ES" dirty="0"/>
-          </a:p>
-        </p:txBody>
-      </p:sp>
-      <p:sp>
-        <p:nvSpPr>
-          <p:cNvPr id="14" name="CuadroTexto 13">
-            <a:extLst>
-              <a:ext uri="{FF2B5EF4-FFF2-40B4-BE49-F238E27FC236}">
-                <a16:creationId xmlns:a16="http://schemas.microsoft.com/office/drawing/2014/main" id="{BEC8769F-346D-490B-02EB-B8B913BCD8B2}"/>
+            <a:endParaRPr lang="es-ES"/>
+          </a:p>
+        </p:txBody>
+      </p:sp>
+      <p:sp>
+        <p:nvSpPr>
+          <p:cNvPr id="6" name="CuadroTexto 5">
+            <a:extLst>
+              <a:ext uri="{FF2B5EF4-FFF2-40B4-BE49-F238E27FC236}">
+                <a16:creationId xmlns:a16="http://schemas.microsoft.com/office/drawing/2014/main" id="{912CB09F-2697-B431-B381-F1775FF6D8DA}"/>
               </a:ext>
             </a:extLst>
           </p:cNvPr>
@@ -6380,180 +6390,7 @@
         </p:nvSpPr>
         <p:spPr>
           <a:xfrm>
-            <a:off x="4182223" y="1118650"/>
-            <a:ext cx="3940502" cy="707886"/>
-          </a:xfrm>
-          <a:prstGeom prst="rect">
-            <a:avLst/>
-          </a:prstGeom>
-          <a:noFill/>
-        </p:spPr>
-        <p:txBody>
-          <a:bodyPr wrap="none" rtlCol="0">
-            <a:spAutoFit/>
-          </a:bodyPr>
-          <a:lstStyle/>
-          <a:p>
-            <a:r>
-              <a:rPr lang="es-ES" sz="4000" dirty="0"/>
-              <a:t>Sugerencia/Filtros</a:t>
-            </a:r>
-          </a:p>
-        </p:txBody>
-      </p:sp>
-      <p:sp>
-        <p:nvSpPr>
-          <p:cNvPr id="16" name="Flecha: a la derecha 15">
-            <a:extLst>
-              <a:ext uri="{FF2B5EF4-FFF2-40B4-BE49-F238E27FC236}">
-                <a16:creationId xmlns:a16="http://schemas.microsoft.com/office/drawing/2014/main" id="{73024F4F-22F9-737E-2321-C0B3CA555E52}"/>
-              </a:ext>
-            </a:extLst>
-          </p:cNvPr>
-          <p:cNvSpPr/>
-          <p:nvPr/>
-        </p:nvSpPr>
-        <p:spPr>
-          <a:xfrm>
-            <a:off x="3481692" y="3404555"/>
-            <a:ext cx="1082529" cy="465912"/>
-          </a:xfrm>
-          <a:prstGeom prst="rightArrow">
-            <a:avLst/>
-          </a:prstGeom>
-        </p:spPr>
-        <p:style>
-          <a:lnRef idx="2">
-            <a:schemeClr val="accent1">
-              <a:shade val="15000"/>
-            </a:schemeClr>
-          </a:lnRef>
-          <a:fillRef idx="1">
-            <a:schemeClr val="accent1"/>
-          </a:fillRef>
-          <a:effectRef idx="0">
-            <a:schemeClr val="accent1"/>
-          </a:effectRef>
-          <a:fontRef idx="minor">
-            <a:schemeClr val="lt1"/>
-          </a:fontRef>
-        </p:style>
-        <p:txBody>
-          <a:bodyPr rtlCol="0" anchor="ctr"/>
-          <a:lstStyle/>
-          <a:p>
-            <a:pPr algn="ctr"/>
-            <a:endParaRPr lang="es-ES"/>
-          </a:p>
-        </p:txBody>
-      </p:sp>
-      <p:sp>
-        <p:nvSpPr>
-          <p:cNvPr id="2" name="Flecha: a la derecha 1">
-            <a:extLst>
-              <a:ext uri="{FF2B5EF4-FFF2-40B4-BE49-F238E27FC236}">
-                <a16:creationId xmlns:a16="http://schemas.microsoft.com/office/drawing/2014/main" id="{4734DEDB-A7A8-0082-9728-84B3899201D9}"/>
-              </a:ext>
-            </a:extLst>
-          </p:cNvPr>
-          <p:cNvSpPr/>
-          <p:nvPr/>
-        </p:nvSpPr>
-        <p:spPr>
-          <a:xfrm>
-            <a:off x="7571344" y="3404555"/>
-            <a:ext cx="1082529" cy="465912"/>
-          </a:xfrm>
-          <a:prstGeom prst="rightArrow">
-            <a:avLst/>
-          </a:prstGeom>
-        </p:spPr>
-        <p:style>
-          <a:lnRef idx="2">
-            <a:schemeClr val="accent1">
-              <a:shade val="15000"/>
-            </a:schemeClr>
-          </a:lnRef>
-          <a:fillRef idx="1">
-            <a:schemeClr val="accent1"/>
-          </a:fillRef>
-          <a:effectRef idx="0">
-            <a:schemeClr val="accent1"/>
-          </a:effectRef>
-          <a:fontRef idx="minor">
-            <a:schemeClr val="lt1"/>
-          </a:fontRef>
-        </p:style>
-        <p:txBody>
-          <a:bodyPr rtlCol="0" anchor="ctr"/>
-          <a:lstStyle/>
-          <a:p>
-            <a:pPr algn="ctr"/>
-            <a:endParaRPr lang="es-ES"/>
-          </a:p>
-        </p:txBody>
-      </p:sp>
-      <p:sp>
-        <p:nvSpPr>
-          <p:cNvPr id="5" name="Rectángulo: esquinas redondeadas 4">
-            <a:extLst>
-              <a:ext uri="{FF2B5EF4-FFF2-40B4-BE49-F238E27FC236}">
-                <a16:creationId xmlns:a16="http://schemas.microsoft.com/office/drawing/2014/main" id="{3C666E25-0514-5036-E0DB-699520D03745}"/>
-              </a:ext>
-            </a:extLst>
-          </p:cNvPr>
-          <p:cNvSpPr/>
-          <p:nvPr/>
-        </p:nvSpPr>
-        <p:spPr>
-          <a:xfrm>
-            <a:off x="9035575" y="1718544"/>
-            <a:ext cx="2423160" cy="4192416"/>
-          </a:xfrm>
-          <a:prstGeom prst="roundRect">
-            <a:avLst/>
-          </a:prstGeom>
-        </p:spPr>
-        <p:style>
-          <a:lnRef idx="2">
-            <a:schemeClr val="accent1">
-              <a:shade val="15000"/>
-            </a:schemeClr>
-          </a:lnRef>
-          <a:fillRef idx="1">
-            <a:schemeClr val="accent1"/>
-          </a:fillRef>
-          <a:effectRef idx="0">
-            <a:schemeClr val="accent1"/>
-          </a:effectRef>
-          <a:fontRef idx="minor">
-            <a:schemeClr val="lt1"/>
-          </a:fontRef>
-        </p:style>
-        <p:txBody>
-          <a:bodyPr rtlCol="0" anchor="ctr"/>
-          <a:lstStyle/>
-          <a:p>
-            <a:pPr algn="ctr"/>
-            <a:endParaRPr lang="es-ES" dirty="0"/>
-          </a:p>
-        </p:txBody>
-      </p:sp>
-      <p:sp>
-        <p:nvSpPr>
-          <p:cNvPr id="6" name="CuadroTexto 5">
-            <a:extLst>
-              <a:ext uri="{FF2B5EF4-FFF2-40B4-BE49-F238E27FC236}">
-                <a16:creationId xmlns:a16="http://schemas.microsoft.com/office/drawing/2014/main" id="{912CB09F-2697-B431-B381-F1775FF6D8DA}"/>
-              </a:ext>
-            </a:extLst>
-          </p:cNvPr>
-          <p:cNvSpPr txBox="1"/>
-          <p:nvPr/>
-        </p:nvSpPr>
-        <p:spPr>
-          <a:xfrm>
-            <a:off x="9018164" y="1023081"/>
+            <a:off x="9015649" y="1039137"/>
             <a:ext cx="2457981" cy="707886"/>
           </a:xfrm>
           <a:prstGeom prst="rect">
@@ -6670,6 +6507,111 @@
           <a:xfrm>
             <a:off x="11506869" y="82334"/>
             <a:ext cx="531934" cy="670872"/>
+          </a:xfrm>
+          <a:prstGeom prst="rect">
+            <a:avLst/>
+          </a:prstGeom>
+        </p:spPr>
+      </p:pic>
+      <p:pic>
+        <p:nvPicPr>
+          <p:cNvPr id="12" name="Imagen 11" descr="Interfaz de usuario gráfica, Aplicación&#10;&#10;Descripción generada automáticamente">
+            <a:extLst>
+              <a:ext uri="{FF2B5EF4-FFF2-40B4-BE49-F238E27FC236}">
+                <a16:creationId xmlns:a16="http://schemas.microsoft.com/office/drawing/2014/main" id="{1173F8DB-DA24-2336-1CA9-2BE8095491E0}"/>
+              </a:ext>
+            </a:extLst>
+          </p:cNvPr>
+          <p:cNvPicPr>
+            <a:picLocks noChangeAspect="1"/>
+          </p:cNvPicPr>
+          <p:nvPr/>
+        </p:nvPicPr>
+        <p:blipFill rotWithShape="1">
+          <a:blip r:embed="rId4">
+            <a:extLst>
+              <a:ext uri="{28A0092B-C50C-407E-A947-70E740481C1C}">
+                <a14:useLocalDpi xmlns:a14="http://schemas.microsoft.com/office/drawing/2010/main" val="0"/>
+              </a:ext>
+            </a:extLst>
+          </a:blip>
+          <a:srcRect t="4480" r="1303"/>
+          <a:stretch/>
+        </p:blipFill>
+        <p:spPr>
+          <a:xfrm>
+            <a:off x="1028368" y="1730967"/>
+            <a:ext cx="1955216" cy="4207844"/>
+          </a:xfrm>
+          <a:prstGeom prst="rect">
+            <a:avLst/>
+          </a:prstGeom>
+        </p:spPr>
+      </p:pic>
+      <p:pic>
+        <p:nvPicPr>
+          <p:cNvPr id="17" name="Imagen 16" descr="Interfaz de usuario gráfica, Texto, Aplicación, Chat o mensaje de texto&#10;&#10;Descripción generada automáticamente">
+            <a:extLst>
+              <a:ext uri="{FF2B5EF4-FFF2-40B4-BE49-F238E27FC236}">
+                <a16:creationId xmlns:a16="http://schemas.microsoft.com/office/drawing/2014/main" id="{7FFCC23A-857C-5D49-CE27-37C728D10920}"/>
+              </a:ext>
+            </a:extLst>
+          </p:cNvPr>
+          <p:cNvPicPr>
+            <a:picLocks noChangeAspect="1"/>
+          </p:cNvPicPr>
+          <p:nvPr/>
+        </p:nvPicPr>
+        <p:blipFill rotWithShape="1">
+          <a:blip r:embed="rId5">
+            <a:extLst>
+              <a:ext uri="{28A0092B-C50C-407E-A947-70E740481C1C}">
+                <a14:useLocalDpi xmlns:a14="http://schemas.microsoft.com/office/drawing/2010/main" val="0"/>
+              </a:ext>
+            </a:extLst>
+          </a:blip>
+          <a:srcRect t="3722" r="333"/>
+          <a:stretch/>
+        </p:blipFill>
+        <p:spPr>
+          <a:xfrm>
+            <a:off x="5012410" y="1891305"/>
+            <a:ext cx="1998788" cy="4293532"/>
+          </a:xfrm>
+          <a:prstGeom prst="rect">
+            <a:avLst/>
+          </a:prstGeom>
+        </p:spPr>
+      </p:pic>
+      <p:pic>
+        <p:nvPicPr>
+          <p:cNvPr id="19" name="Imagen 18" descr="Interfaz de usuario gráfica, Aplicación, Sitio web&#10;&#10;Descripción generada automáticamente">
+            <a:extLst>
+              <a:ext uri="{FF2B5EF4-FFF2-40B4-BE49-F238E27FC236}">
+                <a16:creationId xmlns:a16="http://schemas.microsoft.com/office/drawing/2014/main" id="{B9284B5C-9ACE-4AC3-0259-736CFEF2F16F}"/>
+              </a:ext>
+            </a:extLst>
+          </p:cNvPr>
+          <p:cNvPicPr>
+            <a:picLocks noChangeAspect="1"/>
+          </p:cNvPicPr>
+          <p:nvPr/>
+        </p:nvPicPr>
+        <p:blipFill rotWithShape="1">
+          <a:blip r:embed="rId6">
+            <a:extLst>
+              <a:ext uri="{28A0092B-C50C-407E-A947-70E740481C1C}">
+                <a14:useLocalDpi xmlns:a14="http://schemas.microsoft.com/office/drawing/2010/main" val="0"/>
+              </a:ext>
+            </a:extLst>
+          </a:blip>
+          <a:srcRect t="3722" r="333"/>
+          <a:stretch/>
+        </p:blipFill>
+        <p:spPr>
+          <a:xfrm>
+            <a:off x="9176457" y="1703741"/>
+            <a:ext cx="2136364" cy="4589055"/>
           </a:xfrm>
           <a:prstGeom prst="rect">
             <a:avLst/>
@@ -6793,10 +6735,115 @@
       </p:cxnSp>
       <p:sp>
         <p:nvSpPr>
-          <p:cNvPr id="7" name="Rectángulo: esquinas redondeadas 6">
-            <a:extLst>
-              <a:ext uri="{FF2B5EF4-FFF2-40B4-BE49-F238E27FC236}">
-                <a16:creationId xmlns:a16="http://schemas.microsoft.com/office/drawing/2014/main" id="{615B91DF-4210-5E5F-049D-FC78274FB030}"/>
+          <p:cNvPr id="11" name="CuadroTexto 10">
+            <a:extLst>
+              <a:ext uri="{FF2B5EF4-FFF2-40B4-BE49-F238E27FC236}">
+                <a16:creationId xmlns:a16="http://schemas.microsoft.com/office/drawing/2014/main" id="{C1CF97DD-A361-B116-C77B-0F3B9D7C7848}"/>
+              </a:ext>
+            </a:extLst>
+          </p:cNvPr>
+          <p:cNvSpPr txBox="1"/>
+          <p:nvPr/>
+        </p:nvSpPr>
+        <p:spPr>
+          <a:xfrm>
+            <a:off x="5397732" y="967997"/>
+            <a:ext cx="1396536" cy="707886"/>
+          </a:xfrm>
+          <a:prstGeom prst="rect">
+            <a:avLst/>
+          </a:prstGeom>
+          <a:noFill/>
+        </p:spPr>
+        <p:txBody>
+          <a:bodyPr wrap="none" rtlCol="0">
+            <a:spAutoFit/>
+          </a:bodyPr>
+          <a:lstStyle/>
+          <a:p>
+            <a:r>
+              <a:rPr lang="es-ES" sz="4000" dirty="0"/>
+              <a:t>Inicial</a:t>
+            </a:r>
+          </a:p>
+        </p:txBody>
+      </p:sp>
+      <p:sp>
+        <p:nvSpPr>
+          <p:cNvPr id="12" name="CuadroTexto 11">
+            <a:extLst>
+              <a:ext uri="{FF2B5EF4-FFF2-40B4-BE49-F238E27FC236}">
+                <a16:creationId xmlns:a16="http://schemas.microsoft.com/office/drawing/2014/main" id="{84D967ED-65BC-CFD5-E209-CAE0C4BC242A}"/>
+              </a:ext>
+            </a:extLst>
+          </p:cNvPr>
+          <p:cNvSpPr txBox="1"/>
+          <p:nvPr/>
+        </p:nvSpPr>
+        <p:spPr>
+          <a:xfrm>
+            <a:off x="1240848" y="1204566"/>
+            <a:ext cx="1403589" cy="707886"/>
+          </a:xfrm>
+          <a:prstGeom prst="rect">
+            <a:avLst/>
+          </a:prstGeom>
+          <a:noFill/>
+        </p:spPr>
+        <p:txBody>
+          <a:bodyPr wrap="none" rtlCol="0">
+            <a:spAutoFit/>
+          </a:bodyPr>
+          <a:lstStyle/>
+          <a:p>
+            <a:r>
+              <a:rPr lang="es-ES" sz="4000" dirty="0"/>
+              <a:t>Editar</a:t>
+            </a:r>
+          </a:p>
+        </p:txBody>
+      </p:sp>
+      <p:sp>
+        <p:nvSpPr>
+          <p:cNvPr id="14" name="CuadroTexto 13">
+            <a:extLst>
+              <a:ext uri="{FF2B5EF4-FFF2-40B4-BE49-F238E27FC236}">
+                <a16:creationId xmlns:a16="http://schemas.microsoft.com/office/drawing/2014/main" id="{BEC8769F-346D-490B-02EB-B8B913BCD8B2}"/>
+              </a:ext>
+            </a:extLst>
+          </p:cNvPr>
+          <p:cNvSpPr txBox="1"/>
+          <p:nvPr/>
+        </p:nvSpPr>
+        <p:spPr>
+          <a:xfrm>
+            <a:off x="9280429" y="1335842"/>
+            <a:ext cx="1831848" cy="707886"/>
+          </a:xfrm>
+          <a:prstGeom prst="rect">
+            <a:avLst/>
+          </a:prstGeom>
+          <a:noFill/>
+        </p:spPr>
+        <p:txBody>
+          <a:bodyPr wrap="none" rtlCol="0">
+            <a:spAutoFit/>
+          </a:bodyPr>
+          <a:lstStyle/>
+          <a:p>
+            <a:r>
+              <a:rPr lang="es-ES" sz="4000" dirty="0"/>
+              <a:t>Soporte</a:t>
+            </a:r>
+          </a:p>
+        </p:txBody>
+      </p:sp>
+      <p:sp>
+        <p:nvSpPr>
+          <p:cNvPr id="15" name="Flecha: a la derecha 14">
+            <a:extLst>
+              <a:ext uri="{FF2B5EF4-FFF2-40B4-BE49-F238E27FC236}">
+                <a16:creationId xmlns:a16="http://schemas.microsoft.com/office/drawing/2014/main" id="{00D8AC1D-6376-68B3-C968-517801907F45}"/>
               </a:ext>
             </a:extLst>
           </p:cNvPr>
@@ -6804,11 +6851,11 @@
           <p:nvPr/>
         </p:nvSpPr>
         <p:spPr>
-          <a:xfrm>
-            <a:off x="846212" y="2295945"/>
-            <a:ext cx="2423160" cy="4192416"/>
-          </a:xfrm>
-          <a:prstGeom prst="roundRect">
+          <a:xfrm rot="8761098">
+            <a:off x="3480327" y="2478024"/>
+            <a:ext cx="1082529" cy="465912"/>
+          </a:xfrm>
+          <a:prstGeom prst="rightArrow">
             <a:avLst/>
           </a:prstGeom>
         </p:spPr>
@@ -6839,10 +6886,10 @@
       </p:sp>
       <p:sp>
         <p:nvSpPr>
-          <p:cNvPr id="8" name="Rectángulo: esquinas redondeadas 7">
-            <a:extLst>
-              <a:ext uri="{FF2B5EF4-FFF2-40B4-BE49-F238E27FC236}">
-                <a16:creationId xmlns:a16="http://schemas.microsoft.com/office/drawing/2014/main" id="{FD456482-F852-5C25-60C5-37B057367CFC}"/>
+          <p:cNvPr id="16" name="Flecha: a la derecha 15">
+            <a:extLst>
+              <a:ext uri="{FF2B5EF4-FFF2-40B4-BE49-F238E27FC236}">
+                <a16:creationId xmlns:a16="http://schemas.microsoft.com/office/drawing/2014/main" id="{73024F4F-22F9-737E-2321-C0B3CA555E52}"/>
               </a:ext>
             </a:extLst>
           </p:cNvPr>
@@ -6850,11 +6897,11 @@
           <p:nvPr/>
         </p:nvSpPr>
         <p:spPr>
-          <a:xfrm>
-            <a:off x="4884420" y="1665009"/>
-            <a:ext cx="2423160" cy="4192416"/>
-          </a:xfrm>
-          <a:prstGeom prst="roundRect">
+          <a:xfrm rot="2434594">
+            <a:off x="7612753" y="2444712"/>
+            <a:ext cx="1082529" cy="465912"/>
+          </a:xfrm>
+          <a:prstGeom prst="rightArrow">
             <a:avLst/>
           </a:prstGeom>
         </p:spPr>
@@ -6883,249 +6930,6 @@
           </a:p>
         </p:txBody>
       </p:sp>
-      <p:sp>
-        <p:nvSpPr>
-          <p:cNvPr id="11" name="CuadroTexto 10">
-            <a:extLst>
-              <a:ext uri="{FF2B5EF4-FFF2-40B4-BE49-F238E27FC236}">
-                <a16:creationId xmlns:a16="http://schemas.microsoft.com/office/drawing/2014/main" id="{C1CF97DD-A361-B116-C77B-0F3B9D7C7848}"/>
-              </a:ext>
-            </a:extLst>
-          </p:cNvPr>
-          <p:cNvSpPr txBox="1"/>
-          <p:nvPr/>
-        </p:nvSpPr>
-        <p:spPr>
-          <a:xfrm>
-            <a:off x="5397732" y="967997"/>
-            <a:ext cx="1396536" cy="707886"/>
-          </a:xfrm>
-          <a:prstGeom prst="rect">
-            <a:avLst/>
-          </a:prstGeom>
-          <a:noFill/>
-        </p:spPr>
-        <p:txBody>
-          <a:bodyPr wrap="none" rtlCol="0">
-            <a:spAutoFit/>
-          </a:bodyPr>
-          <a:lstStyle/>
-          <a:p>
-            <a:r>
-              <a:rPr lang="es-ES" sz="4000" dirty="0"/>
-              <a:t>Inicial</a:t>
-            </a:r>
-          </a:p>
-        </p:txBody>
-      </p:sp>
-      <p:sp>
-        <p:nvSpPr>
-          <p:cNvPr id="12" name="CuadroTexto 11">
-            <a:extLst>
-              <a:ext uri="{FF2B5EF4-FFF2-40B4-BE49-F238E27FC236}">
-                <a16:creationId xmlns:a16="http://schemas.microsoft.com/office/drawing/2014/main" id="{84D967ED-65BC-CFD5-E209-CAE0C4BC242A}"/>
-              </a:ext>
-            </a:extLst>
-          </p:cNvPr>
-          <p:cNvSpPr txBox="1"/>
-          <p:nvPr/>
-        </p:nvSpPr>
-        <p:spPr>
-          <a:xfrm>
-            <a:off x="1323585" y="1588059"/>
-            <a:ext cx="1403589" cy="707886"/>
-          </a:xfrm>
-          <a:prstGeom prst="rect">
-            <a:avLst/>
-          </a:prstGeom>
-          <a:noFill/>
-        </p:spPr>
-        <p:txBody>
-          <a:bodyPr wrap="none" rtlCol="0">
-            <a:spAutoFit/>
-          </a:bodyPr>
-          <a:lstStyle/>
-          <a:p>
-            <a:r>
-              <a:rPr lang="es-ES" sz="4000" dirty="0"/>
-              <a:t>Editar</a:t>
-            </a:r>
-          </a:p>
-        </p:txBody>
-      </p:sp>
-      <p:sp>
-        <p:nvSpPr>
-          <p:cNvPr id="13" name="Rectángulo: esquinas redondeadas 12">
-            <a:extLst>
-              <a:ext uri="{FF2B5EF4-FFF2-40B4-BE49-F238E27FC236}">
-                <a16:creationId xmlns:a16="http://schemas.microsoft.com/office/drawing/2014/main" id="{BED32F55-342F-11E0-3BD8-38A9ABEBAECE}"/>
-              </a:ext>
-            </a:extLst>
-          </p:cNvPr>
-          <p:cNvSpPr/>
-          <p:nvPr/>
-        </p:nvSpPr>
-        <p:spPr>
-          <a:xfrm>
-            <a:off x="8922628" y="2295945"/>
-            <a:ext cx="2423160" cy="4192416"/>
-          </a:xfrm>
-          <a:prstGeom prst="roundRect">
-            <a:avLst/>
-          </a:prstGeom>
-        </p:spPr>
-        <p:style>
-          <a:lnRef idx="2">
-            <a:schemeClr val="accent1">
-              <a:shade val="15000"/>
-            </a:schemeClr>
-          </a:lnRef>
-          <a:fillRef idx="1">
-            <a:schemeClr val="accent1"/>
-          </a:fillRef>
-          <a:effectRef idx="0">
-            <a:schemeClr val="accent1"/>
-          </a:effectRef>
-          <a:fontRef idx="minor">
-            <a:schemeClr val="lt1"/>
-          </a:fontRef>
-        </p:style>
-        <p:txBody>
-          <a:bodyPr rtlCol="0" anchor="ctr"/>
-          <a:lstStyle/>
-          <a:p>
-            <a:pPr algn="ctr"/>
-            <a:endParaRPr lang="es-ES" dirty="0"/>
-          </a:p>
-        </p:txBody>
-      </p:sp>
-      <p:sp>
-        <p:nvSpPr>
-          <p:cNvPr id="14" name="CuadroTexto 13">
-            <a:extLst>
-              <a:ext uri="{FF2B5EF4-FFF2-40B4-BE49-F238E27FC236}">
-                <a16:creationId xmlns:a16="http://schemas.microsoft.com/office/drawing/2014/main" id="{BEC8769F-346D-490B-02EB-B8B913BCD8B2}"/>
-              </a:ext>
-            </a:extLst>
-          </p:cNvPr>
-          <p:cNvSpPr txBox="1"/>
-          <p:nvPr/>
-        </p:nvSpPr>
-        <p:spPr>
-          <a:xfrm>
-            <a:off x="9218284" y="1588059"/>
-            <a:ext cx="1831848" cy="707886"/>
-          </a:xfrm>
-          <a:prstGeom prst="rect">
-            <a:avLst/>
-          </a:prstGeom>
-          <a:noFill/>
-        </p:spPr>
-        <p:txBody>
-          <a:bodyPr wrap="none" rtlCol="0">
-            <a:spAutoFit/>
-          </a:bodyPr>
-          <a:lstStyle/>
-          <a:p>
-            <a:r>
-              <a:rPr lang="es-ES" sz="4000" dirty="0"/>
-              <a:t>Soporte</a:t>
-            </a:r>
-          </a:p>
-        </p:txBody>
-      </p:sp>
-      <p:sp>
-        <p:nvSpPr>
-          <p:cNvPr id="15" name="Flecha: a la derecha 14">
-            <a:extLst>
-              <a:ext uri="{FF2B5EF4-FFF2-40B4-BE49-F238E27FC236}">
-                <a16:creationId xmlns:a16="http://schemas.microsoft.com/office/drawing/2014/main" id="{00D8AC1D-6376-68B3-C968-517801907F45}"/>
-              </a:ext>
-            </a:extLst>
-          </p:cNvPr>
-          <p:cNvSpPr/>
-          <p:nvPr/>
-        </p:nvSpPr>
-        <p:spPr>
-          <a:xfrm rot="8761098">
-            <a:off x="3480327" y="2478024"/>
-            <a:ext cx="1082529" cy="465912"/>
-          </a:xfrm>
-          <a:prstGeom prst="rightArrow">
-            <a:avLst/>
-          </a:prstGeom>
-        </p:spPr>
-        <p:style>
-          <a:lnRef idx="2">
-            <a:schemeClr val="accent1">
-              <a:shade val="15000"/>
-            </a:schemeClr>
-          </a:lnRef>
-          <a:fillRef idx="1">
-            <a:schemeClr val="accent1"/>
-          </a:fillRef>
-          <a:effectRef idx="0">
-            <a:schemeClr val="accent1"/>
-          </a:effectRef>
-          <a:fontRef idx="minor">
-            <a:schemeClr val="lt1"/>
-          </a:fontRef>
-        </p:style>
-        <p:txBody>
-          <a:bodyPr rtlCol="0" anchor="ctr"/>
-          <a:lstStyle/>
-          <a:p>
-            <a:pPr algn="ctr"/>
-            <a:endParaRPr lang="es-ES"/>
-          </a:p>
-        </p:txBody>
-      </p:sp>
-      <p:sp>
-        <p:nvSpPr>
-          <p:cNvPr id="16" name="Flecha: a la derecha 15">
-            <a:extLst>
-              <a:ext uri="{FF2B5EF4-FFF2-40B4-BE49-F238E27FC236}">
-                <a16:creationId xmlns:a16="http://schemas.microsoft.com/office/drawing/2014/main" id="{73024F4F-22F9-737E-2321-C0B3CA555E52}"/>
-              </a:ext>
-            </a:extLst>
-          </p:cNvPr>
-          <p:cNvSpPr/>
-          <p:nvPr/>
-        </p:nvSpPr>
-        <p:spPr>
-          <a:xfrm rot="2434594">
-            <a:off x="7612753" y="2444712"/>
-            <a:ext cx="1082529" cy="465912"/>
-          </a:xfrm>
-          <a:prstGeom prst="rightArrow">
-            <a:avLst/>
-          </a:prstGeom>
-        </p:spPr>
-        <p:style>
-          <a:lnRef idx="2">
-            <a:schemeClr val="accent1">
-              <a:shade val="15000"/>
-            </a:schemeClr>
-          </a:lnRef>
-          <a:fillRef idx="1">
-            <a:schemeClr val="accent1"/>
-          </a:fillRef>
-          <a:effectRef idx="0">
-            <a:schemeClr val="accent1"/>
-          </a:effectRef>
-          <a:fontRef idx="minor">
-            <a:schemeClr val="lt1"/>
-          </a:fontRef>
-        </p:style>
-        <p:txBody>
-          <a:bodyPr rtlCol="0" anchor="ctr"/>
-          <a:lstStyle/>
-          <a:p>
-            <a:pPr algn="ctr"/>
-            <a:endParaRPr lang="es-ES"/>
-          </a:p>
-        </p:txBody>
-      </p:sp>
       <p:pic>
         <p:nvPicPr>
           <p:cNvPr id="2" name="Gráfico 1">
@@ -7159,6 +6963,111 @@
           <a:xfrm>
             <a:off x="11506869" y="82334"/>
             <a:ext cx="531934" cy="670872"/>
+          </a:xfrm>
+          <a:prstGeom prst="rect">
+            <a:avLst/>
+          </a:prstGeom>
+        </p:spPr>
+      </p:pic>
+      <p:pic>
+        <p:nvPicPr>
+          <p:cNvPr id="6" name="Imagen 5" descr="Interfaz de usuario gráfica&#10;&#10;Descripción generada automáticamente con confianza media">
+            <a:extLst>
+              <a:ext uri="{FF2B5EF4-FFF2-40B4-BE49-F238E27FC236}">
+                <a16:creationId xmlns:a16="http://schemas.microsoft.com/office/drawing/2014/main" id="{7225BC6D-55AC-BA58-EC15-EBB4D504B63C}"/>
+              </a:ext>
+            </a:extLst>
+          </p:cNvPr>
+          <p:cNvPicPr>
+            <a:picLocks noChangeAspect="1"/>
+          </p:cNvPicPr>
+          <p:nvPr/>
+        </p:nvPicPr>
+        <p:blipFill rotWithShape="1">
+          <a:blip r:embed="rId4">
+            <a:extLst>
+              <a:ext uri="{28A0092B-C50C-407E-A947-70E740481C1C}">
+                <a14:useLocalDpi xmlns:a14="http://schemas.microsoft.com/office/drawing/2010/main" val="0"/>
+              </a:ext>
+            </a:extLst>
+          </a:blip>
+          <a:srcRect l="-1" t="4059" r="489"/>
+          <a:stretch/>
+        </p:blipFill>
+        <p:spPr>
+          <a:xfrm>
+            <a:off x="4955037" y="1675883"/>
+            <a:ext cx="2281926" cy="4892217"/>
+          </a:xfrm>
+          <a:prstGeom prst="rect">
+            <a:avLst/>
+          </a:prstGeom>
+        </p:spPr>
+      </p:pic>
+      <p:pic>
+        <p:nvPicPr>
+          <p:cNvPr id="18" name="Imagen 17" descr="Una captura de pantalla de un celular con letras&#10;&#10;Descripción generada automáticamente">
+            <a:extLst>
+              <a:ext uri="{FF2B5EF4-FFF2-40B4-BE49-F238E27FC236}">
+                <a16:creationId xmlns:a16="http://schemas.microsoft.com/office/drawing/2014/main" id="{914F723D-9796-7442-C454-AB8A2FDC6D7C}"/>
+              </a:ext>
+            </a:extLst>
+          </p:cNvPr>
+          <p:cNvPicPr>
+            <a:picLocks noChangeAspect="1"/>
+          </p:cNvPicPr>
+          <p:nvPr/>
+        </p:nvPicPr>
+        <p:blipFill rotWithShape="1">
+          <a:blip r:embed="rId5">
+            <a:extLst>
+              <a:ext uri="{28A0092B-C50C-407E-A947-70E740481C1C}">
+                <a14:useLocalDpi xmlns:a14="http://schemas.microsoft.com/office/drawing/2010/main" val="0"/>
+              </a:ext>
+            </a:extLst>
+          </a:blip>
+          <a:srcRect t="3776" r="-229"/>
+          <a:stretch/>
+        </p:blipFill>
+        <p:spPr>
+          <a:xfrm>
+            <a:off x="9138929" y="2043728"/>
+            <a:ext cx="2114847" cy="4514856"/>
+          </a:xfrm>
+          <a:prstGeom prst="rect">
+            <a:avLst/>
+          </a:prstGeom>
+        </p:spPr>
+      </p:pic>
+      <p:pic>
+        <p:nvPicPr>
+          <p:cNvPr id="20" name="Imagen 19" descr="Interfaz de usuario gráfica, Aplicación&#10;&#10;Descripción generada automáticamente">
+            <a:extLst>
+              <a:ext uri="{FF2B5EF4-FFF2-40B4-BE49-F238E27FC236}">
+                <a16:creationId xmlns:a16="http://schemas.microsoft.com/office/drawing/2014/main" id="{08FB905B-1FA2-C052-0D16-C06E1107A5B2}"/>
+              </a:ext>
+            </a:extLst>
+          </p:cNvPr>
+          <p:cNvPicPr>
+            <a:picLocks noChangeAspect="1"/>
+          </p:cNvPicPr>
+          <p:nvPr/>
+        </p:nvPicPr>
+        <p:blipFill rotWithShape="1">
+          <a:blip r:embed="rId6">
+            <a:extLst>
+              <a:ext uri="{28A0092B-C50C-407E-A947-70E740481C1C}">
+                <a14:useLocalDpi xmlns:a14="http://schemas.microsoft.com/office/drawing/2010/main" val="0"/>
+              </a:ext>
+            </a:extLst>
+          </a:blip>
+          <a:srcRect l="1" t="3992" r="15"/>
+          <a:stretch/>
+        </p:blipFill>
+        <p:spPr>
+          <a:xfrm>
+            <a:off x="838707" y="1957371"/>
+            <a:ext cx="2127664" cy="4543071"/>
           </a:xfrm>
           <a:prstGeom prst="rect">
             <a:avLst/>
@@ -7282,98 +7191,6 @@
       </p:cxnSp>
       <p:sp>
         <p:nvSpPr>
-          <p:cNvPr id="7" name="Rectángulo: esquinas redondeadas 6">
-            <a:extLst>
-              <a:ext uri="{FF2B5EF4-FFF2-40B4-BE49-F238E27FC236}">
-                <a16:creationId xmlns:a16="http://schemas.microsoft.com/office/drawing/2014/main" id="{615B91DF-4210-5E5F-049D-FC78274FB030}"/>
-              </a:ext>
-            </a:extLst>
-          </p:cNvPr>
-          <p:cNvSpPr/>
-          <p:nvPr/>
-        </p:nvSpPr>
-        <p:spPr>
-          <a:xfrm>
-            <a:off x="846212" y="2295945"/>
-            <a:ext cx="2423160" cy="4192416"/>
-          </a:xfrm>
-          <a:prstGeom prst="roundRect">
-            <a:avLst/>
-          </a:prstGeom>
-        </p:spPr>
-        <p:style>
-          <a:lnRef idx="2">
-            <a:schemeClr val="accent1">
-              <a:shade val="15000"/>
-            </a:schemeClr>
-          </a:lnRef>
-          <a:fillRef idx="1">
-            <a:schemeClr val="accent1"/>
-          </a:fillRef>
-          <a:effectRef idx="0">
-            <a:schemeClr val="accent1"/>
-          </a:effectRef>
-          <a:fontRef idx="minor">
-            <a:schemeClr val="lt1"/>
-          </a:fontRef>
-        </p:style>
-        <p:txBody>
-          <a:bodyPr rtlCol="0" anchor="ctr"/>
-          <a:lstStyle/>
-          <a:p>
-            <a:pPr algn="ctr"/>
-            <a:endParaRPr lang="es-ES"/>
-          </a:p>
-        </p:txBody>
-      </p:sp>
-      <p:sp>
-        <p:nvSpPr>
-          <p:cNvPr id="8" name="Rectángulo: esquinas redondeadas 7">
-            <a:extLst>
-              <a:ext uri="{FF2B5EF4-FFF2-40B4-BE49-F238E27FC236}">
-                <a16:creationId xmlns:a16="http://schemas.microsoft.com/office/drawing/2014/main" id="{FD456482-F852-5C25-60C5-37B057367CFC}"/>
-              </a:ext>
-            </a:extLst>
-          </p:cNvPr>
-          <p:cNvSpPr/>
-          <p:nvPr/>
-        </p:nvSpPr>
-        <p:spPr>
-          <a:xfrm>
-            <a:off x="4884420" y="1665009"/>
-            <a:ext cx="2423160" cy="4192416"/>
-          </a:xfrm>
-          <a:prstGeom prst="roundRect">
-            <a:avLst/>
-          </a:prstGeom>
-        </p:spPr>
-        <p:style>
-          <a:lnRef idx="2">
-            <a:schemeClr val="accent1">
-              <a:shade val="15000"/>
-            </a:schemeClr>
-          </a:lnRef>
-          <a:fillRef idx="1">
-            <a:schemeClr val="accent1"/>
-          </a:fillRef>
-          <a:effectRef idx="0">
-            <a:schemeClr val="accent1"/>
-          </a:effectRef>
-          <a:fontRef idx="minor">
-            <a:schemeClr val="lt1"/>
-          </a:fontRef>
-        </p:style>
-        <p:txBody>
-          <a:bodyPr rtlCol="0" anchor="ctr"/>
-          <a:lstStyle/>
-          <a:p>
-            <a:pPr algn="ctr"/>
-            <a:endParaRPr lang="es-ES"/>
-          </a:p>
-        </p:txBody>
-      </p:sp>
-      <p:sp>
-        <p:nvSpPr>
           <p:cNvPr id="11" name="CuadroTexto 10">
             <a:extLst>
               <a:ext uri="{FF2B5EF4-FFF2-40B4-BE49-F238E27FC236}">
@@ -7386,7 +7203,7 @@
         </p:nvSpPr>
         <p:spPr>
           <a:xfrm>
-            <a:off x="4637878" y="995797"/>
+            <a:off x="7097499" y="1036426"/>
             <a:ext cx="3069366" cy="707886"/>
           </a:xfrm>
           <a:prstGeom prst="rect">
@@ -7421,7 +7238,7 @@
         </p:nvSpPr>
         <p:spPr>
           <a:xfrm>
-            <a:off x="393201" y="1580868"/>
+            <a:off x="1191854" y="1036426"/>
             <a:ext cx="3329181" cy="707886"/>
           </a:xfrm>
           <a:prstGeom prst="rect">
@@ -7439,179 +7256,6 @@
               <a:rPr lang="es-ES" sz="4000" dirty="0"/>
               <a:t>Sobre nosotros</a:t>
             </a:r>
-          </a:p>
-        </p:txBody>
-      </p:sp>
-      <p:sp>
-        <p:nvSpPr>
-          <p:cNvPr id="13" name="Rectángulo: esquinas redondeadas 12">
-            <a:extLst>
-              <a:ext uri="{FF2B5EF4-FFF2-40B4-BE49-F238E27FC236}">
-                <a16:creationId xmlns:a16="http://schemas.microsoft.com/office/drawing/2014/main" id="{BED32F55-342F-11E0-3BD8-38A9ABEBAECE}"/>
-              </a:ext>
-            </a:extLst>
-          </p:cNvPr>
-          <p:cNvSpPr/>
-          <p:nvPr/>
-        </p:nvSpPr>
-        <p:spPr>
-          <a:xfrm>
-            <a:off x="8922628" y="2295945"/>
-            <a:ext cx="2423160" cy="4192416"/>
-          </a:xfrm>
-          <a:prstGeom prst="roundRect">
-            <a:avLst/>
-          </a:prstGeom>
-        </p:spPr>
-        <p:style>
-          <a:lnRef idx="2">
-            <a:schemeClr val="accent1">
-              <a:shade val="15000"/>
-            </a:schemeClr>
-          </a:lnRef>
-          <a:fillRef idx="1">
-            <a:schemeClr val="accent1"/>
-          </a:fillRef>
-          <a:effectRef idx="0">
-            <a:schemeClr val="accent1"/>
-          </a:effectRef>
-          <a:fontRef idx="minor">
-            <a:schemeClr val="lt1"/>
-          </a:fontRef>
-        </p:style>
-        <p:txBody>
-          <a:bodyPr rtlCol="0" anchor="ctr"/>
-          <a:lstStyle/>
-          <a:p>
-            <a:pPr algn="ctr"/>
-            <a:endParaRPr lang="es-ES" dirty="0"/>
-          </a:p>
-        </p:txBody>
-      </p:sp>
-      <p:sp>
-        <p:nvSpPr>
-          <p:cNvPr id="14" name="CuadroTexto 13">
-            <a:extLst>
-              <a:ext uri="{FF2B5EF4-FFF2-40B4-BE49-F238E27FC236}">
-                <a16:creationId xmlns:a16="http://schemas.microsoft.com/office/drawing/2014/main" id="{BEC8769F-346D-490B-02EB-B8B913BCD8B2}"/>
-              </a:ext>
-            </a:extLst>
-          </p:cNvPr>
-          <p:cNvSpPr txBox="1"/>
-          <p:nvPr/>
-        </p:nvSpPr>
-        <p:spPr>
-          <a:xfrm>
-            <a:off x="9384195" y="1580868"/>
-            <a:ext cx="1500026" cy="707886"/>
-          </a:xfrm>
-          <a:prstGeom prst="rect">
-            <a:avLst/>
-          </a:prstGeom>
-          <a:noFill/>
-        </p:spPr>
-        <p:txBody>
-          <a:bodyPr wrap="none" rtlCol="0">
-            <a:spAutoFit/>
-          </a:bodyPr>
-          <a:lstStyle/>
-          <a:p>
-            <a:r>
-              <a:rPr lang="es-ES" sz="4000" dirty="0"/>
-              <a:t>Temas</a:t>
-            </a:r>
-          </a:p>
-        </p:txBody>
-      </p:sp>
-      <p:sp>
-        <p:nvSpPr>
-          <p:cNvPr id="15" name="Flecha: a la derecha 14">
-            <a:extLst>
-              <a:ext uri="{FF2B5EF4-FFF2-40B4-BE49-F238E27FC236}">
-                <a16:creationId xmlns:a16="http://schemas.microsoft.com/office/drawing/2014/main" id="{00D8AC1D-6376-68B3-C968-517801907F45}"/>
-              </a:ext>
-            </a:extLst>
-          </p:cNvPr>
-          <p:cNvSpPr/>
-          <p:nvPr/>
-        </p:nvSpPr>
-        <p:spPr>
-          <a:xfrm rot="8761098">
-            <a:off x="3480327" y="2478024"/>
-            <a:ext cx="1082529" cy="465912"/>
-          </a:xfrm>
-          <a:prstGeom prst="rightArrow">
-            <a:avLst/>
-          </a:prstGeom>
-        </p:spPr>
-        <p:style>
-          <a:lnRef idx="2">
-            <a:schemeClr val="accent1">
-              <a:shade val="15000"/>
-            </a:schemeClr>
-          </a:lnRef>
-          <a:fillRef idx="1">
-            <a:schemeClr val="accent1"/>
-          </a:fillRef>
-          <a:effectRef idx="0">
-            <a:schemeClr val="accent1"/>
-          </a:effectRef>
-          <a:fontRef idx="minor">
-            <a:schemeClr val="lt1"/>
-          </a:fontRef>
-        </p:style>
-        <p:txBody>
-          <a:bodyPr rtlCol="0" anchor="ctr"/>
-          <a:lstStyle/>
-          <a:p>
-            <a:pPr algn="ctr"/>
-            <a:endParaRPr lang="es-ES"/>
-          </a:p>
-        </p:txBody>
-      </p:sp>
-      <p:sp>
-        <p:nvSpPr>
-          <p:cNvPr id="16" name="Flecha: a la derecha 15">
-            <a:extLst>
-              <a:ext uri="{FF2B5EF4-FFF2-40B4-BE49-F238E27FC236}">
-                <a16:creationId xmlns:a16="http://schemas.microsoft.com/office/drawing/2014/main" id="{73024F4F-22F9-737E-2321-C0B3CA555E52}"/>
-              </a:ext>
-            </a:extLst>
-          </p:cNvPr>
-          <p:cNvSpPr/>
-          <p:nvPr/>
-        </p:nvSpPr>
-        <p:spPr>
-          <a:xfrm rot="2434594">
-            <a:off x="7612753" y="2444712"/>
-            <a:ext cx="1082529" cy="465912"/>
-          </a:xfrm>
-          <a:prstGeom prst="rightArrow">
-            <a:avLst/>
-          </a:prstGeom>
-        </p:spPr>
-        <p:style>
-          <a:lnRef idx="2">
-            <a:schemeClr val="accent1">
-              <a:shade val="15000"/>
-            </a:schemeClr>
-          </a:lnRef>
-          <a:fillRef idx="1">
-            <a:schemeClr val="accent1"/>
-          </a:fillRef>
-          <a:effectRef idx="0">
-            <a:schemeClr val="accent1"/>
-          </a:effectRef>
-          <a:fontRef idx="minor">
-            <a:schemeClr val="lt1"/>
-          </a:fontRef>
-        </p:style>
-        <p:txBody>
-          <a:bodyPr rtlCol="0" anchor="ctr"/>
-          <a:lstStyle/>
-          <a:p>
-            <a:pPr algn="ctr"/>
-            <a:endParaRPr lang="es-ES"/>
           </a:p>
         </p:txBody>
       </p:sp>
@@ -7648,6 +7292,77 @@
           <a:xfrm>
             <a:off x="11506869" y="82334"/>
             <a:ext cx="531934" cy="670872"/>
+          </a:xfrm>
+          <a:prstGeom prst="rect">
+            <a:avLst/>
+          </a:prstGeom>
+        </p:spPr>
+      </p:pic>
+      <p:pic>
+        <p:nvPicPr>
+          <p:cNvPr id="10" name="Imagen 9" descr="Interfaz de usuario gráfica, Texto, Aplicación&#10;&#10;Descripción generada automáticamente">
+            <a:extLst>
+              <a:ext uri="{FF2B5EF4-FFF2-40B4-BE49-F238E27FC236}">
+                <a16:creationId xmlns:a16="http://schemas.microsoft.com/office/drawing/2014/main" id="{815016A9-63C4-E5D5-FDE0-6F3F3DDFF675}"/>
+              </a:ext>
+            </a:extLst>
+          </p:cNvPr>
+          <p:cNvPicPr>
+            <a:picLocks noChangeAspect="1"/>
+          </p:cNvPicPr>
+          <p:nvPr/>
+        </p:nvPicPr>
+        <p:blipFill>
+          <a:blip r:embed="rId4">
+            <a:extLst>
+              <a:ext uri="{28A0092B-C50C-407E-A947-70E740481C1C}">
+                <a14:useLocalDpi xmlns:a14="http://schemas.microsoft.com/office/drawing/2010/main" val="0"/>
+              </a:ext>
+            </a:extLst>
+          </a:blip>
+          <a:stretch>
+            <a:fillRect/>
+          </a:stretch>
+        </p:blipFill>
+        <p:spPr>
+          <a:xfrm>
+            <a:off x="1716341" y="1744312"/>
+            <a:ext cx="2074368" cy="4612711"/>
+          </a:xfrm>
+          <a:prstGeom prst="rect">
+            <a:avLst/>
+          </a:prstGeom>
+        </p:spPr>
+      </p:pic>
+      <p:pic>
+        <p:nvPicPr>
+          <p:cNvPr id="6" name="Imagen 5" descr="Interfaz de usuario gráfica, Texto, Aplicación, Chat o mensaje de texto&#10;&#10;Descripción generada automáticamente">
+            <a:extLst>
+              <a:ext uri="{FF2B5EF4-FFF2-40B4-BE49-F238E27FC236}">
+                <a16:creationId xmlns:a16="http://schemas.microsoft.com/office/drawing/2014/main" id="{F4B5E13E-B4D5-ECF3-390D-3AC68D47B93F}"/>
+              </a:ext>
+            </a:extLst>
+          </p:cNvPr>
+          <p:cNvPicPr>
+            <a:picLocks noChangeAspect="1"/>
+          </p:cNvPicPr>
+          <p:nvPr/>
+        </p:nvPicPr>
+        <p:blipFill rotWithShape="1">
+          <a:blip r:embed="rId5">
+            <a:extLst>
+              <a:ext uri="{28A0092B-C50C-407E-A947-70E740481C1C}">
+                <a14:useLocalDpi xmlns:a14="http://schemas.microsoft.com/office/drawing/2010/main" val="0"/>
+              </a:ext>
+            </a:extLst>
+          </a:blip>
+          <a:srcRect t="4170" r="-387"/>
+          <a:stretch/>
+        </p:blipFill>
+        <p:spPr>
+          <a:xfrm>
+            <a:off x="7514295" y="1706694"/>
+            <a:ext cx="2235773" cy="4745911"/>
           </a:xfrm>
           <a:prstGeom prst="rect">
             <a:avLst/>

</xml_diff>

<commit_message>
[Finish] Slide and memorandum
</commit_message>
<xml_diff>
--- a/02_Documentacion/Presentacion_Wewiza.pptx
+++ b/02_Documentacion/Presentacion_Wewiza.pptx
@@ -5346,8 +5346,8 @@
         </p:nvSpPr>
         <p:spPr>
           <a:xfrm>
-            <a:off x="1637120" y="907937"/>
-            <a:ext cx="3251318" cy="707886"/>
+            <a:off x="1845886" y="936116"/>
+            <a:ext cx="2751257" cy="707886"/>
           </a:xfrm>
           <a:prstGeom prst="rect">
             <a:avLst/>
@@ -5361,44 +5361,8 @@
           <a:lstStyle/>
           <a:p>
             <a:r>
-              <a:rPr lang="es-ES" sz="4000" dirty="0"/>
+              <a:rPr lang="es-ES" sz="4000" b="1" u="sng" dirty="0"/>
               <a:t>Destacados</a:t>
-            </a:r>
-          </a:p>
-        </p:txBody>
-      </p:sp>
-      <p:sp>
-        <p:nvSpPr>
-          <p:cNvPr id="9" name="CuadroTexto 8">
-            <a:extLst>
-              <a:ext uri="{FF2B5EF4-FFF2-40B4-BE49-F238E27FC236}">
-                <a16:creationId xmlns:a16="http://schemas.microsoft.com/office/drawing/2014/main" id="{10951958-685D-A434-25CF-6D6BA120428D}"/>
-              </a:ext>
-            </a:extLst>
-          </p:cNvPr>
-          <p:cNvSpPr txBox="1"/>
-          <p:nvPr/>
-        </p:nvSpPr>
-        <p:spPr>
-          <a:xfrm>
-            <a:off x="254372" y="1498650"/>
-            <a:ext cx="5317836" cy="646331"/>
-          </a:xfrm>
-          <a:prstGeom prst="rect">
-            <a:avLst/>
-          </a:prstGeom>
-          <a:noFill/>
-        </p:spPr>
-        <p:txBody>
-          <a:bodyPr wrap="square" rtlCol="0">
-            <a:spAutoFit/>
-          </a:bodyPr>
-          <a:lstStyle/>
-          <a:p>
-            <a:pPr algn="ctr"/>
-            <a:r>
-              <a:rPr lang="es-ES" dirty="0"/>
-              <a:t>Destacamos los productos que tengan un mayor ahorra y los más gustados por la comunidad. </a:t>
             </a:r>
           </a:p>
         </p:txBody>
@@ -5469,12 +5433,36 @@
         </p:blipFill>
         <p:spPr>
           <a:xfrm>
-            <a:off x="845677" y="2259369"/>
-            <a:ext cx="2067613" cy="4420965"/>
-          </a:xfrm>
-          <a:prstGeom prst="rect">
-            <a:avLst/>
-          </a:prstGeom>
+            <a:off x="744169" y="1325054"/>
+            <a:ext cx="2317297" cy="4954839"/>
+          </a:xfrm>
+          <a:prstGeom prst="roundRect">
+            <a:avLst>
+              <a:gd name="adj" fmla="val 16667"/>
+            </a:avLst>
+          </a:prstGeom>
+          <a:ln>
+            <a:noFill/>
+          </a:ln>
+          <a:effectLst>
+            <a:outerShdw blurRad="152400" dist="12000" dir="900000" sy="98000" kx="110000" ky="200000" algn="tl" rotWithShape="0">
+              <a:srgbClr val="000000">
+                <a:alpha val="30000"/>
+              </a:srgbClr>
+            </a:outerShdw>
+          </a:effectLst>
+          <a:scene3d>
+            <a:camera prst="perspectiveRelaxed">
+              <a:rot lat="19800000" lon="1200000" rev="20820000"/>
+            </a:camera>
+            <a:lightRig rig="threePt" dir="t"/>
+          </a:scene3d>
+          <a:sp3d contourW="6350" prstMaterial="matte">
+            <a:bevelT w="101600" h="101600"/>
+            <a:contourClr>
+              <a:srgbClr val="969696"/>
+            </a:contourClr>
+          </a:sp3d>
         </p:spPr>
       </p:pic>
       <p:pic>
@@ -5491,28 +5479,230 @@
           </p:cNvPicPr>
           <p:nvPr/>
         </p:nvPicPr>
+        <p:blipFill rotWithShape="1">
+          <a:blip r:embed="rId5"/>
+          <a:srcRect l="2413" t="1511" r="13086" b="2266"/>
+          <a:stretch/>
+        </p:blipFill>
+        <p:spPr>
+          <a:xfrm>
+            <a:off x="3691441" y="1996539"/>
+            <a:ext cx="1387670" cy="1805935"/>
+          </a:xfrm>
+          <a:prstGeom prst="round2DiagRect">
+            <a:avLst>
+              <a:gd name="adj1" fmla="val 16667"/>
+              <a:gd name="adj2" fmla="val 3636"/>
+            </a:avLst>
+          </a:prstGeom>
+          <a:ln w="88900" cap="sq">
+            <a:solidFill>
+              <a:srgbClr val="FFFFFF"/>
+            </a:solidFill>
+            <a:miter lim="800000"/>
+          </a:ln>
+          <a:effectLst>
+            <a:outerShdw blurRad="254000" algn="tl" rotWithShape="0">
+              <a:srgbClr val="000000">
+                <a:alpha val="43000"/>
+              </a:srgbClr>
+            </a:outerShdw>
+          </a:effectLst>
+        </p:spPr>
+      </p:pic>
+      <p:pic>
+        <p:nvPicPr>
+          <p:cNvPr id="16" name="Imagen 15">
+            <a:extLst>
+              <a:ext uri="{FF2B5EF4-FFF2-40B4-BE49-F238E27FC236}">
+                <a16:creationId xmlns:a16="http://schemas.microsoft.com/office/drawing/2014/main" id="{6FC586F6-7C03-F30D-F4FB-92BE4EE5D3AC}"/>
+              </a:ext>
+            </a:extLst>
+          </p:cNvPr>
+          <p:cNvPicPr>
+            <a:picLocks noChangeAspect="1"/>
+          </p:cNvPicPr>
+          <p:nvPr/>
+        </p:nvPicPr>
+        <p:blipFill rotWithShape="1">
+          <a:blip r:embed="rId6"/>
+          <a:srcRect l="5698" t="3967" r="9801" b="4332"/>
+          <a:stretch/>
+        </p:blipFill>
+        <p:spPr>
+          <a:xfrm>
+            <a:off x="4385276" y="3844285"/>
+            <a:ext cx="1403684" cy="1855457"/>
+          </a:xfrm>
+          <a:prstGeom prst="round2DiagRect">
+            <a:avLst>
+              <a:gd name="adj1" fmla="val 16667"/>
+              <a:gd name="adj2" fmla="val 0"/>
+            </a:avLst>
+          </a:prstGeom>
+          <a:ln w="88900" cap="sq">
+            <a:solidFill>
+              <a:srgbClr val="FFFFFF"/>
+            </a:solidFill>
+            <a:miter lim="800000"/>
+          </a:ln>
+          <a:effectLst>
+            <a:outerShdw blurRad="254000" algn="tl" rotWithShape="0">
+              <a:srgbClr val="000000">
+                <a:alpha val="43000"/>
+              </a:srgbClr>
+            </a:outerShdw>
+          </a:effectLst>
+        </p:spPr>
+      </p:pic>
+      <p:pic>
+        <p:nvPicPr>
+          <p:cNvPr id="17" name="Imagen 16" descr="Interfaz de usuario gráfica, Aplicación&#10;&#10;Descripción generada automáticamente">
+            <a:extLst>
+              <a:ext uri="{FF2B5EF4-FFF2-40B4-BE49-F238E27FC236}">
+                <a16:creationId xmlns:a16="http://schemas.microsoft.com/office/drawing/2014/main" id="{FAFB58EB-2FB0-9A3E-DCF2-FC12FCE8E197}"/>
+              </a:ext>
+            </a:extLst>
+          </p:cNvPr>
+          <p:cNvPicPr>
+            <a:picLocks noChangeAspect="1"/>
+          </p:cNvPicPr>
+          <p:nvPr/>
+        </p:nvPicPr>
+        <p:blipFill rotWithShape="1">
+          <a:blip r:embed="rId7">
+            <a:extLst>
+              <a:ext uri="{28A0092B-C50C-407E-A947-70E740481C1C}">
+                <a14:useLocalDpi xmlns:a14="http://schemas.microsoft.com/office/drawing/2010/main" val="0"/>
+              </a:ext>
+            </a:extLst>
+          </a:blip>
+          <a:srcRect t="3949" r="-273"/>
+          <a:stretch/>
+        </p:blipFill>
+        <p:spPr>
+          <a:xfrm>
+            <a:off x="7806725" y="1409580"/>
+            <a:ext cx="2234566" cy="4759758"/>
+          </a:xfrm>
+          <a:prstGeom prst="roundRect">
+            <a:avLst>
+              <a:gd name="adj" fmla="val 16667"/>
+            </a:avLst>
+          </a:prstGeom>
+          <a:ln>
+            <a:noFill/>
+          </a:ln>
+          <a:effectLst>
+            <a:outerShdw blurRad="152400" dist="12000" dir="900000" sy="98000" kx="110000" ky="200000" algn="tl" rotWithShape="0">
+              <a:srgbClr val="000000">
+                <a:alpha val="30000"/>
+              </a:srgbClr>
+            </a:outerShdw>
+          </a:effectLst>
+          <a:scene3d>
+            <a:camera prst="perspectiveRelaxed">
+              <a:rot lat="19800000" lon="1200000" rev="20820000"/>
+            </a:camera>
+            <a:lightRig rig="threePt" dir="t"/>
+          </a:scene3d>
+          <a:sp3d contourW="6350" prstMaterial="matte">
+            <a:bevelT w="101600" h="101600"/>
+            <a:contourClr>
+              <a:srgbClr val="969696"/>
+            </a:contourClr>
+          </a:sp3d>
+        </p:spPr>
+      </p:pic>
+      <p:sp>
+        <p:nvSpPr>
+          <p:cNvPr id="18" name="CuadroTexto 17">
+            <a:extLst>
+              <a:ext uri="{FF2B5EF4-FFF2-40B4-BE49-F238E27FC236}">
+                <a16:creationId xmlns:a16="http://schemas.microsoft.com/office/drawing/2014/main" id="{9718BA95-FE7F-A023-9E9B-3E081A77BC9B}"/>
+              </a:ext>
+            </a:extLst>
+          </p:cNvPr>
+          <p:cNvSpPr txBox="1"/>
+          <p:nvPr/>
+        </p:nvSpPr>
+        <p:spPr>
+          <a:xfrm>
+            <a:off x="7594859" y="936116"/>
+            <a:ext cx="3251318" cy="707886"/>
+          </a:xfrm>
+          <a:prstGeom prst="rect">
+            <a:avLst/>
+          </a:prstGeom>
+          <a:noFill/>
+        </p:spPr>
+        <p:txBody>
+          <a:bodyPr wrap="square" rtlCol="0">
+            <a:spAutoFit/>
+          </a:bodyPr>
+          <a:lstStyle/>
+          <a:p>
+            <a:pPr algn="ctr"/>
+            <a:r>
+              <a:rPr lang="es-ES" sz="4000" b="1" u="sng" dirty="0"/>
+              <a:t>Categorías</a:t>
+            </a:r>
+          </a:p>
+        </p:txBody>
+      </p:sp>
+      <p:pic>
+        <p:nvPicPr>
+          <p:cNvPr id="7" name="Picture 6" descr="Facebook Like Logo PNG Vector (EPS) Free Download">
+            <a:extLst>
+              <a:ext uri="{FF2B5EF4-FFF2-40B4-BE49-F238E27FC236}">
+                <a16:creationId xmlns:a16="http://schemas.microsoft.com/office/drawing/2014/main" id="{9F383450-9DA4-F83B-C4D6-2DEEBD8BD1BE}"/>
+              </a:ext>
+            </a:extLst>
+          </p:cNvPr>
+          <p:cNvPicPr>
+            <a:picLocks noChangeAspect="1" noChangeArrowheads="1"/>
+          </p:cNvPicPr>
+          <p:nvPr/>
+        </p:nvPicPr>
         <p:blipFill>
-          <a:blip r:embed="rId5"/>
+          <a:blip r:embed="rId8">
+            <a:extLst>
+              <a:ext uri="{28A0092B-C50C-407E-A947-70E740481C1C}">
+                <a14:useLocalDpi xmlns:a14="http://schemas.microsoft.com/office/drawing/2010/main" val="0"/>
+              </a:ext>
+            </a:extLst>
+          </a:blip>
+          <a:srcRect/>
           <a:stretch>
             <a:fillRect/>
           </a:stretch>
         </p:blipFill>
-        <p:spPr>
-          <a:xfrm>
-            <a:off x="3028484" y="2261267"/>
-            <a:ext cx="1859955" cy="2125663"/>
-          </a:xfrm>
-          <a:prstGeom prst="rect">
-            <a:avLst/>
-          </a:prstGeom>
+        <p:spPr bwMode="auto">
+          <a:xfrm rot="877360">
+            <a:off x="5345070" y="2428611"/>
+            <a:ext cx="609040" cy="585104"/>
+          </a:xfrm>
+          <a:prstGeom prst="rect">
+            <a:avLst/>
+          </a:prstGeom>
+          <a:noFill/>
+          <a:extLst>
+            <a:ext uri="{909E8E84-426E-40DD-AFC4-6F175D3DCCD1}">
+              <a14:hiddenFill xmlns:a14="http://schemas.microsoft.com/office/drawing/2010/main">
+                <a:solidFill>
+                  <a:srgbClr val="FFFFFF"/>
+                </a:solidFill>
+              </a14:hiddenFill>
+            </a:ext>
+          </a:extLst>
         </p:spPr>
       </p:pic>
       <p:pic>
         <p:nvPicPr>
-          <p:cNvPr id="16" name="Imagen 15">
-            <a:extLst>
-              <a:ext uri="{FF2B5EF4-FFF2-40B4-BE49-F238E27FC236}">
-                <a16:creationId xmlns:a16="http://schemas.microsoft.com/office/drawing/2014/main" id="{6FC586F6-7C03-F30D-F4FB-92BE4EE5D3AC}"/>
+          <p:cNvPr id="11" name="Imagen 10" descr="Icono&#10;&#10;Descripción generada automáticamente">
+            <a:extLst>
+              <a:ext uri="{FF2B5EF4-FFF2-40B4-BE49-F238E27FC236}">
+                <a16:creationId xmlns:a16="http://schemas.microsoft.com/office/drawing/2014/main" id="{5F7A111A-D218-B54D-3217-176715911956}"/>
               </a:ext>
             </a:extLst>
           </p:cNvPr>
@@ -5522,15 +5712,21 @@
           <p:nvPr/>
         </p:nvPicPr>
         <p:blipFill>
-          <a:blip r:embed="rId6"/>
+          <a:blip r:embed="rId9">
+            <a:extLst>
+              <a:ext uri="{28A0092B-C50C-407E-A947-70E740481C1C}">
+                <a14:useLocalDpi xmlns:a14="http://schemas.microsoft.com/office/drawing/2010/main" val="0"/>
+              </a:ext>
+            </a:extLst>
+          </a:blip>
           <a:stretch>
             <a:fillRect/>
           </a:stretch>
         </p:blipFill>
         <p:spPr>
-          <a:xfrm>
-            <a:off x="3028483" y="4457709"/>
-            <a:ext cx="1859955" cy="2265509"/>
+          <a:xfrm rot="20092851">
+            <a:off x="3337498" y="4324327"/>
+            <a:ext cx="707886" cy="707886"/>
           </a:xfrm>
           <a:prstGeom prst="rect">
             <a:avLst/>
@@ -5539,10 +5735,10 @@
       </p:pic>
       <p:pic>
         <p:nvPicPr>
-          <p:cNvPr id="17" name="Imagen 16" descr="Interfaz de usuario gráfica, Aplicación&#10;&#10;Descripción generada automáticamente">
-            <a:extLst>
-              <a:ext uri="{FF2B5EF4-FFF2-40B4-BE49-F238E27FC236}">
-                <a16:creationId xmlns:a16="http://schemas.microsoft.com/office/drawing/2014/main" id="{FAFB58EB-2FB0-9A3E-DCF2-FC12FCE8E197}"/>
+          <p:cNvPr id="15" name="Imagen 14" descr="Interfaz de usuario gráfica, Icono&#10;&#10;Descripción generada automáticamente">
+            <a:extLst>
+              <a:ext uri="{FF2B5EF4-FFF2-40B4-BE49-F238E27FC236}">
+                <a16:creationId xmlns:a16="http://schemas.microsoft.com/office/drawing/2014/main" id="{5E055223-BB65-614A-7A89-69A8AD51A035}"/>
               </a:ext>
             </a:extLst>
           </p:cNvPr>
@@ -5551,63 +5747,28 @@
           </p:cNvPicPr>
           <p:nvPr/>
         </p:nvPicPr>
-        <p:blipFill rotWithShape="1">
-          <a:blip r:embed="rId7">
+        <p:blipFill>
+          <a:blip r:embed="rId10">
             <a:extLst>
               <a:ext uri="{28A0092B-C50C-407E-A947-70E740481C1C}">
                 <a14:useLocalDpi xmlns:a14="http://schemas.microsoft.com/office/drawing/2010/main" val="0"/>
               </a:ext>
             </a:extLst>
           </a:blip>
-          <a:srcRect t="3949" r="-273"/>
-          <a:stretch/>
+          <a:stretch>
+            <a:fillRect/>
+          </a:stretch>
         </p:blipFill>
         <p:spPr>
           <a:xfrm>
-            <a:off x="8103234" y="1817135"/>
-            <a:ext cx="2234566" cy="4759758"/>
+            <a:off x="10129333" y="3429000"/>
+            <a:ext cx="1206126" cy="1206126"/>
           </a:xfrm>
           <a:prstGeom prst="rect">
             <a:avLst/>
           </a:prstGeom>
         </p:spPr>
       </p:pic>
-      <p:sp>
-        <p:nvSpPr>
-          <p:cNvPr id="18" name="CuadroTexto 17">
-            <a:extLst>
-              <a:ext uri="{FF2B5EF4-FFF2-40B4-BE49-F238E27FC236}">
-                <a16:creationId xmlns:a16="http://schemas.microsoft.com/office/drawing/2014/main" id="{9718BA95-FE7F-A023-9E9B-3E081A77BC9B}"/>
-              </a:ext>
-            </a:extLst>
-          </p:cNvPr>
-          <p:cNvSpPr txBox="1"/>
-          <p:nvPr/>
-        </p:nvSpPr>
-        <p:spPr>
-          <a:xfrm>
-            <a:off x="7594858" y="982176"/>
-            <a:ext cx="3251318" cy="707886"/>
-          </a:xfrm>
-          <a:prstGeom prst="rect">
-            <a:avLst/>
-          </a:prstGeom>
-          <a:noFill/>
-        </p:spPr>
-        <p:txBody>
-          <a:bodyPr wrap="square" rtlCol="0">
-            <a:spAutoFit/>
-          </a:bodyPr>
-          <a:lstStyle/>
-          <a:p>
-            <a:pPr algn="ctr"/>
-            <a:r>
-              <a:rPr lang="es-ES" sz="4000" dirty="0"/>
-              <a:t>Categorías</a:t>
-            </a:r>
-          </a:p>
-        </p:txBody>
-      </p:sp>
     </p:spTree>
     <p:extLst>
       <p:ext uri="{BB962C8B-B14F-4D97-AF65-F5344CB8AC3E}">
@@ -5737,8 +5898,8 @@
         </p:nvSpPr>
         <p:spPr>
           <a:xfrm>
-            <a:off x="4064437" y="1077432"/>
-            <a:ext cx="1852367" cy="707886"/>
+            <a:off x="1137327" y="1358247"/>
+            <a:ext cx="1905778" cy="707886"/>
           </a:xfrm>
           <a:prstGeom prst="rect">
             <a:avLst/>
@@ -5752,7 +5913,7 @@
           <a:lstStyle/>
           <a:p>
             <a:r>
-              <a:rPr lang="es-ES" sz="4000" dirty="0"/>
+              <a:rPr lang="es-ES" sz="4000" b="1" u="sng" dirty="0"/>
               <a:t>Detalles</a:t>
             </a:r>
           </a:p>
@@ -5772,8 +5933,8 @@
         </p:nvSpPr>
         <p:spPr>
           <a:xfrm>
-            <a:off x="360286" y="1588059"/>
-            <a:ext cx="2284151" cy="707886"/>
+            <a:off x="5197065" y="896027"/>
+            <a:ext cx="2151743" cy="707886"/>
           </a:xfrm>
           <a:prstGeom prst="rect">
             <a:avLst/>
@@ -5787,8 +5948,8 @@
           <a:lstStyle/>
           <a:p>
             <a:r>
-              <a:rPr lang="es-ES" sz="4000" dirty="0"/>
-              <a:t>Productos</a:t>
+              <a:rPr lang="es-ES" sz="4000" b="1" u="sng" dirty="0"/>
+              <a:t>Buscador</a:t>
             </a:r>
           </a:p>
         </p:txBody>
@@ -5807,8 +5968,8 @@
         </p:nvSpPr>
         <p:spPr>
           <a:xfrm>
-            <a:off x="8983830" y="1247959"/>
-            <a:ext cx="1468415" cy="707886"/>
+            <a:off x="9545798" y="1358247"/>
+            <a:ext cx="1508875" cy="707886"/>
           </a:xfrm>
           <a:prstGeom prst="rect">
             <a:avLst/>
@@ -5822,7 +5983,7 @@
           <a:lstStyle/>
           <a:p>
             <a:r>
-              <a:rPr lang="es-ES" sz="4000" dirty="0"/>
+              <a:rPr lang="es-ES" sz="4000" b="1" u="sng" dirty="0"/>
               <a:t>Filtros</a:t>
             </a:r>
           </a:p>
@@ -5830,10 +5991,10 @@
       </p:sp>
       <p:sp>
         <p:nvSpPr>
-          <p:cNvPr id="15" name="Flecha: a la derecha 14">
-            <a:extLst>
-              <a:ext uri="{FF2B5EF4-FFF2-40B4-BE49-F238E27FC236}">
-                <a16:creationId xmlns:a16="http://schemas.microsoft.com/office/drawing/2014/main" id="{00D8AC1D-6376-68B3-C968-517801907F45}"/>
+          <p:cNvPr id="16" name="Flecha: a la derecha 15">
+            <a:extLst>
+              <a:ext uri="{FF2B5EF4-FFF2-40B4-BE49-F238E27FC236}">
+                <a16:creationId xmlns:a16="http://schemas.microsoft.com/office/drawing/2014/main" id="{73024F4F-22F9-737E-2321-C0B3CA555E52}"/>
               </a:ext>
             </a:extLst>
           </p:cNvPr>
@@ -5841,13 +6002,21 @@
           <p:nvPr/>
         </p:nvSpPr>
         <p:spPr>
-          <a:xfrm rot="8761098">
-            <a:off x="2567248" y="2209776"/>
-            <a:ext cx="1082529" cy="465912"/>
+          <a:xfrm rot="1535658">
+            <a:off x="7638635" y="1327084"/>
+            <a:ext cx="882357" cy="465912"/>
           </a:xfrm>
           <a:prstGeom prst="rightArrow">
             <a:avLst/>
           </a:prstGeom>
+          <a:solidFill>
+            <a:srgbClr val="8B3AAC"/>
+          </a:solidFill>
+          <a:ln>
+            <a:solidFill>
+              <a:srgbClr val="8B3AAC"/>
+            </a:solidFill>
+          </a:ln>
         </p:spPr>
         <p:style>
           <a:lnRef idx="2">
@@ -5874,12 +6043,287 @@
           </a:p>
         </p:txBody>
       </p:sp>
-      <p:sp>
-        <p:nvSpPr>
-          <p:cNvPr id="16" name="Flecha: a la derecha 15">
-            <a:extLst>
-              <a:ext uri="{FF2B5EF4-FFF2-40B4-BE49-F238E27FC236}">
-                <a16:creationId xmlns:a16="http://schemas.microsoft.com/office/drawing/2014/main" id="{73024F4F-22F9-737E-2321-C0B3CA555E52}"/>
+      <p:pic>
+        <p:nvPicPr>
+          <p:cNvPr id="2" name="Gráfico 1">
+            <a:extLst>
+              <a:ext uri="{FF2B5EF4-FFF2-40B4-BE49-F238E27FC236}">
+                <a16:creationId xmlns:a16="http://schemas.microsoft.com/office/drawing/2014/main" id="{44F07C3F-91C2-BAEC-6C86-57783607D327}"/>
+              </a:ext>
+            </a:extLst>
+          </p:cNvPr>
+          <p:cNvPicPr>
+            <a:picLocks noChangeAspect="1"/>
+          </p:cNvPicPr>
+          <p:nvPr/>
+        </p:nvPicPr>
+        <p:blipFill>
+          <a:blip r:embed="rId2">
+            <a:extLst>
+              <a:ext uri="{28A0092B-C50C-407E-A947-70E740481C1C}">
+                <a14:useLocalDpi xmlns:a14="http://schemas.microsoft.com/office/drawing/2010/main" val="0"/>
+              </a:ext>
+              <a:ext uri="{96DAC541-7B7A-43D3-8B79-37D633B846F1}">
+                <asvg:svgBlip xmlns:asvg="http://schemas.microsoft.com/office/drawing/2016/SVG/main" r:embed="rId3"/>
+              </a:ext>
+            </a:extLst>
+          </a:blip>
+          <a:stretch>
+            <a:fillRect/>
+          </a:stretch>
+        </p:blipFill>
+        <p:spPr>
+          <a:xfrm>
+            <a:off x="11506869" y="82334"/>
+            <a:ext cx="531934" cy="670872"/>
+          </a:xfrm>
+          <a:prstGeom prst="rect">
+            <a:avLst/>
+          </a:prstGeom>
+        </p:spPr>
+      </p:pic>
+      <p:pic>
+        <p:nvPicPr>
+          <p:cNvPr id="6" name="Imagen 5" descr="Interfaz de usuario gráfica, Aplicación, Sitio web&#10;&#10;Descripción generada automáticamente">
+            <a:extLst>
+              <a:ext uri="{FF2B5EF4-FFF2-40B4-BE49-F238E27FC236}">
+                <a16:creationId xmlns:a16="http://schemas.microsoft.com/office/drawing/2014/main" id="{8D5C6448-14AC-5BD0-42AA-3927759B80FA}"/>
+              </a:ext>
+            </a:extLst>
+          </p:cNvPr>
+          <p:cNvPicPr>
+            <a:picLocks noChangeAspect="1"/>
+          </p:cNvPicPr>
+          <p:nvPr/>
+        </p:nvPicPr>
+        <p:blipFill rotWithShape="1">
+          <a:blip r:embed="rId4">
+            <a:extLst>
+              <a:ext uri="{28A0092B-C50C-407E-A947-70E740481C1C}">
+                <a14:useLocalDpi xmlns:a14="http://schemas.microsoft.com/office/drawing/2010/main" val="0"/>
+              </a:ext>
+            </a:extLst>
+          </a:blip>
+          <a:srcRect l="-1" t="4489" r="147"/>
+          <a:stretch/>
+        </p:blipFill>
+        <p:spPr>
+          <a:xfrm>
+            <a:off x="4843192" y="1064327"/>
+            <a:ext cx="2505616" cy="5329397"/>
+          </a:xfrm>
+          <a:prstGeom prst="roundRect">
+            <a:avLst>
+              <a:gd name="adj" fmla="val 16667"/>
+            </a:avLst>
+          </a:prstGeom>
+          <a:ln>
+            <a:noFill/>
+          </a:ln>
+          <a:effectLst>
+            <a:outerShdw blurRad="152400" dist="12000" dir="900000" sy="98000" kx="110000" ky="200000" algn="tl" rotWithShape="0">
+              <a:srgbClr val="000000">
+                <a:alpha val="30000"/>
+              </a:srgbClr>
+            </a:outerShdw>
+          </a:effectLst>
+          <a:scene3d>
+            <a:camera prst="perspectiveRelaxed">
+              <a:rot lat="19800000" lon="1200000" rev="20820000"/>
+            </a:camera>
+            <a:lightRig rig="threePt" dir="t"/>
+          </a:scene3d>
+          <a:sp3d contourW="6350" prstMaterial="matte">
+            <a:bevelT w="101600" h="101600"/>
+            <a:contourClr>
+              <a:srgbClr val="969696"/>
+            </a:contourClr>
+          </a:sp3d>
+        </p:spPr>
+      </p:pic>
+      <p:pic>
+        <p:nvPicPr>
+          <p:cNvPr id="18" name="Imagen 17" descr="Interfaz de usuario gráfica, Aplicación&#10;&#10;Descripción generada automáticamente">
+            <a:extLst>
+              <a:ext uri="{FF2B5EF4-FFF2-40B4-BE49-F238E27FC236}">
+                <a16:creationId xmlns:a16="http://schemas.microsoft.com/office/drawing/2014/main" id="{EBC13BCD-95DC-C67B-FB69-0846B1CA87F8}"/>
+              </a:ext>
+            </a:extLst>
+          </p:cNvPr>
+          <p:cNvPicPr>
+            <a:picLocks noChangeAspect="1"/>
+          </p:cNvPicPr>
+          <p:nvPr/>
+        </p:nvPicPr>
+        <p:blipFill rotWithShape="1">
+          <a:blip r:embed="rId5">
+            <a:extLst>
+              <a:ext uri="{28A0092B-C50C-407E-A947-70E740481C1C}">
+                <a14:useLocalDpi xmlns:a14="http://schemas.microsoft.com/office/drawing/2010/main" val="0"/>
+              </a:ext>
+            </a:extLst>
+          </a:blip>
+          <a:srcRect t="3741" r="-40"/>
+          <a:stretch/>
+        </p:blipFill>
+        <p:spPr>
+          <a:xfrm>
+            <a:off x="10322492" y="2101239"/>
+            <a:ext cx="1716311" cy="3672276"/>
+          </a:xfrm>
+          <a:prstGeom prst="roundRect">
+            <a:avLst>
+              <a:gd name="adj" fmla="val 16667"/>
+            </a:avLst>
+          </a:prstGeom>
+          <a:ln>
+            <a:noFill/>
+          </a:ln>
+          <a:effectLst>
+            <a:outerShdw blurRad="76200" dist="38100" dir="7800000" algn="tl" rotWithShape="0">
+              <a:srgbClr val="000000">
+                <a:alpha val="40000"/>
+              </a:srgbClr>
+            </a:outerShdw>
+          </a:effectLst>
+          <a:scene3d>
+            <a:camera prst="orthographicFront"/>
+            <a:lightRig rig="contrasting" dir="t">
+              <a:rot lat="0" lon="0" rev="4200000"/>
+            </a:lightRig>
+          </a:scene3d>
+          <a:sp3d prstMaterial="plastic">
+            <a:bevelT w="381000" h="114300" prst="relaxedInset"/>
+            <a:contourClr>
+              <a:srgbClr val="969696"/>
+            </a:contourClr>
+          </a:sp3d>
+        </p:spPr>
+      </p:pic>
+      <p:pic>
+        <p:nvPicPr>
+          <p:cNvPr id="20" name="Imagen 19" descr="Interfaz de usuario gráfica&#10;&#10;Descripción generada automáticamente con confianza media">
+            <a:extLst>
+              <a:ext uri="{FF2B5EF4-FFF2-40B4-BE49-F238E27FC236}">
+                <a16:creationId xmlns:a16="http://schemas.microsoft.com/office/drawing/2014/main" id="{9099A761-9326-958F-DAD2-EFA4C6630942}"/>
+              </a:ext>
+            </a:extLst>
+          </p:cNvPr>
+          <p:cNvPicPr>
+            <a:picLocks noChangeAspect="1"/>
+          </p:cNvPicPr>
+          <p:nvPr/>
+        </p:nvPicPr>
+        <p:blipFill rotWithShape="1">
+          <a:blip r:embed="rId6">
+            <a:extLst>
+              <a:ext uri="{28A0092B-C50C-407E-A947-70E740481C1C}">
+                <a14:useLocalDpi xmlns:a14="http://schemas.microsoft.com/office/drawing/2010/main" val="0"/>
+              </a:ext>
+            </a:extLst>
+          </a:blip>
+          <a:srcRect t="4055" r="-746"/>
+          <a:stretch/>
+        </p:blipFill>
+        <p:spPr>
+          <a:xfrm>
+            <a:off x="8516605" y="2133351"/>
+            <a:ext cx="1719621" cy="3641698"/>
+          </a:xfrm>
+          <a:prstGeom prst="roundRect">
+            <a:avLst>
+              <a:gd name="adj" fmla="val 16667"/>
+            </a:avLst>
+          </a:prstGeom>
+          <a:ln>
+            <a:noFill/>
+          </a:ln>
+          <a:effectLst>
+            <a:outerShdw blurRad="76200" dist="38100" dir="7800000" algn="tl" rotWithShape="0">
+              <a:srgbClr val="000000">
+                <a:alpha val="40000"/>
+              </a:srgbClr>
+            </a:outerShdw>
+          </a:effectLst>
+          <a:scene3d>
+            <a:camera prst="orthographicFront"/>
+            <a:lightRig rig="contrasting" dir="t">
+              <a:rot lat="0" lon="0" rev="4200000"/>
+            </a:lightRig>
+          </a:scene3d>
+          <a:sp3d prstMaterial="plastic">
+            <a:bevelT w="381000" h="114300" prst="relaxedInset"/>
+            <a:contourClr>
+              <a:srgbClr val="969696"/>
+            </a:contourClr>
+          </a:sp3d>
+        </p:spPr>
+      </p:pic>
+      <p:pic>
+        <p:nvPicPr>
+          <p:cNvPr id="22" name="Imagen 21" descr="Diagrama&#10;&#10;Descripción generada automáticamente">
+            <a:extLst>
+              <a:ext uri="{FF2B5EF4-FFF2-40B4-BE49-F238E27FC236}">
+                <a16:creationId xmlns:a16="http://schemas.microsoft.com/office/drawing/2014/main" id="{573F9B75-9E89-8037-2D3E-AF59E2C37CA5}"/>
+              </a:ext>
+            </a:extLst>
+          </p:cNvPr>
+          <p:cNvPicPr>
+            <a:picLocks noChangeAspect="1"/>
+          </p:cNvPicPr>
+          <p:nvPr/>
+        </p:nvPicPr>
+        <p:blipFill rotWithShape="1">
+          <a:blip r:embed="rId7">
+            <a:extLst>
+              <a:ext uri="{28A0092B-C50C-407E-A947-70E740481C1C}">
+                <a14:useLocalDpi xmlns:a14="http://schemas.microsoft.com/office/drawing/2010/main" val="0"/>
+              </a:ext>
+            </a:extLst>
+          </a:blip>
+          <a:srcRect l="1" t="3768" r="-771"/>
+          <a:stretch/>
+        </p:blipFill>
+        <p:spPr>
+          <a:xfrm>
+            <a:off x="906617" y="1560040"/>
+            <a:ext cx="2365367" cy="5022844"/>
+          </a:xfrm>
+          <a:prstGeom prst="roundRect">
+            <a:avLst>
+              <a:gd name="adj" fmla="val 16667"/>
+            </a:avLst>
+          </a:prstGeom>
+          <a:ln>
+            <a:noFill/>
+          </a:ln>
+          <a:effectLst>
+            <a:outerShdw blurRad="152400" dist="12000" dir="900000" sy="98000" kx="110000" ky="200000" algn="tl" rotWithShape="0">
+              <a:srgbClr val="000000">
+                <a:alpha val="30000"/>
+              </a:srgbClr>
+            </a:outerShdw>
+          </a:effectLst>
+          <a:scene3d>
+            <a:camera prst="perspectiveRelaxed">
+              <a:rot lat="19800000" lon="1200000" rev="20820000"/>
+            </a:camera>
+            <a:lightRig rig="threePt" dir="t"/>
+          </a:scene3d>
+          <a:sp3d contourW="6350" prstMaterial="matte">
+            <a:bevelT w="101600" h="101600"/>
+            <a:contourClr>
+              <a:srgbClr val="969696"/>
+            </a:contourClr>
+          </a:sp3d>
+        </p:spPr>
+      </p:pic>
+      <p:sp>
+        <p:nvSpPr>
+          <p:cNvPr id="5" name="Flecha: a la derecha 4">
+            <a:extLst>
+              <a:ext uri="{FF2B5EF4-FFF2-40B4-BE49-F238E27FC236}">
+                <a16:creationId xmlns:a16="http://schemas.microsoft.com/office/drawing/2014/main" id="{6C87FA79-D3D3-9CF5-6898-B82BEBA89555}"/>
               </a:ext>
             </a:extLst>
           </p:cNvPr>
@@ -5887,13 +6331,21 @@
           <p:nvPr/>
         </p:nvSpPr>
         <p:spPr>
-          <a:xfrm rot="2434594">
-            <a:off x="6321419" y="2209775"/>
-            <a:ext cx="1082529" cy="465912"/>
+          <a:xfrm rot="9154376">
+            <a:off x="4024513" y="1296894"/>
+            <a:ext cx="882357" cy="465912"/>
           </a:xfrm>
           <a:prstGeom prst="rightArrow">
             <a:avLst/>
           </a:prstGeom>
+          <a:solidFill>
+            <a:srgbClr val="8B3AAC"/>
+          </a:solidFill>
+          <a:ln>
+            <a:solidFill>
+              <a:srgbClr val="8B3AAC"/>
+            </a:solidFill>
+          </a:ln>
         </p:spPr>
         <p:style>
           <a:lnRef idx="2">
@@ -5922,10 +6374,10 @@
       </p:sp>
       <p:pic>
         <p:nvPicPr>
-          <p:cNvPr id="2" name="Gráfico 1">
-            <a:extLst>
-              <a:ext uri="{FF2B5EF4-FFF2-40B4-BE49-F238E27FC236}">
-                <a16:creationId xmlns:a16="http://schemas.microsoft.com/office/drawing/2014/main" id="{44F07C3F-91C2-BAEC-6C86-57783607D327}"/>
+          <p:cNvPr id="8" name="Imagen 7" descr="Icono&#10;&#10;Descripción generada automáticamente">
+            <a:extLst>
+              <a:ext uri="{FF2B5EF4-FFF2-40B4-BE49-F238E27FC236}">
+                <a16:creationId xmlns:a16="http://schemas.microsoft.com/office/drawing/2014/main" id="{725FA477-3345-6EA7-D070-136AA3FACDB0}"/>
               </a:ext>
             </a:extLst>
           </p:cNvPr>
@@ -5935,13 +6387,10 @@
           <p:nvPr/>
         </p:nvPicPr>
         <p:blipFill>
-          <a:blip r:embed="rId2">
+          <a:blip r:embed="rId8">
             <a:extLst>
               <a:ext uri="{28A0092B-C50C-407E-A947-70E740481C1C}">
                 <a14:useLocalDpi xmlns:a14="http://schemas.microsoft.com/office/drawing/2010/main" val="0"/>
-              </a:ext>
-              <a:ext uri="{96DAC541-7B7A-43D3-8B79-37D633B846F1}">
-                <asvg:svgBlip xmlns:asvg="http://schemas.microsoft.com/office/drawing/2016/SVG/main" r:embed="rId3"/>
               </a:ext>
             </a:extLst>
           </a:blip>
@@ -5951,8 +6400,8 @@
         </p:blipFill>
         <p:spPr>
           <a:xfrm>
-            <a:off x="11506869" y="82334"/>
-            <a:ext cx="531934" cy="670872"/>
+            <a:off x="8810819" y="1406415"/>
+            <a:ext cx="659718" cy="659718"/>
           </a:xfrm>
           <a:prstGeom prst="rect">
             <a:avLst/>
@@ -5961,10 +6410,10 @@
       </p:pic>
       <p:pic>
         <p:nvPicPr>
-          <p:cNvPr id="6" name="Imagen 5" descr="Interfaz de usuario gráfica, Aplicación, Sitio web&#10;&#10;Descripción generada automáticamente">
-            <a:extLst>
-              <a:ext uri="{FF2B5EF4-FFF2-40B4-BE49-F238E27FC236}">
-                <a16:creationId xmlns:a16="http://schemas.microsoft.com/office/drawing/2014/main" id="{8D5C6448-14AC-5BD0-42AA-3927759B80FA}"/>
+          <p:cNvPr id="10" name="Imagen 9" descr="Icono&#10;&#10;Descripción generada automáticamente">
+            <a:extLst>
+              <a:ext uri="{FF2B5EF4-FFF2-40B4-BE49-F238E27FC236}">
+                <a16:creationId xmlns:a16="http://schemas.microsoft.com/office/drawing/2014/main" id="{C13E8F4C-F7CA-DCCB-6ADC-1EC752324BAC}"/>
               </a:ext>
             </a:extLst>
           </p:cNvPr>
@@ -5973,126 +6422,22 @@
           </p:cNvPicPr>
           <p:nvPr/>
         </p:nvPicPr>
-        <p:blipFill rotWithShape="1">
-          <a:blip r:embed="rId4">
+        <p:blipFill>
+          <a:blip r:embed="rId9">
             <a:extLst>
               <a:ext uri="{28A0092B-C50C-407E-A947-70E740481C1C}">
                 <a14:useLocalDpi xmlns:a14="http://schemas.microsoft.com/office/drawing/2010/main" val="0"/>
               </a:ext>
             </a:extLst>
           </a:blip>
-          <a:srcRect l="-1" t="4489" r="147"/>
-          <a:stretch/>
+          <a:stretch>
+            <a:fillRect/>
+          </a:stretch>
         </p:blipFill>
         <p:spPr>
-          <a:xfrm>
-            <a:off x="503802" y="2442732"/>
-            <a:ext cx="1821060" cy="3873361"/>
-          </a:xfrm>
-          <a:prstGeom prst="rect">
-            <a:avLst/>
-          </a:prstGeom>
-        </p:spPr>
-      </p:pic>
-      <p:pic>
-        <p:nvPicPr>
-          <p:cNvPr id="18" name="Imagen 17" descr="Interfaz de usuario gráfica, Aplicación&#10;&#10;Descripción generada automáticamente">
-            <a:extLst>
-              <a:ext uri="{FF2B5EF4-FFF2-40B4-BE49-F238E27FC236}">
-                <a16:creationId xmlns:a16="http://schemas.microsoft.com/office/drawing/2014/main" id="{EBC13BCD-95DC-C67B-FB69-0846B1CA87F8}"/>
-              </a:ext>
-            </a:extLst>
-          </p:cNvPr>
-          <p:cNvPicPr>
-            <a:picLocks noChangeAspect="1"/>
-          </p:cNvPicPr>
-          <p:nvPr/>
-        </p:nvPicPr>
-        <p:blipFill rotWithShape="1">
-          <a:blip r:embed="rId5">
-            <a:extLst>
-              <a:ext uri="{28A0092B-C50C-407E-A947-70E740481C1C}">
-                <a14:useLocalDpi xmlns:a14="http://schemas.microsoft.com/office/drawing/2010/main" val="0"/>
-              </a:ext>
-            </a:extLst>
-          </a:blip>
-          <a:srcRect t="3741" r="-40"/>
-          <a:stretch/>
-        </p:blipFill>
-        <p:spPr>
-          <a:xfrm>
-            <a:off x="9848805" y="1990665"/>
-            <a:ext cx="2042663" cy="4370550"/>
-          </a:xfrm>
-          <a:prstGeom prst="rect">
-            <a:avLst/>
-          </a:prstGeom>
-        </p:spPr>
-      </p:pic>
-      <p:pic>
-        <p:nvPicPr>
-          <p:cNvPr id="20" name="Imagen 19" descr="Interfaz de usuario gráfica&#10;&#10;Descripción generada automáticamente con confianza media">
-            <a:extLst>
-              <a:ext uri="{FF2B5EF4-FFF2-40B4-BE49-F238E27FC236}">
-                <a16:creationId xmlns:a16="http://schemas.microsoft.com/office/drawing/2014/main" id="{9099A761-9326-958F-DAD2-EFA4C6630942}"/>
-              </a:ext>
-            </a:extLst>
-          </p:cNvPr>
-          <p:cNvPicPr>
-            <a:picLocks noChangeAspect="1"/>
-          </p:cNvPicPr>
-          <p:nvPr/>
-        </p:nvPicPr>
-        <p:blipFill rotWithShape="1">
-          <a:blip r:embed="rId6">
-            <a:extLst>
-              <a:ext uri="{28A0092B-C50C-407E-A947-70E740481C1C}">
-                <a14:useLocalDpi xmlns:a14="http://schemas.microsoft.com/office/drawing/2010/main" val="0"/>
-              </a:ext>
-            </a:extLst>
-          </a:blip>
-          <a:srcRect t="4055" r="-746"/>
-          <a:stretch/>
-        </p:blipFill>
-        <p:spPr>
-          <a:xfrm>
-            <a:off x="7661831" y="1990665"/>
-            <a:ext cx="2056206" cy="4354494"/>
-          </a:xfrm>
-          <a:prstGeom prst="rect">
-            <a:avLst/>
-          </a:prstGeom>
-        </p:spPr>
-      </p:pic>
-      <p:pic>
-        <p:nvPicPr>
-          <p:cNvPr id="22" name="Imagen 21" descr="Diagrama&#10;&#10;Descripción generada automáticamente">
-            <a:extLst>
-              <a:ext uri="{FF2B5EF4-FFF2-40B4-BE49-F238E27FC236}">
-                <a16:creationId xmlns:a16="http://schemas.microsoft.com/office/drawing/2014/main" id="{573F9B75-9E89-8037-2D3E-AF59E2C37CA5}"/>
-              </a:ext>
-            </a:extLst>
-          </p:cNvPr>
-          <p:cNvPicPr>
-            <a:picLocks noChangeAspect="1"/>
-          </p:cNvPicPr>
-          <p:nvPr/>
-        </p:nvPicPr>
-        <p:blipFill rotWithShape="1">
-          <a:blip r:embed="rId7">
-            <a:extLst>
-              <a:ext uri="{28A0092B-C50C-407E-A947-70E740481C1C}">
-                <a14:useLocalDpi xmlns:a14="http://schemas.microsoft.com/office/drawing/2010/main" val="0"/>
-              </a:ext>
-            </a:extLst>
-          </a:blip>
-          <a:srcRect l="1" t="3768" r="-771"/>
-          <a:stretch/>
-        </p:blipFill>
-        <p:spPr>
-          <a:xfrm>
-            <a:off x="3829912" y="1804396"/>
-            <a:ext cx="2233624" cy="4743088"/>
+          <a:xfrm flipH="1">
+            <a:off x="3100687" y="1337768"/>
+            <a:ext cx="584267" cy="613654"/>
           </a:xfrm>
           <a:prstGeom prst="rect">
             <a:avLst/>
@@ -6228,8 +6573,8 @@
         </p:nvSpPr>
         <p:spPr>
           <a:xfrm>
-            <a:off x="1009685" y="1066373"/>
-            <a:ext cx="2096215" cy="707886"/>
+            <a:off x="1015832" y="1118650"/>
+            <a:ext cx="2164823" cy="707886"/>
           </a:xfrm>
           <a:prstGeom prst="rect">
             <a:avLst/>
@@ -6243,7 +6588,7 @@
           <a:lstStyle/>
           <a:p>
             <a:r>
-              <a:rPr lang="es-ES" sz="4000" dirty="0"/>
+              <a:rPr lang="es-ES" sz="4000" b="1" u="sng" dirty="0"/>
               <a:t>Mis listas</a:t>
             </a:r>
           </a:p>
@@ -6263,8 +6608,8 @@
         </p:nvSpPr>
         <p:spPr>
           <a:xfrm>
-            <a:off x="4182223" y="1118650"/>
-            <a:ext cx="3940502" cy="707886"/>
+            <a:off x="4207515" y="1118650"/>
+            <a:ext cx="4049570" cy="707886"/>
           </a:xfrm>
           <a:prstGeom prst="rect">
             <a:avLst/>
@@ -6278,7 +6623,7 @@
           <a:lstStyle/>
           <a:p>
             <a:r>
-              <a:rPr lang="es-ES" sz="4000" dirty="0"/>
+              <a:rPr lang="es-ES" sz="4000" b="1" u="sng" dirty="0"/>
               <a:t>Sugerencia/Filtros</a:t>
             </a:r>
           </a:p>
@@ -6304,6 +6649,14 @@
           <a:prstGeom prst="rightArrow">
             <a:avLst/>
           </a:prstGeom>
+          <a:solidFill>
+            <a:srgbClr val="8B3AAC"/>
+          </a:solidFill>
+          <a:ln>
+            <a:solidFill>
+              <a:srgbClr val="8B3AAC"/>
+            </a:solidFill>
+          </a:ln>
         </p:spPr>
         <p:style>
           <a:lnRef idx="2">
@@ -6344,12 +6697,20 @@
         </p:nvSpPr>
         <p:spPr>
           <a:xfrm>
-            <a:off x="7571344" y="3404555"/>
+            <a:off x="7715820" y="3396113"/>
             <a:ext cx="1082529" cy="465912"/>
           </a:xfrm>
           <a:prstGeom prst="rightArrow">
             <a:avLst/>
           </a:prstGeom>
+          <a:solidFill>
+            <a:srgbClr val="8B3AAC"/>
+          </a:solidFill>
+          <a:ln>
+            <a:solidFill>
+              <a:srgbClr val="8B3AAC"/>
+            </a:solidFill>
+          </a:ln>
         </p:spPr>
         <p:style>
           <a:lnRef idx="2">
@@ -6390,8 +6751,8 @@
         </p:nvSpPr>
         <p:spPr>
           <a:xfrm>
-            <a:off x="9015649" y="1039137"/>
-            <a:ext cx="2457981" cy="707886"/>
+            <a:off x="9029892" y="1118650"/>
+            <a:ext cx="2709331" cy="707886"/>
           </a:xfrm>
           <a:prstGeom prst="rect">
             <a:avLst/>
@@ -6405,8 +6766,8 @@
           <a:lstStyle/>
           <a:p>
             <a:r>
-              <a:rPr lang="es-ES" sz="4000" dirty="0"/>
-              <a:t>Sugerencia</a:t>
+              <a:rPr lang="es-ES" sz="4000" b="1" u="sng" dirty="0"/>
+              <a:t>Sugerencias</a:t>
             </a:r>
           </a:p>
         </p:txBody>
@@ -6425,7 +6786,7 @@
         </p:nvSpPr>
         <p:spPr>
           <a:xfrm>
-            <a:off x="2070744" y="6249514"/>
+            <a:off x="2070744" y="6274402"/>
             <a:ext cx="8323112" cy="369332"/>
           </a:xfrm>
           <a:prstGeom prst="rect">
@@ -6540,12 +6901,36 @@
         </p:blipFill>
         <p:spPr>
           <a:xfrm>
-            <a:off x="1028368" y="1730967"/>
-            <a:ext cx="1955216" cy="4207844"/>
-          </a:xfrm>
-          <a:prstGeom prst="rect">
-            <a:avLst/>
-          </a:prstGeom>
+            <a:off x="876386" y="1316078"/>
+            <a:ext cx="2264187" cy="4872784"/>
+          </a:xfrm>
+          <a:prstGeom prst="roundRect">
+            <a:avLst>
+              <a:gd name="adj" fmla="val 16667"/>
+            </a:avLst>
+          </a:prstGeom>
+          <a:ln>
+            <a:noFill/>
+          </a:ln>
+          <a:effectLst>
+            <a:outerShdw blurRad="152400" dist="12000" dir="900000" sy="98000" kx="110000" ky="200000" algn="tl" rotWithShape="0">
+              <a:srgbClr val="000000">
+                <a:alpha val="30000"/>
+              </a:srgbClr>
+            </a:outerShdw>
+          </a:effectLst>
+          <a:scene3d>
+            <a:camera prst="perspectiveRelaxed">
+              <a:rot lat="19800000" lon="1200000" rev="20820000"/>
+            </a:camera>
+            <a:lightRig rig="threePt" dir="t"/>
+          </a:scene3d>
+          <a:sp3d contourW="6350" prstMaterial="matte">
+            <a:bevelT w="101600" h="101600"/>
+            <a:contourClr>
+              <a:srgbClr val="969696"/>
+            </a:contourClr>
+          </a:sp3d>
         </p:spPr>
       </p:pic>
       <p:pic>
@@ -6575,12 +6960,36 @@
         </p:blipFill>
         <p:spPr>
           <a:xfrm>
-            <a:off x="5012410" y="1891305"/>
-            <a:ext cx="1998788" cy="4293532"/>
-          </a:xfrm>
-          <a:prstGeom prst="rect">
-            <a:avLst/>
-          </a:prstGeom>
+            <a:off x="4961775" y="1324451"/>
+            <a:ext cx="2304375" cy="4949951"/>
+          </a:xfrm>
+          <a:prstGeom prst="roundRect">
+            <a:avLst>
+              <a:gd name="adj" fmla="val 16667"/>
+            </a:avLst>
+          </a:prstGeom>
+          <a:ln>
+            <a:noFill/>
+          </a:ln>
+          <a:effectLst>
+            <a:outerShdw blurRad="152400" dist="12000" dir="900000" sy="98000" kx="110000" ky="200000" algn="tl" rotWithShape="0">
+              <a:srgbClr val="000000">
+                <a:alpha val="30000"/>
+              </a:srgbClr>
+            </a:outerShdw>
+          </a:effectLst>
+          <a:scene3d>
+            <a:camera prst="perspectiveRelaxed">
+              <a:rot lat="19800000" lon="1200000" rev="20820000"/>
+            </a:camera>
+            <a:lightRig rig="threePt" dir="t"/>
+          </a:scene3d>
+          <a:sp3d contourW="6350" prstMaterial="matte">
+            <a:bevelT w="101600" h="101600"/>
+            <a:contourClr>
+              <a:srgbClr val="969696"/>
+            </a:contourClr>
+          </a:sp3d>
         </p:spPr>
       </p:pic>
       <p:pic>
@@ -6610,8 +7019,104 @@
         </p:blipFill>
         <p:spPr>
           <a:xfrm>
-            <a:off x="9176457" y="1703741"/>
-            <a:ext cx="2136364" cy="4589055"/>
+            <a:off x="9122197" y="1324451"/>
+            <a:ext cx="2300489" cy="4941607"/>
+          </a:xfrm>
+          <a:prstGeom prst="roundRect">
+            <a:avLst>
+              <a:gd name="adj" fmla="val 16667"/>
+            </a:avLst>
+          </a:prstGeom>
+          <a:ln>
+            <a:noFill/>
+          </a:ln>
+          <a:effectLst>
+            <a:outerShdw blurRad="152400" dist="12000" dir="900000" sy="98000" kx="110000" ky="200000" algn="tl" rotWithShape="0">
+              <a:srgbClr val="000000">
+                <a:alpha val="30000"/>
+              </a:srgbClr>
+            </a:outerShdw>
+          </a:effectLst>
+          <a:scene3d>
+            <a:camera prst="perspectiveRelaxed">
+              <a:rot lat="19800000" lon="1200000" rev="20820000"/>
+            </a:camera>
+            <a:lightRig rig="threePt" dir="t"/>
+          </a:scene3d>
+          <a:sp3d contourW="6350" prstMaterial="matte">
+            <a:bevelT w="101600" h="101600"/>
+            <a:contourClr>
+              <a:srgbClr val="969696"/>
+            </a:contourClr>
+          </a:sp3d>
+        </p:spPr>
+      </p:pic>
+      <p:pic>
+        <p:nvPicPr>
+          <p:cNvPr id="8" name="Imagen 7" descr="Icono&#10;&#10;Descripción generada automáticamente">
+            <a:extLst>
+              <a:ext uri="{FF2B5EF4-FFF2-40B4-BE49-F238E27FC236}">
+                <a16:creationId xmlns:a16="http://schemas.microsoft.com/office/drawing/2014/main" id="{93B2F72B-8D5C-E5D2-E549-86144D5859E3}"/>
+              </a:ext>
+            </a:extLst>
+          </p:cNvPr>
+          <p:cNvPicPr>
+            <a:picLocks noChangeAspect="1"/>
+          </p:cNvPicPr>
+          <p:nvPr/>
+        </p:nvPicPr>
+        <p:blipFill>
+          <a:blip r:embed="rId7">
+            <a:extLst>
+              <a:ext uri="{28A0092B-C50C-407E-A947-70E740481C1C}">
+                <a14:useLocalDpi xmlns:a14="http://schemas.microsoft.com/office/drawing/2010/main" val="0"/>
+              </a:ext>
+            </a:extLst>
+          </a:blip>
+          <a:stretch>
+            <a:fillRect/>
+          </a:stretch>
+        </p:blipFill>
+        <p:spPr>
+          <a:xfrm>
+            <a:off x="7903142" y="2546612"/>
+            <a:ext cx="707886" cy="707886"/>
+          </a:xfrm>
+          <a:prstGeom prst="rect">
+            <a:avLst/>
+          </a:prstGeom>
+        </p:spPr>
+      </p:pic>
+      <p:pic>
+        <p:nvPicPr>
+          <p:cNvPr id="13" name="Imagen 12" descr="Icono&#10;&#10;Descripción generada automáticamente">
+            <a:extLst>
+              <a:ext uri="{FF2B5EF4-FFF2-40B4-BE49-F238E27FC236}">
+                <a16:creationId xmlns:a16="http://schemas.microsoft.com/office/drawing/2014/main" id="{C8248203-584D-02A1-C458-5FED9D7FA601}"/>
+              </a:ext>
+            </a:extLst>
+          </p:cNvPr>
+          <p:cNvPicPr>
+            <a:picLocks noChangeAspect="1"/>
+          </p:cNvPicPr>
+          <p:nvPr/>
+        </p:nvPicPr>
+        <p:blipFill>
+          <a:blip r:embed="rId8">
+            <a:extLst>
+              <a:ext uri="{28A0092B-C50C-407E-A947-70E740481C1C}">
+                <a14:useLocalDpi xmlns:a14="http://schemas.microsoft.com/office/drawing/2010/main" val="0"/>
+              </a:ext>
+            </a:extLst>
+          </a:blip>
+          <a:stretch>
+            <a:fillRect/>
+          </a:stretch>
+        </p:blipFill>
+        <p:spPr>
+          <a:xfrm>
+            <a:off x="3813490" y="2625481"/>
+            <a:ext cx="626181" cy="626181"/>
           </a:xfrm>
           <a:prstGeom prst="rect">
             <a:avLst/>
@@ -6747,8 +7252,8 @@
         </p:nvSpPr>
         <p:spPr>
           <a:xfrm>
-            <a:off x="5397732" y="967997"/>
-            <a:ext cx="1396536" cy="707886"/>
+            <a:off x="5430161" y="1068595"/>
+            <a:ext cx="1444626" cy="707886"/>
           </a:xfrm>
           <a:prstGeom prst="rect">
             <a:avLst/>
@@ -6762,7 +7267,7 @@
           <a:lstStyle/>
           <a:p>
             <a:r>
-              <a:rPr lang="es-ES" sz="4000" dirty="0"/>
+              <a:rPr lang="es-ES" sz="4000" b="1" u="sng" dirty="0"/>
               <a:t>Inicial</a:t>
             </a:r>
           </a:p>
@@ -6782,8 +7287,8 @@
         </p:nvSpPr>
         <p:spPr>
           <a:xfrm>
-            <a:off x="1240848" y="1204566"/>
-            <a:ext cx="1403589" cy="707886"/>
+            <a:off x="1446854" y="1053410"/>
+            <a:ext cx="1438535" cy="707886"/>
           </a:xfrm>
           <a:prstGeom prst="rect">
             <a:avLst/>
@@ -6797,7 +7302,7 @@
           <a:lstStyle/>
           <a:p>
             <a:r>
-              <a:rPr lang="es-ES" sz="4000" dirty="0"/>
+              <a:rPr lang="es-ES" sz="4000" b="1" u="sng" dirty="0"/>
               <a:t>Editar</a:t>
             </a:r>
           </a:p>
@@ -6817,8 +7322,8 @@
         </p:nvSpPr>
         <p:spPr>
           <a:xfrm>
-            <a:off x="9280429" y="1335842"/>
-            <a:ext cx="1831848" cy="707886"/>
+            <a:off x="9149103" y="1073301"/>
+            <a:ext cx="1866345" cy="707886"/>
           </a:xfrm>
           <a:prstGeom prst="rect">
             <a:avLst/>
@@ -6832,7 +7337,7 @@
           <a:lstStyle/>
           <a:p>
             <a:r>
-              <a:rPr lang="es-ES" sz="4000" dirty="0"/>
+              <a:rPr lang="es-ES" sz="4000" b="1" u="sng" dirty="0"/>
               <a:t>Soporte</a:t>
             </a:r>
           </a:p>
@@ -6851,13 +7356,21 @@
           <p:nvPr/>
         </p:nvSpPr>
         <p:spPr>
-          <a:xfrm rot="8761098">
-            <a:off x="3480327" y="2478024"/>
+          <a:xfrm rot="10800000">
+            <a:off x="3428036" y="1249888"/>
             <a:ext cx="1082529" cy="465912"/>
           </a:xfrm>
           <a:prstGeom prst="rightArrow">
             <a:avLst/>
           </a:prstGeom>
+          <a:solidFill>
+            <a:srgbClr val="8B3AAC"/>
+          </a:solidFill>
+          <a:ln>
+            <a:solidFill>
+              <a:srgbClr val="8B3AAC"/>
+            </a:solidFill>
+          </a:ln>
         </p:spPr>
         <p:style>
           <a:lnRef idx="2">
@@ -6884,12 +7397,228 @@
           </a:p>
         </p:txBody>
       </p:sp>
-      <p:sp>
-        <p:nvSpPr>
-          <p:cNvPr id="16" name="Flecha: a la derecha 15">
-            <a:extLst>
-              <a:ext uri="{FF2B5EF4-FFF2-40B4-BE49-F238E27FC236}">
-                <a16:creationId xmlns:a16="http://schemas.microsoft.com/office/drawing/2014/main" id="{73024F4F-22F9-737E-2321-C0B3CA555E52}"/>
+      <p:pic>
+        <p:nvPicPr>
+          <p:cNvPr id="2" name="Gráfico 1">
+            <a:extLst>
+              <a:ext uri="{FF2B5EF4-FFF2-40B4-BE49-F238E27FC236}">
+                <a16:creationId xmlns:a16="http://schemas.microsoft.com/office/drawing/2014/main" id="{E5C8D729-6585-5539-B004-ED7AE3519E0E}"/>
+              </a:ext>
+            </a:extLst>
+          </p:cNvPr>
+          <p:cNvPicPr>
+            <a:picLocks noChangeAspect="1"/>
+          </p:cNvPicPr>
+          <p:nvPr/>
+        </p:nvPicPr>
+        <p:blipFill>
+          <a:blip r:embed="rId2">
+            <a:extLst>
+              <a:ext uri="{28A0092B-C50C-407E-A947-70E740481C1C}">
+                <a14:useLocalDpi xmlns:a14="http://schemas.microsoft.com/office/drawing/2010/main" val="0"/>
+              </a:ext>
+              <a:ext uri="{96DAC541-7B7A-43D3-8B79-37D633B846F1}">
+                <asvg:svgBlip xmlns:asvg="http://schemas.microsoft.com/office/drawing/2016/SVG/main" r:embed="rId3"/>
+              </a:ext>
+            </a:extLst>
+          </a:blip>
+          <a:stretch>
+            <a:fillRect/>
+          </a:stretch>
+        </p:blipFill>
+        <p:spPr>
+          <a:xfrm>
+            <a:off x="11506869" y="82334"/>
+            <a:ext cx="531934" cy="670872"/>
+          </a:xfrm>
+          <a:prstGeom prst="rect">
+            <a:avLst/>
+          </a:prstGeom>
+        </p:spPr>
+      </p:pic>
+      <p:pic>
+        <p:nvPicPr>
+          <p:cNvPr id="6" name="Imagen 5" descr="Interfaz de usuario gráfica&#10;&#10;Descripción generada automáticamente con confianza media">
+            <a:extLst>
+              <a:ext uri="{FF2B5EF4-FFF2-40B4-BE49-F238E27FC236}">
+                <a16:creationId xmlns:a16="http://schemas.microsoft.com/office/drawing/2014/main" id="{7225BC6D-55AC-BA58-EC15-EBB4D504B63C}"/>
+              </a:ext>
+            </a:extLst>
+          </p:cNvPr>
+          <p:cNvPicPr>
+            <a:picLocks noChangeAspect="1"/>
+          </p:cNvPicPr>
+          <p:nvPr/>
+        </p:nvPicPr>
+        <p:blipFill rotWithShape="1">
+          <a:blip r:embed="rId4">
+            <a:extLst>
+              <a:ext uri="{28A0092B-C50C-407E-A947-70E740481C1C}">
+                <a14:useLocalDpi xmlns:a14="http://schemas.microsoft.com/office/drawing/2010/main" val="0"/>
+              </a:ext>
+            </a:extLst>
+          </a:blip>
+          <a:srcRect l="-1" t="4059" r="489"/>
+          <a:stretch/>
+        </p:blipFill>
+        <p:spPr>
+          <a:xfrm>
+            <a:off x="4646320" y="1257585"/>
+            <a:ext cx="2396677" cy="5138232"/>
+          </a:xfrm>
+          <a:prstGeom prst="roundRect">
+            <a:avLst>
+              <a:gd name="adj" fmla="val 16667"/>
+            </a:avLst>
+          </a:prstGeom>
+          <a:ln>
+            <a:noFill/>
+          </a:ln>
+          <a:effectLst>
+            <a:outerShdw blurRad="152400" dist="12000" dir="900000" sy="98000" kx="110000" ky="200000" algn="tl" rotWithShape="0">
+              <a:srgbClr val="000000">
+                <a:alpha val="30000"/>
+              </a:srgbClr>
+            </a:outerShdw>
+          </a:effectLst>
+          <a:scene3d>
+            <a:camera prst="perspectiveRelaxed">
+              <a:rot lat="19800000" lon="1200000" rev="20820000"/>
+            </a:camera>
+            <a:lightRig rig="threePt" dir="t"/>
+          </a:scene3d>
+          <a:sp3d contourW="6350" prstMaterial="matte">
+            <a:bevelT w="101600" h="101600"/>
+            <a:contourClr>
+              <a:srgbClr val="969696"/>
+            </a:contourClr>
+          </a:sp3d>
+        </p:spPr>
+      </p:pic>
+      <p:pic>
+        <p:nvPicPr>
+          <p:cNvPr id="18" name="Imagen 17" descr="Una captura de pantalla de un celular con letras&#10;&#10;Descripción generada automáticamente">
+            <a:extLst>
+              <a:ext uri="{FF2B5EF4-FFF2-40B4-BE49-F238E27FC236}">
+                <a16:creationId xmlns:a16="http://schemas.microsoft.com/office/drawing/2014/main" id="{914F723D-9796-7442-C454-AB8A2FDC6D7C}"/>
+              </a:ext>
+            </a:extLst>
+          </p:cNvPr>
+          <p:cNvPicPr>
+            <a:picLocks noChangeAspect="1"/>
+          </p:cNvPicPr>
+          <p:nvPr/>
+        </p:nvPicPr>
+        <p:blipFill rotWithShape="1">
+          <a:blip r:embed="rId5">
+            <a:extLst>
+              <a:ext uri="{28A0092B-C50C-407E-A947-70E740481C1C}">
+                <a14:useLocalDpi xmlns:a14="http://schemas.microsoft.com/office/drawing/2010/main" val="0"/>
+              </a:ext>
+            </a:extLst>
+          </a:blip>
+          <a:srcRect t="3776" r="-229"/>
+          <a:stretch/>
+        </p:blipFill>
+        <p:spPr>
+          <a:xfrm>
+            <a:off x="8704228" y="1217725"/>
+            <a:ext cx="2425520" cy="5178092"/>
+          </a:xfrm>
+          <a:prstGeom prst="roundRect">
+            <a:avLst>
+              <a:gd name="adj" fmla="val 16667"/>
+            </a:avLst>
+          </a:prstGeom>
+          <a:ln>
+            <a:noFill/>
+          </a:ln>
+          <a:effectLst>
+            <a:outerShdw blurRad="152400" dist="12000" dir="900000" sy="98000" kx="110000" ky="200000" algn="tl" rotWithShape="0">
+              <a:srgbClr val="000000">
+                <a:alpha val="30000"/>
+              </a:srgbClr>
+            </a:outerShdw>
+          </a:effectLst>
+          <a:scene3d>
+            <a:camera prst="perspectiveRelaxed">
+              <a:rot lat="19800000" lon="1200000" rev="20820000"/>
+            </a:camera>
+            <a:lightRig rig="threePt" dir="t"/>
+          </a:scene3d>
+          <a:sp3d contourW="6350" prstMaterial="matte">
+            <a:bevelT w="101600" h="101600"/>
+            <a:contourClr>
+              <a:srgbClr val="969696"/>
+            </a:contourClr>
+          </a:sp3d>
+        </p:spPr>
+      </p:pic>
+      <p:pic>
+        <p:nvPicPr>
+          <p:cNvPr id="20" name="Imagen 19" descr="Interfaz de usuario gráfica, Aplicación&#10;&#10;Descripción generada automáticamente">
+            <a:extLst>
+              <a:ext uri="{FF2B5EF4-FFF2-40B4-BE49-F238E27FC236}">
+                <a16:creationId xmlns:a16="http://schemas.microsoft.com/office/drawing/2014/main" id="{08FB905B-1FA2-C052-0D16-C06E1107A5B2}"/>
+              </a:ext>
+            </a:extLst>
+          </p:cNvPr>
+          <p:cNvPicPr>
+            <a:picLocks noChangeAspect="1"/>
+          </p:cNvPicPr>
+          <p:nvPr/>
+        </p:nvPicPr>
+        <p:blipFill rotWithShape="1">
+          <a:blip r:embed="rId6">
+            <a:extLst>
+              <a:ext uri="{28A0092B-C50C-407E-A947-70E740481C1C}">
+                <a14:useLocalDpi xmlns:a14="http://schemas.microsoft.com/office/drawing/2010/main" val="0"/>
+              </a:ext>
+            </a:extLst>
+          </a:blip>
+          <a:srcRect l="1" t="3992" r="15"/>
+          <a:stretch/>
+        </p:blipFill>
+        <p:spPr>
+          <a:xfrm>
+            <a:off x="622194" y="1278336"/>
+            <a:ext cx="2396678" cy="5117481"/>
+          </a:xfrm>
+          <a:prstGeom prst="roundRect">
+            <a:avLst>
+              <a:gd name="adj" fmla="val 16667"/>
+            </a:avLst>
+          </a:prstGeom>
+          <a:ln>
+            <a:noFill/>
+          </a:ln>
+          <a:effectLst>
+            <a:outerShdw blurRad="152400" dist="12000" dir="900000" sy="98000" kx="110000" ky="200000" algn="tl" rotWithShape="0">
+              <a:srgbClr val="000000">
+                <a:alpha val="30000"/>
+              </a:srgbClr>
+            </a:outerShdw>
+          </a:effectLst>
+          <a:scene3d>
+            <a:camera prst="perspectiveRelaxed">
+              <a:rot lat="19800000" lon="1200000" rev="20820000"/>
+            </a:camera>
+            <a:lightRig rig="threePt" dir="t"/>
+          </a:scene3d>
+          <a:sp3d contourW="6350" prstMaterial="matte">
+            <a:bevelT w="101600" h="101600"/>
+            <a:contourClr>
+              <a:srgbClr val="969696"/>
+            </a:contourClr>
+          </a:sp3d>
+        </p:spPr>
+      </p:pic>
+      <p:sp>
+        <p:nvSpPr>
+          <p:cNvPr id="5" name="Flecha: a la derecha 4">
+            <a:extLst>
+              <a:ext uri="{FF2B5EF4-FFF2-40B4-BE49-F238E27FC236}">
+                <a16:creationId xmlns:a16="http://schemas.microsoft.com/office/drawing/2014/main" id="{E8178975-5797-56C8-618F-36668CFC085C}"/>
               </a:ext>
             </a:extLst>
           </p:cNvPr>
@@ -6897,13 +7626,21 @@
           <p:nvPr/>
         </p:nvSpPr>
         <p:spPr>
-          <a:xfrm rot="2434594">
-            <a:off x="7612753" y="2444712"/>
+          <a:xfrm>
+            <a:off x="3848199" y="1249888"/>
             <a:ext cx="1082529" cy="465912"/>
           </a:xfrm>
           <a:prstGeom prst="rightArrow">
             <a:avLst/>
           </a:prstGeom>
+          <a:solidFill>
+            <a:srgbClr val="8B3AAC"/>
+          </a:solidFill>
+          <a:ln>
+            <a:solidFill>
+              <a:srgbClr val="8B3AAC"/>
+            </a:solidFill>
+          </a:ln>
         </p:spPr>
         <p:style>
           <a:lnRef idx="2">
@@ -6930,12 +7667,120 @@
           </a:p>
         </p:txBody>
       </p:sp>
+      <p:sp>
+        <p:nvSpPr>
+          <p:cNvPr id="7" name="Flecha: a la derecha 6">
+            <a:extLst>
+              <a:ext uri="{FF2B5EF4-FFF2-40B4-BE49-F238E27FC236}">
+                <a16:creationId xmlns:a16="http://schemas.microsoft.com/office/drawing/2014/main" id="{236982EC-43C3-0EE2-1CB9-BD04E0B55752}"/>
+              </a:ext>
+            </a:extLst>
+          </p:cNvPr>
+          <p:cNvSpPr/>
+          <p:nvPr/>
+        </p:nvSpPr>
+        <p:spPr>
+          <a:xfrm rot="10800000">
+            <a:off x="7369746" y="1249888"/>
+            <a:ext cx="1082529" cy="465912"/>
+          </a:xfrm>
+          <a:prstGeom prst="rightArrow">
+            <a:avLst/>
+          </a:prstGeom>
+          <a:solidFill>
+            <a:srgbClr val="8B3AAC"/>
+          </a:solidFill>
+          <a:ln>
+            <a:solidFill>
+              <a:srgbClr val="8B3AAC"/>
+            </a:solidFill>
+          </a:ln>
+        </p:spPr>
+        <p:style>
+          <a:lnRef idx="2">
+            <a:schemeClr val="accent1">
+              <a:shade val="15000"/>
+            </a:schemeClr>
+          </a:lnRef>
+          <a:fillRef idx="1">
+            <a:schemeClr val="accent1"/>
+          </a:fillRef>
+          <a:effectRef idx="0">
+            <a:schemeClr val="accent1"/>
+          </a:effectRef>
+          <a:fontRef idx="minor">
+            <a:schemeClr val="lt1"/>
+          </a:fontRef>
+        </p:style>
+        <p:txBody>
+          <a:bodyPr rtlCol="0" anchor="ctr"/>
+          <a:lstStyle/>
+          <a:p>
+            <a:pPr algn="ctr"/>
+            <a:endParaRPr lang="es-ES"/>
+          </a:p>
+        </p:txBody>
+      </p:sp>
+      <p:sp>
+        <p:nvSpPr>
+          <p:cNvPr id="8" name="Flecha: a la derecha 7">
+            <a:extLst>
+              <a:ext uri="{FF2B5EF4-FFF2-40B4-BE49-F238E27FC236}">
+                <a16:creationId xmlns:a16="http://schemas.microsoft.com/office/drawing/2014/main" id="{B494CD1C-4CCC-EAA8-BFD7-1585E5854521}"/>
+              </a:ext>
+            </a:extLst>
+          </p:cNvPr>
+          <p:cNvSpPr/>
+          <p:nvPr/>
+        </p:nvSpPr>
+        <p:spPr>
+          <a:xfrm>
+            <a:off x="7789909" y="1249888"/>
+            <a:ext cx="1082529" cy="465912"/>
+          </a:xfrm>
+          <a:prstGeom prst="rightArrow">
+            <a:avLst/>
+          </a:prstGeom>
+          <a:solidFill>
+            <a:srgbClr val="8B3AAC"/>
+          </a:solidFill>
+          <a:ln>
+            <a:solidFill>
+              <a:srgbClr val="8B3AAC"/>
+            </a:solidFill>
+          </a:ln>
+        </p:spPr>
+        <p:style>
+          <a:lnRef idx="2">
+            <a:schemeClr val="accent1">
+              <a:shade val="15000"/>
+            </a:schemeClr>
+          </a:lnRef>
+          <a:fillRef idx="1">
+            <a:schemeClr val="accent1"/>
+          </a:fillRef>
+          <a:effectRef idx="0">
+            <a:schemeClr val="accent1"/>
+          </a:effectRef>
+          <a:fontRef idx="minor">
+            <a:schemeClr val="lt1"/>
+          </a:fontRef>
+        </p:style>
+        <p:txBody>
+          <a:bodyPr rtlCol="0" anchor="ctr"/>
+          <a:lstStyle/>
+          <a:p>
+            <a:pPr algn="ctr"/>
+            <a:endParaRPr lang="es-ES"/>
+          </a:p>
+        </p:txBody>
+      </p:sp>
       <p:pic>
         <p:nvPicPr>
-          <p:cNvPr id="2" name="Gráfico 1">
-            <a:extLst>
-              <a:ext uri="{FF2B5EF4-FFF2-40B4-BE49-F238E27FC236}">
-                <a16:creationId xmlns:a16="http://schemas.microsoft.com/office/drawing/2014/main" id="{E5C8D729-6585-5539-B004-ED7AE3519E0E}"/>
+          <p:cNvPr id="10" name="Imagen 9" descr="Icono&#10;&#10;Descripción generada automáticamente">
+            <a:extLst>
+              <a:ext uri="{FF2B5EF4-FFF2-40B4-BE49-F238E27FC236}">
+                <a16:creationId xmlns:a16="http://schemas.microsoft.com/office/drawing/2014/main" id="{A185EAA6-2A31-1514-790B-A7D4781BD32A}"/>
               </a:ext>
             </a:extLst>
           </p:cNvPr>
@@ -6945,13 +7790,10 @@
           <p:nvPr/>
         </p:nvPicPr>
         <p:blipFill>
-          <a:blip r:embed="rId2">
+          <a:blip r:embed="rId7">
             <a:extLst>
               <a:ext uri="{28A0092B-C50C-407E-A947-70E740481C1C}">
                 <a14:useLocalDpi xmlns:a14="http://schemas.microsoft.com/office/drawing/2010/main" val="0"/>
-              </a:ext>
-              <a:ext uri="{96DAC541-7B7A-43D3-8B79-37D633B846F1}">
-                <asvg:svgBlip xmlns:asvg="http://schemas.microsoft.com/office/drawing/2016/SVG/main" r:embed="rId3"/>
               </a:ext>
             </a:extLst>
           </a:blip>
@@ -6961,8 +7803,8 @@
         </p:blipFill>
         <p:spPr>
           <a:xfrm>
-            <a:off x="11506869" y="82334"/>
-            <a:ext cx="531934" cy="670872"/>
+            <a:off x="7721955" y="2200422"/>
+            <a:ext cx="874761" cy="874761"/>
           </a:xfrm>
           <a:prstGeom prst="rect">
             <a:avLst/>
@@ -6971,10 +7813,10 @@
       </p:pic>
       <p:pic>
         <p:nvPicPr>
-          <p:cNvPr id="6" name="Imagen 5" descr="Interfaz de usuario gráfica&#10;&#10;Descripción generada automáticamente con confianza media">
-            <a:extLst>
-              <a:ext uri="{FF2B5EF4-FFF2-40B4-BE49-F238E27FC236}">
-                <a16:creationId xmlns:a16="http://schemas.microsoft.com/office/drawing/2014/main" id="{7225BC6D-55AC-BA58-EC15-EBB4D504B63C}"/>
+          <p:cNvPr id="23" name="Imagen 22" descr="Icono&#10;&#10;Descripción generada automáticamente">
+            <a:extLst>
+              <a:ext uri="{FF2B5EF4-FFF2-40B4-BE49-F238E27FC236}">
+                <a16:creationId xmlns:a16="http://schemas.microsoft.com/office/drawing/2014/main" id="{E114334F-EA81-93B3-A2F2-CB3FD20FA87D}"/>
               </a:ext>
             </a:extLst>
           </p:cNvPr>
@@ -6983,91 +7825,22 @@
           </p:cNvPicPr>
           <p:nvPr/>
         </p:nvPicPr>
-        <p:blipFill rotWithShape="1">
-          <a:blip r:embed="rId4">
+        <p:blipFill>
+          <a:blip r:embed="rId8">
             <a:extLst>
               <a:ext uri="{28A0092B-C50C-407E-A947-70E740481C1C}">
                 <a14:useLocalDpi xmlns:a14="http://schemas.microsoft.com/office/drawing/2010/main" val="0"/>
               </a:ext>
             </a:extLst>
           </a:blip>
-          <a:srcRect l="-1" t="4059" r="489"/>
-          <a:stretch/>
+          <a:stretch>
+            <a:fillRect/>
+          </a:stretch>
         </p:blipFill>
         <p:spPr>
           <a:xfrm>
-            <a:off x="4955037" y="1675883"/>
-            <a:ext cx="2281926" cy="4892217"/>
-          </a:xfrm>
-          <a:prstGeom prst="rect">
-            <a:avLst/>
-          </a:prstGeom>
-        </p:spPr>
-      </p:pic>
-      <p:pic>
-        <p:nvPicPr>
-          <p:cNvPr id="18" name="Imagen 17" descr="Una captura de pantalla de un celular con letras&#10;&#10;Descripción generada automáticamente">
-            <a:extLst>
-              <a:ext uri="{FF2B5EF4-FFF2-40B4-BE49-F238E27FC236}">
-                <a16:creationId xmlns:a16="http://schemas.microsoft.com/office/drawing/2014/main" id="{914F723D-9796-7442-C454-AB8A2FDC6D7C}"/>
-              </a:ext>
-            </a:extLst>
-          </p:cNvPr>
-          <p:cNvPicPr>
-            <a:picLocks noChangeAspect="1"/>
-          </p:cNvPicPr>
-          <p:nvPr/>
-        </p:nvPicPr>
-        <p:blipFill rotWithShape="1">
-          <a:blip r:embed="rId5">
-            <a:extLst>
-              <a:ext uri="{28A0092B-C50C-407E-A947-70E740481C1C}">
-                <a14:useLocalDpi xmlns:a14="http://schemas.microsoft.com/office/drawing/2010/main" val="0"/>
-              </a:ext>
-            </a:extLst>
-          </a:blip>
-          <a:srcRect t="3776" r="-229"/>
-          <a:stretch/>
-        </p:blipFill>
-        <p:spPr>
-          <a:xfrm>
-            <a:off x="9138929" y="2043728"/>
-            <a:ext cx="2114847" cy="4514856"/>
-          </a:xfrm>
-          <a:prstGeom prst="rect">
-            <a:avLst/>
-          </a:prstGeom>
-        </p:spPr>
-      </p:pic>
-      <p:pic>
-        <p:nvPicPr>
-          <p:cNvPr id="20" name="Imagen 19" descr="Interfaz de usuario gráfica, Aplicación&#10;&#10;Descripción generada automáticamente">
-            <a:extLst>
-              <a:ext uri="{FF2B5EF4-FFF2-40B4-BE49-F238E27FC236}">
-                <a16:creationId xmlns:a16="http://schemas.microsoft.com/office/drawing/2014/main" id="{08FB905B-1FA2-C052-0D16-C06E1107A5B2}"/>
-              </a:ext>
-            </a:extLst>
-          </p:cNvPr>
-          <p:cNvPicPr>
-            <a:picLocks noChangeAspect="1"/>
-          </p:cNvPicPr>
-          <p:nvPr/>
-        </p:nvPicPr>
-        <p:blipFill rotWithShape="1">
-          <a:blip r:embed="rId6">
-            <a:extLst>
-              <a:ext uri="{28A0092B-C50C-407E-A947-70E740481C1C}">
-                <a14:useLocalDpi xmlns:a14="http://schemas.microsoft.com/office/drawing/2010/main" val="0"/>
-              </a:ext>
-            </a:extLst>
-          </a:blip>
-          <a:srcRect l="1" t="3992" r="15"/>
-          <a:stretch/>
-        </p:blipFill>
-        <p:spPr>
-          <a:xfrm>
-            <a:off x="838707" y="1957371"/>
-            <a:ext cx="2127664" cy="4543071"/>
+            <a:off x="3753126" y="2200422"/>
+            <a:ext cx="790428" cy="790428"/>
           </a:xfrm>
           <a:prstGeom prst="rect">
             <a:avLst/>
@@ -7203,8 +7976,8 @@
         </p:nvSpPr>
         <p:spPr>
           <a:xfrm>
-            <a:off x="7097499" y="1036426"/>
-            <a:ext cx="3069366" cy="707886"/>
+            <a:off x="7085041" y="1136803"/>
+            <a:ext cx="3129768" cy="707886"/>
           </a:xfrm>
           <a:prstGeom prst="rect">
             <a:avLst/>
@@ -7218,7 +7991,7 @@
           <a:lstStyle/>
           <a:p>
             <a:r>
-              <a:rPr lang="es-ES" sz="4000" dirty="0"/>
+              <a:rPr lang="es-ES" sz="4000" b="1" u="sng" dirty="0"/>
               <a:t>Configuración</a:t>
             </a:r>
           </a:p>
@@ -7238,8 +8011,8 @@
         </p:nvSpPr>
         <p:spPr>
           <a:xfrm>
-            <a:off x="1191854" y="1036426"/>
-            <a:ext cx="3329181" cy="707886"/>
+            <a:off x="1360370" y="1119552"/>
+            <a:ext cx="3396251" cy="707886"/>
           </a:xfrm>
           <a:prstGeom prst="rect">
             <a:avLst/>
@@ -7253,7 +8026,7 @@
           <a:lstStyle/>
           <a:p>
             <a:r>
-              <a:rPr lang="es-ES" sz="4000" dirty="0"/>
+              <a:rPr lang="es-ES" sz="4000" b="1" u="sng" dirty="0"/>
               <a:t>Sobre nosotros</a:t>
             </a:r>
           </a:p>
@@ -7326,12 +8099,36 @@
         </p:blipFill>
         <p:spPr>
           <a:xfrm>
-            <a:off x="1716341" y="1744312"/>
-            <a:ext cx="2074368" cy="4612711"/>
-          </a:xfrm>
-          <a:prstGeom prst="rect">
-            <a:avLst/>
-          </a:prstGeom>
+            <a:off x="1701586" y="1369115"/>
+            <a:ext cx="2235772" cy="4971620"/>
+          </a:xfrm>
+          <a:prstGeom prst="roundRect">
+            <a:avLst>
+              <a:gd name="adj" fmla="val 16667"/>
+            </a:avLst>
+          </a:prstGeom>
+          <a:ln>
+            <a:noFill/>
+          </a:ln>
+          <a:effectLst>
+            <a:outerShdw blurRad="152400" dist="12000" dir="900000" sy="98000" kx="110000" ky="200000" algn="tl" rotWithShape="0">
+              <a:srgbClr val="000000">
+                <a:alpha val="30000"/>
+              </a:srgbClr>
+            </a:outerShdw>
+          </a:effectLst>
+          <a:scene3d>
+            <a:camera prst="perspectiveRelaxed">
+              <a:rot lat="19800000" lon="1200000" rev="20820000"/>
+            </a:camera>
+            <a:lightRig rig="threePt" dir="t"/>
+          </a:scene3d>
+          <a:sp3d contourW="6350" prstMaterial="matte">
+            <a:bevelT w="101600" h="101600"/>
+            <a:contourClr>
+              <a:srgbClr val="969696"/>
+            </a:contourClr>
+          </a:sp3d>
         </p:spPr>
       </p:pic>
       <p:pic>
@@ -7361,14 +8158,224 @@
         </p:blipFill>
         <p:spPr>
           <a:xfrm>
-            <a:off x="7514295" y="1706694"/>
-            <a:ext cx="2235773" cy="4745911"/>
-          </a:xfrm>
-          <a:prstGeom prst="rect">
-            <a:avLst/>
-          </a:prstGeom>
+            <a:off x="7188752" y="1387770"/>
+            <a:ext cx="2333315" cy="4952965"/>
+          </a:xfrm>
+          <a:prstGeom prst="roundRect">
+            <a:avLst>
+              <a:gd name="adj" fmla="val 16667"/>
+            </a:avLst>
+          </a:prstGeom>
+          <a:ln>
+            <a:noFill/>
+          </a:ln>
+          <a:effectLst>
+            <a:outerShdw blurRad="152400" dist="12000" dir="900000" sy="98000" kx="110000" ky="200000" algn="tl" rotWithShape="0">
+              <a:srgbClr val="000000">
+                <a:alpha val="30000"/>
+              </a:srgbClr>
+            </a:outerShdw>
+          </a:effectLst>
+          <a:scene3d>
+            <a:camera prst="perspectiveRelaxed">
+              <a:rot lat="19800000" lon="1200000" rev="20820000"/>
+            </a:camera>
+            <a:lightRig rig="threePt" dir="t"/>
+          </a:scene3d>
+          <a:sp3d contourW="6350" prstMaterial="matte">
+            <a:bevelT w="101600" h="101600"/>
+            <a:contourClr>
+              <a:srgbClr val="969696"/>
+            </a:contourClr>
+          </a:sp3d>
         </p:spPr>
       </p:pic>
+      <p:pic>
+        <p:nvPicPr>
+          <p:cNvPr id="7" name="Gráfico 6">
+            <a:extLst>
+              <a:ext uri="{FF2B5EF4-FFF2-40B4-BE49-F238E27FC236}">
+                <a16:creationId xmlns:a16="http://schemas.microsoft.com/office/drawing/2014/main" id="{D075CAAE-1B95-7997-2218-642417AC05D5}"/>
+              </a:ext>
+            </a:extLst>
+          </p:cNvPr>
+          <p:cNvPicPr>
+            <a:picLocks noChangeAspect="1"/>
+          </p:cNvPicPr>
+          <p:nvPr/>
+        </p:nvPicPr>
+        <p:blipFill>
+          <a:blip r:embed="rId6">
+            <a:extLst>
+              <a:ext uri="{28A0092B-C50C-407E-A947-70E740481C1C}">
+                <a14:useLocalDpi xmlns:a14="http://schemas.microsoft.com/office/drawing/2010/main" val="0"/>
+              </a:ext>
+              <a:ext uri="{96DAC541-7B7A-43D3-8B79-37D633B846F1}">
+                <asvg:svgBlip xmlns:asvg="http://schemas.microsoft.com/office/drawing/2016/SVG/main" r:embed="rId7"/>
+              </a:ext>
+            </a:extLst>
+          </a:blip>
+          <a:stretch>
+            <a:fillRect/>
+          </a:stretch>
+        </p:blipFill>
+        <p:spPr>
+          <a:xfrm>
+            <a:off x="4679740" y="996776"/>
+            <a:ext cx="920536" cy="920536"/>
+          </a:xfrm>
+          <a:prstGeom prst="rect">
+            <a:avLst/>
+          </a:prstGeom>
+        </p:spPr>
+      </p:pic>
+      <p:pic>
+        <p:nvPicPr>
+          <p:cNvPr id="14" name="Gráfico 13">
+            <a:extLst>
+              <a:ext uri="{FF2B5EF4-FFF2-40B4-BE49-F238E27FC236}">
+                <a16:creationId xmlns:a16="http://schemas.microsoft.com/office/drawing/2014/main" id="{2F40B12C-9D16-DC8C-FAF9-561764C1242B}"/>
+              </a:ext>
+            </a:extLst>
+          </p:cNvPr>
+          <p:cNvPicPr>
+            <a:picLocks noChangeAspect="1"/>
+          </p:cNvPicPr>
+          <p:nvPr/>
+        </p:nvPicPr>
+        <p:blipFill>
+          <a:blip r:embed="rId8">
+            <a:extLst>
+              <a:ext uri="{28A0092B-C50C-407E-A947-70E740481C1C}">
+                <a14:useLocalDpi xmlns:a14="http://schemas.microsoft.com/office/drawing/2010/main" val="0"/>
+              </a:ext>
+              <a:ext uri="{96DAC541-7B7A-43D3-8B79-37D633B846F1}">
+                <asvg:svgBlip xmlns:asvg="http://schemas.microsoft.com/office/drawing/2016/SVG/main" r:embed="rId9"/>
+              </a:ext>
+            </a:extLst>
+          </a:blip>
+          <a:stretch>
+            <a:fillRect/>
+          </a:stretch>
+        </p:blipFill>
+        <p:spPr>
+          <a:xfrm>
+            <a:off x="10211865" y="1036321"/>
+            <a:ext cx="874347" cy="874347"/>
+          </a:xfrm>
+          <a:prstGeom prst="rect">
+            <a:avLst/>
+          </a:prstGeom>
+        </p:spPr>
+      </p:pic>
+      <p:sp>
+        <p:nvSpPr>
+          <p:cNvPr id="15" name="Flecha: a la derecha 14">
+            <a:extLst>
+              <a:ext uri="{FF2B5EF4-FFF2-40B4-BE49-F238E27FC236}">
+                <a16:creationId xmlns:a16="http://schemas.microsoft.com/office/drawing/2014/main" id="{AA5CBFC5-FCEF-FFD6-F3B8-FE187B11F70C}"/>
+              </a:ext>
+            </a:extLst>
+          </p:cNvPr>
+          <p:cNvSpPr/>
+          <p:nvPr/>
+        </p:nvSpPr>
+        <p:spPr>
+          <a:xfrm rot="10800000">
+            <a:off x="4854658" y="3240613"/>
+            <a:ext cx="1493765" cy="727774"/>
+          </a:xfrm>
+          <a:prstGeom prst="rightArrow">
+            <a:avLst/>
+          </a:prstGeom>
+          <a:solidFill>
+            <a:srgbClr val="8B3AAC"/>
+          </a:solidFill>
+          <a:ln>
+            <a:solidFill>
+              <a:srgbClr val="8B3AAC"/>
+            </a:solidFill>
+          </a:ln>
+        </p:spPr>
+        <p:style>
+          <a:lnRef idx="2">
+            <a:schemeClr val="accent1">
+              <a:shade val="15000"/>
+            </a:schemeClr>
+          </a:lnRef>
+          <a:fillRef idx="1">
+            <a:schemeClr val="accent1"/>
+          </a:fillRef>
+          <a:effectRef idx="0">
+            <a:schemeClr val="accent1"/>
+          </a:effectRef>
+          <a:fontRef idx="minor">
+            <a:schemeClr val="lt1"/>
+          </a:fontRef>
+        </p:style>
+        <p:txBody>
+          <a:bodyPr rtlCol="0" anchor="ctr"/>
+          <a:lstStyle/>
+          <a:p>
+            <a:pPr algn="ctr"/>
+            <a:endParaRPr lang="es-ES"/>
+          </a:p>
+        </p:txBody>
+      </p:sp>
+      <p:sp>
+        <p:nvSpPr>
+          <p:cNvPr id="16" name="Flecha: a la derecha 15">
+            <a:extLst>
+              <a:ext uri="{FF2B5EF4-FFF2-40B4-BE49-F238E27FC236}">
+                <a16:creationId xmlns:a16="http://schemas.microsoft.com/office/drawing/2014/main" id="{EEAF6580-B671-E6E2-52AA-064E76632635}"/>
+              </a:ext>
+            </a:extLst>
+          </p:cNvPr>
+          <p:cNvSpPr/>
+          <p:nvPr/>
+        </p:nvSpPr>
+        <p:spPr>
+          <a:xfrm>
+            <a:off x="5274822" y="3240613"/>
+            <a:ext cx="1493765" cy="727774"/>
+          </a:xfrm>
+          <a:prstGeom prst="rightArrow">
+            <a:avLst/>
+          </a:prstGeom>
+          <a:solidFill>
+            <a:srgbClr val="8B3AAC"/>
+          </a:solidFill>
+          <a:ln>
+            <a:solidFill>
+              <a:srgbClr val="8B3AAC"/>
+            </a:solidFill>
+          </a:ln>
+        </p:spPr>
+        <p:style>
+          <a:lnRef idx="2">
+            <a:schemeClr val="accent1">
+              <a:shade val="15000"/>
+            </a:schemeClr>
+          </a:lnRef>
+          <a:fillRef idx="1">
+            <a:schemeClr val="accent1"/>
+          </a:fillRef>
+          <a:effectRef idx="0">
+            <a:schemeClr val="accent1"/>
+          </a:effectRef>
+          <a:fontRef idx="minor">
+            <a:schemeClr val="lt1"/>
+          </a:fontRef>
+        </p:style>
+        <p:txBody>
+          <a:bodyPr rtlCol="0" anchor="ctr"/>
+          <a:lstStyle/>
+          <a:p>
+            <a:pPr algn="ctr"/>
+            <a:endParaRPr lang="es-ES"/>
+          </a:p>
+        </p:txBody>
+      </p:sp>
     </p:spTree>
     <p:extLst>
       <p:ext uri="{BB962C8B-B14F-4D97-AF65-F5344CB8AC3E}">
@@ -9301,13 +10308,28 @@
           <a:prstGeom prst="roundRect">
             <a:avLst/>
           </a:prstGeom>
-          <a:ln w="19050">
-            <a:solidFill>
-              <a:schemeClr val="bg2">
-                <a:lumMod val="75000"/>
-              </a:schemeClr>
-            </a:solidFill>
+          <a:ln>
+            <a:noFill/>
           </a:ln>
+          <a:effectLst>
+            <a:outerShdw blurRad="152400" dist="12000" dir="900000" sy="98000" kx="110000" ky="200000" algn="tl" rotWithShape="0">
+              <a:srgbClr val="000000">
+                <a:alpha val="30000"/>
+              </a:srgbClr>
+            </a:outerShdw>
+          </a:effectLst>
+          <a:scene3d>
+            <a:camera prst="perspectiveRelaxed">
+              <a:rot lat="19800000" lon="1200000" rev="20820000"/>
+            </a:camera>
+            <a:lightRig rig="threePt" dir="t"/>
+          </a:scene3d>
+          <a:sp3d contourW="6350" prstMaterial="matte">
+            <a:bevelT w="101600" h="101600"/>
+            <a:contourClr>
+              <a:srgbClr val="969696"/>
+            </a:contourClr>
+          </a:sp3d>
         </p:spPr>
       </p:pic>
       <p:pic>
@@ -9332,67 +10354,36 @@
         </p:blipFill>
         <p:spPr>
           <a:xfrm>
-            <a:off x="6814301" y="2374421"/>
+            <a:off x="6781184" y="2374421"/>
             <a:ext cx="1968600" cy="3900745"/>
           </a:xfrm>
           <a:prstGeom prst="roundRect">
             <a:avLst/>
           </a:prstGeom>
-          <a:ln w="19050">
-            <a:solidFill>
-              <a:schemeClr val="bg2">
-                <a:lumMod val="75000"/>
-              </a:schemeClr>
-            </a:solidFill>
+          <a:ln>
+            <a:noFill/>
           </a:ln>
+          <a:effectLst>
+            <a:outerShdw blurRad="152400" dist="12000" dir="900000" sy="98000" kx="110000" ky="200000" algn="tl" rotWithShape="0">
+              <a:srgbClr val="000000">
+                <a:alpha val="30000"/>
+              </a:srgbClr>
+            </a:outerShdw>
+          </a:effectLst>
+          <a:scene3d>
+            <a:camera prst="perspectiveRelaxed">
+              <a:rot lat="19800000" lon="1200000" rev="20820000"/>
+            </a:camera>
+            <a:lightRig rig="threePt" dir="t"/>
+          </a:scene3d>
+          <a:sp3d contourW="6350" prstMaterial="matte">
+            <a:bevelT w="101600" h="101600"/>
+            <a:contourClr>
+              <a:srgbClr val="969696"/>
+            </a:contourClr>
+          </a:sp3d>
         </p:spPr>
       </p:pic>
-      <p:sp>
-        <p:nvSpPr>
-          <p:cNvPr id="9" name="Flecha: a la derecha 8">
-            <a:extLst>
-              <a:ext uri="{FF2B5EF4-FFF2-40B4-BE49-F238E27FC236}">
-                <a16:creationId xmlns:a16="http://schemas.microsoft.com/office/drawing/2014/main" id="{62AA2E22-CB31-65CA-874A-6F27DFD2D4E0}"/>
-              </a:ext>
-            </a:extLst>
-          </p:cNvPr>
-          <p:cNvSpPr/>
-          <p:nvPr/>
-        </p:nvSpPr>
-        <p:spPr>
-          <a:xfrm>
-            <a:off x="8931029" y="3561347"/>
-            <a:ext cx="346510" cy="231007"/>
-          </a:xfrm>
-          <a:prstGeom prst="rightArrow">
-            <a:avLst/>
-          </a:prstGeom>
-        </p:spPr>
-        <p:style>
-          <a:lnRef idx="2">
-            <a:schemeClr val="accent1">
-              <a:shade val="15000"/>
-            </a:schemeClr>
-          </a:lnRef>
-          <a:fillRef idx="1">
-            <a:schemeClr val="accent1"/>
-          </a:fillRef>
-          <a:effectRef idx="0">
-            <a:schemeClr val="accent1"/>
-          </a:effectRef>
-          <a:fontRef idx="minor">
-            <a:schemeClr val="lt1"/>
-          </a:fontRef>
-        </p:style>
-        <p:txBody>
-          <a:bodyPr rtlCol="0" anchor="ctr"/>
-          <a:lstStyle/>
-          <a:p>
-            <a:pPr algn="ctr"/>
-            <a:endParaRPr lang="es-ES"/>
-          </a:p>
-        </p:txBody>
-      </p:sp>
     </p:spTree>
     <p:extLst>
       <p:ext uri="{BB962C8B-B14F-4D97-AF65-F5344CB8AC3E}">
@@ -11488,7 +12479,6 @@
       <p:pic>
         <p:nvPicPr>
           <p:cNvPr id="2068" name="Picture 20">
-            <a:hlinkClick r:id="rId11"/>
             <a:extLst>
               <a:ext uri="{FF2B5EF4-FFF2-40B4-BE49-F238E27FC236}">
                 <a16:creationId xmlns:a16="http://schemas.microsoft.com/office/drawing/2014/main" id="{D660EA2F-5AA2-37BA-C33E-CF8FA1A2D74F}"/>
@@ -11501,7 +12491,7 @@
           <p:nvPr/>
         </p:nvPicPr>
         <p:blipFill>
-          <a:blip r:embed="rId12">
+          <a:blip r:embed="rId11">
             <a:extLst>
               <a:ext uri="{28A0092B-C50C-407E-A947-70E740481C1C}">
                 <a14:useLocalDpi xmlns:a14="http://schemas.microsoft.com/office/drawing/2010/main" val="0"/>
@@ -11548,7 +12538,7 @@
           <p:nvPr/>
         </p:nvPicPr>
         <p:blipFill>
-          <a:blip r:embed="rId13">
+          <a:blip r:embed="rId12">
             <a:extLst>
               <a:ext uri="{28A0092B-C50C-407E-A947-70E740481C1C}">
                 <a14:useLocalDpi xmlns:a14="http://schemas.microsoft.com/office/drawing/2010/main" val="0"/>
@@ -11790,246 +12780,6 @@
           </a:p>
         </p:txBody>
       </p:sp>
-      <p:sp>
-        <p:nvSpPr>
-          <p:cNvPr id="28" name="Rectángulo 27">
-            <a:extLst>
-              <a:ext uri="{FF2B5EF4-FFF2-40B4-BE49-F238E27FC236}">
-                <a16:creationId xmlns:a16="http://schemas.microsoft.com/office/drawing/2014/main" id="{8EC8ADFA-2573-BD0F-328F-3CF1FF6F769A}"/>
-              </a:ext>
-            </a:extLst>
-          </p:cNvPr>
-          <p:cNvSpPr/>
-          <p:nvPr/>
-        </p:nvSpPr>
-        <p:spPr>
-          <a:xfrm>
-            <a:off x="186296" y="1822961"/>
-            <a:ext cx="1853778" cy="1644258"/>
-          </a:xfrm>
-          <a:prstGeom prst="rect">
-            <a:avLst/>
-          </a:prstGeom>
-          <a:noFill/>
-          <a:ln w="57150"/>
-        </p:spPr>
-        <p:style>
-          <a:lnRef idx="2">
-            <a:schemeClr val="accent1">
-              <a:shade val="15000"/>
-            </a:schemeClr>
-          </a:lnRef>
-          <a:fillRef idx="1">
-            <a:schemeClr val="accent1"/>
-          </a:fillRef>
-          <a:effectRef idx="0">
-            <a:schemeClr val="accent1"/>
-          </a:effectRef>
-          <a:fontRef idx="minor">
-            <a:schemeClr val="lt1"/>
-          </a:fontRef>
-        </p:style>
-        <p:txBody>
-          <a:bodyPr rtlCol="0" anchor="ctr"/>
-          <a:lstStyle/>
-          <a:p>
-            <a:pPr algn="ctr"/>
-            <a:endParaRPr lang="es-ES"/>
-          </a:p>
-        </p:txBody>
-      </p:sp>
-      <p:sp>
-        <p:nvSpPr>
-          <p:cNvPr id="29" name="Rectángulo 28">
-            <a:extLst>
-              <a:ext uri="{FF2B5EF4-FFF2-40B4-BE49-F238E27FC236}">
-                <a16:creationId xmlns:a16="http://schemas.microsoft.com/office/drawing/2014/main" id="{F7CC90C6-CD7D-8027-7FB6-E0CAF13B639B}"/>
-              </a:ext>
-            </a:extLst>
-          </p:cNvPr>
-          <p:cNvSpPr/>
-          <p:nvPr/>
-        </p:nvSpPr>
-        <p:spPr>
-          <a:xfrm>
-            <a:off x="2214979" y="1822961"/>
-            <a:ext cx="3764420" cy="1644258"/>
-          </a:xfrm>
-          <a:prstGeom prst="rect">
-            <a:avLst/>
-          </a:prstGeom>
-          <a:noFill/>
-          <a:ln w="57150"/>
-        </p:spPr>
-        <p:style>
-          <a:lnRef idx="2">
-            <a:schemeClr val="accent1">
-              <a:shade val="15000"/>
-            </a:schemeClr>
-          </a:lnRef>
-          <a:fillRef idx="1">
-            <a:schemeClr val="accent1"/>
-          </a:fillRef>
-          <a:effectRef idx="0">
-            <a:schemeClr val="accent1"/>
-          </a:effectRef>
-          <a:fontRef idx="minor">
-            <a:schemeClr val="lt1"/>
-          </a:fontRef>
-        </p:style>
-        <p:txBody>
-          <a:bodyPr rtlCol="0" anchor="ctr"/>
-          <a:lstStyle/>
-          <a:p>
-            <a:pPr algn="ctr"/>
-            <a:endParaRPr lang="es-ES"/>
-          </a:p>
-        </p:txBody>
-      </p:sp>
-      <p:sp>
-        <p:nvSpPr>
-          <p:cNvPr id="30" name="Rectángulo 29">
-            <a:extLst>
-              <a:ext uri="{FF2B5EF4-FFF2-40B4-BE49-F238E27FC236}">
-                <a16:creationId xmlns:a16="http://schemas.microsoft.com/office/drawing/2014/main" id="{23114B4F-D0B2-D4A0-0F93-FC7B2604392A}"/>
-              </a:ext>
-            </a:extLst>
-          </p:cNvPr>
-          <p:cNvSpPr/>
-          <p:nvPr/>
-        </p:nvSpPr>
-        <p:spPr>
-          <a:xfrm>
-            <a:off x="772998" y="3599188"/>
-            <a:ext cx="2486379" cy="1530226"/>
-          </a:xfrm>
-          <a:prstGeom prst="rect">
-            <a:avLst/>
-          </a:prstGeom>
-          <a:noFill/>
-          <a:ln w="57150"/>
-        </p:spPr>
-        <p:style>
-          <a:lnRef idx="2">
-            <a:schemeClr val="accent1">
-              <a:shade val="15000"/>
-            </a:schemeClr>
-          </a:lnRef>
-          <a:fillRef idx="1">
-            <a:schemeClr val="accent1"/>
-          </a:fillRef>
-          <a:effectRef idx="0">
-            <a:schemeClr val="accent1"/>
-          </a:effectRef>
-          <a:fontRef idx="minor">
-            <a:schemeClr val="lt1"/>
-          </a:fontRef>
-        </p:style>
-        <p:txBody>
-          <a:bodyPr rtlCol="0" anchor="ctr"/>
-          <a:lstStyle/>
-          <a:p>
-            <a:pPr algn="ctr"/>
-            <a:endParaRPr lang="es-ES"/>
-          </a:p>
-        </p:txBody>
-      </p:sp>
-      <p:sp>
-        <p:nvSpPr>
-          <p:cNvPr id="31" name="Rectángulo 30">
-            <a:extLst>
-              <a:ext uri="{FF2B5EF4-FFF2-40B4-BE49-F238E27FC236}">
-                <a16:creationId xmlns:a16="http://schemas.microsoft.com/office/drawing/2014/main" id="{6498A3FE-661E-1955-978B-705B5BC6F7AC}"/>
-              </a:ext>
-            </a:extLst>
-          </p:cNvPr>
-          <p:cNvSpPr/>
-          <p:nvPr/>
-        </p:nvSpPr>
-        <p:spPr>
-          <a:xfrm>
-            <a:off x="3409885" y="3589899"/>
-            <a:ext cx="1945968" cy="1539516"/>
-          </a:xfrm>
-          <a:prstGeom prst="rect">
-            <a:avLst/>
-          </a:prstGeom>
-          <a:noFill/>
-          <a:ln w="57150"/>
-        </p:spPr>
-        <p:style>
-          <a:lnRef idx="2">
-            <a:schemeClr val="accent1">
-              <a:shade val="15000"/>
-            </a:schemeClr>
-          </a:lnRef>
-          <a:fillRef idx="1">
-            <a:schemeClr val="accent1"/>
-          </a:fillRef>
-          <a:effectRef idx="0">
-            <a:schemeClr val="accent1"/>
-          </a:effectRef>
-          <a:fontRef idx="minor">
-            <a:schemeClr val="lt1"/>
-          </a:fontRef>
-        </p:style>
-        <p:txBody>
-          <a:bodyPr rtlCol="0" anchor="ctr"/>
-          <a:lstStyle/>
-          <a:p>
-            <a:pPr algn="ctr"/>
-            <a:endParaRPr lang="es-ES"/>
-          </a:p>
-        </p:txBody>
-      </p:sp>
-      <p:sp>
-        <p:nvSpPr>
-          <p:cNvPr id="32" name="Rectángulo 31">
-            <a:extLst>
-              <a:ext uri="{FF2B5EF4-FFF2-40B4-BE49-F238E27FC236}">
-                <a16:creationId xmlns:a16="http://schemas.microsoft.com/office/drawing/2014/main" id="{9FB0ED3C-2747-C402-4A52-E3DFBB23C645}"/>
-              </a:ext>
-            </a:extLst>
-          </p:cNvPr>
-          <p:cNvSpPr/>
-          <p:nvPr/>
-        </p:nvSpPr>
-        <p:spPr>
-          <a:xfrm>
-            <a:off x="186296" y="5273488"/>
-            <a:ext cx="3764420" cy="1502179"/>
-          </a:xfrm>
-          <a:prstGeom prst="rect">
-            <a:avLst/>
-          </a:prstGeom>
-          <a:noFill/>
-          <a:ln w="57150"/>
-        </p:spPr>
-        <p:style>
-          <a:lnRef idx="2">
-            <a:schemeClr val="accent1">
-              <a:shade val="15000"/>
-            </a:schemeClr>
-          </a:lnRef>
-          <a:fillRef idx="1">
-            <a:schemeClr val="accent1"/>
-          </a:fillRef>
-          <a:effectRef idx="0">
-            <a:schemeClr val="accent1"/>
-          </a:effectRef>
-          <a:fontRef idx="minor">
-            <a:schemeClr val="lt1"/>
-          </a:fontRef>
-        </p:style>
-        <p:txBody>
-          <a:bodyPr rtlCol="0" anchor="ctr"/>
-          <a:lstStyle/>
-          <a:p>
-            <a:pPr algn="ctr"/>
-            <a:endParaRPr lang="es-ES"/>
-          </a:p>
-        </p:txBody>
-      </p:sp>
       <p:cxnSp>
         <p:nvCxnSpPr>
           <p:cNvPr id="17" name="Conector recto 16">
@@ -12075,54 +12825,6 @@
           </a:fontRef>
         </p:style>
       </p:cxnSp>
-      <p:sp>
-        <p:nvSpPr>
-          <p:cNvPr id="33" name="Rectángulo 32">
-            <a:extLst>
-              <a:ext uri="{FF2B5EF4-FFF2-40B4-BE49-F238E27FC236}">
-                <a16:creationId xmlns:a16="http://schemas.microsoft.com/office/drawing/2014/main" id="{2701E1D9-7DD1-72DA-F982-6437DA374670}"/>
-              </a:ext>
-            </a:extLst>
-          </p:cNvPr>
-          <p:cNvSpPr/>
-          <p:nvPr/>
-        </p:nvSpPr>
-        <p:spPr>
-          <a:xfrm>
-            <a:off x="4097189" y="5270673"/>
-            <a:ext cx="1708255" cy="1522009"/>
-          </a:xfrm>
-          <a:prstGeom prst="rect">
-            <a:avLst/>
-          </a:prstGeom>
-          <a:noFill/>
-          <a:ln w="57150"/>
-        </p:spPr>
-        <p:style>
-          <a:lnRef idx="2">
-            <a:schemeClr val="accent1">
-              <a:shade val="15000"/>
-            </a:schemeClr>
-          </a:lnRef>
-          <a:fillRef idx="1">
-            <a:schemeClr val="accent1"/>
-          </a:fillRef>
-          <a:effectRef idx="0">
-            <a:schemeClr val="accent1"/>
-          </a:effectRef>
-          <a:fontRef idx="minor">
-            <a:schemeClr val="lt1"/>
-          </a:fontRef>
-        </p:style>
-        <p:txBody>
-          <a:bodyPr rtlCol="0" anchor="ctr"/>
-          <a:lstStyle/>
-          <a:p>
-            <a:pPr algn="ctr"/>
-            <a:endParaRPr lang="es-ES"/>
-          </a:p>
-        </p:txBody>
-      </p:sp>
       <p:pic>
         <p:nvPicPr>
           <p:cNvPr id="2072" name="Picture 24">
@@ -12138,7 +12840,7 @@
           <p:nvPr/>
         </p:nvPicPr>
         <p:blipFill>
-          <a:blip r:embed="rId14">
+          <a:blip r:embed="rId13">
             <a:extLst>
               <a:ext uri="{28A0092B-C50C-407E-A947-70E740481C1C}">
                 <a14:useLocalDpi xmlns:a14="http://schemas.microsoft.com/office/drawing/2010/main" val="0"/>
@@ -12152,7 +12854,7 @@
         </p:blipFill>
         <p:spPr bwMode="auto">
           <a:xfrm>
-            <a:off x="7662570" y="2184147"/>
+            <a:off x="7725866" y="2122005"/>
             <a:ext cx="3223685" cy="1102618"/>
           </a:xfrm>
           <a:prstGeom prst="rect">
@@ -12185,7 +12887,7 @@
           <p:nvPr/>
         </p:nvPicPr>
         <p:blipFill>
-          <a:blip r:embed="rId15">
+          <a:blip r:embed="rId14">
             <a:extLst>
               <a:ext uri="{28A0092B-C50C-407E-A947-70E740481C1C}">
                 <a14:useLocalDpi xmlns:a14="http://schemas.microsoft.com/office/drawing/2010/main" val="0"/>
@@ -12232,7 +12934,7 @@
           <p:nvPr/>
         </p:nvPicPr>
         <p:blipFill>
-          <a:blip r:embed="rId16">
+          <a:blip r:embed="rId15">
             <a:extLst>
               <a:ext uri="{28A0092B-C50C-407E-A947-70E740481C1C}">
                 <a14:useLocalDpi xmlns:a14="http://schemas.microsoft.com/office/drawing/2010/main" val="0"/>
@@ -12279,7 +12981,7 @@
           <p:nvPr/>
         </p:nvPicPr>
         <p:blipFill>
-          <a:blip r:embed="rId17">
+          <a:blip r:embed="rId16">
             <a:extLst>
               <a:ext uri="{28A0092B-C50C-407E-A947-70E740481C1C}">
                 <a14:useLocalDpi xmlns:a14="http://schemas.microsoft.com/office/drawing/2010/main" val="0"/>
@@ -12326,7 +13028,7 @@
           <p:nvPr/>
         </p:nvPicPr>
         <p:blipFill>
-          <a:blip r:embed="rId18">
+          <a:blip r:embed="rId17">
             <a:extLst>
               <a:ext uri="{28A0092B-C50C-407E-A947-70E740481C1C}">
                 <a14:useLocalDpi xmlns:a14="http://schemas.microsoft.com/office/drawing/2010/main" val="0"/>
@@ -12360,10 +13062,185 @@
       </p:pic>
       <p:sp>
         <p:nvSpPr>
-          <p:cNvPr id="38" name="Rectángulo 37">
-            <a:extLst>
-              <a:ext uri="{FF2B5EF4-FFF2-40B4-BE49-F238E27FC236}">
-                <a16:creationId xmlns:a16="http://schemas.microsoft.com/office/drawing/2014/main" id="{91A47D5B-49B0-9F99-C2F9-B5DB52857F5C}"/>
+          <p:cNvPr id="39" name="CuadroTexto 38">
+            <a:extLst>
+              <a:ext uri="{FF2B5EF4-FFF2-40B4-BE49-F238E27FC236}">
+                <a16:creationId xmlns:a16="http://schemas.microsoft.com/office/drawing/2014/main" id="{82087DC6-CC26-5AC5-4817-28250A72721C}"/>
+              </a:ext>
+            </a:extLst>
+          </p:cNvPr>
+          <p:cNvSpPr txBox="1"/>
+          <p:nvPr/>
+        </p:nvSpPr>
+        <p:spPr>
+          <a:xfrm>
+            <a:off x="8468129" y="1854091"/>
+            <a:ext cx="1806328" cy="430887"/>
+          </a:xfrm>
+          <a:prstGeom prst="rect">
+            <a:avLst/>
+          </a:prstGeom>
+          <a:noFill/>
+        </p:spPr>
+        <p:txBody>
+          <a:bodyPr wrap="none" rtlCol="0">
+            <a:spAutoFit/>
+          </a:bodyPr>
+          <a:lstStyle/>
+          <a:p>
+            <a:r>
+              <a:rPr lang="es-ES" sz="2200" b="1" u="sng" dirty="0"/>
+              <a:t>Base de datos</a:t>
+            </a:r>
+          </a:p>
+        </p:txBody>
+      </p:sp>
+      <p:sp>
+        <p:nvSpPr>
+          <p:cNvPr id="42" name="CuadroTexto 41">
+            <a:extLst>
+              <a:ext uri="{FF2B5EF4-FFF2-40B4-BE49-F238E27FC236}">
+                <a16:creationId xmlns:a16="http://schemas.microsoft.com/office/drawing/2014/main" id="{6D65E93B-9754-2891-96B9-93AC0FB59D9F}"/>
+              </a:ext>
+            </a:extLst>
+          </p:cNvPr>
+          <p:cNvSpPr txBox="1"/>
+          <p:nvPr/>
+        </p:nvSpPr>
+        <p:spPr>
+          <a:xfrm>
+            <a:off x="7276757" y="3639882"/>
+            <a:ext cx="1855060" cy="430887"/>
+          </a:xfrm>
+          <a:prstGeom prst="rect">
+            <a:avLst/>
+          </a:prstGeom>
+          <a:noFill/>
+        </p:spPr>
+        <p:txBody>
+          <a:bodyPr wrap="none" rtlCol="0">
+            <a:spAutoFit/>
+          </a:bodyPr>
+          <a:lstStyle/>
+          <a:p>
+            <a:r>
+              <a:rPr lang="es-ES" sz="2200" b="1" u="sng" dirty="0"/>
+              <a:t>Distribuciones</a:t>
+            </a:r>
+          </a:p>
+        </p:txBody>
+      </p:sp>
+      <p:sp>
+        <p:nvSpPr>
+          <p:cNvPr id="43" name="CuadroTexto 42">
+            <a:extLst>
+              <a:ext uri="{FF2B5EF4-FFF2-40B4-BE49-F238E27FC236}">
+                <a16:creationId xmlns:a16="http://schemas.microsoft.com/office/drawing/2014/main" id="{93200911-788A-9E77-674E-85766BC1A429}"/>
+              </a:ext>
+            </a:extLst>
+          </p:cNvPr>
+          <p:cNvSpPr txBox="1"/>
+          <p:nvPr/>
+        </p:nvSpPr>
+        <p:spPr>
+          <a:xfrm>
+            <a:off x="10072342" y="3622292"/>
+            <a:ext cx="1082925" cy="430887"/>
+          </a:xfrm>
+          <a:prstGeom prst="rect">
+            <a:avLst/>
+          </a:prstGeom>
+          <a:noFill/>
+        </p:spPr>
+        <p:txBody>
+          <a:bodyPr wrap="none" rtlCol="0">
+            <a:spAutoFit/>
+          </a:bodyPr>
+          <a:lstStyle/>
+          <a:p>
+            <a:r>
+              <a:rPr lang="es-ES" sz="2200" b="1" u="sng" dirty="0"/>
+              <a:t>Interfaz</a:t>
+            </a:r>
+          </a:p>
+        </p:txBody>
+      </p:sp>
+      <p:sp>
+        <p:nvSpPr>
+          <p:cNvPr id="46" name="CuadroTexto 45">
+            <a:extLst>
+              <a:ext uri="{FF2B5EF4-FFF2-40B4-BE49-F238E27FC236}">
+                <a16:creationId xmlns:a16="http://schemas.microsoft.com/office/drawing/2014/main" id="{7CAAC47A-D2EF-21F8-6E5A-20C7F123620E}"/>
+              </a:ext>
+            </a:extLst>
+          </p:cNvPr>
+          <p:cNvSpPr txBox="1"/>
+          <p:nvPr/>
+        </p:nvSpPr>
+        <p:spPr>
+          <a:xfrm>
+            <a:off x="10134175" y="5324370"/>
+            <a:ext cx="1234633" cy="430887"/>
+          </a:xfrm>
+          <a:prstGeom prst="rect">
+            <a:avLst/>
+          </a:prstGeom>
+          <a:noFill/>
+        </p:spPr>
+        <p:txBody>
+          <a:bodyPr wrap="none" rtlCol="0">
+            <a:spAutoFit/>
+          </a:bodyPr>
+          <a:lstStyle/>
+          <a:p>
+            <a:r>
+              <a:rPr lang="es-ES" sz="2200" b="1" u="sng" dirty="0"/>
+              <a:t>Lenguaje</a:t>
+            </a:r>
+          </a:p>
+        </p:txBody>
+      </p:sp>
+      <p:sp>
+        <p:nvSpPr>
+          <p:cNvPr id="48" name="CuadroTexto 47">
+            <a:extLst>
+              <a:ext uri="{FF2B5EF4-FFF2-40B4-BE49-F238E27FC236}">
+                <a16:creationId xmlns:a16="http://schemas.microsoft.com/office/drawing/2014/main" id="{73C15B33-6F19-C6B4-89AC-7D7CF5CB13AA}"/>
+              </a:ext>
+            </a:extLst>
+          </p:cNvPr>
+          <p:cNvSpPr txBox="1"/>
+          <p:nvPr/>
+        </p:nvSpPr>
+        <p:spPr>
+          <a:xfrm>
+            <a:off x="7232163" y="5321038"/>
+            <a:ext cx="1747658" cy="430887"/>
+          </a:xfrm>
+          <a:prstGeom prst="rect">
+            <a:avLst/>
+          </a:prstGeom>
+          <a:noFill/>
+        </p:spPr>
+        <p:txBody>
+          <a:bodyPr wrap="none" rtlCol="0">
+            <a:spAutoFit/>
+          </a:bodyPr>
+          <a:lstStyle/>
+          <a:p>
+            <a:r>
+              <a:rPr lang="es-ES" sz="2200" b="1" u="sng" dirty="0"/>
+              <a:t>Gestión Build</a:t>
+            </a:r>
+          </a:p>
+        </p:txBody>
+      </p:sp>
+      <p:sp>
+        <p:nvSpPr>
+          <p:cNvPr id="5" name="Rectángulo: esquinas redondeadas 4">
+            <a:extLst>
+              <a:ext uri="{FF2B5EF4-FFF2-40B4-BE49-F238E27FC236}">
+                <a16:creationId xmlns:a16="http://schemas.microsoft.com/office/drawing/2014/main" id="{C08D815E-169E-E70B-E60D-2ACF3FCBE168}"/>
               </a:ext>
             </a:extLst>
           </p:cNvPr>
@@ -12372,14 +13249,18 @@
         </p:nvSpPr>
         <p:spPr>
           <a:xfrm>
-            <a:off x="7735890" y="1871748"/>
-            <a:ext cx="3145708" cy="1644258"/>
-          </a:xfrm>
-          <a:prstGeom prst="rect">
+            <a:off x="186296" y="1822960"/>
+            <a:ext cx="1839992" cy="1632154"/>
+          </a:xfrm>
+          <a:prstGeom prst="roundRect">
             <a:avLst/>
           </a:prstGeom>
           <a:noFill/>
-          <a:ln w="57150"/>
+          <a:ln w="38100">
+            <a:solidFill>
+              <a:schemeClr val="accent6"/>
+            </a:solidFill>
+          </a:ln>
         </p:spPr>
         <p:style>
           <a:lnRef idx="2">
@@ -12408,61 +13289,30 @@
       </p:sp>
       <p:sp>
         <p:nvSpPr>
-          <p:cNvPr id="39" name="CuadroTexto 38">
-            <a:extLst>
-              <a:ext uri="{FF2B5EF4-FFF2-40B4-BE49-F238E27FC236}">
-                <a16:creationId xmlns:a16="http://schemas.microsoft.com/office/drawing/2014/main" id="{82087DC6-CC26-5AC5-4817-28250A72721C}"/>
-              </a:ext>
-            </a:extLst>
-          </p:cNvPr>
-          <p:cNvSpPr txBox="1"/>
-          <p:nvPr/>
-        </p:nvSpPr>
-        <p:spPr>
-          <a:xfrm>
-            <a:off x="8450405" y="1900744"/>
-            <a:ext cx="1806328" cy="430887"/>
-          </a:xfrm>
-          <a:prstGeom prst="rect">
+          <p:cNvPr id="6" name="Rectángulo: esquinas redondeadas 5">
+            <a:extLst>
+              <a:ext uri="{FF2B5EF4-FFF2-40B4-BE49-F238E27FC236}">
+                <a16:creationId xmlns:a16="http://schemas.microsoft.com/office/drawing/2014/main" id="{B5F073A4-7A3B-3155-08F6-93FE57E1D0A4}"/>
+              </a:ext>
+            </a:extLst>
+          </p:cNvPr>
+          <p:cNvSpPr/>
+          <p:nvPr/>
+        </p:nvSpPr>
+        <p:spPr>
+          <a:xfrm>
+            <a:off x="2138062" y="1822960"/>
+            <a:ext cx="3899165" cy="1632154"/>
+          </a:xfrm>
+          <a:prstGeom prst="roundRect">
             <a:avLst/>
           </a:prstGeom>
           <a:noFill/>
-        </p:spPr>
-        <p:txBody>
-          <a:bodyPr wrap="none" rtlCol="0">
-            <a:spAutoFit/>
-          </a:bodyPr>
-          <a:lstStyle/>
-          <a:p>
-            <a:r>
-              <a:rPr lang="es-ES" sz="2200" b="1" u="sng" dirty="0"/>
-              <a:t>Base de datos</a:t>
-            </a:r>
-          </a:p>
-        </p:txBody>
-      </p:sp>
-      <p:sp>
-        <p:nvSpPr>
-          <p:cNvPr id="41" name="Rectángulo 40">
-            <a:extLst>
-              <a:ext uri="{FF2B5EF4-FFF2-40B4-BE49-F238E27FC236}">
-                <a16:creationId xmlns:a16="http://schemas.microsoft.com/office/drawing/2014/main" id="{107B5874-A846-8743-7CFA-8007ADB06419}"/>
-              </a:ext>
-            </a:extLst>
-          </p:cNvPr>
-          <p:cNvSpPr/>
-          <p:nvPr/>
-        </p:nvSpPr>
-        <p:spPr>
-          <a:xfrm>
-            <a:off x="6961098" y="3640376"/>
-            <a:ext cx="2486379" cy="1530226"/>
-          </a:xfrm>
-          <a:prstGeom prst="rect">
-            <a:avLst/>
-          </a:prstGeom>
-          <a:noFill/>
-          <a:ln w="57150"/>
+          <a:ln w="38100">
+            <a:solidFill>
+              <a:srgbClr val="0095C0"/>
+            </a:solidFill>
+          </a:ln>
         </p:spPr>
         <p:style>
           <a:lnRef idx="2">
@@ -12491,96 +13341,32 @@
       </p:sp>
       <p:sp>
         <p:nvSpPr>
-          <p:cNvPr id="42" name="CuadroTexto 41">
-            <a:extLst>
-              <a:ext uri="{FF2B5EF4-FFF2-40B4-BE49-F238E27FC236}">
-                <a16:creationId xmlns:a16="http://schemas.microsoft.com/office/drawing/2014/main" id="{6D65E93B-9754-2891-96B9-93AC0FB59D9F}"/>
-              </a:ext>
-            </a:extLst>
-          </p:cNvPr>
-          <p:cNvSpPr txBox="1"/>
-          <p:nvPr/>
-        </p:nvSpPr>
-        <p:spPr>
-          <a:xfrm>
-            <a:off x="7276757" y="3639882"/>
-            <a:ext cx="1855060" cy="430887"/>
-          </a:xfrm>
-          <a:prstGeom prst="rect">
+          <p:cNvPr id="7" name="Rectángulo: esquinas redondeadas 6">
+            <a:extLst>
+              <a:ext uri="{FF2B5EF4-FFF2-40B4-BE49-F238E27FC236}">
+                <a16:creationId xmlns:a16="http://schemas.microsoft.com/office/drawing/2014/main" id="{7ABC0722-16C0-C1A9-152E-CE63FB4EEB99}"/>
+              </a:ext>
+            </a:extLst>
+          </p:cNvPr>
+          <p:cNvSpPr/>
+          <p:nvPr/>
+        </p:nvSpPr>
+        <p:spPr>
+          <a:xfrm>
+            <a:off x="768857" y="3546816"/>
+            <a:ext cx="2503101" cy="1632154"/>
+          </a:xfrm>
+          <a:prstGeom prst="roundRect">
             <a:avLst/>
           </a:prstGeom>
           <a:noFill/>
-        </p:spPr>
-        <p:txBody>
-          <a:bodyPr wrap="none" rtlCol="0">
-            <a:spAutoFit/>
-          </a:bodyPr>
-          <a:lstStyle/>
-          <a:p>
-            <a:r>
-              <a:rPr lang="es-ES" sz="2200" b="1" u="sng" dirty="0"/>
-              <a:t>Distribuciones</a:t>
-            </a:r>
-          </a:p>
-        </p:txBody>
-      </p:sp>
-      <p:sp>
-        <p:nvSpPr>
-          <p:cNvPr id="43" name="CuadroTexto 42">
-            <a:extLst>
-              <a:ext uri="{FF2B5EF4-FFF2-40B4-BE49-F238E27FC236}">
-                <a16:creationId xmlns:a16="http://schemas.microsoft.com/office/drawing/2014/main" id="{93200911-788A-9E77-674E-85766BC1A429}"/>
-              </a:ext>
-            </a:extLst>
-          </p:cNvPr>
-          <p:cNvSpPr txBox="1"/>
-          <p:nvPr/>
-        </p:nvSpPr>
-        <p:spPr>
-          <a:xfrm>
-            <a:off x="10072342" y="3622292"/>
-            <a:ext cx="1082925" cy="430887"/>
-          </a:xfrm>
-          <a:prstGeom prst="rect">
-            <a:avLst/>
-          </a:prstGeom>
-          <a:noFill/>
-        </p:spPr>
-        <p:txBody>
-          <a:bodyPr wrap="none" rtlCol="0">
-            <a:spAutoFit/>
-          </a:bodyPr>
-          <a:lstStyle/>
-          <a:p>
-            <a:r>
-              <a:rPr lang="es-ES" sz="2200" b="1" u="sng" dirty="0"/>
-              <a:t>Interfaz</a:t>
-            </a:r>
-          </a:p>
-        </p:txBody>
-      </p:sp>
-      <p:sp>
-        <p:nvSpPr>
-          <p:cNvPr id="44" name="Rectángulo 43">
-            <a:extLst>
-              <a:ext uri="{FF2B5EF4-FFF2-40B4-BE49-F238E27FC236}">
-                <a16:creationId xmlns:a16="http://schemas.microsoft.com/office/drawing/2014/main" id="{87FB1B85-D0FB-7786-FEDA-DDC218588CA5}"/>
-              </a:ext>
-            </a:extLst>
-          </p:cNvPr>
-          <p:cNvSpPr/>
-          <p:nvPr/>
-        </p:nvSpPr>
-        <p:spPr>
-          <a:xfrm>
-            <a:off x="9620268" y="3643808"/>
-            <a:ext cx="1945968" cy="1539516"/>
-          </a:xfrm>
-          <a:prstGeom prst="rect">
-            <a:avLst/>
-          </a:prstGeom>
-          <a:noFill/>
-          <a:ln w="57150"/>
+          <a:ln w="38100">
+            <a:solidFill>
+              <a:schemeClr val="accent2">
+                <a:lumMod val="75000"/>
+              </a:schemeClr>
+            </a:solidFill>
+          </a:ln>
         </p:spPr>
         <p:style>
           <a:lnRef idx="2">
@@ -12609,10 +13395,10 @@
       </p:sp>
       <p:sp>
         <p:nvSpPr>
-          <p:cNvPr id="45" name="Rectángulo 44">
-            <a:extLst>
-              <a:ext uri="{FF2B5EF4-FFF2-40B4-BE49-F238E27FC236}">
-                <a16:creationId xmlns:a16="http://schemas.microsoft.com/office/drawing/2014/main" id="{AF2A30B0-FDDB-28D2-9C8D-7CEE0F6728CF}"/>
+          <p:cNvPr id="8" name="Rectángulo: esquinas redondeadas 7">
+            <a:extLst>
+              <a:ext uri="{FF2B5EF4-FFF2-40B4-BE49-F238E27FC236}">
+                <a16:creationId xmlns:a16="http://schemas.microsoft.com/office/drawing/2014/main" id="{39786F88-1A80-E8DC-8D7C-4C320DEF451F}"/>
               </a:ext>
             </a:extLst>
           </p:cNvPr>
@@ -12621,14 +13407,18 @@
         </p:nvSpPr>
         <p:spPr>
           <a:xfrm>
-            <a:off x="9508688" y="5308710"/>
-            <a:ext cx="2440853" cy="1466944"/>
-          </a:xfrm>
-          <a:prstGeom prst="rect">
+            <a:off x="3436198" y="3538448"/>
+            <a:ext cx="1942335" cy="1632154"/>
+          </a:xfrm>
+          <a:prstGeom prst="roundRect">
             <a:avLst/>
           </a:prstGeom>
           <a:noFill/>
-          <a:ln w="57150"/>
+          <a:ln w="38100">
+            <a:solidFill>
+              <a:srgbClr val="05988A"/>
+            </a:solidFill>
+          </a:ln>
         </p:spPr>
         <p:style>
           <a:lnRef idx="2">
@@ -12657,61 +13447,30 @@
       </p:sp>
       <p:sp>
         <p:nvSpPr>
-          <p:cNvPr id="46" name="CuadroTexto 45">
-            <a:extLst>
-              <a:ext uri="{FF2B5EF4-FFF2-40B4-BE49-F238E27FC236}">
-                <a16:creationId xmlns:a16="http://schemas.microsoft.com/office/drawing/2014/main" id="{7CAAC47A-D2EF-21F8-6E5A-20C7F123620E}"/>
-              </a:ext>
-            </a:extLst>
-          </p:cNvPr>
-          <p:cNvSpPr txBox="1"/>
-          <p:nvPr/>
-        </p:nvSpPr>
-        <p:spPr>
-          <a:xfrm>
-            <a:off x="10134175" y="5324370"/>
-            <a:ext cx="1234633" cy="430887"/>
-          </a:xfrm>
-          <a:prstGeom prst="rect">
+          <p:cNvPr id="9" name="Rectángulo: esquinas redondeadas 8">
+            <a:extLst>
+              <a:ext uri="{FF2B5EF4-FFF2-40B4-BE49-F238E27FC236}">
+                <a16:creationId xmlns:a16="http://schemas.microsoft.com/office/drawing/2014/main" id="{EB21A6FA-954A-0C7F-6EE9-919DE940E877}"/>
+              </a:ext>
+            </a:extLst>
+          </p:cNvPr>
+          <p:cNvSpPr/>
+          <p:nvPr/>
+        </p:nvSpPr>
+        <p:spPr>
+          <a:xfrm>
+            <a:off x="82319" y="5270672"/>
+            <a:ext cx="3751965" cy="1504982"/>
+          </a:xfrm>
+          <a:prstGeom prst="roundRect">
             <a:avLst/>
           </a:prstGeom>
           <a:noFill/>
-        </p:spPr>
-        <p:txBody>
-          <a:bodyPr wrap="none" rtlCol="0">
-            <a:spAutoFit/>
-          </a:bodyPr>
-          <a:lstStyle/>
-          <a:p>
-            <a:r>
-              <a:rPr lang="es-ES" sz="2200" b="1" u="sng" dirty="0"/>
-              <a:t>Lenguaje</a:t>
-            </a:r>
-          </a:p>
-        </p:txBody>
-      </p:sp>
-      <p:sp>
-        <p:nvSpPr>
-          <p:cNvPr id="47" name="Rectángulo 46">
-            <a:extLst>
-              <a:ext uri="{FF2B5EF4-FFF2-40B4-BE49-F238E27FC236}">
-                <a16:creationId xmlns:a16="http://schemas.microsoft.com/office/drawing/2014/main" id="{A05F57A4-1CAD-29AF-24B5-55EC58C24BC4}"/>
-              </a:ext>
-            </a:extLst>
-          </p:cNvPr>
-          <p:cNvSpPr/>
-          <p:nvPr/>
-        </p:nvSpPr>
-        <p:spPr>
-          <a:xfrm>
-            <a:off x="6829501" y="5284798"/>
-            <a:ext cx="2530481" cy="1507871"/>
-          </a:xfrm>
-          <a:prstGeom prst="rect">
-            <a:avLst/>
-          </a:prstGeom>
-          <a:noFill/>
-          <a:ln w="57150"/>
+          <a:ln w="38100">
+            <a:solidFill>
+              <a:srgbClr val="01A71C"/>
+            </a:solidFill>
+          </a:ln>
         </p:spPr>
         <p:style>
           <a:lnRef idx="2">
@@ -12740,36 +13499,313 @@
       </p:sp>
       <p:sp>
         <p:nvSpPr>
-          <p:cNvPr id="48" name="CuadroTexto 47">
-            <a:extLst>
-              <a:ext uri="{FF2B5EF4-FFF2-40B4-BE49-F238E27FC236}">
-                <a16:creationId xmlns:a16="http://schemas.microsoft.com/office/drawing/2014/main" id="{73C15B33-6F19-C6B4-89AC-7D7CF5CB13AA}"/>
-              </a:ext>
-            </a:extLst>
-          </p:cNvPr>
-          <p:cNvSpPr txBox="1"/>
-          <p:nvPr/>
-        </p:nvSpPr>
-        <p:spPr>
-          <a:xfrm>
-            <a:off x="7232163" y="5321038"/>
-            <a:ext cx="1747658" cy="430887"/>
-          </a:xfrm>
-          <a:prstGeom prst="rect">
+          <p:cNvPr id="10" name="Rectángulo: esquinas redondeadas 9">
+            <a:extLst>
+              <a:ext uri="{FF2B5EF4-FFF2-40B4-BE49-F238E27FC236}">
+                <a16:creationId xmlns:a16="http://schemas.microsoft.com/office/drawing/2014/main" id="{E3DECBA3-A408-BFC9-213C-E370A5BF2C29}"/>
+              </a:ext>
+            </a:extLst>
+          </p:cNvPr>
+          <p:cNvSpPr/>
+          <p:nvPr/>
+        </p:nvSpPr>
+        <p:spPr>
+          <a:xfrm>
+            <a:off x="4079110" y="5264899"/>
+            <a:ext cx="1717555" cy="1533857"/>
+          </a:xfrm>
+          <a:prstGeom prst="roundRect">
             <a:avLst/>
           </a:prstGeom>
           <a:noFill/>
-        </p:spPr>
-        <p:txBody>
-          <a:bodyPr wrap="none" rtlCol="0">
-            <a:spAutoFit/>
-          </a:bodyPr>
-          <a:lstStyle/>
-          <a:p>
-            <a:r>
-              <a:rPr lang="es-ES" sz="2200" b="1" u="sng" dirty="0"/>
-              <a:t>Gestión Build</a:t>
-            </a:r>
+          <a:ln w="38100">
+            <a:solidFill>
+              <a:srgbClr val="FFC331"/>
+            </a:solidFill>
+          </a:ln>
+        </p:spPr>
+        <p:style>
+          <a:lnRef idx="2">
+            <a:schemeClr val="accent1">
+              <a:shade val="15000"/>
+            </a:schemeClr>
+          </a:lnRef>
+          <a:fillRef idx="1">
+            <a:schemeClr val="accent1"/>
+          </a:fillRef>
+          <a:effectRef idx="0">
+            <a:schemeClr val="accent1"/>
+          </a:effectRef>
+          <a:fontRef idx="minor">
+            <a:schemeClr val="lt1"/>
+          </a:fontRef>
+        </p:style>
+        <p:txBody>
+          <a:bodyPr rtlCol="0" anchor="ctr"/>
+          <a:lstStyle/>
+          <a:p>
+            <a:pPr algn="ctr"/>
+            <a:endParaRPr lang="es-ES"/>
+          </a:p>
+        </p:txBody>
+      </p:sp>
+      <p:sp>
+        <p:nvSpPr>
+          <p:cNvPr id="13" name="Rectángulo: esquinas redondeadas 12">
+            <a:extLst>
+              <a:ext uri="{FF2B5EF4-FFF2-40B4-BE49-F238E27FC236}">
+                <a16:creationId xmlns:a16="http://schemas.microsoft.com/office/drawing/2014/main" id="{D9B10429-1FED-A1D5-3EA5-21E3A6AC5DB2}"/>
+              </a:ext>
+            </a:extLst>
+          </p:cNvPr>
+          <p:cNvSpPr/>
+          <p:nvPr/>
+        </p:nvSpPr>
+        <p:spPr>
+          <a:xfrm>
+            <a:off x="7403986" y="1804050"/>
+            <a:ext cx="3899165" cy="1632154"/>
+          </a:xfrm>
+          <a:prstGeom prst="roundRect">
+            <a:avLst/>
+          </a:prstGeom>
+          <a:noFill/>
+          <a:ln w="38100">
+            <a:solidFill>
+              <a:srgbClr val="FFCA2B"/>
+            </a:solidFill>
+          </a:ln>
+        </p:spPr>
+        <p:style>
+          <a:lnRef idx="2">
+            <a:schemeClr val="accent1">
+              <a:shade val="15000"/>
+            </a:schemeClr>
+          </a:lnRef>
+          <a:fillRef idx="1">
+            <a:schemeClr val="accent1"/>
+          </a:fillRef>
+          <a:effectRef idx="0">
+            <a:schemeClr val="accent1"/>
+          </a:effectRef>
+          <a:fontRef idx="minor">
+            <a:schemeClr val="lt1"/>
+          </a:fontRef>
+        </p:style>
+        <p:txBody>
+          <a:bodyPr rtlCol="0" anchor="ctr"/>
+          <a:lstStyle/>
+          <a:p>
+            <a:pPr algn="ctr"/>
+            <a:endParaRPr lang="es-ES"/>
+          </a:p>
+        </p:txBody>
+      </p:sp>
+      <p:sp>
+        <p:nvSpPr>
+          <p:cNvPr id="14" name="Rectángulo: esquinas redondeadas 13">
+            <a:extLst>
+              <a:ext uri="{FF2B5EF4-FFF2-40B4-BE49-F238E27FC236}">
+                <a16:creationId xmlns:a16="http://schemas.microsoft.com/office/drawing/2014/main" id="{EB0244EE-D190-586A-826F-B32A66A4526B}"/>
+              </a:ext>
+            </a:extLst>
+          </p:cNvPr>
+          <p:cNvSpPr/>
+          <p:nvPr/>
+        </p:nvSpPr>
+        <p:spPr>
+          <a:xfrm>
+            <a:off x="6952735" y="3538448"/>
+            <a:ext cx="2503101" cy="1632154"/>
+          </a:xfrm>
+          <a:prstGeom prst="roundRect">
+            <a:avLst/>
+          </a:prstGeom>
+          <a:noFill/>
+          <a:ln w="38100">
+            <a:solidFill>
+              <a:srgbClr val="3DDC84"/>
+            </a:solidFill>
+          </a:ln>
+        </p:spPr>
+        <p:style>
+          <a:lnRef idx="2">
+            <a:schemeClr val="accent1">
+              <a:shade val="15000"/>
+            </a:schemeClr>
+          </a:lnRef>
+          <a:fillRef idx="1">
+            <a:schemeClr val="accent1"/>
+          </a:fillRef>
+          <a:effectRef idx="0">
+            <a:schemeClr val="accent1"/>
+          </a:effectRef>
+          <a:fontRef idx="minor">
+            <a:schemeClr val="lt1"/>
+          </a:fontRef>
+        </p:style>
+        <p:txBody>
+          <a:bodyPr rtlCol="0" anchor="ctr"/>
+          <a:lstStyle/>
+          <a:p>
+            <a:pPr algn="ctr"/>
+            <a:endParaRPr lang="es-ES"/>
+          </a:p>
+        </p:txBody>
+      </p:sp>
+      <p:sp>
+        <p:nvSpPr>
+          <p:cNvPr id="15" name="Rectángulo: esquinas redondeadas 14">
+            <a:extLst>
+              <a:ext uri="{FF2B5EF4-FFF2-40B4-BE49-F238E27FC236}">
+                <a16:creationId xmlns:a16="http://schemas.microsoft.com/office/drawing/2014/main" id="{C4613060-1B42-C6EB-4035-C872B4E9F68E}"/>
+              </a:ext>
+            </a:extLst>
+          </p:cNvPr>
+          <p:cNvSpPr/>
+          <p:nvPr/>
+        </p:nvSpPr>
+        <p:spPr>
+          <a:xfrm>
+            <a:off x="9590200" y="3541217"/>
+            <a:ext cx="1942335" cy="1632154"/>
+          </a:xfrm>
+          <a:prstGeom prst="roundRect">
+            <a:avLst/>
+          </a:prstGeom>
+          <a:noFill/>
+          <a:ln w="38100">
+            <a:solidFill>
+              <a:srgbClr val="05988A"/>
+            </a:solidFill>
+          </a:ln>
+        </p:spPr>
+        <p:style>
+          <a:lnRef idx="2">
+            <a:schemeClr val="accent1">
+              <a:shade val="15000"/>
+            </a:schemeClr>
+          </a:lnRef>
+          <a:fillRef idx="1">
+            <a:schemeClr val="accent1"/>
+          </a:fillRef>
+          <a:effectRef idx="0">
+            <a:schemeClr val="accent1"/>
+          </a:effectRef>
+          <a:fontRef idx="minor">
+            <a:schemeClr val="lt1"/>
+          </a:fontRef>
+        </p:style>
+        <p:txBody>
+          <a:bodyPr rtlCol="0" anchor="ctr"/>
+          <a:lstStyle/>
+          <a:p>
+            <a:pPr algn="ctr"/>
+            <a:endParaRPr lang="es-ES"/>
+          </a:p>
+        </p:txBody>
+      </p:sp>
+      <p:sp>
+        <p:nvSpPr>
+          <p:cNvPr id="16" name="Rectángulo: esquinas redondeadas 15">
+            <a:extLst>
+              <a:ext uri="{FF2B5EF4-FFF2-40B4-BE49-F238E27FC236}">
+                <a16:creationId xmlns:a16="http://schemas.microsoft.com/office/drawing/2014/main" id="{32B70F2B-8DBF-AE61-DBCC-87934C56A466}"/>
+              </a:ext>
+            </a:extLst>
+          </p:cNvPr>
+          <p:cNvSpPr/>
+          <p:nvPr/>
+        </p:nvSpPr>
+        <p:spPr>
+          <a:xfrm>
+            <a:off x="6868192" y="5272035"/>
+            <a:ext cx="2503101" cy="1495037"/>
+          </a:xfrm>
+          <a:prstGeom prst="roundRect">
+            <a:avLst/>
+          </a:prstGeom>
+          <a:noFill/>
+          <a:ln w="38100">
+            <a:solidFill>
+              <a:srgbClr val="02303A"/>
+            </a:solidFill>
+          </a:ln>
+        </p:spPr>
+        <p:style>
+          <a:lnRef idx="2">
+            <a:schemeClr val="accent1">
+              <a:shade val="15000"/>
+            </a:schemeClr>
+          </a:lnRef>
+          <a:fillRef idx="1">
+            <a:schemeClr val="accent1"/>
+          </a:fillRef>
+          <a:effectRef idx="0">
+            <a:schemeClr val="accent1"/>
+          </a:effectRef>
+          <a:fontRef idx="minor">
+            <a:schemeClr val="lt1"/>
+          </a:fontRef>
+        </p:style>
+        <p:txBody>
+          <a:bodyPr rtlCol="0" anchor="ctr"/>
+          <a:lstStyle/>
+          <a:p>
+            <a:pPr algn="ctr"/>
+            <a:endParaRPr lang="es-ES"/>
+          </a:p>
+        </p:txBody>
+      </p:sp>
+      <p:sp>
+        <p:nvSpPr>
+          <p:cNvPr id="18" name="Rectángulo: esquinas redondeadas 17">
+            <a:extLst>
+              <a:ext uri="{FF2B5EF4-FFF2-40B4-BE49-F238E27FC236}">
+                <a16:creationId xmlns:a16="http://schemas.microsoft.com/office/drawing/2014/main" id="{CEEAF9B3-5549-E6EE-24FB-3D4944A03BAC}"/>
+              </a:ext>
+            </a:extLst>
+          </p:cNvPr>
+          <p:cNvSpPr/>
+          <p:nvPr/>
+        </p:nvSpPr>
+        <p:spPr>
+          <a:xfrm>
+            <a:off x="9499940" y="5280617"/>
+            <a:ext cx="2503101" cy="1495037"/>
+          </a:xfrm>
+          <a:prstGeom prst="roundRect">
+            <a:avLst/>
+          </a:prstGeom>
+          <a:noFill/>
+          <a:ln w="38100">
+            <a:solidFill>
+              <a:srgbClr val="FB850D"/>
+            </a:solidFill>
+          </a:ln>
+        </p:spPr>
+        <p:style>
+          <a:lnRef idx="2">
+            <a:schemeClr val="accent1">
+              <a:shade val="15000"/>
+            </a:schemeClr>
+          </a:lnRef>
+          <a:fillRef idx="1">
+            <a:schemeClr val="accent1"/>
+          </a:fillRef>
+          <a:effectRef idx="0">
+            <a:schemeClr val="accent1"/>
+          </a:effectRef>
+          <a:fontRef idx="minor">
+            <a:schemeClr val="lt1"/>
+          </a:fontRef>
+        </p:style>
+        <p:txBody>
+          <a:bodyPr rtlCol="0" anchor="ctr"/>
+          <a:lstStyle/>
+          <a:p>
+            <a:pPr algn="ctr"/>
+            <a:endParaRPr lang="es-ES"/>
           </a:p>
         </p:txBody>
       </p:sp>
@@ -12937,51 +13973,6 @@
       </p:sp>
       <p:sp>
         <p:nvSpPr>
-          <p:cNvPr id="23" name="CuadroTexto 22">
-            <a:extLst>
-              <a:ext uri="{FF2B5EF4-FFF2-40B4-BE49-F238E27FC236}">
-                <a16:creationId xmlns:a16="http://schemas.microsoft.com/office/drawing/2014/main" id="{4F9E44F3-CA15-78E5-F94E-2651B31479B5}"/>
-              </a:ext>
-            </a:extLst>
-          </p:cNvPr>
-          <p:cNvSpPr txBox="1"/>
-          <p:nvPr/>
-        </p:nvSpPr>
-        <p:spPr>
-          <a:xfrm>
-            <a:off x="10783309" y="3316432"/>
-            <a:ext cx="1160190" cy="646331"/>
-          </a:xfrm>
-          <a:prstGeom prst="rect">
-            <a:avLst/>
-          </a:prstGeom>
-          <a:solidFill>
-            <a:srgbClr val="A121AF"/>
-          </a:solidFill>
-        </p:spPr>
-        <p:txBody>
-          <a:bodyPr wrap="square" rtlCol="0">
-            <a:spAutoFit/>
-          </a:bodyPr>
-          <a:lstStyle/>
-          <a:p>
-            <a:pPr algn="ctr"/>
-            <a:r>
-              <a:rPr lang="es-ES" dirty="0"/>
-              <a:t>App </a:t>
-            </a:r>
-          </a:p>
-          <a:p>
-            <a:pPr algn="ctr"/>
-            <a:r>
-              <a:rPr lang="es-ES" dirty="0"/>
-              <a:t>Wewiza</a:t>
-            </a:r>
-          </a:p>
-        </p:txBody>
-      </p:sp>
-      <p:sp>
-        <p:nvSpPr>
           <p:cNvPr id="26" name="Rectángulo 25">
             <a:extLst>
               <a:ext uri="{FF2B5EF4-FFF2-40B4-BE49-F238E27FC236}">
@@ -13088,7 +14079,7 @@
             <a:avLst/>
           </a:prstGeom>
           <a:solidFill>
-            <a:schemeClr val="accent4"/>
+            <a:srgbClr val="DB291B"/>
           </a:solidFill>
         </p:spPr>
         <p:txBody>
@@ -13098,7 +14089,11 @@
           <a:lstStyle/>
           <a:p>
             <a:r>
-              <a:rPr lang="es-ES" dirty="0"/>
+              <a:rPr lang="es-ES" dirty="0">
+                <a:solidFill>
+                  <a:schemeClr val="bg1"/>
+                </a:solidFill>
+              </a:rPr>
               <a:t>Servicio API – Market 2</a:t>
             </a:r>
           </a:p>
@@ -13417,7 +14412,7 @@
         </p:nvSpPr>
         <p:spPr>
           <a:xfrm>
-            <a:off x="9792113" y="3071285"/>
+            <a:off x="9720017" y="3071285"/>
             <a:ext cx="554960" cy="369332"/>
           </a:xfrm>
           <a:prstGeom prst="rect">
@@ -13589,8 +14584,13 @@
             <a:avLst/>
           </a:prstGeom>
           <a:solidFill>
-            <a:schemeClr val="accent2"/>
+            <a:srgbClr val="05988A"/>
           </a:solidFill>
+          <a:ln>
+            <a:solidFill>
+              <a:srgbClr val="3DDC84"/>
+            </a:solidFill>
+          </a:ln>
         </p:spPr>
         <p:txBody>
           <a:bodyPr wrap="square" rtlCol="0">
@@ -13600,14 +14600,22 @@
           <a:p>
             <a:pPr algn="ctr"/>
             <a:r>
-              <a:rPr lang="es-ES" dirty="0"/>
+              <a:rPr lang="es-ES" dirty="0">
+                <a:solidFill>
+                  <a:schemeClr val="bg1"/>
+                </a:solidFill>
+              </a:rPr>
               <a:t>Procesamiento de datos</a:t>
             </a:r>
           </a:p>
           <a:p>
             <a:pPr algn="ctr"/>
             <a:r>
-              <a:rPr lang="es-ES" dirty="0"/>
+              <a:rPr lang="es-ES" dirty="0">
+                <a:solidFill>
+                  <a:schemeClr val="bg1"/>
+                </a:solidFill>
+              </a:rPr>
               <a:t>API - Wewiza</a:t>
             </a:r>
           </a:p>
@@ -13754,44 +14762,6 @@
       </p:sp>
       <p:sp>
         <p:nvSpPr>
-          <p:cNvPr id="20" name="CuadroTexto 19">
-            <a:extLst>
-              <a:ext uri="{FF2B5EF4-FFF2-40B4-BE49-F238E27FC236}">
-                <a16:creationId xmlns:a16="http://schemas.microsoft.com/office/drawing/2014/main" id="{17250C0F-BC8A-B302-2E90-58ED7CF0492B}"/>
-              </a:ext>
-            </a:extLst>
-          </p:cNvPr>
-          <p:cNvSpPr txBox="1"/>
-          <p:nvPr/>
-        </p:nvSpPr>
-        <p:spPr>
-          <a:xfrm>
-            <a:off x="10795605" y="2144278"/>
-            <a:ext cx="1087185" cy="369332"/>
-          </a:xfrm>
-          <a:prstGeom prst="rect">
-            <a:avLst/>
-          </a:prstGeom>
-          <a:solidFill>
-            <a:srgbClr val="FFFF00"/>
-          </a:solidFill>
-        </p:spPr>
-        <p:txBody>
-          <a:bodyPr wrap="square" rtlCol="0">
-            <a:spAutoFit/>
-          </a:bodyPr>
-          <a:lstStyle/>
-          <a:p>
-            <a:pPr algn="ctr"/>
-            <a:r>
-              <a:rPr lang="es-ES" dirty="0"/>
-              <a:t>Firebase</a:t>
-            </a:r>
-          </a:p>
-        </p:txBody>
-      </p:sp>
-      <p:sp>
-        <p:nvSpPr>
           <p:cNvPr id="28" name="Flecha: hacia arriba 27">
             <a:extLst>
               <a:ext uri="{FF2B5EF4-FFF2-40B4-BE49-F238E27FC236}">
@@ -13884,44 +14854,6 @@
       </p:sp>
       <p:sp>
         <p:nvSpPr>
-          <p:cNvPr id="54" name="CuadroTexto 53">
-            <a:extLst>
-              <a:ext uri="{FF2B5EF4-FFF2-40B4-BE49-F238E27FC236}">
-                <a16:creationId xmlns:a16="http://schemas.microsoft.com/office/drawing/2014/main" id="{BFB39B3C-C0AC-814F-1FA5-0D14C71AB95D}"/>
-              </a:ext>
-            </a:extLst>
-          </p:cNvPr>
-          <p:cNvSpPr txBox="1"/>
-          <p:nvPr/>
-        </p:nvSpPr>
-        <p:spPr>
-          <a:xfrm>
-            <a:off x="6747137" y="4913544"/>
-            <a:ext cx="1548766" cy="369332"/>
-          </a:xfrm>
-          <a:prstGeom prst="rect">
-            <a:avLst/>
-          </a:prstGeom>
-          <a:solidFill>
-            <a:schemeClr val="accent6"/>
-          </a:solidFill>
-        </p:spPr>
-        <p:txBody>
-          <a:bodyPr wrap="square" rtlCol="0">
-            <a:spAutoFit/>
-          </a:bodyPr>
-          <a:lstStyle/>
-          <a:p>
-            <a:pPr algn="ctr"/>
-            <a:r>
-              <a:rPr lang="es-ES" dirty="0"/>
-              <a:t>DDBB NoSQL</a:t>
-            </a:r>
-          </a:p>
-        </p:txBody>
-      </p:sp>
-      <p:sp>
-        <p:nvSpPr>
           <p:cNvPr id="60" name="Rectángulo 59">
             <a:extLst>
               <a:ext uri="{FF2B5EF4-FFF2-40B4-BE49-F238E27FC236}">
@@ -13993,7 +14925,7 @@
             <a:avLst/>
           </a:prstGeom>
           <a:solidFill>
-            <a:schemeClr val="accent4"/>
+            <a:srgbClr val="DB291B"/>
           </a:solidFill>
         </p:spPr>
         <p:txBody>
@@ -14003,7 +14935,11 @@
           <a:lstStyle/>
           <a:p>
             <a:r>
-              <a:rPr lang="es-ES" dirty="0"/>
+              <a:rPr lang="es-ES" dirty="0">
+                <a:solidFill>
+                  <a:schemeClr val="bg1"/>
+                </a:solidFill>
+              </a:rPr>
               <a:t>Servicio API – Market 1</a:t>
             </a:r>
           </a:p>
@@ -14211,7 +15147,7 @@
             <a:avLst/>
           </a:prstGeom>
           <a:solidFill>
-            <a:schemeClr val="accent4"/>
+            <a:srgbClr val="DB291B"/>
           </a:solidFill>
         </p:spPr>
         <p:txBody>
@@ -14221,7 +15157,11 @@
           <a:lstStyle/>
           <a:p>
             <a:r>
-              <a:rPr lang="es-ES" dirty="0"/>
+              <a:rPr lang="es-ES" dirty="0">
+                <a:solidFill>
+                  <a:schemeClr val="bg1"/>
+                </a:solidFill>
+              </a:rPr>
               <a:t>Servicio API – Market 3</a:t>
             </a:r>
           </a:p>
@@ -15667,6 +16607,139 @@
           </a:prstGeom>
         </p:spPr>
       </p:pic>
+      <p:sp>
+        <p:nvSpPr>
+          <p:cNvPr id="3" name="CuadroTexto 2">
+            <a:extLst>
+              <a:ext uri="{FF2B5EF4-FFF2-40B4-BE49-F238E27FC236}">
+                <a16:creationId xmlns:a16="http://schemas.microsoft.com/office/drawing/2014/main" id="{28FA2FDC-A4E5-42CB-96DD-037D63B54C75}"/>
+              </a:ext>
+            </a:extLst>
+          </p:cNvPr>
+          <p:cNvSpPr txBox="1"/>
+          <p:nvPr/>
+        </p:nvSpPr>
+        <p:spPr>
+          <a:xfrm>
+            <a:off x="10783309" y="3316432"/>
+            <a:ext cx="1160190" cy="646331"/>
+          </a:xfrm>
+          <a:prstGeom prst="rect">
+            <a:avLst/>
+          </a:prstGeom>
+          <a:solidFill>
+            <a:srgbClr val="8B3AAC"/>
+          </a:solidFill>
+        </p:spPr>
+        <p:txBody>
+          <a:bodyPr wrap="square" rtlCol="0">
+            <a:spAutoFit/>
+          </a:bodyPr>
+          <a:lstStyle/>
+          <a:p>
+            <a:pPr algn="ctr"/>
+            <a:r>
+              <a:rPr lang="es-ES" dirty="0">
+                <a:solidFill>
+                  <a:schemeClr val="bg1"/>
+                </a:solidFill>
+              </a:rPr>
+              <a:t>App </a:t>
+            </a:r>
+          </a:p>
+          <a:p>
+            <a:pPr algn="ctr"/>
+            <a:r>
+              <a:rPr lang="es-ES" dirty="0">
+                <a:solidFill>
+                  <a:schemeClr val="bg1"/>
+                </a:solidFill>
+              </a:rPr>
+              <a:t>Wewiza</a:t>
+            </a:r>
+          </a:p>
+        </p:txBody>
+      </p:sp>
+      <p:sp>
+        <p:nvSpPr>
+          <p:cNvPr id="5" name="CuadroTexto 4">
+            <a:extLst>
+              <a:ext uri="{FF2B5EF4-FFF2-40B4-BE49-F238E27FC236}">
+                <a16:creationId xmlns:a16="http://schemas.microsoft.com/office/drawing/2014/main" id="{58F6AAA4-172A-3970-E770-2DA3E938DFC6}"/>
+              </a:ext>
+            </a:extLst>
+          </p:cNvPr>
+          <p:cNvSpPr txBox="1"/>
+          <p:nvPr/>
+        </p:nvSpPr>
+        <p:spPr>
+          <a:xfrm>
+            <a:off x="10795605" y="2144278"/>
+            <a:ext cx="1087185" cy="369332"/>
+          </a:xfrm>
+          <a:prstGeom prst="rect">
+            <a:avLst/>
+          </a:prstGeom>
+          <a:solidFill>
+            <a:srgbClr val="FFC331"/>
+          </a:solidFill>
+        </p:spPr>
+        <p:txBody>
+          <a:bodyPr wrap="square" rtlCol="0">
+            <a:spAutoFit/>
+          </a:bodyPr>
+          <a:lstStyle/>
+          <a:p>
+            <a:pPr algn="ctr"/>
+            <a:r>
+              <a:rPr lang="es-ES" dirty="0"/>
+              <a:t>Firebase</a:t>
+            </a:r>
+          </a:p>
+        </p:txBody>
+      </p:sp>
+      <p:sp>
+        <p:nvSpPr>
+          <p:cNvPr id="6" name="CuadroTexto 5">
+            <a:extLst>
+              <a:ext uri="{FF2B5EF4-FFF2-40B4-BE49-F238E27FC236}">
+                <a16:creationId xmlns:a16="http://schemas.microsoft.com/office/drawing/2014/main" id="{FFC4A861-92A1-FA0F-5773-4B5B1E276B29}"/>
+              </a:ext>
+            </a:extLst>
+          </p:cNvPr>
+          <p:cNvSpPr txBox="1"/>
+          <p:nvPr/>
+        </p:nvSpPr>
+        <p:spPr>
+          <a:xfrm>
+            <a:off x="6747137" y="4913544"/>
+            <a:ext cx="1548766" cy="369332"/>
+          </a:xfrm>
+          <a:prstGeom prst="rect">
+            <a:avLst/>
+          </a:prstGeom>
+          <a:solidFill>
+            <a:schemeClr val="accent6"/>
+          </a:solidFill>
+        </p:spPr>
+        <p:txBody>
+          <a:bodyPr wrap="square" rtlCol="0">
+            <a:spAutoFit/>
+          </a:bodyPr>
+          <a:lstStyle/>
+          <a:p>
+            <a:pPr algn="ctr"/>
+            <a:r>
+              <a:rPr lang="es-ES" dirty="0">
+                <a:solidFill>
+                  <a:schemeClr val="bg1"/>
+                </a:solidFill>
+              </a:rPr>
+              <a:t>DDBB NoSQL</a:t>
+            </a:r>
+          </a:p>
+        </p:txBody>
+      </p:sp>
     </p:spTree>
     <p:extLst>
       <p:ext uri="{BB962C8B-B14F-4D97-AF65-F5344CB8AC3E}">
@@ -15947,8 +17020,13 @@
             <a:avLst/>
           </a:prstGeom>
           <a:solidFill>
-            <a:schemeClr val="accent4"/>
+            <a:srgbClr val="DB291B"/>
           </a:solidFill>
+          <a:ln>
+            <a:solidFill>
+              <a:srgbClr val="DB291B"/>
+            </a:solidFill>
+          </a:ln>
         </p:spPr>
         <p:txBody>
           <a:bodyPr wrap="square" rtlCol="0">
@@ -15957,7 +17035,11 @@
           <a:lstStyle/>
           <a:p>
             <a:r>
-              <a:rPr lang="es-ES" dirty="0"/>
+              <a:rPr lang="es-ES" dirty="0">
+                <a:solidFill>
+                  <a:schemeClr val="bg1"/>
+                </a:solidFill>
+              </a:rPr>
               <a:t>Servicio API - Market</a:t>
             </a:r>
           </a:p>
@@ -16202,7 +17284,7 @@
             <a:avLst/>
           </a:prstGeom>
           <a:solidFill>
-            <a:srgbClr val="FF0000"/>
+            <a:srgbClr val="DB291B"/>
           </a:solidFill>
         </p:spPr>
         <p:txBody>
@@ -16211,8 +17293,13 @@
           </a:bodyPr>
           <a:lstStyle/>
           <a:p>
-            <a:r>
-              <a:rPr lang="es-ES" dirty="0"/>
+            <a:pPr algn="ctr"/>
+            <a:r>
+              <a:rPr lang="es-ES" dirty="0">
+                <a:solidFill>
+                  <a:schemeClr val="bg1"/>
+                </a:solidFill>
+              </a:rPr>
               <a:t>Página web</a:t>
             </a:r>
           </a:p>
@@ -16502,44 +17589,6 @@
             <a:r>
               <a:rPr lang="es-ES" dirty="0"/>
               <a:t>Insertamos</a:t>
-            </a:r>
-          </a:p>
-        </p:txBody>
-      </p:sp>
-      <p:sp>
-        <p:nvSpPr>
-          <p:cNvPr id="67" name="CuadroTexto 66">
-            <a:extLst>
-              <a:ext uri="{FF2B5EF4-FFF2-40B4-BE49-F238E27FC236}">
-                <a16:creationId xmlns:a16="http://schemas.microsoft.com/office/drawing/2014/main" id="{95F35566-FD28-BDEC-0EC0-72CC34CD83F0}"/>
-              </a:ext>
-            </a:extLst>
-          </p:cNvPr>
-          <p:cNvSpPr txBox="1"/>
-          <p:nvPr/>
-        </p:nvSpPr>
-        <p:spPr>
-          <a:xfrm>
-            <a:off x="2544172" y="3002517"/>
-            <a:ext cx="1552229" cy="369332"/>
-          </a:xfrm>
-          <a:prstGeom prst="rect">
-            <a:avLst/>
-          </a:prstGeom>
-          <a:solidFill>
-            <a:schemeClr val="accent6"/>
-          </a:solidFill>
-        </p:spPr>
-        <p:txBody>
-          <a:bodyPr wrap="square" rtlCol="0">
-            <a:spAutoFit/>
-          </a:bodyPr>
-          <a:lstStyle/>
-          <a:p>
-            <a:pPr algn="ctr"/>
-            <a:r>
-              <a:rPr lang="es-ES" dirty="0"/>
-              <a:t>DDBB NoSQL </a:t>
             </a:r>
           </a:p>
         </p:txBody>
@@ -17047,7 +18096,7 @@
             <a:avLst/>
           </a:prstGeom>
           <a:solidFill>
-            <a:srgbClr val="A121AF"/>
+            <a:srgbClr val="8B3AAC"/>
           </a:solidFill>
         </p:spPr>
         <p:txBody>
@@ -17058,14 +18107,22 @@
           <a:p>
             <a:pPr algn="ctr"/>
             <a:r>
-              <a:rPr lang="es-ES" dirty="0"/>
+              <a:rPr lang="es-ES" dirty="0">
+                <a:solidFill>
+                  <a:schemeClr val="bg1"/>
+                </a:solidFill>
+              </a:rPr>
               <a:t>App </a:t>
             </a:r>
           </a:p>
           <a:p>
             <a:pPr algn="ctr"/>
             <a:r>
-              <a:rPr lang="es-ES" dirty="0"/>
+              <a:rPr lang="es-ES" dirty="0">
+                <a:solidFill>
+                  <a:schemeClr val="bg1"/>
+                </a:solidFill>
+              </a:rPr>
               <a:t>Wewiza</a:t>
             </a:r>
           </a:p>
@@ -17160,42 +18217,6 @@
       </p:sp>
       <p:sp>
         <p:nvSpPr>
-          <p:cNvPr id="129" name="CuadroTexto 128">
-            <a:extLst>
-              <a:ext uri="{FF2B5EF4-FFF2-40B4-BE49-F238E27FC236}">
-                <a16:creationId xmlns:a16="http://schemas.microsoft.com/office/drawing/2014/main" id="{B272F11A-CBA2-AA3E-B3DA-3E33A215987B}"/>
-              </a:ext>
-            </a:extLst>
-          </p:cNvPr>
-          <p:cNvSpPr txBox="1"/>
-          <p:nvPr/>
-        </p:nvSpPr>
-        <p:spPr>
-          <a:xfrm>
-            <a:off x="9761049" y="3081358"/>
-            <a:ext cx="554960" cy="369332"/>
-          </a:xfrm>
-          <a:prstGeom prst="rect">
-            <a:avLst/>
-          </a:prstGeom>
-          <a:noFill/>
-        </p:spPr>
-        <p:txBody>
-          <a:bodyPr wrap="none" rtlCol="0">
-            <a:spAutoFit/>
-          </a:bodyPr>
-          <a:lstStyle/>
-          <a:p>
-            <a:pPr algn="ctr"/>
-            <a:r>
-              <a:rPr lang="es-ES" dirty="0"/>
-              <a:t>GET</a:t>
-            </a:r>
-          </a:p>
-        </p:txBody>
-      </p:sp>
-      <p:sp>
-        <p:nvSpPr>
           <p:cNvPr id="130" name="CuadroTexto 129">
             <a:extLst>
               <a:ext uri="{FF2B5EF4-FFF2-40B4-BE49-F238E27FC236}">
@@ -17344,8 +18365,13 @@
             <a:avLst/>
           </a:prstGeom>
           <a:solidFill>
-            <a:schemeClr val="accent2"/>
+            <a:srgbClr val="05988A"/>
           </a:solidFill>
+          <a:ln>
+            <a:solidFill>
+              <a:srgbClr val="05988A"/>
+            </a:solidFill>
+          </a:ln>
         </p:spPr>
         <p:txBody>
           <a:bodyPr wrap="square" rtlCol="0">
@@ -17355,14 +18381,22 @@
           <a:p>
             <a:pPr algn="ctr"/>
             <a:r>
-              <a:rPr lang="es-ES" dirty="0"/>
+              <a:rPr lang="es-ES" dirty="0">
+                <a:solidFill>
+                  <a:schemeClr val="bg1"/>
+                </a:solidFill>
+              </a:rPr>
               <a:t>Procesamiento de datos</a:t>
             </a:r>
           </a:p>
           <a:p>
             <a:pPr algn="ctr"/>
             <a:r>
-              <a:rPr lang="es-ES" dirty="0"/>
+              <a:rPr lang="es-ES" dirty="0">
+                <a:solidFill>
+                  <a:schemeClr val="bg1"/>
+                </a:solidFill>
+              </a:rPr>
               <a:t>API - Wewiza</a:t>
             </a:r>
           </a:p>
@@ -17528,7 +18562,7 @@
             <a:avLst/>
           </a:prstGeom>
           <a:solidFill>
-            <a:srgbClr val="FFFF00"/>
+            <a:srgbClr val="FFC331"/>
           </a:solidFill>
         </p:spPr>
         <p:txBody>
@@ -17669,7 +18703,11 @@
           <a:p>
             <a:pPr algn="ctr"/>
             <a:r>
-              <a:rPr lang="es-ES" dirty="0"/>
+              <a:rPr lang="es-ES" dirty="0">
+                <a:solidFill>
+                  <a:schemeClr val="bg1"/>
+                </a:solidFill>
+              </a:rPr>
               <a:t>DDBB NoSQL</a:t>
             </a:r>
           </a:p>
@@ -18412,6 +19450,84 @@
           </a:prstGeom>
         </p:spPr>
       </p:pic>
+      <p:sp>
+        <p:nvSpPr>
+          <p:cNvPr id="4" name="CuadroTexto 3">
+            <a:extLst>
+              <a:ext uri="{FF2B5EF4-FFF2-40B4-BE49-F238E27FC236}">
+                <a16:creationId xmlns:a16="http://schemas.microsoft.com/office/drawing/2014/main" id="{2F47C4D0-4F43-E1CE-43C6-7A5CA7089A9C}"/>
+              </a:ext>
+            </a:extLst>
+          </p:cNvPr>
+          <p:cNvSpPr txBox="1"/>
+          <p:nvPr/>
+        </p:nvSpPr>
+        <p:spPr>
+          <a:xfrm>
+            <a:off x="9720017" y="3071285"/>
+            <a:ext cx="554960" cy="369332"/>
+          </a:xfrm>
+          <a:prstGeom prst="rect">
+            <a:avLst/>
+          </a:prstGeom>
+          <a:noFill/>
+        </p:spPr>
+        <p:txBody>
+          <a:bodyPr wrap="none" rtlCol="0">
+            <a:spAutoFit/>
+          </a:bodyPr>
+          <a:lstStyle/>
+          <a:p>
+            <a:pPr algn="ctr"/>
+            <a:r>
+              <a:rPr lang="es-ES" dirty="0"/>
+              <a:t>GET</a:t>
+            </a:r>
+          </a:p>
+        </p:txBody>
+      </p:sp>
+      <p:sp>
+        <p:nvSpPr>
+          <p:cNvPr id="5" name="CuadroTexto 4">
+            <a:extLst>
+              <a:ext uri="{FF2B5EF4-FFF2-40B4-BE49-F238E27FC236}">
+                <a16:creationId xmlns:a16="http://schemas.microsoft.com/office/drawing/2014/main" id="{A7F41325-B6BA-1FF1-72D3-C7DB25502E65}"/>
+              </a:ext>
+            </a:extLst>
+          </p:cNvPr>
+          <p:cNvSpPr txBox="1"/>
+          <p:nvPr/>
+        </p:nvSpPr>
+        <p:spPr>
+          <a:xfrm>
+            <a:off x="2548434" y="2990466"/>
+            <a:ext cx="1548766" cy="369332"/>
+          </a:xfrm>
+          <a:prstGeom prst="rect">
+            <a:avLst/>
+          </a:prstGeom>
+          <a:solidFill>
+            <a:schemeClr val="accent6"/>
+          </a:solidFill>
+        </p:spPr>
+        <p:txBody>
+          <a:bodyPr wrap="square" rtlCol="0">
+            <a:spAutoFit/>
+          </a:bodyPr>
+          <a:lstStyle/>
+          <a:p>
+            <a:pPr algn="ctr"/>
+            <a:r>
+              <a:rPr lang="es-ES" dirty="0">
+                <a:solidFill>
+                  <a:schemeClr val="bg1"/>
+                </a:solidFill>
+              </a:rPr>
+              <a:t>DDBB NoSQL</a:t>
+            </a:r>
+          </a:p>
+        </p:txBody>
+      </p:sp>
     </p:spTree>
     <p:extLst>
       <p:ext uri="{BB962C8B-B14F-4D97-AF65-F5344CB8AC3E}">

</xml_diff>